<commit_message>
update missing facilities feature in readme and presentation
</commit_message>
<xml_diff>
--- a/presentation/Bangkok Housing Price Prediction for buyers and sellers.pptx
+++ b/presentation/Bangkok Housing Price Prediction for buyers and sellers.pptx
@@ -4915,12 +4915,95 @@
           <a:chExt cx="0" cy="0"/>
         </a:xfrm>
       </p:grpSpPr>
+      <p:sp>
+        <p:nvSpPr>
+          <p:cNvPr id="2" name="Title 1">
+            <a:extLst>
+              <a:ext uri="{FF2B5EF4-FFF2-40B4-BE49-F238E27FC236}">
+                <a16:creationId xmlns:a16="http://schemas.microsoft.com/office/drawing/2014/main" id="{85509D40-1E08-D5EF-A550-4F2859839975}"/>
+              </a:ext>
+            </a:extLst>
+          </p:cNvPr>
+          <p:cNvSpPr>
+            <a:spLocks noGrp="1"/>
+          </p:cNvSpPr>
+          <p:nvPr>
+            <p:ph type="title"/>
+          </p:nvPr>
+        </p:nvSpPr>
+        <p:spPr>
+          <a:xfrm>
+            <a:off x="839788" y="457199"/>
+            <a:ext cx="3932237" cy="5899149"/>
+          </a:xfrm>
+        </p:spPr>
+        <p:txBody>
+          <a:bodyPr anchor="ctr">
+            <a:normAutofit/>
+          </a:bodyPr>
+          <a:lstStyle/>
+          <a:p>
+            <a:pPr algn="ctr"/>
+            <a:r>
+              <a:rPr lang="en-US" b="1" dirty="0"/>
+              <a:t>The data:</a:t>
+            </a:r>
+            <a:br>
+              <a:rPr lang="en-US" b="1" dirty="0"/>
+            </a:br>
+            <a:br>
+              <a:rPr lang="en-US" b="1" dirty="0"/>
+            </a:br>
+            <a:r>
+              <a:rPr lang="en-US" sz="4000" b="1" dirty="0"/>
+              <a:t>Bangkok</a:t>
+            </a:r>
+            <a:br>
+              <a:rPr lang="en-US" sz="4000" b="1" dirty="0"/>
+            </a:br>
+            <a:r>
+              <a:rPr lang="en-US" sz="4000" b="1" dirty="0"/>
+              <a:t>Housing Price</a:t>
+            </a:r>
+            <a:endParaRPr lang="en-US" b="1" dirty="0"/>
+          </a:p>
+        </p:txBody>
+      </p:sp>
+      <p:sp>
+        <p:nvSpPr>
+          <p:cNvPr id="17" name="Slide Number Placeholder 16">
+            <a:extLst>
+              <a:ext uri="{FF2B5EF4-FFF2-40B4-BE49-F238E27FC236}">
+                <a16:creationId xmlns:a16="http://schemas.microsoft.com/office/drawing/2014/main" id="{1793876B-EEDF-C521-6907-7C11DC9CDAA5}"/>
+              </a:ext>
+            </a:extLst>
+          </p:cNvPr>
+          <p:cNvSpPr>
+            <a:spLocks noGrp="1"/>
+          </p:cNvSpPr>
+          <p:nvPr>
+            <p:ph type="sldNum" sz="quarter" idx="12"/>
+          </p:nvPr>
+        </p:nvSpPr>
+        <p:spPr/>
+        <p:txBody>
+          <a:bodyPr/>
+          <a:lstStyle/>
+          <a:p>
+            <a:fld id="{640C5978-D207-4356-A33B-DAFE34A7F8D2}" type="slidenum">
+              <a:rPr lang="en-US" smtClean="0"/>
+              <a:t>3</a:t>
+            </a:fld>
+            <a:endParaRPr lang="en-US" dirty="0"/>
+          </a:p>
+        </p:txBody>
+      </p:sp>
       <p:pic>
         <p:nvPicPr>
-          <p:cNvPr id="5" name="Picture 4">
-            <a:extLst>
-              <a:ext uri="{FF2B5EF4-FFF2-40B4-BE49-F238E27FC236}">
-                <a16:creationId xmlns:a16="http://schemas.microsoft.com/office/drawing/2014/main" id="{13F93E51-30A8-9A86-9C0F-C8A89A3F0353}"/>
+          <p:cNvPr id="6" name="Picture 5">
+            <a:extLst>
+              <a:ext uri="{FF2B5EF4-FFF2-40B4-BE49-F238E27FC236}">
+                <a16:creationId xmlns:a16="http://schemas.microsoft.com/office/drawing/2014/main" id="{6AA823C4-D25D-6154-A6FF-92815A7F9380}"/>
               </a:ext>
             </a:extLst>
           </p:cNvPr>
@@ -4937,8 +5020,8 @@
         </p:blipFill>
         <p:spPr>
           <a:xfrm>
-            <a:off x="5316791" y="0"/>
-            <a:ext cx="6875209" cy="6858000"/>
+            <a:off x="5657804" y="194"/>
+            <a:ext cx="6534196" cy="6858000"/>
           </a:xfrm>
           <a:prstGeom prst="rect">
             <a:avLst/>
@@ -4947,103 +5030,20 @@
       </p:pic>
       <p:sp>
         <p:nvSpPr>
-          <p:cNvPr id="2" name="Title 1">
-            <a:extLst>
-              <a:ext uri="{FF2B5EF4-FFF2-40B4-BE49-F238E27FC236}">
-                <a16:creationId xmlns:a16="http://schemas.microsoft.com/office/drawing/2014/main" id="{85509D40-1E08-D5EF-A550-4F2859839975}"/>
-              </a:ext>
-            </a:extLst>
-          </p:cNvPr>
-          <p:cNvSpPr>
-            <a:spLocks noGrp="1"/>
-          </p:cNvSpPr>
-          <p:nvPr>
-            <p:ph type="title"/>
-          </p:nvPr>
+          <p:cNvPr id="3" name="Rectangle 2">
+            <a:extLst>
+              <a:ext uri="{FF2B5EF4-FFF2-40B4-BE49-F238E27FC236}">
+                <a16:creationId xmlns:a16="http://schemas.microsoft.com/office/drawing/2014/main" id="{E28F38A9-F1D9-FB94-F424-1A6F77FEC491}"/>
+              </a:ext>
+            </a:extLst>
+          </p:cNvPr>
+          <p:cNvSpPr/>
+          <p:nvPr/>
         </p:nvSpPr>
         <p:spPr>
           <a:xfrm>
-            <a:off x="839788" y="457199"/>
-            <a:ext cx="3932237" cy="5899149"/>
-          </a:xfrm>
-        </p:spPr>
-        <p:txBody>
-          <a:bodyPr anchor="ctr">
-            <a:normAutofit/>
-          </a:bodyPr>
-          <a:lstStyle/>
-          <a:p>
-            <a:pPr algn="ctr"/>
-            <a:r>
-              <a:rPr lang="en-US" b="1" dirty="0"/>
-              <a:t>The data:</a:t>
-            </a:r>
-            <a:br>
-              <a:rPr lang="en-US" b="1" dirty="0"/>
-            </a:br>
-            <a:br>
-              <a:rPr lang="en-US" b="1" dirty="0"/>
-            </a:br>
-            <a:r>
-              <a:rPr lang="en-US" sz="4000" b="1" dirty="0"/>
-              <a:t>Bangkok</a:t>
-            </a:r>
-            <a:br>
-              <a:rPr lang="en-US" sz="4000" b="1" dirty="0"/>
-            </a:br>
-            <a:r>
-              <a:rPr lang="en-US" sz="4000" b="1" dirty="0"/>
-              <a:t>Housing Price</a:t>
-            </a:r>
-            <a:endParaRPr lang="en-US" b="1" dirty="0"/>
-          </a:p>
-        </p:txBody>
-      </p:sp>
-      <p:sp>
-        <p:nvSpPr>
-          <p:cNvPr id="17" name="Slide Number Placeholder 16">
-            <a:extLst>
-              <a:ext uri="{FF2B5EF4-FFF2-40B4-BE49-F238E27FC236}">
-                <a16:creationId xmlns:a16="http://schemas.microsoft.com/office/drawing/2014/main" id="{1793876B-EEDF-C521-6907-7C11DC9CDAA5}"/>
-              </a:ext>
-            </a:extLst>
-          </p:cNvPr>
-          <p:cNvSpPr>
-            <a:spLocks noGrp="1"/>
-          </p:cNvSpPr>
-          <p:nvPr>
-            <p:ph type="sldNum" sz="quarter" idx="12"/>
-          </p:nvPr>
-        </p:nvSpPr>
-        <p:spPr/>
-        <p:txBody>
-          <a:bodyPr/>
-          <a:lstStyle/>
-          <a:p>
-            <a:fld id="{640C5978-D207-4356-A33B-DAFE34A7F8D2}" type="slidenum">
-              <a:rPr lang="en-US" smtClean="0"/>
-              <a:t>3</a:t>
-            </a:fld>
-            <a:endParaRPr lang="en-US" dirty="0"/>
-          </a:p>
-        </p:txBody>
-      </p:sp>
-      <p:sp>
-        <p:nvSpPr>
-          <p:cNvPr id="3" name="Rectangle 2">
-            <a:extLst>
-              <a:ext uri="{FF2B5EF4-FFF2-40B4-BE49-F238E27FC236}">
-                <a16:creationId xmlns:a16="http://schemas.microsoft.com/office/drawing/2014/main" id="{E28F38A9-F1D9-FB94-F424-1A6F77FEC491}"/>
-              </a:ext>
-            </a:extLst>
-          </p:cNvPr>
-          <p:cNvSpPr/>
-          <p:nvPr/>
-        </p:nvSpPr>
-        <p:spPr>
-          <a:xfrm>
-            <a:off x="5316792" y="6512767"/>
-            <a:ext cx="4355140" cy="326377"/>
+            <a:off x="5659692" y="6512767"/>
+            <a:ext cx="3284283" cy="326377"/>
           </a:xfrm>
           <a:prstGeom prst="rect">
             <a:avLst/>
@@ -5126,7 +5126,12 @@
             <p:ph type="title"/>
           </p:nvPr>
         </p:nvSpPr>
-        <p:spPr/>
+        <p:spPr>
+          <a:xfrm>
+            <a:off x="838200" y="336550"/>
+            <a:ext cx="10515600" cy="1325563"/>
+          </a:xfrm>
+        </p:spPr>
         <p:txBody>
           <a:bodyPr/>
           <a:lstStyle/>
@@ -5139,21 +5144,153 @@
           </a:p>
         </p:txBody>
       </p:sp>
+      <p:sp>
+        <p:nvSpPr>
+          <p:cNvPr id="17" name="Content Placeholder 16">
+            <a:extLst>
+              <a:ext uri="{FF2B5EF4-FFF2-40B4-BE49-F238E27FC236}">
+                <a16:creationId xmlns:a16="http://schemas.microsoft.com/office/drawing/2014/main" id="{DB6201FB-F51B-E4D7-DED1-7417FA2E2B11}"/>
+              </a:ext>
+            </a:extLst>
+          </p:cNvPr>
+          <p:cNvSpPr>
+            <a:spLocks noGrp="1"/>
+          </p:cNvSpPr>
+          <p:nvPr>
+            <p:ph sz="half" idx="2"/>
+          </p:nvPr>
+        </p:nvSpPr>
+        <p:spPr>
+          <a:xfrm>
+            <a:off x="838200" y="1825625"/>
+            <a:ext cx="4097694" cy="4351338"/>
+          </a:xfrm>
+        </p:spPr>
+        <p:txBody>
+          <a:bodyPr>
+            <a:normAutofit/>
+          </a:bodyPr>
+          <a:lstStyle/>
+          <a:p>
+            <a:pPr marL="0" indent="0">
+              <a:buNone/>
+            </a:pPr>
+            <a:r>
+              <a:rPr lang="en-US" b="1" dirty="0">
+                <a:solidFill>
+                  <a:srgbClr val="C00000"/>
+                </a:solidFill>
+              </a:rPr>
+              <a:t>Useless</a:t>
+            </a:r>
+          </a:p>
+          <a:p>
+            <a:pPr lvl="1"/>
+            <a:r>
+              <a:rPr lang="en-US" dirty="0"/>
+              <a:t>Id</a:t>
+            </a:r>
+          </a:p>
+          <a:p>
+            <a:pPr lvl="1"/>
+            <a:r>
+              <a:rPr lang="en-US" dirty="0"/>
+              <a:t>Month built</a:t>
+            </a:r>
+          </a:p>
+          <a:p>
+            <a:pPr lvl="1"/>
+            <a:r>
+              <a:rPr lang="en-US" dirty="0"/>
+              <a:t>Address</a:t>
+            </a:r>
+          </a:p>
+          <a:p>
+            <a:pPr lvl="1"/>
+            <a:endParaRPr lang="en-US" dirty="0"/>
+          </a:p>
+          <a:p>
+            <a:pPr marL="0" indent="0">
+              <a:buNone/>
+            </a:pPr>
+            <a:r>
+              <a:rPr lang="en-US" b="1" dirty="0">
+                <a:solidFill>
+                  <a:schemeClr val="accent1"/>
+                </a:solidFill>
+              </a:rPr>
+              <a:t>Redundant</a:t>
+            </a:r>
+          </a:p>
+          <a:p>
+            <a:pPr lvl="1"/>
+            <a:r>
+              <a:rPr lang="en-US" dirty="0"/>
+              <a:t>Province</a:t>
+            </a:r>
+          </a:p>
+          <a:p>
+            <a:pPr lvl="1"/>
+            <a:r>
+              <a:rPr lang="en-US" dirty="0"/>
+              <a:t>Latitude</a:t>
+            </a:r>
+          </a:p>
+          <a:p>
+            <a:pPr lvl="1"/>
+            <a:r>
+              <a:rPr lang="en-US" dirty="0"/>
+              <a:t>Longitude</a:t>
+            </a:r>
+          </a:p>
+          <a:p>
+            <a:pPr lvl="1"/>
+            <a:endParaRPr lang="en-US" dirty="0"/>
+          </a:p>
+        </p:txBody>
+      </p:sp>
+      <p:sp>
+        <p:nvSpPr>
+          <p:cNvPr id="5" name="Slide Number Placeholder 4">
+            <a:extLst>
+              <a:ext uri="{FF2B5EF4-FFF2-40B4-BE49-F238E27FC236}">
+                <a16:creationId xmlns:a16="http://schemas.microsoft.com/office/drawing/2014/main" id="{841260C9-E28D-04EB-2C04-2A3968A06CB0}"/>
+              </a:ext>
+            </a:extLst>
+          </p:cNvPr>
+          <p:cNvSpPr>
+            <a:spLocks noGrp="1"/>
+          </p:cNvSpPr>
+          <p:nvPr>
+            <p:ph type="sldNum" sz="quarter" idx="12"/>
+          </p:nvPr>
+        </p:nvSpPr>
+        <p:spPr/>
+        <p:txBody>
+          <a:bodyPr/>
+          <a:lstStyle/>
+          <a:p>
+            <a:fld id="{640C5978-D207-4356-A33B-DAFE34A7F8D2}" type="slidenum">
+              <a:rPr lang="en-US" smtClean="0"/>
+              <a:t>4</a:t>
+            </a:fld>
+            <a:endParaRPr lang="en-US"/>
+          </a:p>
+        </p:txBody>
+      </p:sp>
       <p:pic>
         <p:nvPicPr>
-          <p:cNvPr id="14" name="Content Placeholder 13">
-            <a:extLst>
-              <a:ext uri="{FF2B5EF4-FFF2-40B4-BE49-F238E27FC236}">
-                <a16:creationId xmlns:a16="http://schemas.microsoft.com/office/drawing/2014/main" id="{A43601FB-181B-F12A-458D-ECAA62C07A29}"/>
+          <p:cNvPr id="8" name="Picture 7">
+            <a:extLst>
+              <a:ext uri="{FF2B5EF4-FFF2-40B4-BE49-F238E27FC236}">
+                <a16:creationId xmlns:a16="http://schemas.microsoft.com/office/drawing/2014/main" id="{EA1A8507-B9DC-8495-686B-D96C79AE7B8F}"/>
               </a:ext>
             </a:extLst>
           </p:cNvPr>
           <p:cNvPicPr>
-            <a:picLocks noGrp="1" noChangeAspect="1"/>
+            <a:picLocks noChangeAspect="1"/>
           </p:cNvPicPr>
-          <p:nvPr>
-            <p:ph sz="half" idx="1"/>
-          </p:nvPr>
+          <p:nvPr/>
         </p:nvPicPr>
         <p:blipFill>
           <a:blip r:embed="rId3"/>
@@ -5163,155 +5300,14 @@
         </p:blipFill>
         <p:spPr>
           <a:xfrm>
-            <a:off x="5281128" y="1816913"/>
-            <a:ext cx="6421016" cy="4360050"/>
+            <a:off x="5152116" y="1593057"/>
+            <a:ext cx="6392184" cy="4816474"/>
           </a:xfrm>
           <a:prstGeom prst="rect">
             <a:avLst/>
           </a:prstGeom>
         </p:spPr>
       </p:pic>
-      <p:sp>
-        <p:nvSpPr>
-          <p:cNvPr id="17" name="Content Placeholder 16">
-            <a:extLst>
-              <a:ext uri="{FF2B5EF4-FFF2-40B4-BE49-F238E27FC236}">
-                <a16:creationId xmlns:a16="http://schemas.microsoft.com/office/drawing/2014/main" id="{DB6201FB-F51B-E4D7-DED1-7417FA2E2B11}"/>
-              </a:ext>
-            </a:extLst>
-          </p:cNvPr>
-          <p:cNvSpPr>
-            <a:spLocks noGrp="1"/>
-          </p:cNvSpPr>
-          <p:nvPr>
-            <p:ph sz="half" idx="2"/>
-          </p:nvPr>
-        </p:nvSpPr>
-        <p:spPr>
-          <a:xfrm>
-            <a:off x="838200" y="1825625"/>
-            <a:ext cx="4097694" cy="4351338"/>
-          </a:xfrm>
-        </p:spPr>
-        <p:txBody>
-          <a:bodyPr>
-            <a:normAutofit lnSpcReduction="10000"/>
-          </a:bodyPr>
-          <a:lstStyle/>
-          <a:p>
-            <a:pPr marL="0" indent="0">
-              <a:buNone/>
-            </a:pPr>
-            <a:r>
-              <a:rPr lang="en-US" b="1" dirty="0">
-                <a:solidFill>
-                  <a:srgbClr val="C00000"/>
-                </a:solidFill>
-              </a:rPr>
-              <a:t>Useless</a:t>
-            </a:r>
-          </a:p>
-          <a:p>
-            <a:pPr lvl="1"/>
-            <a:r>
-              <a:rPr lang="en-US" dirty="0"/>
-              <a:t>Id</a:t>
-            </a:r>
-          </a:p>
-          <a:p>
-            <a:pPr lvl="1"/>
-            <a:r>
-              <a:rPr lang="en-US" dirty="0"/>
-              <a:t>Month built</a:t>
-            </a:r>
-          </a:p>
-          <a:p>
-            <a:pPr lvl="1"/>
-            <a:r>
-              <a:rPr lang="en-US" dirty="0"/>
-              <a:t>Address</a:t>
-            </a:r>
-          </a:p>
-          <a:p>
-            <a:pPr lvl="1"/>
-            <a:r>
-              <a:rPr lang="en-US" dirty="0"/>
-              <a:t>Number of nearby bus stops</a:t>
-            </a:r>
-          </a:p>
-          <a:p>
-            <a:pPr lvl="1"/>
-            <a:endParaRPr lang="en-US" dirty="0"/>
-          </a:p>
-          <a:p>
-            <a:pPr marL="0" indent="0">
-              <a:buNone/>
-            </a:pPr>
-            <a:r>
-              <a:rPr lang="en-US" b="1" dirty="0">
-                <a:solidFill>
-                  <a:schemeClr val="accent1"/>
-                </a:solidFill>
-              </a:rPr>
-              <a:t>Redundant</a:t>
-            </a:r>
-          </a:p>
-          <a:p>
-            <a:pPr lvl="1"/>
-            <a:r>
-              <a:rPr lang="en-US" dirty="0"/>
-              <a:t>Province</a:t>
-            </a:r>
-          </a:p>
-          <a:p>
-            <a:pPr lvl="1"/>
-            <a:r>
-              <a:rPr lang="en-US" dirty="0"/>
-              <a:t>Latitude</a:t>
-            </a:r>
-          </a:p>
-          <a:p>
-            <a:pPr lvl="1"/>
-            <a:r>
-              <a:rPr lang="en-US" dirty="0"/>
-              <a:t>Longitude</a:t>
-            </a:r>
-          </a:p>
-          <a:p>
-            <a:pPr lvl="1"/>
-            <a:endParaRPr lang="en-US" dirty="0"/>
-          </a:p>
-        </p:txBody>
-      </p:sp>
-      <p:sp>
-        <p:nvSpPr>
-          <p:cNvPr id="5" name="Slide Number Placeholder 4">
-            <a:extLst>
-              <a:ext uri="{FF2B5EF4-FFF2-40B4-BE49-F238E27FC236}">
-                <a16:creationId xmlns:a16="http://schemas.microsoft.com/office/drawing/2014/main" id="{841260C9-E28D-04EB-2C04-2A3968A06CB0}"/>
-              </a:ext>
-            </a:extLst>
-          </p:cNvPr>
-          <p:cNvSpPr>
-            <a:spLocks noGrp="1"/>
-          </p:cNvSpPr>
-          <p:nvPr>
-            <p:ph type="sldNum" sz="quarter" idx="12"/>
-          </p:nvPr>
-        </p:nvSpPr>
-        <p:spPr/>
-        <p:txBody>
-          <a:bodyPr/>
-          <a:lstStyle/>
-          <a:p>
-            <a:fld id="{640C5978-D207-4356-A33B-DAFE34A7F8D2}" type="slidenum">
-              <a:rPr lang="en-US" smtClean="0"/>
-              <a:t>4</a:t>
-            </a:fld>
-            <a:endParaRPr lang="en-US"/>
-          </a:p>
-        </p:txBody>
-      </p:sp>
     </p:spTree>
     <p:extLst>
       <p:ext uri="{BB962C8B-B14F-4D97-AF65-F5344CB8AC3E}">
@@ -6636,10 +6632,10 @@
       </p:sp>
       <p:pic>
         <p:nvPicPr>
-          <p:cNvPr id="8" name="Picture 7">
-            <a:extLst>
-              <a:ext uri="{FF2B5EF4-FFF2-40B4-BE49-F238E27FC236}">
-                <a16:creationId xmlns:a16="http://schemas.microsoft.com/office/drawing/2014/main" id="{D6C8D208-4CF4-CD2E-5333-81FF36AA8144}"/>
+          <p:cNvPr id="6" name="Picture 5">
+            <a:extLst>
+              <a:ext uri="{FF2B5EF4-FFF2-40B4-BE49-F238E27FC236}">
+                <a16:creationId xmlns:a16="http://schemas.microsoft.com/office/drawing/2014/main" id="{BFC47B14-A0E2-2CE7-05B5-890082060D4B}"/>
               </a:ext>
             </a:extLst>
           </p:cNvPr>
@@ -6656,8 +6652,8 @@
         </p:blipFill>
         <p:spPr>
           <a:xfrm>
-            <a:off x="1461440" y="1653054"/>
-            <a:ext cx="9269119" cy="4696480"/>
+            <a:off x="1254565" y="1446471"/>
+            <a:ext cx="9682870" cy="5109646"/>
           </a:xfrm>
           <a:prstGeom prst="rect">
             <a:avLst/>

</xml_diff>

<commit_message>
update value correction step in presentation
</commit_message>
<xml_diff>
--- a/presentation/Bangkok Housing Price Prediction for buyers and sellers.pptx
+++ b/presentation/Bangkok Housing Price Prediction for buyers and sellers.pptx
@@ -5,10 +5,10 @@
     <p:sldMasterId id="2147483648" r:id="rId1"/>
   </p:sldMasterIdLst>
   <p:notesMasterIdLst>
-    <p:notesMasterId r:id="rId13"/>
+    <p:notesMasterId r:id="rId14"/>
   </p:notesMasterIdLst>
   <p:handoutMasterIdLst>
-    <p:handoutMasterId r:id="rId14"/>
+    <p:handoutMasterId r:id="rId15"/>
   </p:handoutMasterIdLst>
   <p:sldIdLst>
     <p:sldId id="256" r:id="rId2"/>
@@ -16,12 +16,13 @@
     <p:sldId id="259" r:id="rId4"/>
     <p:sldId id="260" r:id="rId5"/>
     <p:sldId id="263" r:id="rId6"/>
-    <p:sldId id="261" r:id="rId7"/>
-    <p:sldId id="262" r:id="rId8"/>
-    <p:sldId id="264" r:id="rId9"/>
-    <p:sldId id="265" r:id="rId10"/>
-    <p:sldId id="266" r:id="rId11"/>
-    <p:sldId id="267" r:id="rId12"/>
+    <p:sldId id="268" r:id="rId7"/>
+    <p:sldId id="261" r:id="rId8"/>
+    <p:sldId id="262" r:id="rId9"/>
+    <p:sldId id="264" r:id="rId10"/>
+    <p:sldId id="265" r:id="rId11"/>
+    <p:sldId id="266" r:id="rId12"/>
+    <p:sldId id="267" r:id="rId13"/>
   </p:sldIdLst>
   <p:sldSz cx="12192000" cy="6858000"/>
   <p:notesSz cx="6858000" cy="9144000"/>
@@ -4247,6 +4248,189 @@
           <p:cNvPr id="2" name="Title 1">
             <a:extLst>
               <a:ext uri="{FF2B5EF4-FFF2-40B4-BE49-F238E27FC236}">
+                <a16:creationId xmlns:a16="http://schemas.microsoft.com/office/drawing/2014/main" id="{FB8A6BE0-E966-93AD-F411-DC44B85C3646}"/>
+              </a:ext>
+            </a:extLst>
+          </p:cNvPr>
+          <p:cNvSpPr>
+            <a:spLocks noGrp="1"/>
+          </p:cNvSpPr>
+          <p:nvPr>
+            <p:ph type="title"/>
+          </p:nvPr>
+        </p:nvSpPr>
+        <p:spPr/>
+        <p:txBody>
+          <a:bodyPr/>
+          <a:lstStyle/>
+          <a:p>
+            <a:r>
+              <a:rPr lang="en-US" b="1" dirty="0"/>
+              <a:t>Result</a:t>
+            </a:r>
+          </a:p>
+        </p:txBody>
+      </p:sp>
+      <p:sp>
+        <p:nvSpPr>
+          <p:cNvPr id="3" name="Content Placeholder 2">
+            <a:extLst>
+              <a:ext uri="{FF2B5EF4-FFF2-40B4-BE49-F238E27FC236}">
+                <a16:creationId xmlns:a16="http://schemas.microsoft.com/office/drawing/2014/main" id="{C6491CDD-2DED-489B-8A10-151C6C020DC1}"/>
+              </a:ext>
+            </a:extLst>
+          </p:cNvPr>
+          <p:cNvSpPr>
+            <a:spLocks noGrp="1"/>
+          </p:cNvSpPr>
+          <p:nvPr>
+            <p:ph idx="1"/>
+          </p:nvPr>
+        </p:nvSpPr>
+        <p:spPr/>
+        <p:txBody>
+          <a:bodyPr/>
+          <a:lstStyle/>
+          <a:p>
+            <a:r>
+              <a:rPr lang="en-US" dirty="0"/>
+              <a:t>Prediction model that</a:t>
+            </a:r>
+          </a:p>
+          <a:p>
+            <a:pPr lvl="1"/>
+            <a:r>
+              <a:rPr lang="en-US" dirty="0"/>
+              <a:t>Can explain </a:t>
+            </a:r>
+            <a:r>
+              <a:rPr lang="en-US" b="1" dirty="0">
+                <a:solidFill>
+                  <a:schemeClr val="accent1"/>
+                </a:solidFill>
+              </a:rPr>
+              <a:t>79.4%</a:t>
+            </a:r>
+            <a:r>
+              <a:rPr lang="en-US" dirty="0"/>
+              <a:t> of data </a:t>
+            </a:r>
+          </a:p>
+          <a:p>
+            <a:pPr lvl="1"/>
+            <a:r>
+              <a:rPr lang="en-US" dirty="0"/>
+              <a:t>The average error of </a:t>
+            </a:r>
+            <a:r>
+              <a:rPr lang="en-US" b="1" dirty="0">
+                <a:solidFill>
+                  <a:schemeClr val="accent1"/>
+                </a:solidFill>
+              </a:rPr>
+              <a:t>945K</a:t>
+            </a:r>
+            <a:r>
+              <a:rPr lang="en-US" dirty="0"/>
+              <a:t> baht approximately</a:t>
+            </a:r>
+          </a:p>
+        </p:txBody>
+      </p:sp>
+      <p:sp>
+        <p:nvSpPr>
+          <p:cNvPr id="4" name="Slide Number Placeholder 3">
+            <a:extLst>
+              <a:ext uri="{FF2B5EF4-FFF2-40B4-BE49-F238E27FC236}">
+                <a16:creationId xmlns:a16="http://schemas.microsoft.com/office/drawing/2014/main" id="{52229B81-D7A2-29B1-7673-E477ABEC2B38}"/>
+              </a:ext>
+            </a:extLst>
+          </p:cNvPr>
+          <p:cNvSpPr>
+            <a:spLocks noGrp="1"/>
+          </p:cNvSpPr>
+          <p:nvPr>
+            <p:ph type="sldNum" sz="quarter" idx="12"/>
+          </p:nvPr>
+        </p:nvSpPr>
+        <p:spPr/>
+        <p:txBody>
+          <a:bodyPr/>
+          <a:lstStyle/>
+          <a:p>
+            <a:fld id="{640C5978-D207-4356-A33B-DAFE34A7F8D2}" type="slidenum">
+              <a:rPr lang="en-US" smtClean="0"/>
+              <a:t>10</a:t>
+            </a:fld>
+            <a:endParaRPr lang="en-US"/>
+          </a:p>
+        </p:txBody>
+      </p:sp>
+      <p:pic>
+        <p:nvPicPr>
+          <p:cNvPr id="6" name="Picture 5">
+            <a:extLst>
+              <a:ext uri="{FF2B5EF4-FFF2-40B4-BE49-F238E27FC236}">
+                <a16:creationId xmlns:a16="http://schemas.microsoft.com/office/drawing/2014/main" id="{CDF46353-D5C7-5B64-D3B4-7682DAEDA658}"/>
+              </a:ext>
+            </a:extLst>
+          </p:cNvPr>
+          <p:cNvPicPr>
+            <a:picLocks noChangeAspect="1"/>
+          </p:cNvPicPr>
+          <p:nvPr/>
+        </p:nvPicPr>
+        <p:blipFill>
+          <a:blip r:embed="rId2"/>
+          <a:stretch>
+            <a:fillRect/>
+          </a:stretch>
+        </p:blipFill>
+        <p:spPr>
+          <a:xfrm>
+            <a:off x="838200" y="3600355"/>
+            <a:ext cx="10488489" cy="1352739"/>
+          </a:xfrm>
+          <a:prstGeom prst="rect">
+            <a:avLst/>
+          </a:prstGeom>
+        </p:spPr>
+      </p:pic>
+    </p:spTree>
+    <p:extLst>
+      <p:ext uri="{BB962C8B-B14F-4D97-AF65-F5344CB8AC3E}">
+        <p14:creationId xmlns:p14="http://schemas.microsoft.com/office/powerpoint/2010/main" val="2713355754"/>
+      </p:ext>
+    </p:extLst>
+  </p:cSld>
+  <p:clrMapOvr>
+    <a:masterClrMapping/>
+  </p:clrMapOvr>
+</p:sld>
+</file>
+
+<file path=ppt/slides/slide11.xml><?xml version="1.0" encoding="utf-8"?>
+<p:sld xmlns:a="http://schemas.openxmlformats.org/drawingml/2006/main" xmlns:r="http://schemas.openxmlformats.org/officeDocument/2006/relationships" xmlns:p="http://schemas.openxmlformats.org/presentationml/2006/main">
+  <p:cSld>
+    <p:spTree>
+      <p:nvGrpSpPr>
+        <p:cNvPr id="1" name=""/>
+        <p:cNvGrpSpPr/>
+        <p:nvPr/>
+      </p:nvGrpSpPr>
+      <p:grpSpPr>
+        <a:xfrm>
+          <a:off x="0" y="0"/>
+          <a:ext cx="0" cy="0"/>
+          <a:chOff x="0" y="0"/>
+          <a:chExt cx="0" cy="0"/>
+        </a:xfrm>
+      </p:grpSpPr>
+      <p:sp>
+        <p:nvSpPr>
+          <p:cNvPr id="2" name="Title 1">
+            <a:extLst>
+              <a:ext uri="{FF2B5EF4-FFF2-40B4-BE49-F238E27FC236}">
                 <a16:creationId xmlns:a16="http://schemas.microsoft.com/office/drawing/2014/main" id="{6723FDF9-B596-7CAD-2C57-A539302FD5ED}"/>
               </a:ext>
             </a:extLst>
@@ -4412,7 +4596,7 @@
           <a:p>
             <a:fld id="{640C5978-D207-4356-A33B-DAFE34A7F8D2}" type="slidenum">
               <a:rPr lang="en-US" smtClean="0"/>
-              <a:t>10</a:t>
+              <a:t>11</a:t>
             </a:fld>
             <a:endParaRPr lang="en-US"/>
           </a:p>
@@ -4605,7 +4789,7 @@
 </p:sld>
 </file>
 
-<file path=ppt/slides/slide11.xml><?xml version="1.0" encoding="utf-8"?>
+<file path=ppt/slides/slide12.xml><?xml version="1.0" encoding="utf-8"?>
 <p:sld xmlns:a="http://schemas.openxmlformats.org/drawingml/2006/main" xmlns:r="http://schemas.openxmlformats.org/officeDocument/2006/relationships" xmlns:p="http://schemas.openxmlformats.org/presentationml/2006/main">
   <p:cSld>
     <p:spTree>
@@ -4707,7 +4891,7 @@
           <a:p>
             <a:fld id="{640C5978-D207-4356-A33B-DAFE34A7F8D2}" type="slidenum">
               <a:rPr lang="en-US" smtClean="0"/>
-              <a:t>11</a:t>
+              <a:t>12</a:t>
             </a:fld>
             <a:endParaRPr lang="en-US"/>
           </a:p>
@@ -5658,6 +5842,171 @@
           <a:chExt cx="0" cy="0"/>
         </a:xfrm>
       </p:grpSpPr>
+      <p:sp>
+        <p:nvSpPr>
+          <p:cNvPr id="2" name="Title 1">
+            <a:extLst>
+              <a:ext uri="{FF2B5EF4-FFF2-40B4-BE49-F238E27FC236}">
+                <a16:creationId xmlns:a16="http://schemas.microsoft.com/office/drawing/2014/main" id="{9566CC4D-1706-18BD-8D83-ACCE2C6570E9}"/>
+              </a:ext>
+            </a:extLst>
+          </p:cNvPr>
+          <p:cNvSpPr>
+            <a:spLocks noGrp="1"/>
+          </p:cNvSpPr>
+          <p:nvPr>
+            <p:ph type="title"/>
+          </p:nvPr>
+        </p:nvSpPr>
+        <p:spPr/>
+        <p:txBody>
+          <a:bodyPr/>
+          <a:lstStyle/>
+          <a:p>
+            <a:r>
+              <a:rPr lang="en-US" b="1" dirty="0"/>
+              <a:t>Value corrections</a:t>
+            </a:r>
+          </a:p>
+        </p:txBody>
+      </p:sp>
+      <p:sp>
+        <p:nvSpPr>
+          <p:cNvPr id="3" name="Content Placeholder 2">
+            <a:extLst>
+              <a:ext uri="{FF2B5EF4-FFF2-40B4-BE49-F238E27FC236}">
+                <a16:creationId xmlns:a16="http://schemas.microsoft.com/office/drawing/2014/main" id="{D5463579-5659-9E9D-8BD5-E8CDF51970D3}"/>
+              </a:ext>
+            </a:extLst>
+          </p:cNvPr>
+          <p:cNvSpPr>
+            <a:spLocks noGrp="1"/>
+          </p:cNvSpPr>
+          <p:nvPr>
+            <p:ph idx="1"/>
+          </p:nvPr>
+        </p:nvSpPr>
+        <p:spPr>
+          <a:xfrm>
+            <a:off x="838200" y="1825625"/>
+            <a:ext cx="4572000" cy="4351338"/>
+          </a:xfrm>
+        </p:spPr>
+        <p:txBody>
+          <a:bodyPr/>
+          <a:lstStyle/>
+          <a:p>
+            <a:pPr marL="0" indent="0">
+              <a:buNone/>
+            </a:pPr>
+            <a:endParaRPr lang="en-US" dirty="0"/>
+          </a:p>
+          <a:p>
+            <a:pPr marL="0" indent="0">
+              <a:buNone/>
+            </a:pPr>
+            <a:endParaRPr lang="en-US" dirty="0"/>
+          </a:p>
+          <a:p>
+            <a:pPr marL="0" indent="0">
+              <a:buNone/>
+            </a:pPr>
+            <a:r>
+              <a:rPr lang="en-US" dirty="0"/>
+              <a:t>There are some incorrect values in subdistrict that need to be replaced.</a:t>
+            </a:r>
+          </a:p>
+        </p:txBody>
+      </p:sp>
+      <p:sp>
+        <p:nvSpPr>
+          <p:cNvPr id="4" name="Slide Number Placeholder 3">
+            <a:extLst>
+              <a:ext uri="{FF2B5EF4-FFF2-40B4-BE49-F238E27FC236}">
+                <a16:creationId xmlns:a16="http://schemas.microsoft.com/office/drawing/2014/main" id="{1FA17734-0D43-89A6-F072-DE4217B27B92}"/>
+              </a:ext>
+            </a:extLst>
+          </p:cNvPr>
+          <p:cNvSpPr>
+            <a:spLocks noGrp="1"/>
+          </p:cNvSpPr>
+          <p:nvPr>
+            <p:ph type="sldNum" sz="quarter" idx="12"/>
+          </p:nvPr>
+        </p:nvSpPr>
+        <p:spPr/>
+        <p:txBody>
+          <a:bodyPr/>
+          <a:lstStyle/>
+          <a:p>
+            <a:fld id="{640C5978-D207-4356-A33B-DAFE34A7F8D2}" type="slidenum">
+              <a:rPr lang="en-US" smtClean="0"/>
+              <a:t>6</a:t>
+            </a:fld>
+            <a:endParaRPr lang="en-US"/>
+          </a:p>
+        </p:txBody>
+      </p:sp>
+      <p:pic>
+        <p:nvPicPr>
+          <p:cNvPr id="6" name="Picture 5">
+            <a:extLst>
+              <a:ext uri="{FF2B5EF4-FFF2-40B4-BE49-F238E27FC236}">
+                <a16:creationId xmlns:a16="http://schemas.microsoft.com/office/drawing/2014/main" id="{063B296D-4281-D051-2C71-1D1D2EE0E59C}"/>
+              </a:ext>
+            </a:extLst>
+          </p:cNvPr>
+          <p:cNvPicPr>
+            <a:picLocks noChangeAspect="1"/>
+          </p:cNvPicPr>
+          <p:nvPr/>
+        </p:nvPicPr>
+        <p:blipFill>
+          <a:blip r:embed="rId2"/>
+          <a:stretch>
+            <a:fillRect/>
+          </a:stretch>
+        </p:blipFill>
+        <p:spPr>
+          <a:xfrm>
+            <a:off x="5952778" y="1870075"/>
+            <a:ext cx="4972744" cy="3991532"/>
+          </a:xfrm>
+          <a:prstGeom prst="rect">
+            <a:avLst/>
+          </a:prstGeom>
+        </p:spPr>
+      </p:pic>
+    </p:spTree>
+    <p:extLst>
+      <p:ext uri="{BB962C8B-B14F-4D97-AF65-F5344CB8AC3E}">
+        <p14:creationId xmlns:p14="http://schemas.microsoft.com/office/powerpoint/2010/main" val="2990622300"/>
+      </p:ext>
+    </p:extLst>
+  </p:cSld>
+  <p:clrMapOvr>
+    <a:masterClrMapping/>
+  </p:clrMapOvr>
+</p:sld>
+</file>
+
+<file path=ppt/slides/slide7.xml><?xml version="1.0" encoding="utf-8"?>
+<p:sld xmlns:a="http://schemas.openxmlformats.org/drawingml/2006/main" xmlns:r="http://schemas.openxmlformats.org/officeDocument/2006/relationships" xmlns:p="http://schemas.openxmlformats.org/presentationml/2006/main">
+  <p:cSld>
+    <p:spTree>
+      <p:nvGrpSpPr>
+        <p:cNvPr id="1" name=""/>
+        <p:cNvGrpSpPr/>
+        <p:nvPr/>
+      </p:nvGrpSpPr>
+      <p:grpSpPr>
+        <a:xfrm>
+          <a:off x="0" y="0"/>
+          <a:ext cx="0" cy="0"/>
+          <a:chOff x="0" y="0"/>
+          <a:chExt cx="0" cy="0"/>
+        </a:xfrm>
+      </p:grpSpPr>
       <p:pic>
         <p:nvPicPr>
           <p:cNvPr id="13" name="Picture 12">
@@ -5739,7 +6088,7 @@
           <a:p>
             <a:fld id="{640C5978-D207-4356-A33B-DAFE34A7F8D2}" type="slidenum">
               <a:rPr lang="en-US" smtClean="0"/>
-              <a:t>6</a:t>
+              <a:t>7</a:t>
             </a:fld>
             <a:endParaRPr lang="en-US"/>
           </a:p>
@@ -6135,7 +6484,7 @@
 </p:sld>
 </file>
 
-<file path=ppt/slides/slide7.xml><?xml version="1.0" encoding="utf-8"?>
+<file path=ppt/slides/slide8.xml><?xml version="1.0" encoding="utf-8"?>
 <p:sld xmlns:a="http://schemas.openxmlformats.org/drawingml/2006/main" xmlns:r="http://schemas.openxmlformats.org/officeDocument/2006/relationships" xmlns:p="http://schemas.openxmlformats.org/presentationml/2006/main">
   <p:cSld>
     <p:spTree>
@@ -6236,7 +6585,7 @@
           <a:p>
             <a:fld id="{640C5978-D207-4356-A33B-DAFE34A7F8D2}" type="slidenum">
               <a:rPr lang="en-US" smtClean="0"/>
-              <a:t>7</a:t>
+              <a:t>8</a:t>
             </a:fld>
             <a:endParaRPr lang="en-US"/>
           </a:p>
@@ -6530,149 +6879,6 @@
 </p:sld>
 </file>
 
-<file path=ppt/slides/slide8.xml><?xml version="1.0" encoding="utf-8"?>
-<p:sld xmlns:a="http://schemas.openxmlformats.org/drawingml/2006/main" xmlns:r="http://schemas.openxmlformats.org/officeDocument/2006/relationships" xmlns:p="http://schemas.openxmlformats.org/presentationml/2006/main">
-  <p:cSld>
-    <p:spTree>
-      <p:nvGrpSpPr>
-        <p:cNvPr id="1" name=""/>
-        <p:cNvGrpSpPr/>
-        <p:nvPr/>
-      </p:nvGrpSpPr>
-      <p:grpSpPr>
-        <a:xfrm>
-          <a:off x="0" y="0"/>
-          <a:ext cx="0" cy="0"/>
-          <a:chOff x="0" y="0"/>
-          <a:chExt cx="0" cy="0"/>
-        </a:xfrm>
-      </p:grpSpPr>
-      <p:sp>
-        <p:nvSpPr>
-          <p:cNvPr id="2" name="Title 1">
-            <a:extLst>
-              <a:ext uri="{FF2B5EF4-FFF2-40B4-BE49-F238E27FC236}">
-                <a16:creationId xmlns:a16="http://schemas.microsoft.com/office/drawing/2014/main" id="{148BA62D-8993-7949-6689-69FC6B5AD0E8}"/>
-              </a:ext>
-            </a:extLst>
-          </p:cNvPr>
-          <p:cNvSpPr>
-            <a:spLocks noGrp="1"/>
-          </p:cNvSpPr>
-          <p:nvPr>
-            <p:ph type="title"/>
-          </p:nvPr>
-        </p:nvSpPr>
-        <p:spPr/>
-        <p:txBody>
-          <a:bodyPr/>
-          <a:lstStyle/>
-          <a:p>
-            <a:pPr algn="ctr"/>
-            <a:r>
-              <a:rPr lang="en-US" b="1" dirty="0"/>
-              <a:t>Data transformation summary</a:t>
-            </a:r>
-          </a:p>
-        </p:txBody>
-      </p:sp>
-      <p:sp>
-        <p:nvSpPr>
-          <p:cNvPr id="3" name="Content Placeholder 2">
-            <a:extLst>
-              <a:ext uri="{FF2B5EF4-FFF2-40B4-BE49-F238E27FC236}">
-                <a16:creationId xmlns:a16="http://schemas.microsoft.com/office/drawing/2014/main" id="{15C9E1CB-D7D9-4CC1-CBC0-E8C6A62E721E}"/>
-              </a:ext>
-            </a:extLst>
-          </p:cNvPr>
-          <p:cNvSpPr>
-            <a:spLocks noGrp="1"/>
-          </p:cNvSpPr>
-          <p:nvPr>
-            <p:ph idx="1"/>
-          </p:nvPr>
-        </p:nvSpPr>
-        <p:spPr/>
-        <p:txBody>
-          <a:bodyPr/>
-          <a:lstStyle/>
-          <a:p>
-            <a:endParaRPr lang="en-US"/>
-          </a:p>
-        </p:txBody>
-      </p:sp>
-      <p:sp>
-        <p:nvSpPr>
-          <p:cNvPr id="4" name="Slide Number Placeholder 3">
-            <a:extLst>
-              <a:ext uri="{FF2B5EF4-FFF2-40B4-BE49-F238E27FC236}">
-                <a16:creationId xmlns:a16="http://schemas.microsoft.com/office/drawing/2014/main" id="{D1A0C39A-667A-C3B9-02DC-C83AA0289644}"/>
-              </a:ext>
-            </a:extLst>
-          </p:cNvPr>
-          <p:cNvSpPr>
-            <a:spLocks noGrp="1"/>
-          </p:cNvSpPr>
-          <p:nvPr>
-            <p:ph type="sldNum" sz="quarter" idx="12"/>
-          </p:nvPr>
-        </p:nvSpPr>
-        <p:spPr/>
-        <p:txBody>
-          <a:bodyPr/>
-          <a:lstStyle/>
-          <a:p>
-            <a:fld id="{640C5978-D207-4356-A33B-DAFE34A7F8D2}" type="slidenum">
-              <a:rPr lang="en-US" smtClean="0"/>
-              <a:t>8</a:t>
-            </a:fld>
-            <a:endParaRPr lang="en-US"/>
-          </a:p>
-        </p:txBody>
-      </p:sp>
-      <p:pic>
-        <p:nvPicPr>
-          <p:cNvPr id="6" name="Picture 5">
-            <a:extLst>
-              <a:ext uri="{FF2B5EF4-FFF2-40B4-BE49-F238E27FC236}">
-                <a16:creationId xmlns:a16="http://schemas.microsoft.com/office/drawing/2014/main" id="{BFC47B14-A0E2-2CE7-05B5-890082060D4B}"/>
-              </a:ext>
-            </a:extLst>
-          </p:cNvPr>
-          <p:cNvPicPr>
-            <a:picLocks noChangeAspect="1"/>
-          </p:cNvPicPr>
-          <p:nvPr/>
-        </p:nvPicPr>
-        <p:blipFill>
-          <a:blip r:embed="rId2"/>
-          <a:stretch>
-            <a:fillRect/>
-          </a:stretch>
-        </p:blipFill>
-        <p:spPr>
-          <a:xfrm>
-            <a:off x="1254565" y="1446471"/>
-            <a:ext cx="9682870" cy="5109646"/>
-          </a:xfrm>
-          <a:prstGeom prst="rect">
-            <a:avLst/>
-          </a:prstGeom>
-        </p:spPr>
-      </p:pic>
-    </p:spTree>
-    <p:extLst>
-      <p:ext uri="{BB962C8B-B14F-4D97-AF65-F5344CB8AC3E}">
-        <p14:creationId xmlns:p14="http://schemas.microsoft.com/office/powerpoint/2010/main" val="3928268860"/>
-      </p:ext>
-    </p:extLst>
-  </p:cSld>
-  <p:clrMapOvr>
-    <a:masterClrMapping/>
-  </p:clrMapOvr>
-</p:sld>
-</file>
-
 <file path=ppt/slides/slide9.xml><?xml version="1.0" encoding="utf-8"?>
 <p:sld xmlns:a="http://schemas.openxmlformats.org/drawingml/2006/main" xmlns:r="http://schemas.openxmlformats.org/officeDocument/2006/relationships" xmlns:p="http://schemas.openxmlformats.org/presentationml/2006/main">
   <p:cSld>
@@ -6695,7 +6901,7 @@
           <p:cNvPr id="2" name="Title 1">
             <a:extLst>
               <a:ext uri="{FF2B5EF4-FFF2-40B4-BE49-F238E27FC236}">
-                <a16:creationId xmlns:a16="http://schemas.microsoft.com/office/drawing/2014/main" id="{FB8A6BE0-E966-93AD-F411-DC44B85C3646}"/>
+                <a16:creationId xmlns:a16="http://schemas.microsoft.com/office/drawing/2014/main" id="{148BA62D-8993-7949-6689-69FC6B5AD0E8}"/>
               </a:ext>
             </a:extLst>
           </p:cNvPr>
@@ -6711,9 +6917,10 @@
           <a:bodyPr/>
           <a:lstStyle/>
           <a:p>
+            <a:pPr algn="ctr"/>
             <a:r>
               <a:rPr lang="en-US" b="1" dirty="0"/>
-              <a:t>Result</a:t>
+              <a:t>Data transformation summary</a:t>
             </a:r>
           </a:p>
         </p:txBody>
@@ -6723,7 +6930,7 @@
           <p:cNvPr id="3" name="Content Placeholder 2">
             <a:extLst>
               <a:ext uri="{FF2B5EF4-FFF2-40B4-BE49-F238E27FC236}">
-                <a16:creationId xmlns:a16="http://schemas.microsoft.com/office/drawing/2014/main" id="{C6491CDD-2DED-489B-8A10-151C6C020DC1}"/>
+                <a16:creationId xmlns:a16="http://schemas.microsoft.com/office/drawing/2014/main" id="{15C9E1CB-D7D9-4CC1-CBC0-E8C6A62E721E}"/>
               </a:ext>
             </a:extLst>
           </p:cNvPr>
@@ -6739,48 +6946,7 @@
           <a:bodyPr/>
           <a:lstStyle/>
           <a:p>
-            <a:r>
-              <a:rPr lang="en-US" dirty="0"/>
-              <a:t>Prediction model that</a:t>
-            </a:r>
-          </a:p>
-          <a:p>
-            <a:pPr lvl="1"/>
-            <a:r>
-              <a:rPr lang="en-US" dirty="0"/>
-              <a:t>Can explain </a:t>
-            </a:r>
-            <a:r>
-              <a:rPr lang="en-US" b="1" dirty="0">
-                <a:solidFill>
-                  <a:schemeClr val="accent1"/>
-                </a:solidFill>
-              </a:rPr>
-              <a:t>79.4%</a:t>
-            </a:r>
-            <a:r>
-              <a:rPr lang="en-US" dirty="0"/>
-              <a:t> of data </a:t>
-            </a:r>
-          </a:p>
-          <a:p>
-            <a:pPr lvl="1"/>
-            <a:r>
-              <a:rPr lang="en-US" dirty="0"/>
-              <a:t>The average error of </a:t>
-            </a:r>
-            <a:r>
-              <a:rPr lang="en-US" b="1" dirty="0">
-                <a:solidFill>
-                  <a:schemeClr val="accent1"/>
-                </a:solidFill>
-              </a:rPr>
-              <a:t>945K</a:t>
-            </a:r>
-            <a:r>
-              <a:rPr lang="en-US" dirty="0"/>
-              <a:t> baht approximately</a:t>
-            </a:r>
+            <a:endParaRPr lang="en-US"/>
           </a:p>
         </p:txBody>
       </p:sp>
@@ -6789,7 +6955,7 @@
           <p:cNvPr id="4" name="Slide Number Placeholder 3">
             <a:extLst>
               <a:ext uri="{FF2B5EF4-FFF2-40B4-BE49-F238E27FC236}">
-                <a16:creationId xmlns:a16="http://schemas.microsoft.com/office/drawing/2014/main" id="{52229B81-D7A2-29B1-7673-E477ABEC2B38}"/>
+                <a16:creationId xmlns:a16="http://schemas.microsoft.com/office/drawing/2014/main" id="{D1A0C39A-667A-C3B9-02DC-C83AA0289644}"/>
               </a:ext>
             </a:extLst>
           </p:cNvPr>
@@ -6815,10 +6981,10 @@
       </p:sp>
       <p:pic>
         <p:nvPicPr>
-          <p:cNvPr id="6" name="Picture 5">
-            <a:extLst>
-              <a:ext uri="{FF2B5EF4-FFF2-40B4-BE49-F238E27FC236}">
-                <a16:creationId xmlns:a16="http://schemas.microsoft.com/office/drawing/2014/main" id="{CDF46353-D5C7-5B64-D3B4-7682DAEDA658}"/>
+          <p:cNvPr id="9" name="Picture 8">
+            <a:extLst>
+              <a:ext uri="{FF2B5EF4-FFF2-40B4-BE49-F238E27FC236}">
+                <a16:creationId xmlns:a16="http://schemas.microsoft.com/office/drawing/2014/main" id="{98D673E5-BB90-8C15-8D3F-72A1765658C0}"/>
               </a:ext>
             </a:extLst>
           </p:cNvPr>
@@ -6835,8 +7001,8 @@
         </p:blipFill>
         <p:spPr>
           <a:xfrm>
-            <a:off x="838200" y="3600355"/>
-            <a:ext cx="10488489" cy="1352739"/>
+            <a:off x="1297678" y="1455154"/>
+            <a:ext cx="9596643" cy="5092280"/>
           </a:xfrm>
           <a:prstGeom prst="rect">
             <a:avLst/>
@@ -6846,7 +7012,7 @@
     </p:spTree>
     <p:extLst>
       <p:ext uri="{BB962C8B-B14F-4D97-AF65-F5344CB8AC3E}">
-        <p14:creationId xmlns:p14="http://schemas.microsoft.com/office/powerpoint/2010/main" val="2713355754"/>
+        <p14:creationId xmlns:p14="http://schemas.microsoft.com/office/powerpoint/2010/main" val="3928268860"/>
       </p:ext>
     </p:extLst>
   </p:cSld>

</xml_diff>

<commit_message>
update presentation, add more information on missing value and XGBoost model
</commit_message>
<xml_diff>
--- a/presentation/Bangkok Housing Price Prediction for buyers and sellers.pptx
+++ b/presentation/Bangkok Housing Price Prediction for buyers and sellers.pptx
@@ -5,10 +5,10 @@
     <p:sldMasterId id="2147483648" r:id="rId1"/>
   </p:sldMasterIdLst>
   <p:notesMasterIdLst>
-    <p:notesMasterId r:id="rId14"/>
+    <p:notesMasterId r:id="rId19"/>
   </p:notesMasterIdLst>
   <p:handoutMasterIdLst>
-    <p:handoutMasterId r:id="rId15"/>
+    <p:handoutMasterId r:id="rId20"/>
   </p:handoutMasterIdLst>
   <p:sldIdLst>
     <p:sldId id="256" r:id="rId2"/>
@@ -17,12 +17,17 @@
     <p:sldId id="260" r:id="rId5"/>
     <p:sldId id="263" r:id="rId6"/>
     <p:sldId id="268" r:id="rId7"/>
-    <p:sldId id="261" r:id="rId8"/>
-    <p:sldId id="262" r:id="rId9"/>
-    <p:sldId id="264" r:id="rId10"/>
-    <p:sldId id="265" r:id="rId11"/>
-    <p:sldId id="266" r:id="rId12"/>
-    <p:sldId id="267" r:id="rId13"/>
+    <p:sldId id="274" r:id="rId8"/>
+    <p:sldId id="261" r:id="rId9"/>
+    <p:sldId id="270" r:id="rId10"/>
+    <p:sldId id="272" r:id="rId11"/>
+    <p:sldId id="273" r:id="rId12"/>
+    <p:sldId id="262" r:id="rId13"/>
+    <p:sldId id="264" r:id="rId14"/>
+    <p:sldId id="265" r:id="rId15"/>
+    <p:sldId id="266" r:id="rId16"/>
+    <p:sldId id="267" r:id="rId17"/>
+    <p:sldId id="275" r:id="rId18"/>
   </p:sldIdLst>
   <p:sldSz cx="12192000" cy="6858000"/>
   <p:notesSz cx="6858000" cy="9144000"/>
@@ -875,7 +880,323 @@
     </p:spTree>
     <p:extLst>
       <p:ext uri="{BB962C8B-B14F-4D97-AF65-F5344CB8AC3E}">
+        <p14:creationId xmlns:p14="http://schemas.microsoft.com/office/powerpoint/2010/main" val="913288010"/>
+      </p:ext>
+    </p:extLst>
+  </p:cSld>
+  <p:clrMapOvr>
+    <a:masterClrMapping/>
+  </p:clrMapOvr>
+</p:notes>
+</file>
+
+<file path=ppt/notesSlides/notesSlide4.xml><?xml version="1.0" encoding="utf-8"?>
+<p:notes xmlns:a="http://schemas.openxmlformats.org/drawingml/2006/main" xmlns:r="http://schemas.openxmlformats.org/officeDocument/2006/relationships" xmlns:p="http://schemas.openxmlformats.org/presentationml/2006/main">
+  <p:cSld>
+    <p:spTree>
+      <p:nvGrpSpPr>
+        <p:cNvPr id="1" name=""/>
+        <p:cNvGrpSpPr/>
+        <p:nvPr/>
+      </p:nvGrpSpPr>
+      <p:grpSpPr>
+        <a:xfrm>
+          <a:off x="0" y="0"/>
+          <a:ext cx="0" cy="0"/>
+          <a:chOff x="0" y="0"/>
+          <a:chExt cx="0" cy="0"/>
+        </a:xfrm>
+      </p:grpSpPr>
+      <p:sp>
+        <p:nvSpPr>
+          <p:cNvPr id="2" name="Slide Image Placeholder 1"/>
+          <p:cNvSpPr>
+            <a:spLocks noGrp="1" noRot="1" noChangeAspect="1"/>
+          </p:cNvSpPr>
+          <p:nvPr>
+            <p:ph type="sldImg"/>
+          </p:nvPr>
+        </p:nvSpPr>
+        <p:spPr/>
+      </p:sp>
+      <p:sp>
+        <p:nvSpPr>
+          <p:cNvPr id="3" name="Notes Placeholder 2"/>
+          <p:cNvSpPr>
+            <a:spLocks noGrp="1"/>
+          </p:cNvSpPr>
+          <p:nvPr>
+            <p:ph type="body" idx="1"/>
+          </p:nvPr>
+        </p:nvSpPr>
+        <p:spPr/>
+        <p:txBody>
+          <a:bodyPr/>
+          <a:lstStyle/>
+          <a:p>
+            <a:r>
+              <a:rPr lang="en-US" dirty="0"/>
+              <a:t>Some column with fewer missing value, those value can be removed</a:t>
+            </a:r>
+          </a:p>
+          <a:p>
+            <a:r>
+              <a:rPr lang="en-US" dirty="0"/>
+              <a:t>Red columns are what will be used, so it’s need to be imputed</a:t>
+            </a:r>
+          </a:p>
+          <a:p>
+            <a:endParaRPr lang="en-US" dirty="0"/>
+          </a:p>
+          <a:p>
+            <a:r>
+              <a:rPr lang="en-US" dirty="0"/>
+              <a:t>Blue need to use custom transformation, as the missing value means there is no nearby station which can be possible</a:t>
+            </a:r>
+          </a:p>
+        </p:txBody>
+      </p:sp>
+    </p:spTree>
+    <p:extLst>
+      <p:ext uri="{BB962C8B-B14F-4D97-AF65-F5344CB8AC3E}">
         <p14:creationId xmlns:p14="http://schemas.microsoft.com/office/powerpoint/2010/main" val="3853809233"/>
+      </p:ext>
+    </p:extLst>
+  </p:cSld>
+  <p:clrMapOvr>
+    <a:masterClrMapping/>
+  </p:clrMapOvr>
+</p:notes>
+</file>
+
+<file path=ppt/notesSlides/notesSlide5.xml><?xml version="1.0" encoding="utf-8"?>
+<p:notes xmlns:a="http://schemas.openxmlformats.org/drawingml/2006/main" xmlns:r="http://schemas.openxmlformats.org/officeDocument/2006/relationships" xmlns:p="http://schemas.openxmlformats.org/presentationml/2006/main">
+  <p:cSld>
+    <p:spTree>
+      <p:nvGrpSpPr>
+        <p:cNvPr id="1" name=""/>
+        <p:cNvGrpSpPr/>
+        <p:nvPr/>
+      </p:nvGrpSpPr>
+      <p:grpSpPr>
+        <a:xfrm>
+          <a:off x="0" y="0"/>
+          <a:ext cx="0" cy="0"/>
+          <a:chOff x="0" y="0"/>
+          <a:chExt cx="0" cy="0"/>
+        </a:xfrm>
+      </p:grpSpPr>
+      <p:sp>
+        <p:nvSpPr>
+          <p:cNvPr id="2" name="Slide Image Placeholder 1"/>
+          <p:cNvSpPr>
+            <a:spLocks noGrp="1" noRot="1" noChangeAspect="1"/>
+          </p:cNvSpPr>
+          <p:nvPr>
+            <p:ph type="sldImg"/>
+          </p:nvPr>
+        </p:nvSpPr>
+        <p:spPr/>
+      </p:sp>
+      <p:sp>
+        <p:nvSpPr>
+          <p:cNvPr id="3" name="Notes Placeholder 2"/>
+          <p:cNvSpPr>
+            <a:spLocks noGrp="1"/>
+          </p:cNvSpPr>
+          <p:nvPr>
+            <p:ph type="body" idx="1"/>
+          </p:nvPr>
+        </p:nvSpPr>
+        <p:spPr/>
+        <p:txBody>
+          <a:bodyPr/>
+          <a:lstStyle/>
+          <a:p>
+            <a:r>
+              <a:rPr lang="en-US" dirty="0"/>
+              <a:t>Some column with fewer missing value, those value can be removed</a:t>
+            </a:r>
+          </a:p>
+          <a:p>
+            <a:r>
+              <a:rPr lang="en-US" dirty="0"/>
+              <a:t>Red columns are what will be used, so it’s need to be imputed</a:t>
+            </a:r>
+          </a:p>
+          <a:p>
+            <a:endParaRPr lang="en-US" dirty="0"/>
+          </a:p>
+          <a:p>
+            <a:r>
+              <a:rPr lang="en-US" dirty="0"/>
+              <a:t>Blue need to use custom transformation, as the missing value means there is no nearby station which can be possible</a:t>
+            </a:r>
+          </a:p>
+        </p:txBody>
+      </p:sp>
+    </p:spTree>
+    <p:extLst>
+      <p:ext uri="{BB962C8B-B14F-4D97-AF65-F5344CB8AC3E}">
+        <p14:creationId xmlns:p14="http://schemas.microsoft.com/office/powerpoint/2010/main" val="1953685621"/>
+      </p:ext>
+    </p:extLst>
+  </p:cSld>
+  <p:clrMapOvr>
+    <a:masterClrMapping/>
+  </p:clrMapOvr>
+</p:notes>
+</file>
+
+<file path=ppt/notesSlides/notesSlide6.xml><?xml version="1.0" encoding="utf-8"?>
+<p:notes xmlns:a="http://schemas.openxmlformats.org/drawingml/2006/main" xmlns:r="http://schemas.openxmlformats.org/officeDocument/2006/relationships" xmlns:p="http://schemas.openxmlformats.org/presentationml/2006/main">
+  <p:cSld>
+    <p:spTree>
+      <p:nvGrpSpPr>
+        <p:cNvPr id="1" name=""/>
+        <p:cNvGrpSpPr/>
+        <p:nvPr/>
+      </p:nvGrpSpPr>
+      <p:grpSpPr>
+        <a:xfrm>
+          <a:off x="0" y="0"/>
+          <a:ext cx="0" cy="0"/>
+          <a:chOff x="0" y="0"/>
+          <a:chExt cx="0" cy="0"/>
+        </a:xfrm>
+      </p:grpSpPr>
+      <p:sp>
+        <p:nvSpPr>
+          <p:cNvPr id="2" name="Slide Image Placeholder 1"/>
+          <p:cNvSpPr>
+            <a:spLocks noGrp="1" noRot="1" noChangeAspect="1"/>
+          </p:cNvSpPr>
+          <p:nvPr>
+            <p:ph type="sldImg"/>
+          </p:nvPr>
+        </p:nvSpPr>
+        <p:spPr/>
+      </p:sp>
+      <p:sp>
+        <p:nvSpPr>
+          <p:cNvPr id="3" name="Notes Placeholder 2"/>
+          <p:cNvSpPr>
+            <a:spLocks noGrp="1"/>
+          </p:cNvSpPr>
+          <p:nvPr>
+            <p:ph type="body" idx="1"/>
+          </p:nvPr>
+        </p:nvSpPr>
+        <p:spPr/>
+        <p:txBody>
+          <a:bodyPr/>
+          <a:lstStyle/>
+          <a:p>
+            <a:r>
+              <a:rPr lang="en-US" dirty="0"/>
+              <a:t>Some column with fewer missing value, those value can be removed</a:t>
+            </a:r>
+          </a:p>
+          <a:p>
+            <a:r>
+              <a:rPr lang="en-US" dirty="0"/>
+              <a:t>Red columns are what will be used, so it’s need to be imputed</a:t>
+            </a:r>
+          </a:p>
+          <a:p>
+            <a:endParaRPr lang="en-US" dirty="0"/>
+          </a:p>
+          <a:p>
+            <a:r>
+              <a:rPr lang="en-US" dirty="0"/>
+              <a:t>Blue need to use custom transformation, as the missing value means there is no nearby station which can be possible</a:t>
+            </a:r>
+          </a:p>
+        </p:txBody>
+      </p:sp>
+    </p:spTree>
+    <p:extLst>
+      <p:ext uri="{BB962C8B-B14F-4D97-AF65-F5344CB8AC3E}">
+        <p14:creationId xmlns:p14="http://schemas.microsoft.com/office/powerpoint/2010/main" val="1820622707"/>
+      </p:ext>
+    </p:extLst>
+  </p:cSld>
+  <p:clrMapOvr>
+    <a:masterClrMapping/>
+  </p:clrMapOvr>
+</p:notes>
+</file>
+
+<file path=ppt/notesSlides/notesSlide7.xml><?xml version="1.0" encoding="utf-8"?>
+<p:notes xmlns:a="http://schemas.openxmlformats.org/drawingml/2006/main" xmlns:r="http://schemas.openxmlformats.org/officeDocument/2006/relationships" xmlns:p="http://schemas.openxmlformats.org/presentationml/2006/main">
+  <p:cSld>
+    <p:spTree>
+      <p:nvGrpSpPr>
+        <p:cNvPr id="1" name=""/>
+        <p:cNvGrpSpPr/>
+        <p:nvPr/>
+      </p:nvGrpSpPr>
+      <p:grpSpPr>
+        <a:xfrm>
+          <a:off x="0" y="0"/>
+          <a:ext cx="0" cy="0"/>
+          <a:chOff x="0" y="0"/>
+          <a:chExt cx="0" cy="0"/>
+        </a:xfrm>
+      </p:grpSpPr>
+      <p:sp>
+        <p:nvSpPr>
+          <p:cNvPr id="2" name="Slide Image Placeholder 1"/>
+          <p:cNvSpPr>
+            <a:spLocks noGrp="1" noRot="1" noChangeAspect="1"/>
+          </p:cNvSpPr>
+          <p:nvPr>
+            <p:ph type="sldImg"/>
+          </p:nvPr>
+        </p:nvSpPr>
+        <p:spPr/>
+      </p:sp>
+      <p:sp>
+        <p:nvSpPr>
+          <p:cNvPr id="3" name="Notes Placeholder 2"/>
+          <p:cNvSpPr>
+            <a:spLocks noGrp="1"/>
+          </p:cNvSpPr>
+          <p:nvPr>
+            <p:ph type="body" idx="1"/>
+          </p:nvPr>
+        </p:nvSpPr>
+        <p:spPr/>
+        <p:txBody>
+          <a:bodyPr/>
+          <a:lstStyle/>
+          <a:p>
+            <a:r>
+              <a:rPr lang="en-US" dirty="0"/>
+              <a:t>Some column with fewer missing value, those value can be removed</a:t>
+            </a:r>
+          </a:p>
+          <a:p>
+            <a:r>
+              <a:rPr lang="en-US" dirty="0"/>
+              <a:t>Red columns are what will be used, so it’s need to be imputed</a:t>
+            </a:r>
+          </a:p>
+          <a:p>
+            <a:endParaRPr lang="en-US" dirty="0"/>
+          </a:p>
+          <a:p>
+            <a:r>
+              <a:rPr lang="en-US" dirty="0"/>
+              <a:t>Blue need to use custom transformation, as the missing value means there is no nearby station which can be possible</a:t>
+            </a:r>
+          </a:p>
+        </p:txBody>
+      </p:sp>
+    </p:spTree>
+    <p:extLst>
+      <p:ext uri="{BB962C8B-B14F-4D97-AF65-F5344CB8AC3E}">
+        <p14:creationId xmlns:p14="http://schemas.microsoft.com/office/powerpoint/2010/main" val="1256420253"/>
       </p:ext>
     </p:extLst>
   </p:cSld>
@@ -4243,135 +4564,12 @@
           <a:chExt cx="0" cy="0"/>
         </a:xfrm>
       </p:grpSpPr>
-      <p:sp>
-        <p:nvSpPr>
-          <p:cNvPr id="2" name="Title 1">
-            <a:extLst>
-              <a:ext uri="{FF2B5EF4-FFF2-40B4-BE49-F238E27FC236}">
-                <a16:creationId xmlns:a16="http://schemas.microsoft.com/office/drawing/2014/main" id="{FB8A6BE0-E966-93AD-F411-DC44B85C3646}"/>
-              </a:ext>
-            </a:extLst>
-          </p:cNvPr>
-          <p:cNvSpPr>
-            <a:spLocks noGrp="1"/>
-          </p:cNvSpPr>
-          <p:nvPr>
-            <p:ph type="title"/>
-          </p:nvPr>
-        </p:nvSpPr>
-        <p:spPr/>
-        <p:txBody>
-          <a:bodyPr/>
-          <a:lstStyle/>
-          <a:p>
-            <a:r>
-              <a:rPr lang="en-US" b="1" dirty="0"/>
-              <a:t>Result</a:t>
-            </a:r>
-          </a:p>
-        </p:txBody>
-      </p:sp>
-      <p:sp>
-        <p:nvSpPr>
-          <p:cNvPr id="3" name="Content Placeholder 2">
-            <a:extLst>
-              <a:ext uri="{FF2B5EF4-FFF2-40B4-BE49-F238E27FC236}">
-                <a16:creationId xmlns:a16="http://schemas.microsoft.com/office/drawing/2014/main" id="{C6491CDD-2DED-489B-8A10-151C6C020DC1}"/>
-              </a:ext>
-            </a:extLst>
-          </p:cNvPr>
-          <p:cNvSpPr>
-            <a:spLocks noGrp="1"/>
-          </p:cNvSpPr>
-          <p:nvPr>
-            <p:ph idx="1"/>
-          </p:nvPr>
-        </p:nvSpPr>
-        <p:spPr/>
-        <p:txBody>
-          <a:bodyPr/>
-          <a:lstStyle/>
-          <a:p>
-            <a:r>
-              <a:rPr lang="en-US" dirty="0"/>
-              <a:t>Prediction model that</a:t>
-            </a:r>
-          </a:p>
-          <a:p>
-            <a:pPr lvl="1"/>
-            <a:r>
-              <a:rPr lang="en-US" dirty="0"/>
-              <a:t>Can explain </a:t>
-            </a:r>
-            <a:r>
-              <a:rPr lang="en-US" b="1" dirty="0">
-                <a:solidFill>
-                  <a:schemeClr val="accent1"/>
-                </a:solidFill>
-              </a:rPr>
-              <a:t>79.4%</a:t>
-            </a:r>
-            <a:r>
-              <a:rPr lang="en-US" dirty="0"/>
-              <a:t> of data </a:t>
-            </a:r>
-          </a:p>
-          <a:p>
-            <a:pPr lvl="1"/>
-            <a:r>
-              <a:rPr lang="en-US" dirty="0"/>
-              <a:t>The average error of </a:t>
-            </a:r>
-            <a:r>
-              <a:rPr lang="en-US" b="1" dirty="0">
-                <a:solidFill>
-                  <a:schemeClr val="accent1"/>
-                </a:solidFill>
-              </a:rPr>
-              <a:t>945K</a:t>
-            </a:r>
-            <a:r>
-              <a:rPr lang="en-US" dirty="0"/>
-              <a:t> baht approximately</a:t>
-            </a:r>
-          </a:p>
-        </p:txBody>
-      </p:sp>
-      <p:sp>
-        <p:nvSpPr>
-          <p:cNvPr id="4" name="Slide Number Placeholder 3">
-            <a:extLst>
-              <a:ext uri="{FF2B5EF4-FFF2-40B4-BE49-F238E27FC236}">
-                <a16:creationId xmlns:a16="http://schemas.microsoft.com/office/drawing/2014/main" id="{52229B81-D7A2-29B1-7673-E477ABEC2B38}"/>
-              </a:ext>
-            </a:extLst>
-          </p:cNvPr>
-          <p:cNvSpPr>
-            <a:spLocks noGrp="1"/>
-          </p:cNvSpPr>
-          <p:nvPr>
-            <p:ph type="sldNum" sz="quarter" idx="12"/>
-          </p:nvPr>
-        </p:nvSpPr>
-        <p:spPr/>
-        <p:txBody>
-          <a:bodyPr/>
-          <a:lstStyle/>
-          <a:p>
-            <a:fld id="{640C5978-D207-4356-A33B-DAFE34A7F8D2}" type="slidenum">
-              <a:rPr lang="en-US" smtClean="0"/>
-              <a:t>10</a:t>
-            </a:fld>
-            <a:endParaRPr lang="en-US"/>
-          </a:p>
-        </p:txBody>
-      </p:sp>
       <p:pic>
         <p:nvPicPr>
-          <p:cNvPr id="6" name="Picture 5">
-            <a:extLst>
-              <a:ext uri="{FF2B5EF4-FFF2-40B4-BE49-F238E27FC236}">
-                <a16:creationId xmlns:a16="http://schemas.microsoft.com/office/drawing/2014/main" id="{CDF46353-D5C7-5B64-D3B4-7682DAEDA658}"/>
+          <p:cNvPr id="13" name="Picture 12">
+            <a:extLst>
+              <a:ext uri="{FF2B5EF4-FFF2-40B4-BE49-F238E27FC236}">
+                <a16:creationId xmlns:a16="http://schemas.microsoft.com/office/drawing/2014/main" id="{B91B1AE5-8EFB-F315-E9D9-91D71819B839}"/>
               </a:ext>
             </a:extLst>
           </p:cNvPr>
@@ -4381,25 +4579,582 @@
           <p:nvPr/>
         </p:nvPicPr>
         <p:blipFill>
-          <a:blip r:embed="rId2"/>
+          <a:blip r:embed="rId3"/>
           <a:stretch>
             <a:fillRect/>
           </a:stretch>
         </p:blipFill>
         <p:spPr>
           <a:xfrm>
-            <a:off x="838200" y="3600355"/>
-            <a:ext cx="10488489" cy="1352739"/>
+            <a:off x="1676010" y="1196159"/>
+            <a:ext cx="8839980" cy="5083361"/>
           </a:xfrm>
           <a:prstGeom prst="rect">
             <a:avLst/>
           </a:prstGeom>
         </p:spPr>
       </p:pic>
+      <p:sp>
+        <p:nvSpPr>
+          <p:cNvPr id="6" name="Title 5">
+            <a:extLst>
+              <a:ext uri="{FF2B5EF4-FFF2-40B4-BE49-F238E27FC236}">
+                <a16:creationId xmlns:a16="http://schemas.microsoft.com/office/drawing/2014/main" id="{1637AF34-8C12-7F6A-2EE0-90F7DCC03ADF}"/>
+              </a:ext>
+            </a:extLst>
+          </p:cNvPr>
+          <p:cNvSpPr>
+            <a:spLocks noGrp="1"/>
+          </p:cNvSpPr>
+          <p:nvPr>
+            <p:ph type="title"/>
+          </p:nvPr>
+        </p:nvSpPr>
+        <p:spPr/>
+        <p:txBody>
+          <a:bodyPr/>
+          <a:lstStyle/>
+          <a:p>
+            <a:r>
+              <a:rPr lang="en-US" b="1" dirty="0"/>
+              <a:t>A lot of missing data</a:t>
+            </a:r>
+          </a:p>
+        </p:txBody>
+      </p:sp>
+      <p:sp>
+        <p:nvSpPr>
+          <p:cNvPr id="5" name="Slide Number Placeholder 4">
+            <a:extLst>
+              <a:ext uri="{FF2B5EF4-FFF2-40B4-BE49-F238E27FC236}">
+                <a16:creationId xmlns:a16="http://schemas.microsoft.com/office/drawing/2014/main" id="{C0256DC6-B7C3-69BB-F56B-6451A6CE8C98}"/>
+              </a:ext>
+            </a:extLst>
+          </p:cNvPr>
+          <p:cNvSpPr>
+            <a:spLocks noGrp="1"/>
+          </p:cNvSpPr>
+          <p:nvPr>
+            <p:ph type="sldNum" sz="quarter" idx="12"/>
+          </p:nvPr>
+        </p:nvSpPr>
+        <p:spPr/>
+        <p:txBody>
+          <a:bodyPr/>
+          <a:lstStyle/>
+          <a:p>
+            <a:fld id="{640C5978-D207-4356-A33B-DAFE34A7F8D2}" type="slidenum">
+              <a:rPr lang="en-US" smtClean="0"/>
+              <a:t>10</a:t>
+            </a:fld>
+            <a:endParaRPr lang="en-US"/>
+          </a:p>
+        </p:txBody>
+      </p:sp>
+      <p:sp>
+        <p:nvSpPr>
+          <p:cNvPr id="14" name="Rectangle 13">
+            <a:extLst>
+              <a:ext uri="{FF2B5EF4-FFF2-40B4-BE49-F238E27FC236}">
+                <a16:creationId xmlns:a16="http://schemas.microsoft.com/office/drawing/2014/main" id="{8FBA0743-B278-CBA6-650E-54C1D90DCE33}"/>
+              </a:ext>
+            </a:extLst>
+          </p:cNvPr>
+          <p:cNvSpPr/>
+          <p:nvPr/>
+        </p:nvSpPr>
+        <p:spPr>
+          <a:xfrm>
+            <a:off x="3965510" y="2304661"/>
+            <a:ext cx="401217" cy="3834882"/>
+          </a:xfrm>
+          <a:prstGeom prst="rect">
+            <a:avLst/>
+          </a:prstGeom>
+          <a:solidFill>
+            <a:srgbClr val="C00000">
+              <a:alpha val="50196"/>
+            </a:srgbClr>
+          </a:solidFill>
+          <a:ln w="38100">
+            <a:solidFill>
+              <a:srgbClr val="C00000"/>
+            </a:solidFill>
+          </a:ln>
+        </p:spPr>
+        <p:style>
+          <a:lnRef idx="2">
+            <a:schemeClr val="accent1">
+              <a:shade val="15000"/>
+            </a:schemeClr>
+          </a:lnRef>
+          <a:fillRef idx="1">
+            <a:schemeClr val="accent1"/>
+          </a:fillRef>
+          <a:effectRef idx="0">
+            <a:schemeClr val="accent1"/>
+          </a:effectRef>
+          <a:fontRef idx="minor">
+            <a:schemeClr val="lt1"/>
+          </a:fontRef>
+        </p:style>
+        <p:txBody>
+          <a:bodyPr rtlCol="0" anchor="ctr"/>
+          <a:lstStyle/>
+          <a:p>
+            <a:pPr algn="ctr"/>
+            <a:endParaRPr lang="en-US"/>
+          </a:p>
+        </p:txBody>
+      </p:sp>
+      <p:sp>
+        <p:nvSpPr>
+          <p:cNvPr id="15" name="Rectangle 14">
+            <a:extLst>
+              <a:ext uri="{FF2B5EF4-FFF2-40B4-BE49-F238E27FC236}">
+                <a16:creationId xmlns:a16="http://schemas.microsoft.com/office/drawing/2014/main" id="{9E1BC2AE-2382-360A-D1C6-87D253CCEBF3}"/>
+              </a:ext>
+            </a:extLst>
+          </p:cNvPr>
+          <p:cNvSpPr/>
+          <p:nvPr/>
+        </p:nvSpPr>
+        <p:spPr>
+          <a:xfrm>
+            <a:off x="5479791" y="2304661"/>
+            <a:ext cx="401218" cy="3834882"/>
+          </a:xfrm>
+          <a:prstGeom prst="rect">
+            <a:avLst/>
+          </a:prstGeom>
+          <a:solidFill>
+            <a:srgbClr val="C00000">
+              <a:alpha val="50196"/>
+            </a:srgbClr>
+          </a:solidFill>
+          <a:ln w="38100">
+            <a:solidFill>
+              <a:srgbClr val="C00000"/>
+            </a:solidFill>
+          </a:ln>
+        </p:spPr>
+        <p:style>
+          <a:lnRef idx="2">
+            <a:schemeClr val="accent1">
+              <a:shade val="15000"/>
+            </a:schemeClr>
+          </a:lnRef>
+          <a:fillRef idx="1">
+            <a:schemeClr val="accent1"/>
+          </a:fillRef>
+          <a:effectRef idx="0">
+            <a:schemeClr val="accent1"/>
+          </a:effectRef>
+          <a:fontRef idx="minor">
+            <a:schemeClr val="lt1"/>
+          </a:fontRef>
+        </p:style>
+        <p:txBody>
+          <a:bodyPr rtlCol="0" anchor="ctr"/>
+          <a:lstStyle/>
+          <a:p>
+            <a:pPr algn="ctr"/>
+            <a:endParaRPr lang="en-US"/>
+          </a:p>
+        </p:txBody>
+      </p:sp>
+      <p:sp>
+        <p:nvSpPr>
+          <p:cNvPr id="17" name="Rectangle 16">
+            <a:extLst>
+              <a:ext uri="{FF2B5EF4-FFF2-40B4-BE49-F238E27FC236}">
+                <a16:creationId xmlns:a16="http://schemas.microsoft.com/office/drawing/2014/main" id="{B92570B7-BB7B-B8F4-3430-814C78791B87}"/>
+              </a:ext>
+            </a:extLst>
+          </p:cNvPr>
+          <p:cNvSpPr/>
+          <p:nvPr/>
+        </p:nvSpPr>
+        <p:spPr>
+          <a:xfrm>
+            <a:off x="8873023" y="2304661"/>
+            <a:ext cx="401217" cy="3834882"/>
+          </a:xfrm>
+          <a:prstGeom prst="rect">
+            <a:avLst/>
+          </a:prstGeom>
+          <a:solidFill>
+            <a:srgbClr val="C00000">
+              <a:alpha val="50196"/>
+            </a:srgbClr>
+          </a:solidFill>
+          <a:ln w="38100">
+            <a:solidFill>
+              <a:srgbClr val="C00000"/>
+            </a:solidFill>
+          </a:ln>
+        </p:spPr>
+        <p:style>
+          <a:lnRef idx="2">
+            <a:schemeClr val="accent1">
+              <a:shade val="15000"/>
+            </a:schemeClr>
+          </a:lnRef>
+          <a:fillRef idx="1">
+            <a:schemeClr val="accent1"/>
+          </a:fillRef>
+          <a:effectRef idx="0">
+            <a:schemeClr val="accent1"/>
+          </a:effectRef>
+          <a:fontRef idx="minor">
+            <a:schemeClr val="lt1"/>
+          </a:fontRef>
+        </p:style>
+        <p:txBody>
+          <a:bodyPr rtlCol="0" anchor="ctr"/>
+          <a:lstStyle/>
+          <a:p>
+            <a:pPr algn="ctr"/>
+            <a:endParaRPr lang="en-US"/>
+          </a:p>
+        </p:txBody>
+      </p:sp>
+      <p:sp>
+        <p:nvSpPr>
+          <p:cNvPr id="2" name="Rectangle 1">
+            <a:extLst>
+              <a:ext uri="{FF2B5EF4-FFF2-40B4-BE49-F238E27FC236}">
+                <a16:creationId xmlns:a16="http://schemas.microsoft.com/office/drawing/2014/main" id="{6D94E452-0F0A-7E1C-4535-ADD91D4791AD}"/>
+              </a:ext>
+            </a:extLst>
+          </p:cNvPr>
+          <p:cNvSpPr/>
+          <p:nvPr/>
+        </p:nvSpPr>
+        <p:spPr>
+          <a:xfrm>
+            <a:off x="5881008" y="2304661"/>
+            <a:ext cx="401217" cy="3834882"/>
+          </a:xfrm>
+          <a:prstGeom prst="rect">
+            <a:avLst/>
+          </a:prstGeom>
+          <a:solidFill>
+            <a:srgbClr val="4472C4">
+              <a:alpha val="50196"/>
+            </a:srgbClr>
+          </a:solidFill>
+          <a:ln w="38100">
+            <a:solidFill>
+              <a:schemeClr val="accent1"/>
+            </a:solidFill>
+          </a:ln>
+        </p:spPr>
+        <p:style>
+          <a:lnRef idx="2">
+            <a:schemeClr val="accent1">
+              <a:shade val="15000"/>
+            </a:schemeClr>
+          </a:lnRef>
+          <a:fillRef idx="1">
+            <a:schemeClr val="accent1"/>
+          </a:fillRef>
+          <a:effectRef idx="0">
+            <a:schemeClr val="accent1"/>
+          </a:effectRef>
+          <a:fontRef idx="minor">
+            <a:schemeClr val="lt1"/>
+          </a:fontRef>
+        </p:style>
+        <p:txBody>
+          <a:bodyPr rtlCol="0" anchor="ctr"/>
+          <a:lstStyle/>
+          <a:p>
+            <a:pPr algn="ctr"/>
+            <a:endParaRPr lang="en-US"/>
+          </a:p>
+        </p:txBody>
+      </p:sp>
+      <p:sp>
+        <p:nvSpPr>
+          <p:cNvPr id="3" name="Rectangle 2">
+            <a:extLst>
+              <a:ext uri="{FF2B5EF4-FFF2-40B4-BE49-F238E27FC236}">
+                <a16:creationId xmlns:a16="http://schemas.microsoft.com/office/drawing/2014/main" id="{2A500011-A2AA-5B8A-26B1-FC7FE82DACC2}"/>
+              </a:ext>
+            </a:extLst>
+          </p:cNvPr>
+          <p:cNvSpPr/>
+          <p:nvPr/>
+        </p:nvSpPr>
+        <p:spPr>
+          <a:xfrm>
+            <a:off x="7752767" y="2304661"/>
+            <a:ext cx="401217" cy="3834882"/>
+          </a:xfrm>
+          <a:prstGeom prst="rect">
+            <a:avLst/>
+          </a:prstGeom>
+          <a:solidFill>
+            <a:srgbClr val="4472C4">
+              <a:alpha val="50196"/>
+            </a:srgbClr>
+          </a:solidFill>
+          <a:ln w="38100">
+            <a:solidFill>
+              <a:schemeClr val="accent1"/>
+            </a:solidFill>
+          </a:ln>
+        </p:spPr>
+        <p:style>
+          <a:lnRef idx="2">
+            <a:schemeClr val="accent1">
+              <a:shade val="15000"/>
+            </a:schemeClr>
+          </a:lnRef>
+          <a:fillRef idx="1">
+            <a:schemeClr val="accent1"/>
+          </a:fillRef>
+          <a:effectRef idx="0">
+            <a:schemeClr val="accent1"/>
+          </a:effectRef>
+          <a:fontRef idx="minor">
+            <a:schemeClr val="lt1"/>
+          </a:fontRef>
+        </p:style>
+        <p:txBody>
+          <a:bodyPr rtlCol="0" anchor="ctr"/>
+          <a:lstStyle/>
+          <a:p>
+            <a:pPr algn="ctr"/>
+            <a:endParaRPr lang="en-US"/>
+          </a:p>
+        </p:txBody>
+      </p:sp>
+      <p:sp>
+        <p:nvSpPr>
+          <p:cNvPr id="7" name="TextBox 6">
+            <a:extLst>
+              <a:ext uri="{FF2B5EF4-FFF2-40B4-BE49-F238E27FC236}">
+                <a16:creationId xmlns:a16="http://schemas.microsoft.com/office/drawing/2014/main" id="{E611DEC0-DBDB-7573-BD99-1C39BAA31518}"/>
+              </a:ext>
+            </a:extLst>
+          </p:cNvPr>
+          <p:cNvSpPr txBox="1"/>
+          <p:nvPr/>
+        </p:nvSpPr>
+        <p:spPr>
+          <a:xfrm>
+            <a:off x="8199549" y="578480"/>
+            <a:ext cx="3770071" cy="369332"/>
+          </a:xfrm>
+          <a:prstGeom prst="rect">
+            <a:avLst/>
+          </a:prstGeom>
+          <a:noFill/>
+        </p:spPr>
+        <p:txBody>
+          <a:bodyPr wrap="none" rtlCol="0">
+            <a:spAutoFit/>
+          </a:bodyPr>
+          <a:lstStyle/>
+          <a:p>
+            <a:r>
+              <a:rPr lang="en-US" b="1" dirty="0">
+                <a:solidFill>
+                  <a:schemeClr val="accent1"/>
+                </a:solidFill>
+              </a:rPr>
+              <a:t>Mean-imputed with missing indicator</a:t>
+            </a:r>
+          </a:p>
+        </p:txBody>
+      </p:sp>
+      <p:sp>
+        <p:nvSpPr>
+          <p:cNvPr id="9" name="TextBox 8">
+            <a:extLst>
+              <a:ext uri="{FF2B5EF4-FFF2-40B4-BE49-F238E27FC236}">
+                <a16:creationId xmlns:a16="http://schemas.microsoft.com/office/drawing/2014/main" id="{B99E6314-FA5C-93EE-944E-0B971B7A788C}"/>
+              </a:ext>
+            </a:extLst>
+          </p:cNvPr>
+          <p:cNvSpPr txBox="1"/>
+          <p:nvPr/>
+        </p:nvSpPr>
+        <p:spPr>
+          <a:xfrm>
+            <a:off x="8322981" y="195591"/>
+            <a:ext cx="3646639" cy="369332"/>
+          </a:xfrm>
+          <a:prstGeom prst="rect">
+            <a:avLst/>
+          </a:prstGeom>
+          <a:noFill/>
+        </p:spPr>
+        <p:txBody>
+          <a:bodyPr wrap="none" rtlCol="0">
+            <a:spAutoFit/>
+          </a:bodyPr>
+          <a:lstStyle/>
+          <a:p>
+            <a:r>
+              <a:rPr lang="en-US" b="1" dirty="0">
+                <a:solidFill>
+                  <a:srgbClr val="C00000"/>
+                </a:solidFill>
+              </a:rPr>
+              <a:t>KNN-imputed with missing indicator</a:t>
+            </a:r>
+          </a:p>
+        </p:txBody>
+      </p:sp>
+      <p:sp>
+        <p:nvSpPr>
+          <p:cNvPr id="4" name="Rectangle 3">
+            <a:extLst>
+              <a:ext uri="{FF2B5EF4-FFF2-40B4-BE49-F238E27FC236}">
+                <a16:creationId xmlns:a16="http://schemas.microsoft.com/office/drawing/2014/main" id="{B9F5E367-C490-C89F-109A-20D3BC683E4A}"/>
+              </a:ext>
+            </a:extLst>
+          </p:cNvPr>
+          <p:cNvSpPr/>
+          <p:nvPr/>
+        </p:nvSpPr>
+        <p:spPr>
+          <a:xfrm>
+            <a:off x="7354464" y="2304661"/>
+            <a:ext cx="401217" cy="3834882"/>
+          </a:xfrm>
+          <a:prstGeom prst="rect">
+            <a:avLst/>
+          </a:prstGeom>
+          <a:noFill/>
+          <a:ln w="38100">
+            <a:solidFill>
+              <a:schemeClr val="accent6">
+                <a:lumMod val="75000"/>
+              </a:schemeClr>
+            </a:solidFill>
+          </a:ln>
+        </p:spPr>
+        <p:style>
+          <a:lnRef idx="2">
+            <a:schemeClr val="accent1">
+              <a:shade val="15000"/>
+            </a:schemeClr>
+          </a:lnRef>
+          <a:fillRef idx="1">
+            <a:schemeClr val="accent1"/>
+          </a:fillRef>
+          <a:effectRef idx="0">
+            <a:schemeClr val="accent1"/>
+          </a:effectRef>
+          <a:fontRef idx="minor">
+            <a:schemeClr val="lt1"/>
+          </a:fontRef>
+        </p:style>
+        <p:txBody>
+          <a:bodyPr rtlCol="0" anchor="ctr"/>
+          <a:lstStyle/>
+          <a:p>
+            <a:pPr algn="ctr"/>
+            <a:endParaRPr lang="en-US"/>
+          </a:p>
+        </p:txBody>
+      </p:sp>
+      <p:sp>
+        <p:nvSpPr>
+          <p:cNvPr id="8" name="TextBox 7">
+            <a:extLst>
+              <a:ext uri="{FF2B5EF4-FFF2-40B4-BE49-F238E27FC236}">
+                <a16:creationId xmlns:a16="http://schemas.microsoft.com/office/drawing/2014/main" id="{8C0BC50B-E21C-71AC-A5ED-0A48C792C154}"/>
+              </a:ext>
+            </a:extLst>
+          </p:cNvPr>
+          <p:cNvSpPr txBox="1"/>
+          <p:nvPr/>
+        </p:nvSpPr>
+        <p:spPr>
+          <a:xfrm>
+            <a:off x="5881008" y="932680"/>
+            <a:ext cx="4001416" cy="369332"/>
+          </a:xfrm>
+          <a:prstGeom prst="rect">
+            <a:avLst/>
+          </a:prstGeom>
+          <a:noFill/>
+        </p:spPr>
+        <p:txBody>
+          <a:bodyPr wrap="none" rtlCol="0">
+            <a:spAutoFit/>
+          </a:bodyPr>
+          <a:lstStyle/>
+          <a:p>
+            <a:r>
+              <a:rPr lang="en-US" b="1" dirty="0">
+                <a:solidFill>
+                  <a:schemeClr val="accent6">
+                    <a:lumMod val="75000"/>
+                  </a:schemeClr>
+                </a:solidFill>
+              </a:rPr>
+              <a:t>Custom transformation + normalization </a:t>
+            </a:r>
+          </a:p>
+        </p:txBody>
+      </p:sp>
+      <p:cxnSp>
+        <p:nvCxnSpPr>
+          <p:cNvPr id="10" name="Straight Connector 9">
+            <a:extLst>
+              <a:ext uri="{FF2B5EF4-FFF2-40B4-BE49-F238E27FC236}">
+                <a16:creationId xmlns:a16="http://schemas.microsoft.com/office/drawing/2014/main" id="{B4200894-F599-CF6A-C349-BC974F690FDC}"/>
+              </a:ext>
+            </a:extLst>
+          </p:cNvPr>
+          <p:cNvCxnSpPr>
+            <a:cxnSpLocks/>
+            <a:stCxn id="4" idx="0"/>
+          </p:cNvCxnSpPr>
+          <p:nvPr/>
+        </p:nvCxnSpPr>
+        <p:spPr>
+          <a:xfrm flipV="1">
+            <a:off x="7555073" y="1302012"/>
+            <a:ext cx="0" cy="1002649"/>
+          </a:xfrm>
+          <a:prstGeom prst="line">
+            <a:avLst/>
+          </a:prstGeom>
+          <a:ln w="28575">
+            <a:solidFill>
+              <a:schemeClr val="accent6">
+                <a:lumMod val="75000"/>
+              </a:schemeClr>
+            </a:solidFill>
+            <a:tailEnd type="triangle"/>
+          </a:ln>
+        </p:spPr>
+        <p:style>
+          <a:lnRef idx="1">
+            <a:schemeClr val="accent1"/>
+          </a:lnRef>
+          <a:fillRef idx="0">
+            <a:schemeClr val="accent1"/>
+          </a:fillRef>
+          <a:effectRef idx="0">
+            <a:schemeClr val="accent1"/>
+          </a:effectRef>
+          <a:fontRef idx="minor">
+            <a:schemeClr val="tx1"/>
+          </a:fontRef>
+        </p:style>
+      </p:cxnSp>
     </p:spTree>
     <p:extLst>
       <p:ext uri="{BB962C8B-B14F-4D97-AF65-F5344CB8AC3E}">
-        <p14:creationId xmlns:p14="http://schemas.microsoft.com/office/powerpoint/2010/main" val="2713355754"/>
+        <p14:creationId xmlns:p14="http://schemas.microsoft.com/office/powerpoint/2010/main" val="2720193682"/>
       </p:ext>
     </p:extLst>
   </p:cSld>
@@ -4426,12 +5181,42 @@
           <a:chExt cx="0" cy="0"/>
         </a:xfrm>
       </p:grpSpPr>
-      <p:sp>
-        <p:nvSpPr>
-          <p:cNvPr id="2" name="Title 1">
-            <a:extLst>
-              <a:ext uri="{FF2B5EF4-FFF2-40B4-BE49-F238E27FC236}">
-                <a16:creationId xmlns:a16="http://schemas.microsoft.com/office/drawing/2014/main" id="{6723FDF9-B596-7CAD-2C57-A539302FD5ED}"/>
+      <p:pic>
+        <p:nvPicPr>
+          <p:cNvPr id="13" name="Picture 12">
+            <a:extLst>
+              <a:ext uri="{FF2B5EF4-FFF2-40B4-BE49-F238E27FC236}">
+                <a16:creationId xmlns:a16="http://schemas.microsoft.com/office/drawing/2014/main" id="{B91B1AE5-8EFB-F315-E9D9-91D71819B839}"/>
+              </a:ext>
+            </a:extLst>
+          </p:cNvPr>
+          <p:cNvPicPr>
+            <a:picLocks noChangeAspect="1"/>
+          </p:cNvPicPr>
+          <p:nvPr/>
+        </p:nvPicPr>
+        <p:blipFill>
+          <a:blip r:embed="rId3"/>
+          <a:stretch>
+            <a:fillRect/>
+          </a:stretch>
+        </p:blipFill>
+        <p:spPr>
+          <a:xfrm>
+            <a:off x="1676010" y="1196159"/>
+            <a:ext cx="8839980" cy="5083361"/>
+          </a:xfrm>
+          <a:prstGeom prst="rect">
+            <a:avLst/>
+          </a:prstGeom>
+        </p:spPr>
+      </p:pic>
+      <p:sp>
+        <p:nvSpPr>
+          <p:cNvPr id="6" name="Title 5">
+            <a:extLst>
+              <a:ext uri="{FF2B5EF4-FFF2-40B4-BE49-F238E27FC236}">
+                <a16:creationId xmlns:a16="http://schemas.microsoft.com/office/drawing/2014/main" id="{1637AF34-8C12-7F6A-2EE0-90F7DCC03ADF}"/>
               </a:ext>
             </a:extLst>
           </p:cNvPr>
@@ -4447,138 +5232,19 @@
           <a:bodyPr/>
           <a:lstStyle/>
           <a:p>
-            <a:pPr algn="ctr"/>
             <a:r>
               <a:rPr lang="en-US" b="1" dirty="0"/>
-              <a:t>Other findings</a:t>
-            </a:r>
-          </a:p>
-        </p:txBody>
-      </p:sp>
-      <p:sp>
-        <p:nvSpPr>
-          <p:cNvPr id="3" name="Content Placeholder 2">
-            <a:extLst>
-              <a:ext uri="{FF2B5EF4-FFF2-40B4-BE49-F238E27FC236}">
-                <a16:creationId xmlns:a16="http://schemas.microsoft.com/office/drawing/2014/main" id="{70E58C0E-CA1B-669D-293F-DA172BEAACBA}"/>
-              </a:ext>
-            </a:extLst>
-          </p:cNvPr>
-          <p:cNvSpPr>
-            <a:spLocks noGrp="1"/>
-          </p:cNvSpPr>
-          <p:nvPr>
-            <p:ph idx="1"/>
-          </p:nvPr>
-        </p:nvSpPr>
-        <p:spPr/>
-        <p:txBody>
-          <a:bodyPr>
-            <a:normAutofit fontScale="92500" lnSpcReduction="10000"/>
-          </a:bodyPr>
-          <a:lstStyle/>
-          <a:p>
-            <a:r>
-              <a:rPr lang="en-US" dirty="0"/>
-              <a:t>The following factors are significantly affect housing price positively.</a:t>
-            </a:r>
-          </a:p>
-          <a:p>
-            <a:pPr lvl="1"/>
-            <a:r>
-              <a:rPr lang="en-US" dirty="0"/>
-              <a:t>Floor area</a:t>
-            </a:r>
-          </a:p>
-          <a:p>
-            <a:pPr lvl="1"/>
-            <a:r>
-              <a:rPr lang="en-US" dirty="0"/>
-              <a:t>Number of nearby stations (within 1km)</a:t>
-            </a:r>
-          </a:p>
-          <a:p>
-            <a:pPr lvl="1"/>
-            <a:r>
-              <a:rPr lang="en-US" dirty="0"/>
-              <a:t>Number of bathrooms</a:t>
-            </a:r>
-          </a:p>
-          <a:p>
-            <a:pPr lvl="1"/>
-            <a:r>
-              <a:rPr lang="en-US" dirty="0"/>
-              <a:t>Total area of the land</a:t>
-            </a:r>
-          </a:p>
-          <a:p>
-            <a:pPr lvl="1"/>
-            <a:r>
-              <a:rPr lang="en-US" dirty="0"/>
-              <a:t>Year built</a:t>
-            </a:r>
-          </a:p>
-          <a:p>
-            <a:pPr lvl="1"/>
-            <a:r>
-              <a:rPr lang="en-US" dirty="0"/>
-              <a:t>Number of bedrooms</a:t>
-            </a:r>
-          </a:p>
-          <a:p>
-            <a:endParaRPr lang="en-US" dirty="0"/>
-          </a:p>
-          <a:p>
-            <a:r>
-              <a:rPr lang="en-US" dirty="0"/>
-              <a:t>Locating </a:t>
-            </a:r>
-            <a:r>
-              <a:rPr lang="en-US" dirty="0" err="1"/>
-              <a:t>neaby</a:t>
-            </a:r>
-            <a:r>
-              <a:rPr lang="en-US" dirty="0"/>
-              <a:t> these stations will significantly raise the price as well.</a:t>
-            </a:r>
-          </a:p>
-          <a:p>
-            <a:pPr lvl="1"/>
-            <a:r>
-              <a:rPr lang="en-US" dirty="0"/>
-              <a:t>BL11 Bang Sue MRT</a:t>
-            </a:r>
-          </a:p>
-          <a:p>
-            <a:pPr lvl="1"/>
-            <a:r>
-              <a:rPr lang="en-US" dirty="0"/>
-              <a:t>BL32 </a:t>
-            </a:r>
-            <a:r>
-              <a:rPr lang="en-US" dirty="0" err="1"/>
-              <a:t>Itsaraphap</a:t>
-            </a:r>
-            <a:r>
-              <a:rPr lang="en-US" dirty="0"/>
-              <a:t> MRT</a:t>
-            </a:r>
-          </a:p>
-          <a:p>
-            <a:pPr lvl="1"/>
-            <a:r>
-              <a:rPr lang="en-US" dirty="0"/>
-              <a:t>B9 Rama IX Bridge BRT</a:t>
-            </a:r>
-          </a:p>
-        </p:txBody>
-      </p:sp>
-      <p:sp>
-        <p:nvSpPr>
-          <p:cNvPr id="4" name="Slide Number Placeholder 3">
-            <a:extLst>
-              <a:ext uri="{FF2B5EF4-FFF2-40B4-BE49-F238E27FC236}">
-                <a16:creationId xmlns:a16="http://schemas.microsoft.com/office/drawing/2014/main" id="{09750248-72D6-C397-181A-BF727D58C4D1}"/>
+              <a:t>A lot of missing data</a:t>
+            </a:r>
+          </a:p>
+        </p:txBody>
+      </p:sp>
+      <p:sp>
+        <p:nvSpPr>
+          <p:cNvPr id="5" name="Slide Number Placeholder 4">
+            <a:extLst>
+              <a:ext uri="{FF2B5EF4-FFF2-40B4-BE49-F238E27FC236}">
+                <a16:creationId xmlns:a16="http://schemas.microsoft.com/office/drawing/2014/main" id="{C0256DC6-B7C3-69BB-F56B-6451A6CE8C98}"/>
               </a:ext>
             </a:extLst>
           </p:cNvPr>
@@ -4604,10 +5270,10 @@
       </p:sp>
       <p:sp>
         <p:nvSpPr>
-          <p:cNvPr id="7" name="Arrow: Right 6">
-            <a:extLst>
-              <a:ext uri="{FF2B5EF4-FFF2-40B4-BE49-F238E27FC236}">
-                <a16:creationId xmlns:a16="http://schemas.microsoft.com/office/drawing/2014/main" id="{75933EC6-8C4D-50A7-13C7-30CA63AB2BED}"/>
+          <p:cNvPr id="14" name="Rectangle 13">
+            <a:extLst>
+              <a:ext uri="{FF2B5EF4-FFF2-40B4-BE49-F238E27FC236}">
+                <a16:creationId xmlns:a16="http://schemas.microsoft.com/office/drawing/2014/main" id="{8FBA0743-B278-CBA6-650E-54C1D90DCE33}"/>
               </a:ext>
             </a:extLst>
           </p:cNvPr>
@@ -4615,24 +5281,21 @@
           <p:nvPr/>
         </p:nvSpPr>
         <p:spPr>
-          <a:xfrm rot="16200000">
-            <a:off x="8872018" y="3027636"/>
-            <a:ext cx="1385094" cy="606671"/>
-          </a:xfrm>
-          <a:prstGeom prst="rightArrow">
-            <a:avLst>
-              <a:gd name="adj1" fmla="val 50000"/>
-              <a:gd name="adj2" fmla="val 81488"/>
-            </a:avLst>
+          <a:xfrm>
+            <a:off x="3965510" y="2304661"/>
+            <a:ext cx="401217" cy="3834882"/>
+          </a:xfrm>
+          <a:prstGeom prst="rect">
+            <a:avLst/>
           </a:prstGeom>
           <a:solidFill>
-            <a:srgbClr val="00B050"/>
+            <a:srgbClr val="C00000">
+              <a:alpha val="50196"/>
+            </a:srgbClr>
           </a:solidFill>
-          <a:ln>
+          <a:ln w="38100">
             <a:solidFill>
-              <a:schemeClr val="accent6">
-                <a:lumMod val="50000"/>
-              </a:schemeClr>
+              <a:srgbClr val="C00000"/>
             </a:solidFill>
           </a:ln>
         </p:spPr>
@@ -4663,10 +5326,10 @@
       </p:sp>
       <p:sp>
         <p:nvSpPr>
-          <p:cNvPr id="9" name="Arrow: Right 8">
-            <a:extLst>
-              <a:ext uri="{FF2B5EF4-FFF2-40B4-BE49-F238E27FC236}">
-                <a16:creationId xmlns:a16="http://schemas.microsoft.com/office/drawing/2014/main" id="{0E43C9E1-FB20-F24E-CE72-F0CC4F9CFE0B}"/>
+          <p:cNvPr id="15" name="Rectangle 14">
+            <a:extLst>
+              <a:ext uri="{FF2B5EF4-FFF2-40B4-BE49-F238E27FC236}">
+                <a16:creationId xmlns:a16="http://schemas.microsoft.com/office/drawing/2014/main" id="{9E1BC2AE-2382-360A-D1C6-87D253CCEBF3}"/>
               </a:ext>
             </a:extLst>
           </p:cNvPr>
@@ -4674,24 +5337,21 @@
           <p:nvPr/>
         </p:nvSpPr>
         <p:spPr>
-          <a:xfrm rot="16200000">
-            <a:off x="8148119" y="3027635"/>
-            <a:ext cx="1385094" cy="606671"/>
-          </a:xfrm>
-          <a:prstGeom prst="rightArrow">
-            <a:avLst>
-              <a:gd name="adj1" fmla="val 50000"/>
-              <a:gd name="adj2" fmla="val 81488"/>
-            </a:avLst>
+          <a:xfrm>
+            <a:off x="5479791" y="2304661"/>
+            <a:ext cx="401218" cy="3834882"/>
+          </a:xfrm>
+          <a:prstGeom prst="rect">
+            <a:avLst/>
           </a:prstGeom>
           <a:solidFill>
-            <a:srgbClr val="00B050"/>
+            <a:srgbClr val="C00000">
+              <a:alpha val="50196"/>
+            </a:srgbClr>
           </a:solidFill>
-          <a:ln>
+          <a:ln w="38100">
             <a:solidFill>
-              <a:schemeClr val="accent6">
-                <a:lumMod val="50000"/>
-              </a:schemeClr>
+              <a:srgbClr val="C00000"/>
             </a:solidFill>
           </a:ln>
         </p:spPr>
@@ -4722,10 +5382,10 @@
       </p:sp>
       <p:sp>
         <p:nvSpPr>
-          <p:cNvPr id="10" name="Plus Sign 9">
-            <a:extLst>
-              <a:ext uri="{FF2B5EF4-FFF2-40B4-BE49-F238E27FC236}">
-                <a16:creationId xmlns:a16="http://schemas.microsoft.com/office/drawing/2014/main" id="{F6FECDB0-1530-7ED8-4308-B67E5BFA9E88}"/>
+          <p:cNvPr id="17" name="Rectangle 16">
+            <a:extLst>
+              <a:ext uri="{FF2B5EF4-FFF2-40B4-BE49-F238E27FC236}">
+                <a16:creationId xmlns:a16="http://schemas.microsoft.com/office/drawing/2014/main" id="{B92570B7-BB7B-B8F4-3430-814C78791B87}"/>
               </a:ext>
             </a:extLst>
           </p:cNvPr>
@@ -4734,20 +5394,20 @@
         </p:nvSpPr>
         <p:spPr>
           <a:xfrm>
-            <a:off x="9791700" y="2419350"/>
-            <a:ext cx="606672" cy="606672"/>
-          </a:xfrm>
-          <a:prstGeom prst="mathPlus">
+            <a:off x="8873023" y="2304661"/>
+            <a:ext cx="401217" cy="3834882"/>
+          </a:xfrm>
+          <a:prstGeom prst="rect">
             <a:avLst/>
           </a:prstGeom>
           <a:solidFill>
-            <a:srgbClr val="00B050"/>
+            <a:srgbClr val="C00000">
+              <a:alpha val="50196"/>
+            </a:srgbClr>
           </a:solidFill>
-          <a:ln>
+          <a:ln w="38100">
             <a:solidFill>
-              <a:schemeClr val="accent6">
-                <a:lumMod val="50000"/>
-              </a:schemeClr>
+              <a:srgbClr val="C00000"/>
             </a:solidFill>
           </a:ln>
         </p:spPr>
@@ -4776,10 +5436,354 @@
           </a:p>
         </p:txBody>
       </p:sp>
+      <p:sp>
+        <p:nvSpPr>
+          <p:cNvPr id="2" name="Rectangle 1">
+            <a:extLst>
+              <a:ext uri="{FF2B5EF4-FFF2-40B4-BE49-F238E27FC236}">
+                <a16:creationId xmlns:a16="http://schemas.microsoft.com/office/drawing/2014/main" id="{6D94E452-0F0A-7E1C-4535-ADD91D4791AD}"/>
+              </a:ext>
+            </a:extLst>
+          </p:cNvPr>
+          <p:cNvSpPr/>
+          <p:nvPr/>
+        </p:nvSpPr>
+        <p:spPr>
+          <a:xfrm>
+            <a:off x="5881008" y="2304661"/>
+            <a:ext cx="401217" cy="3834882"/>
+          </a:xfrm>
+          <a:prstGeom prst="rect">
+            <a:avLst/>
+          </a:prstGeom>
+          <a:solidFill>
+            <a:srgbClr val="4472C4">
+              <a:alpha val="50196"/>
+            </a:srgbClr>
+          </a:solidFill>
+          <a:ln w="38100">
+            <a:solidFill>
+              <a:schemeClr val="accent1"/>
+            </a:solidFill>
+          </a:ln>
+        </p:spPr>
+        <p:style>
+          <a:lnRef idx="2">
+            <a:schemeClr val="accent1">
+              <a:shade val="15000"/>
+            </a:schemeClr>
+          </a:lnRef>
+          <a:fillRef idx="1">
+            <a:schemeClr val="accent1"/>
+          </a:fillRef>
+          <a:effectRef idx="0">
+            <a:schemeClr val="accent1"/>
+          </a:effectRef>
+          <a:fontRef idx="minor">
+            <a:schemeClr val="lt1"/>
+          </a:fontRef>
+        </p:style>
+        <p:txBody>
+          <a:bodyPr rtlCol="0" anchor="ctr"/>
+          <a:lstStyle/>
+          <a:p>
+            <a:pPr algn="ctr"/>
+            <a:endParaRPr lang="en-US"/>
+          </a:p>
+        </p:txBody>
+      </p:sp>
+      <p:sp>
+        <p:nvSpPr>
+          <p:cNvPr id="3" name="Rectangle 2">
+            <a:extLst>
+              <a:ext uri="{FF2B5EF4-FFF2-40B4-BE49-F238E27FC236}">
+                <a16:creationId xmlns:a16="http://schemas.microsoft.com/office/drawing/2014/main" id="{2A500011-A2AA-5B8A-26B1-FC7FE82DACC2}"/>
+              </a:ext>
+            </a:extLst>
+          </p:cNvPr>
+          <p:cNvSpPr/>
+          <p:nvPr/>
+        </p:nvSpPr>
+        <p:spPr>
+          <a:xfrm>
+            <a:off x="7752767" y="2304661"/>
+            <a:ext cx="401217" cy="3834882"/>
+          </a:xfrm>
+          <a:prstGeom prst="rect">
+            <a:avLst/>
+          </a:prstGeom>
+          <a:solidFill>
+            <a:srgbClr val="4472C4">
+              <a:alpha val="50196"/>
+            </a:srgbClr>
+          </a:solidFill>
+          <a:ln w="38100">
+            <a:solidFill>
+              <a:schemeClr val="accent1"/>
+            </a:solidFill>
+          </a:ln>
+        </p:spPr>
+        <p:style>
+          <a:lnRef idx="2">
+            <a:schemeClr val="accent1">
+              <a:shade val="15000"/>
+            </a:schemeClr>
+          </a:lnRef>
+          <a:fillRef idx="1">
+            <a:schemeClr val="accent1"/>
+          </a:fillRef>
+          <a:effectRef idx="0">
+            <a:schemeClr val="accent1"/>
+          </a:effectRef>
+          <a:fontRef idx="minor">
+            <a:schemeClr val="lt1"/>
+          </a:fontRef>
+        </p:style>
+        <p:txBody>
+          <a:bodyPr rtlCol="0" anchor="ctr"/>
+          <a:lstStyle/>
+          <a:p>
+            <a:pPr algn="ctr"/>
+            <a:endParaRPr lang="en-US"/>
+          </a:p>
+        </p:txBody>
+      </p:sp>
+      <p:sp>
+        <p:nvSpPr>
+          <p:cNvPr id="7" name="TextBox 6">
+            <a:extLst>
+              <a:ext uri="{FF2B5EF4-FFF2-40B4-BE49-F238E27FC236}">
+                <a16:creationId xmlns:a16="http://schemas.microsoft.com/office/drawing/2014/main" id="{E611DEC0-DBDB-7573-BD99-1C39BAA31518}"/>
+              </a:ext>
+            </a:extLst>
+          </p:cNvPr>
+          <p:cNvSpPr txBox="1"/>
+          <p:nvPr/>
+        </p:nvSpPr>
+        <p:spPr>
+          <a:xfrm>
+            <a:off x="8199549" y="578480"/>
+            <a:ext cx="3770071" cy="369332"/>
+          </a:xfrm>
+          <a:prstGeom prst="rect">
+            <a:avLst/>
+          </a:prstGeom>
+          <a:noFill/>
+        </p:spPr>
+        <p:txBody>
+          <a:bodyPr wrap="none" rtlCol="0">
+            <a:spAutoFit/>
+          </a:bodyPr>
+          <a:lstStyle/>
+          <a:p>
+            <a:r>
+              <a:rPr lang="en-US" b="1" dirty="0">
+                <a:solidFill>
+                  <a:schemeClr val="accent1"/>
+                </a:solidFill>
+              </a:rPr>
+              <a:t>Mean-imputed with missing indicator</a:t>
+            </a:r>
+          </a:p>
+        </p:txBody>
+      </p:sp>
+      <p:sp>
+        <p:nvSpPr>
+          <p:cNvPr id="9" name="TextBox 8">
+            <a:extLst>
+              <a:ext uri="{FF2B5EF4-FFF2-40B4-BE49-F238E27FC236}">
+                <a16:creationId xmlns:a16="http://schemas.microsoft.com/office/drawing/2014/main" id="{B99E6314-FA5C-93EE-944E-0B971B7A788C}"/>
+              </a:ext>
+            </a:extLst>
+          </p:cNvPr>
+          <p:cNvSpPr txBox="1"/>
+          <p:nvPr/>
+        </p:nvSpPr>
+        <p:spPr>
+          <a:xfrm>
+            <a:off x="8322981" y="195591"/>
+            <a:ext cx="3646639" cy="369332"/>
+          </a:xfrm>
+          <a:prstGeom prst="rect">
+            <a:avLst/>
+          </a:prstGeom>
+          <a:noFill/>
+        </p:spPr>
+        <p:txBody>
+          <a:bodyPr wrap="none" rtlCol="0">
+            <a:spAutoFit/>
+          </a:bodyPr>
+          <a:lstStyle/>
+          <a:p>
+            <a:r>
+              <a:rPr lang="en-US" b="1" dirty="0">
+                <a:solidFill>
+                  <a:srgbClr val="C00000"/>
+                </a:solidFill>
+              </a:rPr>
+              <a:t>KNN-imputed with missing indicator</a:t>
+            </a:r>
+          </a:p>
+        </p:txBody>
+      </p:sp>
+      <p:sp>
+        <p:nvSpPr>
+          <p:cNvPr id="4" name="Rectangle 3">
+            <a:extLst>
+              <a:ext uri="{FF2B5EF4-FFF2-40B4-BE49-F238E27FC236}">
+                <a16:creationId xmlns:a16="http://schemas.microsoft.com/office/drawing/2014/main" id="{B9F5E367-C490-C89F-109A-20D3BC683E4A}"/>
+              </a:ext>
+            </a:extLst>
+          </p:cNvPr>
+          <p:cNvSpPr/>
+          <p:nvPr/>
+        </p:nvSpPr>
+        <p:spPr>
+          <a:xfrm>
+            <a:off x="7354464" y="2304661"/>
+            <a:ext cx="401217" cy="3834882"/>
+          </a:xfrm>
+          <a:prstGeom prst="rect">
+            <a:avLst/>
+          </a:prstGeom>
+          <a:solidFill>
+            <a:srgbClr val="548235">
+              <a:alpha val="50196"/>
+            </a:srgbClr>
+          </a:solidFill>
+          <a:ln w="38100">
+            <a:solidFill>
+              <a:schemeClr val="accent6">
+                <a:lumMod val="75000"/>
+              </a:schemeClr>
+            </a:solidFill>
+          </a:ln>
+        </p:spPr>
+        <p:style>
+          <a:lnRef idx="2">
+            <a:schemeClr val="accent1">
+              <a:shade val="15000"/>
+            </a:schemeClr>
+          </a:lnRef>
+          <a:fillRef idx="1">
+            <a:schemeClr val="accent1"/>
+          </a:fillRef>
+          <a:effectRef idx="0">
+            <a:schemeClr val="accent1"/>
+          </a:effectRef>
+          <a:fontRef idx="minor">
+            <a:schemeClr val="lt1"/>
+          </a:fontRef>
+        </p:style>
+        <p:txBody>
+          <a:bodyPr rtlCol="0" anchor="ctr"/>
+          <a:lstStyle/>
+          <a:p>
+            <a:pPr algn="ctr"/>
+            <a:endParaRPr lang="en-US"/>
+          </a:p>
+        </p:txBody>
+      </p:sp>
+      <p:sp>
+        <p:nvSpPr>
+          <p:cNvPr id="8" name="TextBox 7">
+            <a:extLst>
+              <a:ext uri="{FF2B5EF4-FFF2-40B4-BE49-F238E27FC236}">
+                <a16:creationId xmlns:a16="http://schemas.microsoft.com/office/drawing/2014/main" id="{8C0BC50B-E21C-71AC-A5ED-0A48C792C154}"/>
+              </a:ext>
+            </a:extLst>
+          </p:cNvPr>
+          <p:cNvSpPr txBox="1"/>
+          <p:nvPr/>
+        </p:nvSpPr>
+        <p:spPr>
+          <a:xfrm>
+            <a:off x="7968204" y="961369"/>
+            <a:ext cx="4001416" cy="369332"/>
+          </a:xfrm>
+          <a:prstGeom prst="rect">
+            <a:avLst/>
+          </a:prstGeom>
+          <a:noFill/>
+        </p:spPr>
+        <p:txBody>
+          <a:bodyPr wrap="none" rtlCol="0">
+            <a:spAutoFit/>
+          </a:bodyPr>
+          <a:lstStyle/>
+          <a:p>
+            <a:r>
+              <a:rPr lang="en-US" b="1" dirty="0">
+                <a:solidFill>
+                  <a:schemeClr val="accent6">
+                    <a:lumMod val="75000"/>
+                  </a:schemeClr>
+                </a:solidFill>
+              </a:rPr>
+              <a:t>Custom transformation + normalization </a:t>
+            </a:r>
+          </a:p>
+        </p:txBody>
+      </p:sp>
+      <p:sp>
+        <p:nvSpPr>
+          <p:cNvPr id="21" name="TextBox 20">
+            <a:extLst>
+              <a:ext uri="{FF2B5EF4-FFF2-40B4-BE49-F238E27FC236}">
+                <a16:creationId xmlns:a16="http://schemas.microsoft.com/office/drawing/2014/main" id="{A75FA578-8018-60E0-2FE6-92B39EC83B12}"/>
+              </a:ext>
+            </a:extLst>
+          </p:cNvPr>
+          <p:cNvSpPr txBox="1"/>
+          <p:nvPr/>
+        </p:nvSpPr>
+        <p:spPr>
+          <a:xfrm>
+            <a:off x="3933880" y="3898936"/>
+            <a:ext cx="4295471" cy="646331"/>
+          </a:xfrm>
+          <a:prstGeom prst="rect">
+            <a:avLst/>
+          </a:prstGeom>
+          <a:solidFill>
+            <a:srgbClr val="FFFFFF">
+              <a:alpha val="80000"/>
+            </a:srgbClr>
+          </a:solidFill>
+        </p:spPr>
+        <p:txBody>
+          <a:bodyPr wrap="none" rtlCol="0">
+            <a:spAutoFit/>
+          </a:bodyPr>
+          <a:lstStyle/>
+          <a:p>
+            <a:pPr algn="ctr"/>
+            <a:r>
+              <a:rPr lang="en-US" dirty="0"/>
+              <a:t>Then, drop the rest of missing value</a:t>
+            </a:r>
+          </a:p>
+          <a:p>
+            <a:pPr algn="ctr"/>
+            <a:r>
+              <a:rPr lang="en-US" dirty="0"/>
+              <a:t>except “</a:t>
+            </a:r>
+            <a:r>
+              <a:rPr lang="en-US" dirty="0" err="1"/>
+              <a:t>month_built</a:t>
+            </a:r>
+            <a:r>
+              <a:rPr lang="en-US" dirty="0"/>
+              <a:t>” because it is not used</a:t>
+            </a:r>
+          </a:p>
+        </p:txBody>
+      </p:sp>
     </p:spTree>
     <p:extLst>
       <p:ext uri="{BB962C8B-B14F-4D97-AF65-F5344CB8AC3E}">
-        <p14:creationId xmlns:p14="http://schemas.microsoft.com/office/powerpoint/2010/main" val="3432038458"/>
+        <p14:creationId xmlns:p14="http://schemas.microsoft.com/office/powerpoint/2010/main" val="1992704265"/>
       </p:ext>
     </p:extLst>
   </p:cSld>
@@ -4811,7 +5815,7 @@
           <p:cNvPr id="2" name="Title 1">
             <a:extLst>
               <a:ext uri="{FF2B5EF4-FFF2-40B4-BE49-F238E27FC236}">
-                <a16:creationId xmlns:a16="http://schemas.microsoft.com/office/drawing/2014/main" id="{1E9777B6-1D18-9AE4-4B2D-A39F96472237}"/>
+                <a16:creationId xmlns:a16="http://schemas.microsoft.com/office/drawing/2014/main" id="{1DCD32CE-9C2F-2DFE-9D51-6B3C6CB76AAD}"/>
               </a:ext>
             </a:extLst>
           </p:cNvPr>
@@ -4827,11 +5831,15 @@
           <a:bodyPr/>
           <a:lstStyle/>
           <a:p>
-            <a:pPr algn="ctr"/>
             <a:r>
               <a:rPr lang="en-US" b="1" dirty="0"/>
-              <a:t>Other findings</a:t>
-            </a:r>
+              <a:t>For </a:t>
+            </a:r>
+            <a:r>
+              <a:rPr lang="en-US" b="1" dirty="0" err="1"/>
+              <a:t>nearby_station_distance</a:t>
+            </a:r>
+            <a:endParaRPr lang="en-US" b="1" dirty="0"/>
           </a:p>
         </p:txBody>
       </p:sp>
@@ -4840,7 +5848,7 @@
           <p:cNvPr id="3" name="Content Placeholder 2">
             <a:extLst>
               <a:ext uri="{FF2B5EF4-FFF2-40B4-BE49-F238E27FC236}">
-                <a16:creationId xmlns:a16="http://schemas.microsoft.com/office/drawing/2014/main" id="{E8A09B5F-DE2C-7CF2-CBF8-F50A988F953A}"/>
+                <a16:creationId xmlns:a16="http://schemas.microsoft.com/office/drawing/2014/main" id="{4A327434-1F00-62AD-0AD2-A1DED59068E9}"/>
               </a:ext>
             </a:extLst>
           </p:cNvPr>
@@ -4858,13 +5866,8 @@
           <a:p>
             <a:r>
               <a:rPr lang="en-US" dirty="0"/>
-              <a:t>Top 10 district/subdistrict that will have higher housing price according to </a:t>
-            </a:r>
-            <a:r>
-              <a:rPr lang="en-US"/>
-              <a:t>the model.</a:t>
-            </a:r>
-            <a:endParaRPr lang="en-US" dirty="0"/>
+              <a:t>Custom transformation + normalization</a:t>
+            </a:r>
           </a:p>
         </p:txBody>
       </p:sp>
@@ -4873,7 +5876,7 @@
           <p:cNvPr id="4" name="Slide Number Placeholder 3">
             <a:extLst>
               <a:ext uri="{FF2B5EF4-FFF2-40B4-BE49-F238E27FC236}">
-                <a16:creationId xmlns:a16="http://schemas.microsoft.com/office/drawing/2014/main" id="{6B418609-1306-BE71-6DA7-0D5AA915DE99}"/>
+                <a16:creationId xmlns:a16="http://schemas.microsoft.com/office/drawing/2014/main" id="{D94C2FA9-0CE8-3ED6-5276-36E23FEB5785}"/>
               </a:ext>
             </a:extLst>
           </p:cNvPr>
@@ -4902,7 +5905,370 @@
           <p:cNvPr id="6" name="Picture 5">
             <a:extLst>
               <a:ext uri="{FF2B5EF4-FFF2-40B4-BE49-F238E27FC236}">
-                <a16:creationId xmlns:a16="http://schemas.microsoft.com/office/drawing/2014/main" id="{49A24DA1-0F48-F3C2-A7D4-5111DC5363B1}"/>
+                <a16:creationId xmlns:a16="http://schemas.microsoft.com/office/drawing/2014/main" id="{E71FF561-A9DF-12D8-E865-1F11DA554B9A}"/>
+              </a:ext>
+            </a:extLst>
+          </p:cNvPr>
+          <p:cNvPicPr>
+            <a:picLocks noChangeAspect="1"/>
+          </p:cNvPicPr>
+          <p:nvPr/>
+        </p:nvPicPr>
+        <p:blipFill rotWithShape="1">
+          <a:blip r:embed="rId2"/>
+          <a:srcRect b="72667"/>
+          <a:stretch/>
+        </p:blipFill>
+        <p:spPr>
+          <a:xfrm>
+            <a:off x="1020209" y="3251812"/>
+            <a:ext cx="3052258" cy="1325563"/>
+          </a:xfrm>
+          <a:prstGeom prst="rect">
+            <a:avLst/>
+          </a:prstGeom>
+        </p:spPr>
+      </p:pic>
+      <p:sp>
+        <p:nvSpPr>
+          <p:cNvPr id="9" name="Arrow: Right 8">
+            <a:extLst>
+              <a:ext uri="{FF2B5EF4-FFF2-40B4-BE49-F238E27FC236}">
+                <a16:creationId xmlns:a16="http://schemas.microsoft.com/office/drawing/2014/main" id="{E821C578-EB69-7AFC-4673-D254CCF733D2}"/>
+              </a:ext>
+            </a:extLst>
+          </p:cNvPr>
+          <p:cNvSpPr/>
+          <p:nvPr/>
+        </p:nvSpPr>
+        <p:spPr>
+          <a:xfrm>
+            <a:off x="4440196" y="3707168"/>
+            <a:ext cx="802432" cy="414855"/>
+          </a:xfrm>
+          <a:prstGeom prst="rightArrow">
+            <a:avLst>
+              <a:gd name="adj1" fmla="val 50000"/>
+              <a:gd name="adj2" fmla="val 81488"/>
+            </a:avLst>
+          </a:prstGeom>
+          <a:solidFill>
+            <a:schemeClr val="tx1">
+              <a:lumMod val="85000"/>
+              <a:lumOff val="15000"/>
+            </a:schemeClr>
+          </a:solidFill>
+          <a:ln>
+            <a:solidFill>
+              <a:schemeClr val="tx1"/>
+            </a:solidFill>
+          </a:ln>
+        </p:spPr>
+        <p:style>
+          <a:lnRef idx="2">
+            <a:schemeClr val="accent1">
+              <a:shade val="15000"/>
+            </a:schemeClr>
+          </a:lnRef>
+          <a:fillRef idx="1">
+            <a:schemeClr val="accent1"/>
+          </a:fillRef>
+          <a:effectRef idx="0">
+            <a:schemeClr val="accent1"/>
+          </a:effectRef>
+          <a:fontRef idx="minor">
+            <a:schemeClr val="lt1"/>
+          </a:fontRef>
+        </p:style>
+        <p:txBody>
+          <a:bodyPr rtlCol="0" anchor="ctr"/>
+          <a:lstStyle/>
+          <a:p>
+            <a:pPr algn="ctr"/>
+            <a:endParaRPr lang="en-US"/>
+          </a:p>
+        </p:txBody>
+      </p:sp>
+      <p:pic>
+        <p:nvPicPr>
+          <p:cNvPr id="15" name="Picture 14">
+            <a:extLst>
+              <a:ext uri="{FF2B5EF4-FFF2-40B4-BE49-F238E27FC236}">
+                <a16:creationId xmlns:a16="http://schemas.microsoft.com/office/drawing/2014/main" id="{A83A28AD-253E-F0B1-D407-B883745B5EFF}"/>
+              </a:ext>
+            </a:extLst>
+          </p:cNvPr>
+          <p:cNvPicPr>
+            <a:picLocks noChangeAspect="1"/>
+          </p:cNvPicPr>
+          <p:nvPr/>
+        </p:nvPicPr>
+        <p:blipFill>
+          <a:blip r:embed="rId3"/>
+          <a:stretch>
+            <a:fillRect/>
+          </a:stretch>
+        </p:blipFill>
+        <p:spPr>
+          <a:xfrm>
+            <a:off x="5571318" y="3176304"/>
+            <a:ext cx="5782482" cy="1476581"/>
+          </a:xfrm>
+          <a:prstGeom prst="rect">
+            <a:avLst/>
+          </a:prstGeom>
+        </p:spPr>
+      </p:pic>
+      <p:sp>
+        <p:nvSpPr>
+          <p:cNvPr id="10" name="Rectangle 9">
+            <a:extLst>
+              <a:ext uri="{FF2B5EF4-FFF2-40B4-BE49-F238E27FC236}">
+                <a16:creationId xmlns:a16="http://schemas.microsoft.com/office/drawing/2014/main" id="{C6A62205-33CC-50AA-1345-5C229F79AB02}"/>
+              </a:ext>
+            </a:extLst>
+          </p:cNvPr>
+          <p:cNvSpPr/>
+          <p:nvPr/>
+        </p:nvSpPr>
+        <p:spPr>
+          <a:xfrm>
+            <a:off x="6250335" y="3441922"/>
+            <a:ext cx="2048002" cy="326377"/>
+          </a:xfrm>
+          <a:prstGeom prst="rect">
+            <a:avLst/>
+          </a:prstGeom>
+          <a:noFill/>
+          <a:ln w="38100">
+            <a:solidFill>
+              <a:srgbClr val="FF0000"/>
+            </a:solidFill>
+          </a:ln>
+        </p:spPr>
+        <p:style>
+          <a:lnRef idx="2">
+            <a:schemeClr val="accent1">
+              <a:shade val="15000"/>
+            </a:schemeClr>
+          </a:lnRef>
+          <a:fillRef idx="1">
+            <a:schemeClr val="accent1"/>
+          </a:fillRef>
+          <a:effectRef idx="0">
+            <a:schemeClr val="accent1"/>
+          </a:effectRef>
+          <a:fontRef idx="minor">
+            <a:schemeClr val="lt1"/>
+          </a:fontRef>
+        </p:style>
+        <p:txBody>
+          <a:bodyPr rtlCol="0" anchor="ctr"/>
+          <a:lstStyle/>
+          <a:p>
+            <a:pPr algn="ctr"/>
+            <a:endParaRPr lang="en-US"/>
+          </a:p>
+        </p:txBody>
+      </p:sp>
+      <p:sp>
+        <p:nvSpPr>
+          <p:cNvPr id="11" name="Rectangle 10">
+            <a:extLst>
+              <a:ext uri="{FF2B5EF4-FFF2-40B4-BE49-F238E27FC236}">
+                <a16:creationId xmlns:a16="http://schemas.microsoft.com/office/drawing/2014/main" id="{ACE4FE6F-1F7A-FA7D-DF5C-CA4E907C57B4}"/>
+              </a:ext>
+            </a:extLst>
+          </p:cNvPr>
+          <p:cNvSpPr/>
+          <p:nvPr/>
+        </p:nvSpPr>
+        <p:spPr>
+          <a:xfrm>
+            <a:off x="8965654" y="3698419"/>
+            <a:ext cx="2388146" cy="326377"/>
+          </a:xfrm>
+          <a:prstGeom prst="rect">
+            <a:avLst/>
+          </a:prstGeom>
+          <a:noFill/>
+          <a:ln w="38100">
+            <a:solidFill>
+              <a:srgbClr val="FF0000"/>
+            </a:solidFill>
+          </a:ln>
+        </p:spPr>
+        <p:style>
+          <a:lnRef idx="2">
+            <a:schemeClr val="accent1">
+              <a:shade val="15000"/>
+            </a:schemeClr>
+          </a:lnRef>
+          <a:fillRef idx="1">
+            <a:schemeClr val="accent1"/>
+          </a:fillRef>
+          <a:effectRef idx="0">
+            <a:schemeClr val="accent1"/>
+          </a:effectRef>
+          <a:fontRef idx="minor">
+            <a:schemeClr val="lt1"/>
+          </a:fontRef>
+        </p:style>
+        <p:txBody>
+          <a:bodyPr rtlCol="0" anchor="ctr"/>
+          <a:lstStyle/>
+          <a:p>
+            <a:pPr algn="ctr"/>
+            <a:endParaRPr lang="en-US"/>
+          </a:p>
+        </p:txBody>
+      </p:sp>
+      <p:sp>
+        <p:nvSpPr>
+          <p:cNvPr id="16" name="Rectangle 15">
+            <a:extLst>
+              <a:ext uri="{FF2B5EF4-FFF2-40B4-BE49-F238E27FC236}">
+                <a16:creationId xmlns:a16="http://schemas.microsoft.com/office/drawing/2014/main" id="{28CA0697-2F6C-9009-2641-286A669B1B54}"/>
+              </a:ext>
+            </a:extLst>
+          </p:cNvPr>
+          <p:cNvSpPr/>
+          <p:nvPr/>
+        </p:nvSpPr>
+        <p:spPr>
+          <a:xfrm>
+            <a:off x="1264565" y="3447069"/>
+            <a:ext cx="2807902" cy="577726"/>
+          </a:xfrm>
+          <a:prstGeom prst="rect">
+            <a:avLst/>
+          </a:prstGeom>
+          <a:noFill/>
+          <a:ln w="38100">
+            <a:solidFill>
+              <a:srgbClr val="FF0000"/>
+            </a:solidFill>
+          </a:ln>
+        </p:spPr>
+        <p:style>
+          <a:lnRef idx="2">
+            <a:schemeClr val="accent1">
+              <a:shade val="15000"/>
+            </a:schemeClr>
+          </a:lnRef>
+          <a:fillRef idx="1">
+            <a:schemeClr val="accent1"/>
+          </a:fillRef>
+          <a:effectRef idx="0">
+            <a:schemeClr val="accent1"/>
+          </a:effectRef>
+          <a:fontRef idx="minor">
+            <a:schemeClr val="lt1"/>
+          </a:fontRef>
+        </p:style>
+        <p:txBody>
+          <a:bodyPr rtlCol="0" anchor="ctr"/>
+          <a:lstStyle/>
+          <a:p>
+            <a:pPr algn="ctr"/>
+            <a:endParaRPr lang="en-US"/>
+          </a:p>
+        </p:txBody>
+      </p:sp>
+    </p:spTree>
+    <p:extLst>
+      <p:ext uri="{BB962C8B-B14F-4D97-AF65-F5344CB8AC3E}">
+        <p14:creationId xmlns:p14="http://schemas.microsoft.com/office/powerpoint/2010/main" val="4287258574"/>
+      </p:ext>
+    </p:extLst>
+  </p:cSld>
+  <p:clrMapOvr>
+    <a:masterClrMapping/>
+  </p:clrMapOvr>
+</p:sld>
+</file>
+
+<file path=ppt/slides/slide13.xml><?xml version="1.0" encoding="utf-8"?>
+<p:sld xmlns:a="http://schemas.openxmlformats.org/drawingml/2006/main" xmlns:r="http://schemas.openxmlformats.org/officeDocument/2006/relationships" xmlns:p="http://schemas.openxmlformats.org/presentationml/2006/main">
+  <p:cSld>
+    <p:spTree>
+      <p:nvGrpSpPr>
+        <p:cNvPr id="1" name=""/>
+        <p:cNvGrpSpPr/>
+        <p:nvPr/>
+      </p:nvGrpSpPr>
+      <p:grpSpPr>
+        <a:xfrm>
+          <a:off x="0" y="0"/>
+          <a:ext cx="0" cy="0"/>
+          <a:chOff x="0" y="0"/>
+          <a:chExt cx="0" cy="0"/>
+        </a:xfrm>
+      </p:grpSpPr>
+      <p:sp>
+        <p:nvSpPr>
+          <p:cNvPr id="2" name="Title 1">
+            <a:extLst>
+              <a:ext uri="{FF2B5EF4-FFF2-40B4-BE49-F238E27FC236}">
+                <a16:creationId xmlns:a16="http://schemas.microsoft.com/office/drawing/2014/main" id="{148BA62D-8993-7949-6689-69FC6B5AD0E8}"/>
+              </a:ext>
+            </a:extLst>
+          </p:cNvPr>
+          <p:cNvSpPr>
+            <a:spLocks noGrp="1"/>
+          </p:cNvSpPr>
+          <p:nvPr>
+            <p:ph type="title"/>
+          </p:nvPr>
+        </p:nvSpPr>
+        <p:spPr/>
+        <p:txBody>
+          <a:bodyPr/>
+          <a:lstStyle/>
+          <a:p>
+            <a:pPr algn="ctr"/>
+            <a:r>
+              <a:rPr lang="en-US" b="1" dirty="0"/>
+              <a:t>Other transformations &amp; summary</a:t>
+            </a:r>
+          </a:p>
+        </p:txBody>
+      </p:sp>
+      <p:sp>
+        <p:nvSpPr>
+          <p:cNvPr id="4" name="Slide Number Placeholder 3">
+            <a:extLst>
+              <a:ext uri="{FF2B5EF4-FFF2-40B4-BE49-F238E27FC236}">
+                <a16:creationId xmlns:a16="http://schemas.microsoft.com/office/drawing/2014/main" id="{D1A0C39A-667A-C3B9-02DC-C83AA0289644}"/>
+              </a:ext>
+            </a:extLst>
+          </p:cNvPr>
+          <p:cNvSpPr>
+            <a:spLocks noGrp="1"/>
+          </p:cNvSpPr>
+          <p:nvPr>
+            <p:ph type="sldNum" sz="quarter" idx="12"/>
+          </p:nvPr>
+        </p:nvSpPr>
+        <p:spPr/>
+        <p:txBody>
+          <a:bodyPr/>
+          <a:lstStyle/>
+          <a:p>
+            <a:fld id="{640C5978-D207-4356-A33B-DAFE34A7F8D2}" type="slidenum">
+              <a:rPr lang="en-US" smtClean="0"/>
+              <a:t>13</a:t>
+            </a:fld>
+            <a:endParaRPr lang="en-US"/>
+          </a:p>
+        </p:txBody>
+      </p:sp>
+      <p:pic>
+        <p:nvPicPr>
+          <p:cNvPr id="9" name="Picture 8">
+            <a:extLst>
+              <a:ext uri="{FF2B5EF4-FFF2-40B4-BE49-F238E27FC236}">
+                <a16:creationId xmlns:a16="http://schemas.microsoft.com/office/drawing/2014/main" id="{98D673E5-BB90-8C15-8D3F-72A1765658C0}"/>
               </a:ext>
             </a:extLst>
           </p:cNvPr>
@@ -4919,7 +6285,728 @@
         </p:blipFill>
         <p:spPr>
           <a:xfrm>
-            <a:off x="4800419" y="2732389"/>
+            <a:off x="1297678" y="1455154"/>
+            <a:ext cx="9596643" cy="5092280"/>
+          </a:xfrm>
+          <a:prstGeom prst="rect">
+            <a:avLst/>
+          </a:prstGeom>
+        </p:spPr>
+      </p:pic>
+    </p:spTree>
+    <p:extLst>
+      <p:ext uri="{BB962C8B-B14F-4D97-AF65-F5344CB8AC3E}">
+        <p14:creationId xmlns:p14="http://schemas.microsoft.com/office/powerpoint/2010/main" val="3928268860"/>
+      </p:ext>
+    </p:extLst>
+  </p:cSld>
+  <p:clrMapOvr>
+    <a:masterClrMapping/>
+  </p:clrMapOvr>
+</p:sld>
+</file>
+
+<file path=ppt/slides/slide14.xml><?xml version="1.0" encoding="utf-8"?>
+<p:sld xmlns:a="http://schemas.openxmlformats.org/drawingml/2006/main" xmlns:r="http://schemas.openxmlformats.org/officeDocument/2006/relationships" xmlns:p="http://schemas.openxmlformats.org/presentationml/2006/main">
+  <p:cSld>
+    <p:spTree>
+      <p:nvGrpSpPr>
+        <p:cNvPr id="1" name=""/>
+        <p:cNvGrpSpPr/>
+        <p:nvPr/>
+      </p:nvGrpSpPr>
+      <p:grpSpPr>
+        <a:xfrm>
+          <a:off x="0" y="0"/>
+          <a:ext cx="0" cy="0"/>
+          <a:chOff x="0" y="0"/>
+          <a:chExt cx="0" cy="0"/>
+        </a:xfrm>
+      </p:grpSpPr>
+      <p:sp>
+        <p:nvSpPr>
+          <p:cNvPr id="2" name="Title 1">
+            <a:extLst>
+              <a:ext uri="{FF2B5EF4-FFF2-40B4-BE49-F238E27FC236}">
+                <a16:creationId xmlns:a16="http://schemas.microsoft.com/office/drawing/2014/main" id="{FB8A6BE0-E966-93AD-F411-DC44B85C3646}"/>
+              </a:ext>
+            </a:extLst>
+          </p:cNvPr>
+          <p:cNvSpPr>
+            <a:spLocks noGrp="1"/>
+          </p:cNvSpPr>
+          <p:nvPr>
+            <p:ph type="title"/>
+          </p:nvPr>
+        </p:nvSpPr>
+        <p:spPr/>
+        <p:txBody>
+          <a:bodyPr/>
+          <a:lstStyle/>
+          <a:p>
+            <a:r>
+              <a:rPr lang="en-US" b="1" dirty="0"/>
+              <a:t>Result</a:t>
+            </a:r>
+          </a:p>
+        </p:txBody>
+      </p:sp>
+      <p:sp>
+        <p:nvSpPr>
+          <p:cNvPr id="3" name="Content Placeholder 2">
+            <a:extLst>
+              <a:ext uri="{FF2B5EF4-FFF2-40B4-BE49-F238E27FC236}">
+                <a16:creationId xmlns:a16="http://schemas.microsoft.com/office/drawing/2014/main" id="{C6491CDD-2DED-489B-8A10-151C6C020DC1}"/>
+              </a:ext>
+            </a:extLst>
+          </p:cNvPr>
+          <p:cNvSpPr>
+            <a:spLocks noGrp="1"/>
+          </p:cNvSpPr>
+          <p:nvPr>
+            <p:ph idx="1"/>
+          </p:nvPr>
+        </p:nvSpPr>
+        <p:spPr/>
+        <p:txBody>
+          <a:bodyPr/>
+          <a:lstStyle/>
+          <a:p>
+            <a:r>
+              <a:rPr lang="en-US" dirty="0"/>
+              <a:t>Prediction model that</a:t>
+            </a:r>
+          </a:p>
+          <a:p>
+            <a:pPr lvl="1"/>
+            <a:r>
+              <a:rPr lang="en-US" dirty="0"/>
+              <a:t>Can explain </a:t>
+            </a:r>
+            <a:r>
+              <a:rPr lang="en-US" b="1" dirty="0">
+                <a:solidFill>
+                  <a:schemeClr val="accent1"/>
+                </a:solidFill>
+              </a:rPr>
+              <a:t>79.4%</a:t>
+            </a:r>
+            <a:r>
+              <a:rPr lang="en-US" dirty="0"/>
+              <a:t> of data </a:t>
+            </a:r>
+          </a:p>
+          <a:p>
+            <a:pPr lvl="1"/>
+            <a:r>
+              <a:rPr lang="en-US" dirty="0"/>
+              <a:t>The average error of </a:t>
+            </a:r>
+            <a:r>
+              <a:rPr lang="en-US" b="1" dirty="0">
+                <a:solidFill>
+                  <a:schemeClr val="accent1"/>
+                </a:solidFill>
+              </a:rPr>
+              <a:t>945K</a:t>
+            </a:r>
+            <a:r>
+              <a:rPr lang="en-US" dirty="0"/>
+              <a:t> THB approximately</a:t>
+            </a:r>
+          </a:p>
+        </p:txBody>
+      </p:sp>
+      <p:sp>
+        <p:nvSpPr>
+          <p:cNvPr id="4" name="Slide Number Placeholder 3">
+            <a:extLst>
+              <a:ext uri="{FF2B5EF4-FFF2-40B4-BE49-F238E27FC236}">
+                <a16:creationId xmlns:a16="http://schemas.microsoft.com/office/drawing/2014/main" id="{52229B81-D7A2-29B1-7673-E477ABEC2B38}"/>
+              </a:ext>
+            </a:extLst>
+          </p:cNvPr>
+          <p:cNvSpPr>
+            <a:spLocks noGrp="1"/>
+          </p:cNvSpPr>
+          <p:nvPr>
+            <p:ph type="sldNum" sz="quarter" idx="12"/>
+          </p:nvPr>
+        </p:nvSpPr>
+        <p:spPr/>
+        <p:txBody>
+          <a:bodyPr/>
+          <a:lstStyle/>
+          <a:p>
+            <a:fld id="{640C5978-D207-4356-A33B-DAFE34A7F8D2}" type="slidenum">
+              <a:rPr lang="en-US" smtClean="0"/>
+              <a:t>14</a:t>
+            </a:fld>
+            <a:endParaRPr lang="en-US"/>
+          </a:p>
+        </p:txBody>
+      </p:sp>
+      <p:pic>
+        <p:nvPicPr>
+          <p:cNvPr id="6" name="Picture 5">
+            <a:extLst>
+              <a:ext uri="{FF2B5EF4-FFF2-40B4-BE49-F238E27FC236}">
+                <a16:creationId xmlns:a16="http://schemas.microsoft.com/office/drawing/2014/main" id="{CDF46353-D5C7-5B64-D3B4-7682DAEDA658}"/>
+              </a:ext>
+            </a:extLst>
+          </p:cNvPr>
+          <p:cNvPicPr>
+            <a:picLocks noChangeAspect="1"/>
+          </p:cNvPicPr>
+          <p:nvPr/>
+        </p:nvPicPr>
+        <p:blipFill>
+          <a:blip r:embed="rId2"/>
+          <a:stretch>
+            <a:fillRect/>
+          </a:stretch>
+        </p:blipFill>
+        <p:spPr>
+          <a:xfrm>
+            <a:off x="838200" y="3600355"/>
+            <a:ext cx="10488489" cy="1352739"/>
+          </a:xfrm>
+          <a:prstGeom prst="rect">
+            <a:avLst/>
+          </a:prstGeom>
+        </p:spPr>
+      </p:pic>
+    </p:spTree>
+    <p:extLst>
+      <p:ext uri="{BB962C8B-B14F-4D97-AF65-F5344CB8AC3E}">
+        <p14:creationId xmlns:p14="http://schemas.microsoft.com/office/powerpoint/2010/main" val="2713355754"/>
+      </p:ext>
+    </p:extLst>
+  </p:cSld>
+  <p:clrMapOvr>
+    <a:masterClrMapping/>
+  </p:clrMapOvr>
+</p:sld>
+</file>
+
+<file path=ppt/slides/slide15.xml><?xml version="1.0" encoding="utf-8"?>
+<p:sld xmlns:a="http://schemas.openxmlformats.org/drawingml/2006/main" xmlns:r="http://schemas.openxmlformats.org/officeDocument/2006/relationships" xmlns:p="http://schemas.openxmlformats.org/presentationml/2006/main">
+  <p:cSld>
+    <p:spTree>
+      <p:nvGrpSpPr>
+        <p:cNvPr id="1" name=""/>
+        <p:cNvGrpSpPr/>
+        <p:nvPr/>
+      </p:nvGrpSpPr>
+      <p:grpSpPr>
+        <a:xfrm>
+          <a:off x="0" y="0"/>
+          <a:ext cx="0" cy="0"/>
+          <a:chOff x="0" y="0"/>
+          <a:chExt cx="0" cy="0"/>
+        </a:xfrm>
+      </p:grpSpPr>
+      <p:sp>
+        <p:nvSpPr>
+          <p:cNvPr id="2" name="Title 1">
+            <a:extLst>
+              <a:ext uri="{FF2B5EF4-FFF2-40B4-BE49-F238E27FC236}">
+                <a16:creationId xmlns:a16="http://schemas.microsoft.com/office/drawing/2014/main" id="{6723FDF9-B596-7CAD-2C57-A539302FD5ED}"/>
+              </a:ext>
+            </a:extLst>
+          </p:cNvPr>
+          <p:cNvSpPr>
+            <a:spLocks noGrp="1"/>
+          </p:cNvSpPr>
+          <p:nvPr>
+            <p:ph type="title"/>
+          </p:nvPr>
+        </p:nvSpPr>
+        <p:spPr/>
+        <p:txBody>
+          <a:bodyPr/>
+          <a:lstStyle/>
+          <a:p>
+            <a:pPr algn="ctr"/>
+            <a:r>
+              <a:rPr lang="en-US" b="1" dirty="0"/>
+              <a:t>Other findings</a:t>
+            </a:r>
+          </a:p>
+        </p:txBody>
+      </p:sp>
+      <p:sp>
+        <p:nvSpPr>
+          <p:cNvPr id="3" name="Content Placeholder 2">
+            <a:extLst>
+              <a:ext uri="{FF2B5EF4-FFF2-40B4-BE49-F238E27FC236}">
+                <a16:creationId xmlns:a16="http://schemas.microsoft.com/office/drawing/2014/main" id="{70E58C0E-CA1B-669D-293F-DA172BEAACBA}"/>
+              </a:ext>
+            </a:extLst>
+          </p:cNvPr>
+          <p:cNvSpPr>
+            <a:spLocks noGrp="1"/>
+          </p:cNvSpPr>
+          <p:nvPr>
+            <p:ph idx="1"/>
+          </p:nvPr>
+        </p:nvSpPr>
+        <p:spPr/>
+        <p:txBody>
+          <a:bodyPr>
+            <a:normAutofit fontScale="92500" lnSpcReduction="10000"/>
+          </a:bodyPr>
+          <a:lstStyle/>
+          <a:p>
+            <a:r>
+              <a:rPr lang="en-US" dirty="0"/>
+              <a:t>The following factors are significantly affect housing price positively.</a:t>
+            </a:r>
+          </a:p>
+          <a:p>
+            <a:pPr lvl="1"/>
+            <a:r>
+              <a:rPr lang="en-US" dirty="0"/>
+              <a:t>Floor area</a:t>
+            </a:r>
+          </a:p>
+          <a:p>
+            <a:pPr lvl="1"/>
+            <a:r>
+              <a:rPr lang="en-US" dirty="0"/>
+              <a:t>Number of nearby stations (within 1km)</a:t>
+            </a:r>
+          </a:p>
+          <a:p>
+            <a:pPr lvl="1"/>
+            <a:r>
+              <a:rPr lang="en-US" dirty="0"/>
+              <a:t>Number of bathrooms</a:t>
+            </a:r>
+          </a:p>
+          <a:p>
+            <a:pPr lvl="1"/>
+            <a:r>
+              <a:rPr lang="en-US" dirty="0"/>
+              <a:t>Total area of the land</a:t>
+            </a:r>
+          </a:p>
+          <a:p>
+            <a:pPr lvl="1"/>
+            <a:r>
+              <a:rPr lang="en-US" dirty="0"/>
+              <a:t>Year built</a:t>
+            </a:r>
+          </a:p>
+          <a:p>
+            <a:pPr lvl="1"/>
+            <a:r>
+              <a:rPr lang="en-US" dirty="0"/>
+              <a:t>Number of bedrooms</a:t>
+            </a:r>
+          </a:p>
+          <a:p>
+            <a:endParaRPr lang="en-US" dirty="0"/>
+          </a:p>
+          <a:p>
+            <a:r>
+              <a:rPr lang="en-US" dirty="0"/>
+              <a:t>Locating </a:t>
+            </a:r>
+            <a:r>
+              <a:rPr lang="en-US" dirty="0" err="1"/>
+              <a:t>neaby</a:t>
+            </a:r>
+            <a:r>
+              <a:rPr lang="en-US" dirty="0"/>
+              <a:t> these stations will significantly raise the price as well.</a:t>
+            </a:r>
+          </a:p>
+          <a:p>
+            <a:pPr lvl="1"/>
+            <a:r>
+              <a:rPr lang="en-US" dirty="0"/>
+              <a:t>BL11 Bang Sue MRT</a:t>
+            </a:r>
+          </a:p>
+          <a:p>
+            <a:pPr lvl="1"/>
+            <a:r>
+              <a:rPr lang="en-US" dirty="0"/>
+              <a:t>BL32 </a:t>
+            </a:r>
+            <a:r>
+              <a:rPr lang="en-US" dirty="0" err="1"/>
+              <a:t>Itsaraphap</a:t>
+            </a:r>
+            <a:r>
+              <a:rPr lang="en-US" dirty="0"/>
+              <a:t> MRT</a:t>
+            </a:r>
+          </a:p>
+          <a:p>
+            <a:pPr lvl="1"/>
+            <a:r>
+              <a:rPr lang="en-US" dirty="0"/>
+              <a:t>B9 Rama IX Bridge BRT</a:t>
+            </a:r>
+          </a:p>
+        </p:txBody>
+      </p:sp>
+      <p:sp>
+        <p:nvSpPr>
+          <p:cNvPr id="4" name="Slide Number Placeholder 3">
+            <a:extLst>
+              <a:ext uri="{FF2B5EF4-FFF2-40B4-BE49-F238E27FC236}">
+                <a16:creationId xmlns:a16="http://schemas.microsoft.com/office/drawing/2014/main" id="{09750248-72D6-C397-181A-BF727D58C4D1}"/>
+              </a:ext>
+            </a:extLst>
+          </p:cNvPr>
+          <p:cNvSpPr>
+            <a:spLocks noGrp="1"/>
+          </p:cNvSpPr>
+          <p:nvPr>
+            <p:ph type="sldNum" sz="quarter" idx="12"/>
+          </p:nvPr>
+        </p:nvSpPr>
+        <p:spPr/>
+        <p:txBody>
+          <a:bodyPr/>
+          <a:lstStyle/>
+          <a:p>
+            <a:fld id="{640C5978-D207-4356-A33B-DAFE34A7F8D2}" type="slidenum">
+              <a:rPr lang="en-US" smtClean="0"/>
+              <a:t>15</a:t>
+            </a:fld>
+            <a:endParaRPr lang="en-US"/>
+          </a:p>
+        </p:txBody>
+      </p:sp>
+      <p:sp>
+        <p:nvSpPr>
+          <p:cNvPr id="7" name="Arrow: Right 6">
+            <a:extLst>
+              <a:ext uri="{FF2B5EF4-FFF2-40B4-BE49-F238E27FC236}">
+                <a16:creationId xmlns:a16="http://schemas.microsoft.com/office/drawing/2014/main" id="{75933EC6-8C4D-50A7-13C7-30CA63AB2BED}"/>
+              </a:ext>
+            </a:extLst>
+          </p:cNvPr>
+          <p:cNvSpPr/>
+          <p:nvPr/>
+        </p:nvSpPr>
+        <p:spPr>
+          <a:xfrm rot="16200000">
+            <a:off x="8872018" y="3027636"/>
+            <a:ext cx="1385094" cy="606671"/>
+          </a:xfrm>
+          <a:prstGeom prst="rightArrow">
+            <a:avLst>
+              <a:gd name="adj1" fmla="val 50000"/>
+              <a:gd name="adj2" fmla="val 81488"/>
+            </a:avLst>
+          </a:prstGeom>
+          <a:solidFill>
+            <a:srgbClr val="00B050"/>
+          </a:solidFill>
+          <a:ln>
+            <a:solidFill>
+              <a:schemeClr val="accent6">
+                <a:lumMod val="50000"/>
+              </a:schemeClr>
+            </a:solidFill>
+          </a:ln>
+        </p:spPr>
+        <p:style>
+          <a:lnRef idx="2">
+            <a:schemeClr val="accent1">
+              <a:shade val="15000"/>
+            </a:schemeClr>
+          </a:lnRef>
+          <a:fillRef idx="1">
+            <a:schemeClr val="accent1"/>
+          </a:fillRef>
+          <a:effectRef idx="0">
+            <a:schemeClr val="accent1"/>
+          </a:effectRef>
+          <a:fontRef idx="minor">
+            <a:schemeClr val="lt1"/>
+          </a:fontRef>
+        </p:style>
+        <p:txBody>
+          <a:bodyPr rtlCol="0" anchor="ctr"/>
+          <a:lstStyle/>
+          <a:p>
+            <a:pPr algn="ctr"/>
+            <a:endParaRPr lang="en-US"/>
+          </a:p>
+        </p:txBody>
+      </p:sp>
+      <p:sp>
+        <p:nvSpPr>
+          <p:cNvPr id="9" name="Arrow: Right 8">
+            <a:extLst>
+              <a:ext uri="{FF2B5EF4-FFF2-40B4-BE49-F238E27FC236}">
+                <a16:creationId xmlns:a16="http://schemas.microsoft.com/office/drawing/2014/main" id="{0E43C9E1-FB20-F24E-CE72-F0CC4F9CFE0B}"/>
+              </a:ext>
+            </a:extLst>
+          </p:cNvPr>
+          <p:cNvSpPr/>
+          <p:nvPr/>
+        </p:nvSpPr>
+        <p:spPr>
+          <a:xfrm rot="16200000">
+            <a:off x="8148119" y="3027635"/>
+            <a:ext cx="1385094" cy="606671"/>
+          </a:xfrm>
+          <a:prstGeom prst="rightArrow">
+            <a:avLst>
+              <a:gd name="adj1" fmla="val 50000"/>
+              <a:gd name="adj2" fmla="val 81488"/>
+            </a:avLst>
+          </a:prstGeom>
+          <a:solidFill>
+            <a:srgbClr val="00B050"/>
+          </a:solidFill>
+          <a:ln>
+            <a:solidFill>
+              <a:schemeClr val="accent6">
+                <a:lumMod val="50000"/>
+              </a:schemeClr>
+            </a:solidFill>
+          </a:ln>
+        </p:spPr>
+        <p:style>
+          <a:lnRef idx="2">
+            <a:schemeClr val="accent1">
+              <a:shade val="15000"/>
+            </a:schemeClr>
+          </a:lnRef>
+          <a:fillRef idx="1">
+            <a:schemeClr val="accent1"/>
+          </a:fillRef>
+          <a:effectRef idx="0">
+            <a:schemeClr val="accent1"/>
+          </a:effectRef>
+          <a:fontRef idx="minor">
+            <a:schemeClr val="lt1"/>
+          </a:fontRef>
+        </p:style>
+        <p:txBody>
+          <a:bodyPr rtlCol="0" anchor="ctr"/>
+          <a:lstStyle/>
+          <a:p>
+            <a:pPr algn="ctr"/>
+            <a:endParaRPr lang="en-US"/>
+          </a:p>
+        </p:txBody>
+      </p:sp>
+      <p:sp>
+        <p:nvSpPr>
+          <p:cNvPr id="10" name="Plus Sign 9">
+            <a:extLst>
+              <a:ext uri="{FF2B5EF4-FFF2-40B4-BE49-F238E27FC236}">
+                <a16:creationId xmlns:a16="http://schemas.microsoft.com/office/drawing/2014/main" id="{F6FECDB0-1530-7ED8-4308-B67E5BFA9E88}"/>
+              </a:ext>
+            </a:extLst>
+          </p:cNvPr>
+          <p:cNvSpPr/>
+          <p:nvPr/>
+        </p:nvSpPr>
+        <p:spPr>
+          <a:xfrm>
+            <a:off x="9791700" y="2419350"/>
+            <a:ext cx="606672" cy="606672"/>
+          </a:xfrm>
+          <a:prstGeom prst="mathPlus">
+            <a:avLst/>
+          </a:prstGeom>
+          <a:solidFill>
+            <a:srgbClr val="00B050"/>
+          </a:solidFill>
+          <a:ln>
+            <a:solidFill>
+              <a:schemeClr val="accent6">
+                <a:lumMod val="50000"/>
+              </a:schemeClr>
+            </a:solidFill>
+          </a:ln>
+        </p:spPr>
+        <p:style>
+          <a:lnRef idx="2">
+            <a:schemeClr val="accent1">
+              <a:shade val="15000"/>
+            </a:schemeClr>
+          </a:lnRef>
+          <a:fillRef idx="1">
+            <a:schemeClr val="accent1"/>
+          </a:fillRef>
+          <a:effectRef idx="0">
+            <a:schemeClr val="accent1"/>
+          </a:effectRef>
+          <a:fontRef idx="minor">
+            <a:schemeClr val="lt1"/>
+          </a:fontRef>
+        </p:style>
+        <p:txBody>
+          <a:bodyPr rtlCol="0" anchor="ctr"/>
+          <a:lstStyle/>
+          <a:p>
+            <a:pPr algn="ctr"/>
+            <a:endParaRPr lang="en-US"/>
+          </a:p>
+        </p:txBody>
+      </p:sp>
+    </p:spTree>
+    <p:extLst>
+      <p:ext uri="{BB962C8B-B14F-4D97-AF65-F5344CB8AC3E}">
+        <p14:creationId xmlns:p14="http://schemas.microsoft.com/office/powerpoint/2010/main" val="3432038458"/>
+      </p:ext>
+    </p:extLst>
+  </p:cSld>
+  <p:clrMapOvr>
+    <a:masterClrMapping/>
+  </p:clrMapOvr>
+</p:sld>
+</file>
+
+<file path=ppt/slides/slide16.xml><?xml version="1.0" encoding="utf-8"?>
+<p:sld xmlns:a="http://schemas.openxmlformats.org/drawingml/2006/main" xmlns:r="http://schemas.openxmlformats.org/officeDocument/2006/relationships" xmlns:p="http://schemas.openxmlformats.org/presentationml/2006/main">
+  <p:cSld>
+    <p:spTree>
+      <p:nvGrpSpPr>
+        <p:cNvPr id="1" name=""/>
+        <p:cNvGrpSpPr/>
+        <p:nvPr/>
+      </p:nvGrpSpPr>
+      <p:grpSpPr>
+        <a:xfrm>
+          <a:off x="0" y="0"/>
+          <a:ext cx="0" cy="0"/>
+          <a:chOff x="0" y="0"/>
+          <a:chExt cx="0" cy="0"/>
+        </a:xfrm>
+      </p:grpSpPr>
+      <p:sp>
+        <p:nvSpPr>
+          <p:cNvPr id="2" name="Title 1">
+            <a:extLst>
+              <a:ext uri="{FF2B5EF4-FFF2-40B4-BE49-F238E27FC236}">
+                <a16:creationId xmlns:a16="http://schemas.microsoft.com/office/drawing/2014/main" id="{1E9777B6-1D18-9AE4-4B2D-A39F96472237}"/>
+              </a:ext>
+            </a:extLst>
+          </p:cNvPr>
+          <p:cNvSpPr>
+            <a:spLocks noGrp="1"/>
+          </p:cNvSpPr>
+          <p:nvPr>
+            <p:ph type="title"/>
+          </p:nvPr>
+        </p:nvSpPr>
+        <p:spPr/>
+        <p:txBody>
+          <a:bodyPr/>
+          <a:lstStyle/>
+          <a:p>
+            <a:pPr algn="ctr"/>
+            <a:r>
+              <a:rPr lang="en-US" b="1" dirty="0"/>
+              <a:t>Other findings</a:t>
+            </a:r>
+          </a:p>
+        </p:txBody>
+      </p:sp>
+      <p:sp>
+        <p:nvSpPr>
+          <p:cNvPr id="3" name="Content Placeholder 2">
+            <a:extLst>
+              <a:ext uri="{FF2B5EF4-FFF2-40B4-BE49-F238E27FC236}">
+                <a16:creationId xmlns:a16="http://schemas.microsoft.com/office/drawing/2014/main" id="{E8A09B5F-DE2C-7CF2-CBF8-F50A988F953A}"/>
+              </a:ext>
+            </a:extLst>
+          </p:cNvPr>
+          <p:cNvSpPr>
+            <a:spLocks noGrp="1"/>
+          </p:cNvSpPr>
+          <p:nvPr>
+            <p:ph idx="1"/>
+          </p:nvPr>
+        </p:nvSpPr>
+        <p:spPr/>
+        <p:txBody>
+          <a:bodyPr/>
+          <a:lstStyle/>
+          <a:p>
+            <a:pPr marL="0" indent="0" algn="ctr">
+              <a:buNone/>
+            </a:pPr>
+            <a:r>
+              <a:rPr lang="en-US" dirty="0"/>
+              <a:t>Top 10 district/subdistrict that will have</a:t>
+            </a:r>
+          </a:p>
+          <a:p>
+            <a:pPr marL="0" indent="0" algn="ctr">
+              <a:buNone/>
+            </a:pPr>
+            <a:r>
+              <a:rPr lang="en-US" dirty="0"/>
+              <a:t>higher housing price according to the model.</a:t>
+            </a:r>
+          </a:p>
+        </p:txBody>
+      </p:sp>
+      <p:sp>
+        <p:nvSpPr>
+          <p:cNvPr id="4" name="Slide Number Placeholder 3">
+            <a:extLst>
+              <a:ext uri="{FF2B5EF4-FFF2-40B4-BE49-F238E27FC236}">
+                <a16:creationId xmlns:a16="http://schemas.microsoft.com/office/drawing/2014/main" id="{6B418609-1306-BE71-6DA7-0D5AA915DE99}"/>
+              </a:ext>
+            </a:extLst>
+          </p:cNvPr>
+          <p:cNvSpPr>
+            <a:spLocks noGrp="1"/>
+          </p:cNvSpPr>
+          <p:nvPr>
+            <p:ph type="sldNum" sz="quarter" idx="12"/>
+          </p:nvPr>
+        </p:nvSpPr>
+        <p:spPr/>
+        <p:txBody>
+          <a:bodyPr/>
+          <a:lstStyle/>
+          <a:p>
+            <a:fld id="{640C5978-D207-4356-A33B-DAFE34A7F8D2}" type="slidenum">
+              <a:rPr lang="en-US" smtClean="0"/>
+              <a:t>16</a:t>
+            </a:fld>
+            <a:endParaRPr lang="en-US"/>
+          </a:p>
+        </p:txBody>
+      </p:sp>
+      <p:pic>
+        <p:nvPicPr>
+          <p:cNvPr id="6" name="Picture 5">
+            <a:extLst>
+              <a:ext uri="{FF2B5EF4-FFF2-40B4-BE49-F238E27FC236}">
+                <a16:creationId xmlns:a16="http://schemas.microsoft.com/office/drawing/2014/main" id="{49A24DA1-0F48-F3C2-A7D4-5111DC5363B1}"/>
+              </a:ext>
+            </a:extLst>
+          </p:cNvPr>
+          <p:cNvPicPr>
+            <a:picLocks noChangeAspect="1"/>
+          </p:cNvPicPr>
+          <p:nvPr/>
+        </p:nvPicPr>
+        <p:blipFill>
+          <a:blip r:embed="rId2"/>
+          <a:stretch>
+            <a:fillRect/>
+          </a:stretch>
+        </p:blipFill>
+        <p:spPr>
+          <a:xfrm>
+            <a:off x="4800419" y="2958607"/>
             <a:ext cx="2591162" cy="3534268"/>
           </a:xfrm>
           <a:prstGeom prst="rect">
@@ -4931,6 +7018,227 @@
     <p:extLst>
       <p:ext uri="{BB962C8B-B14F-4D97-AF65-F5344CB8AC3E}">
         <p14:creationId xmlns:p14="http://schemas.microsoft.com/office/powerpoint/2010/main" val="1643273746"/>
+      </p:ext>
+    </p:extLst>
+  </p:cSld>
+  <p:clrMapOvr>
+    <a:masterClrMapping/>
+  </p:clrMapOvr>
+</p:sld>
+</file>
+
+<file path=ppt/slides/slide17.xml><?xml version="1.0" encoding="utf-8"?>
+<p:sld xmlns:a="http://schemas.openxmlformats.org/drawingml/2006/main" xmlns:r="http://schemas.openxmlformats.org/officeDocument/2006/relationships" xmlns:p="http://schemas.openxmlformats.org/presentationml/2006/main">
+  <p:cSld>
+    <p:spTree>
+      <p:nvGrpSpPr>
+        <p:cNvPr id="1" name=""/>
+        <p:cNvGrpSpPr/>
+        <p:nvPr/>
+      </p:nvGrpSpPr>
+      <p:grpSpPr>
+        <a:xfrm>
+          <a:off x="0" y="0"/>
+          <a:ext cx="0" cy="0"/>
+          <a:chOff x="0" y="0"/>
+          <a:chExt cx="0" cy="0"/>
+        </a:xfrm>
+      </p:grpSpPr>
+      <p:sp>
+        <p:nvSpPr>
+          <p:cNvPr id="2" name="Title 1">
+            <a:extLst>
+              <a:ext uri="{FF2B5EF4-FFF2-40B4-BE49-F238E27FC236}">
+                <a16:creationId xmlns:a16="http://schemas.microsoft.com/office/drawing/2014/main" id="{AFE45B05-502C-7008-8FD5-2B91973F5067}"/>
+              </a:ext>
+            </a:extLst>
+          </p:cNvPr>
+          <p:cNvSpPr>
+            <a:spLocks noGrp="1"/>
+          </p:cNvSpPr>
+          <p:nvPr>
+            <p:ph type="title"/>
+          </p:nvPr>
+        </p:nvSpPr>
+        <p:spPr/>
+        <p:txBody>
+          <a:bodyPr/>
+          <a:lstStyle/>
+          <a:p>
+            <a:r>
+              <a:rPr lang="en-US" b="1" dirty="0"/>
+              <a:t>Extra</a:t>
+            </a:r>
+          </a:p>
+        </p:txBody>
+      </p:sp>
+      <p:sp>
+        <p:nvSpPr>
+          <p:cNvPr id="3" name="Content Placeholder 2">
+            <a:extLst>
+              <a:ext uri="{FF2B5EF4-FFF2-40B4-BE49-F238E27FC236}">
+                <a16:creationId xmlns:a16="http://schemas.microsoft.com/office/drawing/2014/main" id="{A951D87B-10C8-E86F-A536-50FB2BA0FB45}"/>
+              </a:ext>
+            </a:extLst>
+          </p:cNvPr>
+          <p:cNvSpPr>
+            <a:spLocks noGrp="1"/>
+          </p:cNvSpPr>
+          <p:nvPr>
+            <p:ph idx="1"/>
+          </p:nvPr>
+        </p:nvSpPr>
+        <p:spPr/>
+        <p:txBody>
+          <a:bodyPr/>
+          <a:lstStyle/>
+          <a:p>
+            <a:r>
+              <a:rPr lang="en-US" dirty="0" err="1"/>
+              <a:t>XGBoost</a:t>
+            </a:r>
+            <a:r>
+              <a:rPr lang="en-US" dirty="0"/>
+              <a:t> model with ~85% score</a:t>
+            </a:r>
+          </a:p>
+          <a:p>
+            <a:r>
+              <a:rPr lang="en-US" dirty="0"/>
+              <a:t>Average error ~771K</a:t>
+            </a:r>
+          </a:p>
+          <a:p>
+            <a:r>
+              <a:rPr lang="en-US" dirty="0"/>
+              <a:t>Total of 49 features</a:t>
+            </a:r>
+          </a:p>
+        </p:txBody>
+      </p:sp>
+      <p:sp>
+        <p:nvSpPr>
+          <p:cNvPr id="4" name="Slide Number Placeholder 3">
+            <a:extLst>
+              <a:ext uri="{FF2B5EF4-FFF2-40B4-BE49-F238E27FC236}">
+                <a16:creationId xmlns:a16="http://schemas.microsoft.com/office/drawing/2014/main" id="{87E73D06-CD4C-B2C2-7DBC-D9AC79147D9B}"/>
+              </a:ext>
+            </a:extLst>
+          </p:cNvPr>
+          <p:cNvSpPr>
+            <a:spLocks noGrp="1"/>
+          </p:cNvSpPr>
+          <p:nvPr>
+            <p:ph type="sldNum" sz="quarter" idx="12"/>
+          </p:nvPr>
+        </p:nvSpPr>
+        <p:spPr/>
+        <p:txBody>
+          <a:bodyPr/>
+          <a:lstStyle/>
+          <a:p>
+            <a:fld id="{640C5978-D207-4356-A33B-DAFE34A7F8D2}" type="slidenum">
+              <a:rPr lang="en-US" smtClean="0"/>
+              <a:t>17</a:t>
+            </a:fld>
+            <a:endParaRPr lang="en-US"/>
+          </a:p>
+        </p:txBody>
+      </p:sp>
+      <p:pic>
+        <p:nvPicPr>
+          <p:cNvPr id="6" name="Picture 5">
+            <a:extLst>
+              <a:ext uri="{FF2B5EF4-FFF2-40B4-BE49-F238E27FC236}">
+                <a16:creationId xmlns:a16="http://schemas.microsoft.com/office/drawing/2014/main" id="{60094B30-0F8C-55BA-A46E-B82536E8981E}"/>
+              </a:ext>
+            </a:extLst>
+          </p:cNvPr>
+          <p:cNvPicPr>
+            <a:picLocks noChangeAspect="1"/>
+          </p:cNvPicPr>
+          <p:nvPr/>
+        </p:nvPicPr>
+        <p:blipFill>
+          <a:blip r:embed="rId2"/>
+          <a:stretch>
+            <a:fillRect/>
+          </a:stretch>
+        </p:blipFill>
+        <p:spPr>
+          <a:xfrm>
+            <a:off x="838200" y="5748227"/>
+            <a:ext cx="10240804" cy="790685"/>
+          </a:xfrm>
+          <a:prstGeom prst="rect">
+            <a:avLst/>
+          </a:prstGeom>
+        </p:spPr>
+      </p:pic>
+      <p:pic>
+        <p:nvPicPr>
+          <p:cNvPr id="8" name="Picture 7">
+            <a:extLst>
+              <a:ext uri="{FF2B5EF4-FFF2-40B4-BE49-F238E27FC236}">
+                <a16:creationId xmlns:a16="http://schemas.microsoft.com/office/drawing/2014/main" id="{4325931C-1EC1-BA82-6862-8A37E7B93E63}"/>
+              </a:ext>
+            </a:extLst>
+          </p:cNvPr>
+          <p:cNvPicPr>
+            <a:picLocks noChangeAspect="1"/>
+          </p:cNvPicPr>
+          <p:nvPr/>
+        </p:nvPicPr>
+        <p:blipFill>
+          <a:blip r:embed="rId3"/>
+          <a:stretch>
+            <a:fillRect/>
+          </a:stretch>
+        </p:blipFill>
+        <p:spPr>
+          <a:xfrm>
+            <a:off x="838200" y="5246532"/>
+            <a:ext cx="10374173" cy="638264"/>
+          </a:xfrm>
+          <a:prstGeom prst="rect">
+            <a:avLst/>
+          </a:prstGeom>
+        </p:spPr>
+      </p:pic>
+      <p:pic>
+        <p:nvPicPr>
+          <p:cNvPr id="12" name="Picture 11">
+            <a:extLst>
+              <a:ext uri="{FF2B5EF4-FFF2-40B4-BE49-F238E27FC236}">
+                <a16:creationId xmlns:a16="http://schemas.microsoft.com/office/drawing/2014/main" id="{EFA08DD2-9478-5AF1-C1D4-1FAE80F70832}"/>
+              </a:ext>
+            </a:extLst>
+          </p:cNvPr>
+          <p:cNvPicPr>
+            <a:picLocks noChangeAspect="1"/>
+          </p:cNvPicPr>
+          <p:nvPr/>
+        </p:nvPicPr>
+        <p:blipFill>
+          <a:blip r:embed="rId4"/>
+          <a:stretch>
+            <a:fillRect/>
+          </a:stretch>
+        </p:blipFill>
+        <p:spPr>
+          <a:xfrm>
+            <a:off x="6480348" y="411920"/>
+            <a:ext cx="4944165" cy="5153744"/>
+          </a:xfrm>
+          <a:prstGeom prst="rect">
+            <a:avLst/>
+          </a:prstGeom>
+        </p:spPr>
+      </p:pic>
+    </p:spTree>
+    <p:extLst>
+      <p:ext uri="{BB962C8B-B14F-4D97-AF65-F5344CB8AC3E}">
+        <p14:creationId xmlns:p14="http://schemas.microsoft.com/office/powerpoint/2010/main" val="82231759"/>
       </p:ext>
     </p:extLst>
   </p:cSld>
@@ -5323,7 +7631,7 @@
             <a:pPr algn="ctr"/>
             <a:r>
               <a:rPr lang="en-US" b="1" dirty="0"/>
-              <a:t>Considering about the information …</a:t>
+              <a:t>Considering the information …</a:t>
             </a:r>
           </a:p>
         </p:txBody>
@@ -6094,387 +8402,10 @@
           </a:p>
         </p:txBody>
       </p:sp>
-      <p:sp>
-        <p:nvSpPr>
-          <p:cNvPr id="14" name="Rectangle 13">
-            <a:extLst>
-              <a:ext uri="{FF2B5EF4-FFF2-40B4-BE49-F238E27FC236}">
-                <a16:creationId xmlns:a16="http://schemas.microsoft.com/office/drawing/2014/main" id="{8FBA0743-B278-CBA6-650E-54C1D90DCE33}"/>
-              </a:ext>
-            </a:extLst>
-          </p:cNvPr>
-          <p:cNvSpPr/>
-          <p:nvPr/>
-        </p:nvSpPr>
-        <p:spPr>
-          <a:xfrm>
-            <a:off x="3965510" y="2304661"/>
-            <a:ext cx="401217" cy="3834882"/>
-          </a:xfrm>
-          <a:prstGeom prst="rect">
-            <a:avLst/>
-          </a:prstGeom>
-          <a:noFill/>
-          <a:ln w="38100">
-            <a:solidFill>
-              <a:srgbClr val="FF0000"/>
-            </a:solidFill>
-          </a:ln>
-        </p:spPr>
-        <p:style>
-          <a:lnRef idx="2">
-            <a:schemeClr val="accent1">
-              <a:shade val="15000"/>
-            </a:schemeClr>
-          </a:lnRef>
-          <a:fillRef idx="1">
-            <a:schemeClr val="accent1"/>
-          </a:fillRef>
-          <a:effectRef idx="0">
-            <a:schemeClr val="accent1"/>
-          </a:effectRef>
-          <a:fontRef idx="minor">
-            <a:schemeClr val="lt1"/>
-          </a:fontRef>
-        </p:style>
-        <p:txBody>
-          <a:bodyPr rtlCol="0" anchor="ctr"/>
-          <a:lstStyle/>
-          <a:p>
-            <a:pPr algn="ctr"/>
-            <a:endParaRPr lang="en-US"/>
-          </a:p>
-        </p:txBody>
-      </p:sp>
-      <p:sp>
-        <p:nvSpPr>
-          <p:cNvPr id="15" name="Rectangle 14">
-            <a:extLst>
-              <a:ext uri="{FF2B5EF4-FFF2-40B4-BE49-F238E27FC236}">
-                <a16:creationId xmlns:a16="http://schemas.microsoft.com/office/drawing/2014/main" id="{9E1BC2AE-2382-360A-D1C6-87D253CCEBF3}"/>
-              </a:ext>
-            </a:extLst>
-          </p:cNvPr>
-          <p:cNvSpPr/>
-          <p:nvPr/>
-        </p:nvSpPr>
-        <p:spPr>
-          <a:xfrm>
-            <a:off x="5498840" y="2304661"/>
-            <a:ext cx="762001" cy="3834882"/>
-          </a:xfrm>
-          <a:prstGeom prst="rect">
-            <a:avLst/>
-          </a:prstGeom>
-          <a:noFill/>
-          <a:ln w="38100">
-            <a:solidFill>
-              <a:srgbClr val="FF0000"/>
-            </a:solidFill>
-          </a:ln>
-        </p:spPr>
-        <p:style>
-          <a:lnRef idx="2">
-            <a:schemeClr val="accent1">
-              <a:shade val="15000"/>
-            </a:schemeClr>
-          </a:lnRef>
-          <a:fillRef idx="1">
-            <a:schemeClr val="accent1"/>
-          </a:fillRef>
-          <a:effectRef idx="0">
-            <a:schemeClr val="accent1"/>
-          </a:effectRef>
-          <a:fontRef idx="minor">
-            <a:schemeClr val="lt1"/>
-          </a:fontRef>
-        </p:style>
-        <p:txBody>
-          <a:bodyPr rtlCol="0" anchor="ctr"/>
-          <a:lstStyle/>
-          <a:p>
-            <a:pPr algn="ctr"/>
-            <a:endParaRPr lang="en-US"/>
-          </a:p>
-        </p:txBody>
-      </p:sp>
-      <p:sp>
-        <p:nvSpPr>
-          <p:cNvPr id="16" name="Rectangle 15">
-            <a:extLst>
-              <a:ext uri="{FF2B5EF4-FFF2-40B4-BE49-F238E27FC236}">
-                <a16:creationId xmlns:a16="http://schemas.microsoft.com/office/drawing/2014/main" id="{B4FE0109-399A-7439-9222-CD7FEA2EFEFD}"/>
-              </a:ext>
-            </a:extLst>
-          </p:cNvPr>
-          <p:cNvSpPr/>
-          <p:nvPr/>
-        </p:nvSpPr>
-        <p:spPr>
-          <a:xfrm>
-            <a:off x="7364961" y="2304661"/>
-            <a:ext cx="401217" cy="3834882"/>
-          </a:xfrm>
-          <a:prstGeom prst="rect">
-            <a:avLst/>
-          </a:prstGeom>
-          <a:noFill/>
-          <a:ln w="38100">
-            <a:solidFill>
-              <a:srgbClr val="0070C0"/>
-            </a:solidFill>
-          </a:ln>
-        </p:spPr>
-        <p:style>
-          <a:lnRef idx="2">
-            <a:schemeClr val="accent1">
-              <a:shade val="15000"/>
-            </a:schemeClr>
-          </a:lnRef>
-          <a:fillRef idx="1">
-            <a:schemeClr val="accent1"/>
-          </a:fillRef>
-          <a:effectRef idx="0">
-            <a:schemeClr val="accent1"/>
-          </a:effectRef>
-          <a:fontRef idx="minor">
-            <a:schemeClr val="lt1"/>
-          </a:fontRef>
-        </p:style>
-        <p:txBody>
-          <a:bodyPr rtlCol="0" anchor="ctr"/>
-          <a:lstStyle/>
-          <a:p>
-            <a:pPr algn="ctr"/>
-            <a:endParaRPr lang="en-US"/>
-          </a:p>
-        </p:txBody>
-      </p:sp>
-      <p:sp>
-        <p:nvSpPr>
-          <p:cNvPr id="17" name="Rectangle 16">
-            <a:extLst>
-              <a:ext uri="{FF2B5EF4-FFF2-40B4-BE49-F238E27FC236}">
-                <a16:creationId xmlns:a16="http://schemas.microsoft.com/office/drawing/2014/main" id="{B92570B7-BB7B-B8F4-3430-814C78791B87}"/>
-              </a:ext>
-            </a:extLst>
-          </p:cNvPr>
-          <p:cNvSpPr/>
-          <p:nvPr/>
-        </p:nvSpPr>
-        <p:spPr>
-          <a:xfrm>
-            <a:off x="8130073" y="2304661"/>
-            <a:ext cx="401217" cy="3834882"/>
-          </a:xfrm>
-          <a:prstGeom prst="rect">
-            <a:avLst/>
-          </a:prstGeom>
-          <a:noFill/>
-          <a:ln w="38100">
-            <a:solidFill>
-              <a:srgbClr val="FF0000"/>
-            </a:solidFill>
-          </a:ln>
-        </p:spPr>
-        <p:style>
-          <a:lnRef idx="2">
-            <a:schemeClr val="accent1">
-              <a:shade val="15000"/>
-            </a:schemeClr>
-          </a:lnRef>
-          <a:fillRef idx="1">
-            <a:schemeClr val="accent1"/>
-          </a:fillRef>
-          <a:effectRef idx="0">
-            <a:schemeClr val="accent1"/>
-          </a:effectRef>
-          <a:fontRef idx="minor">
-            <a:schemeClr val="lt1"/>
-          </a:fontRef>
-        </p:style>
-        <p:txBody>
-          <a:bodyPr rtlCol="0" anchor="ctr"/>
-          <a:lstStyle/>
-          <a:p>
-            <a:pPr algn="ctr"/>
-            <a:endParaRPr lang="en-US"/>
-          </a:p>
-        </p:txBody>
-      </p:sp>
-      <p:sp>
-        <p:nvSpPr>
-          <p:cNvPr id="18" name="TextBox 17">
-            <a:extLst>
-              <a:ext uri="{FF2B5EF4-FFF2-40B4-BE49-F238E27FC236}">
-                <a16:creationId xmlns:a16="http://schemas.microsoft.com/office/drawing/2014/main" id="{3E7714B3-80D5-ABC3-74DD-A794BA3BD9C2}"/>
-              </a:ext>
-            </a:extLst>
-          </p:cNvPr>
-          <p:cNvSpPr txBox="1"/>
-          <p:nvPr/>
-        </p:nvSpPr>
-        <p:spPr>
-          <a:xfrm>
-            <a:off x="6568751" y="849086"/>
-            <a:ext cx="3088538" cy="369332"/>
-          </a:xfrm>
-          <a:prstGeom prst="rect">
-            <a:avLst/>
-          </a:prstGeom>
-          <a:noFill/>
-        </p:spPr>
-        <p:txBody>
-          <a:bodyPr wrap="none" rtlCol="0">
-            <a:spAutoFit/>
-          </a:bodyPr>
-          <a:lstStyle/>
-          <a:p>
-            <a:r>
-              <a:rPr lang="en-US" dirty="0"/>
-              <a:t>Imputed with missing indicator</a:t>
-            </a:r>
-          </a:p>
-        </p:txBody>
-      </p:sp>
-      <p:cxnSp>
-        <p:nvCxnSpPr>
-          <p:cNvPr id="20" name="Straight Connector 19">
-            <a:extLst>
-              <a:ext uri="{FF2B5EF4-FFF2-40B4-BE49-F238E27FC236}">
-                <a16:creationId xmlns:a16="http://schemas.microsoft.com/office/drawing/2014/main" id="{45843068-1FC6-C47C-FEDB-64C7F9553691}"/>
-              </a:ext>
-            </a:extLst>
-          </p:cNvPr>
-          <p:cNvCxnSpPr>
-            <a:cxnSpLocks/>
-          </p:cNvCxnSpPr>
-          <p:nvPr/>
-        </p:nvCxnSpPr>
-        <p:spPr>
-          <a:xfrm flipV="1">
-            <a:off x="4170784" y="1119329"/>
-            <a:ext cx="2255762" cy="1185332"/>
-          </a:xfrm>
-          <a:prstGeom prst="line">
-            <a:avLst/>
-          </a:prstGeom>
-          <a:ln w="28575">
-            <a:solidFill>
-              <a:srgbClr val="FF0000"/>
-            </a:solidFill>
-            <a:tailEnd type="triangle"/>
-          </a:ln>
-        </p:spPr>
-        <p:style>
-          <a:lnRef idx="1">
-            <a:schemeClr val="accent1"/>
-          </a:lnRef>
-          <a:fillRef idx="0">
-            <a:schemeClr val="accent1"/>
-          </a:fillRef>
-          <a:effectRef idx="0">
-            <a:schemeClr val="accent1"/>
-          </a:effectRef>
-          <a:fontRef idx="minor">
-            <a:schemeClr val="tx1"/>
-          </a:fontRef>
-        </p:style>
-      </p:cxnSp>
-      <p:cxnSp>
-        <p:nvCxnSpPr>
-          <p:cNvPr id="22" name="Straight Connector 21">
-            <a:extLst>
-              <a:ext uri="{FF2B5EF4-FFF2-40B4-BE49-F238E27FC236}">
-                <a16:creationId xmlns:a16="http://schemas.microsoft.com/office/drawing/2014/main" id="{9FD4FEF9-C417-737F-0775-81502388D03E}"/>
-              </a:ext>
-            </a:extLst>
-          </p:cNvPr>
-          <p:cNvCxnSpPr>
-            <a:cxnSpLocks/>
-            <a:stCxn id="15" idx="0"/>
-          </p:cNvCxnSpPr>
-          <p:nvPr/>
-        </p:nvCxnSpPr>
-        <p:spPr>
-          <a:xfrm flipV="1">
-            <a:off x="5879841" y="1218418"/>
-            <a:ext cx="1192763" cy="1086243"/>
-          </a:xfrm>
-          <a:prstGeom prst="line">
-            <a:avLst/>
-          </a:prstGeom>
-          <a:ln w="28575">
-            <a:solidFill>
-              <a:srgbClr val="FF0000"/>
-            </a:solidFill>
-            <a:tailEnd type="triangle"/>
-          </a:ln>
-        </p:spPr>
-        <p:style>
-          <a:lnRef idx="1">
-            <a:schemeClr val="accent1"/>
-          </a:lnRef>
-          <a:fillRef idx="0">
-            <a:schemeClr val="accent1"/>
-          </a:fillRef>
-          <a:effectRef idx="0">
-            <a:schemeClr val="accent1"/>
-          </a:effectRef>
-          <a:fontRef idx="minor">
-            <a:schemeClr val="tx1"/>
-          </a:fontRef>
-        </p:style>
-      </p:cxnSp>
-      <p:cxnSp>
-        <p:nvCxnSpPr>
-          <p:cNvPr id="25" name="Straight Connector 24">
-            <a:extLst>
-              <a:ext uri="{FF2B5EF4-FFF2-40B4-BE49-F238E27FC236}">
-                <a16:creationId xmlns:a16="http://schemas.microsoft.com/office/drawing/2014/main" id="{80A9DF04-A1E2-1365-628B-CF8381A11BA9}"/>
-              </a:ext>
-            </a:extLst>
-          </p:cNvPr>
-          <p:cNvCxnSpPr>
-            <a:cxnSpLocks/>
-            <a:stCxn id="17" idx="0"/>
-          </p:cNvCxnSpPr>
-          <p:nvPr/>
-        </p:nvCxnSpPr>
-        <p:spPr>
-          <a:xfrm flipV="1">
-            <a:off x="8330682" y="1218418"/>
-            <a:ext cx="388192" cy="1086243"/>
-          </a:xfrm>
-          <a:prstGeom prst="line">
-            <a:avLst/>
-          </a:prstGeom>
-          <a:ln w="28575">
-            <a:solidFill>
-              <a:srgbClr val="FF0000"/>
-            </a:solidFill>
-            <a:tailEnd type="triangle"/>
-          </a:ln>
-        </p:spPr>
-        <p:style>
-          <a:lnRef idx="1">
-            <a:schemeClr val="accent1"/>
-          </a:lnRef>
-          <a:fillRef idx="0">
-            <a:schemeClr val="accent1"/>
-          </a:fillRef>
-          <a:effectRef idx="0">
-            <a:schemeClr val="accent1"/>
-          </a:effectRef>
-          <a:fontRef idx="minor">
-            <a:schemeClr val="tx1"/>
-          </a:fontRef>
-        </p:style>
-      </p:cxnSp>
     </p:spTree>
     <p:extLst>
       <p:ext uri="{BB962C8B-B14F-4D97-AF65-F5344CB8AC3E}">
-        <p14:creationId xmlns:p14="http://schemas.microsoft.com/office/powerpoint/2010/main" val="3030811331"/>
+        <p14:creationId xmlns:p14="http://schemas.microsoft.com/office/powerpoint/2010/main" val="3284873159"/>
       </p:ext>
     </p:extLst>
   </p:cSld>
@@ -6501,12 +8432,42 @@
           <a:chExt cx="0" cy="0"/>
         </a:xfrm>
       </p:grpSpPr>
-      <p:sp>
-        <p:nvSpPr>
-          <p:cNvPr id="2" name="Title 1">
-            <a:extLst>
-              <a:ext uri="{FF2B5EF4-FFF2-40B4-BE49-F238E27FC236}">
-                <a16:creationId xmlns:a16="http://schemas.microsoft.com/office/drawing/2014/main" id="{1DCD32CE-9C2F-2DFE-9D51-6B3C6CB76AAD}"/>
+      <p:pic>
+        <p:nvPicPr>
+          <p:cNvPr id="13" name="Picture 12">
+            <a:extLst>
+              <a:ext uri="{FF2B5EF4-FFF2-40B4-BE49-F238E27FC236}">
+                <a16:creationId xmlns:a16="http://schemas.microsoft.com/office/drawing/2014/main" id="{B91B1AE5-8EFB-F315-E9D9-91D71819B839}"/>
+              </a:ext>
+            </a:extLst>
+          </p:cNvPr>
+          <p:cNvPicPr>
+            <a:picLocks noChangeAspect="1"/>
+          </p:cNvPicPr>
+          <p:nvPr/>
+        </p:nvPicPr>
+        <p:blipFill>
+          <a:blip r:embed="rId3"/>
+          <a:stretch>
+            <a:fillRect/>
+          </a:stretch>
+        </p:blipFill>
+        <p:spPr>
+          <a:xfrm>
+            <a:off x="1676010" y="1196159"/>
+            <a:ext cx="8839980" cy="5083361"/>
+          </a:xfrm>
+          <a:prstGeom prst="rect">
+            <a:avLst/>
+          </a:prstGeom>
+        </p:spPr>
+      </p:pic>
+      <p:sp>
+        <p:nvSpPr>
+          <p:cNvPr id="6" name="Title 5">
+            <a:extLst>
+              <a:ext uri="{FF2B5EF4-FFF2-40B4-BE49-F238E27FC236}">
+                <a16:creationId xmlns:a16="http://schemas.microsoft.com/office/drawing/2014/main" id="{1637AF34-8C12-7F6A-2EE0-90F7DCC03ADF}"/>
               </a:ext>
             </a:extLst>
           </p:cNvPr>
@@ -6524,50 +8485,17 @@
           <a:p>
             <a:r>
               <a:rPr lang="en-US" b="1" dirty="0"/>
-              <a:t>For </a:t>
-            </a:r>
-            <a:r>
-              <a:rPr lang="en-US" b="1" dirty="0" err="1"/>
-              <a:t>nearby_station_distance</a:t>
-            </a:r>
-            <a:endParaRPr lang="en-US" b="1" dirty="0"/>
-          </a:p>
-        </p:txBody>
-      </p:sp>
-      <p:sp>
-        <p:nvSpPr>
-          <p:cNvPr id="3" name="Content Placeholder 2">
-            <a:extLst>
-              <a:ext uri="{FF2B5EF4-FFF2-40B4-BE49-F238E27FC236}">
-                <a16:creationId xmlns:a16="http://schemas.microsoft.com/office/drawing/2014/main" id="{4A327434-1F00-62AD-0AD2-A1DED59068E9}"/>
-              </a:ext>
-            </a:extLst>
-          </p:cNvPr>
-          <p:cNvSpPr>
-            <a:spLocks noGrp="1"/>
-          </p:cNvSpPr>
-          <p:nvPr>
-            <p:ph idx="1"/>
-          </p:nvPr>
-        </p:nvSpPr>
-        <p:spPr/>
-        <p:txBody>
-          <a:bodyPr/>
-          <a:lstStyle/>
-          <a:p>
-            <a:r>
-              <a:rPr lang="en-US" dirty="0"/>
-              <a:t>Custom transformation + normalization</a:t>
-            </a:r>
-          </a:p>
-        </p:txBody>
-      </p:sp>
-      <p:sp>
-        <p:nvSpPr>
-          <p:cNvPr id="4" name="Slide Number Placeholder 3">
-            <a:extLst>
-              <a:ext uri="{FF2B5EF4-FFF2-40B4-BE49-F238E27FC236}">
-                <a16:creationId xmlns:a16="http://schemas.microsoft.com/office/drawing/2014/main" id="{D94C2FA9-0CE8-3ED6-5276-36E23FEB5785}"/>
+              <a:t>A lot of missing data</a:t>
+            </a:r>
+          </a:p>
+        </p:txBody>
+      </p:sp>
+      <p:sp>
+        <p:nvSpPr>
+          <p:cNvPr id="5" name="Slide Number Placeholder 4">
+            <a:extLst>
+              <a:ext uri="{FF2B5EF4-FFF2-40B4-BE49-F238E27FC236}">
+                <a16:creationId xmlns:a16="http://schemas.microsoft.com/office/drawing/2014/main" id="{C0256DC6-B7C3-69BB-F56B-6451A6CE8C98}"/>
               </a:ext>
             </a:extLst>
           </p:cNvPr>
@@ -6591,67 +8519,30 @@
           </a:p>
         </p:txBody>
       </p:sp>
-      <p:pic>
-        <p:nvPicPr>
-          <p:cNvPr id="6" name="Picture 5">
-            <a:extLst>
-              <a:ext uri="{FF2B5EF4-FFF2-40B4-BE49-F238E27FC236}">
-                <a16:creationId xmlns:a16="http://schemas.microsoft.com/office/drawing/2014/main" id="{E71FF561-A9DF-12D8-E865-1F11DA554B9A}"/>
-              </a:ext>
-            </a:extLst>
-          </p:cNvPr>
-          <p:cNvPicPr>
-            <a:picLocks noChangeAspect="1"/>
-          </p:cNvPicPr>
+      <p:sp>
+        <p:nvSpPr>
+          <p:cNvPr id="14" name="Rectangle 13">
+            <a:extLst>
+              <a:ext uri="{FF2B5EF4-FFF2-40B4-BE49-F238E27FC236}">
+                <a16:creationId xmlns:a16="http://schemas.microsoft.com/office/drawing/2014/main" id="{8FBA0743-B278-CBA6-650E-54C1D90DCE33}"/>
+              </a:ext>
+            </a:extLst>
+          </p:cNvPr>
+          <p:cNvSpPr/>
           <p:nvPr/>
-        </p:nvPicPr>
-        <p:blipFill rotWithShape="1">
-          <a:blip r:embed="rId2"/>
-          <a:srcRect b="72667"/>
-          <a:stretch/>
-        </p:blipFill>
+        </p:nvSpPr>
         <p:spPr>
           <a:xfrm>
-            <a:off x="1020209" y="3251812"/>
-            <a:ext cx="3052258" cy="1325563"/>
+            <a:off x="3965510" y="2304661"/>
+            <a:ext cx="401217" cy="3834882"/>
           </a:xfrm>
           <a:prstGeom prst="rect">
             <a:avLst/>
           </a:prstGeom>
-        </p:spPr>
-      </p:pic>
-      <p:sp>
-        <p:nvSpPr>
-          <p:cNvPr id="9" name="Arrow: Right 8">
-            <a:extLst>
-              <a:ext uri="{FF2B5EF4-FFF2-40B4-BE49-F238E27FC236}">
-                <a16:creationId xmlns:a16="http://schemas.microsoft.com/office/drawing/2014/main" id="{E821C578-EB69-7AFC-4673-D254CCF733D2}"/>
-              </a:ext>
-            </a:extLst>
-          </p:cNvPr>
-          <p:cNvSpPr/>
-          <p:nvPr/>
-        </p:nvSpPr>
-        <p:spPr>
-          <a:xfrm>
-            <a:off x="4440196" y="3707168"/>
-            <a:ext cx="802432" cy="414855"/>
-          </a:xfrm>
-          <a:prstGeom prst="rightArrow">
-            <a:avLst>
-              <a:gd name="adj1" fmla="val 50000"/>
-              <a:gd name="adj2" fmla="val 81488"/>
-            </a:avLst>
-          </a:prstGeom>
-          <a:solidFill>
-            <a:schemeClr val="tx1">
-              <a:lumMod val="85000"/>
-              <a:lumOff val="15000"/>
-            </a:schemeClr>
-          </a:solidFill>
-          <a:ln>
+          <a:noFill/>
+          <a:ln w="38100">
             <a:solidFill>
-              <a:schemeClr val="tx1"/>
+              <a:srgbClr val="C00000"/>
             </a:solidFill>
           </a:ln>
         </p:spPr>
@@ -6680,42 +8571,12 @@
           </a:p>
         </p:txBody>
       </p:sp>
-      <p:pic>
-        <p:nvPicPr>
-          <p:cNvPr id="15" name="Picture 14">
-            <a:extLst>
-              <a:ext uri="{FF2B5EF4-FFF2-40B4-BE49-F238E27FC236}">
-                <a16:creationId xmlns:a16="http://schemas.microsoft.com/office/drawing/2014/main" id="{A83A28AD-253E-F0B1-D407-B883745B5EFF}"/>
-              </a:ext>
-            </a:extLst>
-          </p:cNvPr>
-          <p:cNvPicPr>
-            <a:picLocks noChangeAspect="1"/>
-          </p:cNvPicPr>
-          <p:nvPr/>
-        </p:nvPicPr>
-        <p:blipFill>
-          <a:blip r:embed="rId3"/>
-          <a:stretch>
-            <a:fillRect/>
-          </a:stretch>
-        </p:blipFill>
-        <p:spPr>
-          <a:xfrm>
-            <a:off x="5571318" y="3176304"/>
-            <a:ext cx="5782482" cy="1476581"/>
-          </a:xfrm>
-          <a:prstGeom prst="rect">
-            <a:avLst/>
-          </a:prstGeom>
-        </p:spPr>
-      </p:pic>
-      <p:sp>
-        <p:nvSpPr>
-          <p:cNvPr id="10" name="Rectangle 9">
-            <a:extLst>
-              <a:ext uri="{FF2B5EF4-FFF2-40B4-BE49-F238E27FC236}">
-                <a16:creationId xmlns:a16="http://schemas.microsoft.com/office/drawing/2014/main" id="{C6A62205-33CC-50AA-1345-5C229F79AB02}"/>
+      <p:sp>
+        <p:nvSpPr>
+          <p:cNvPr id="15" name="Rectangle 14">
+            <a:extLst>
+              <a:ext uri="{FF2B5EF4-FFF2-40B4-BE49-F238E27FC236}">
+                <a16:creationId xmlns:a16="http://schemas.microsoft.com/office/drawing/2014/main" id="{9E1BC2AE-2382-360A-D1C6-87D253CCEBF3}"/>
               </a:ext>
             </a:extLst>
           </p:cNvPr>
@@ -6724,8 +8585,8 @@
         </p:nvSpPr>
         <p:spPr>
           <a:xfrm>
-            <a:off x="6250335" y="3441922"/>
-            <a:ext cx="2048002" cy="326377"/>
+            <a:off x="5479791" y="2304661"/>
+            <a:ext cx="401218" cy="3834882"/>
           </a:xfrm>
           <a:prstGeom prst="rect">
             <a:avLst/>
@@ -6733,7 +8594,7 @@
           <a:noFill/>
           <a:ln w="38100">
             <a:solidFill>
-              <a:srgbClr val="FF0000"/>
+              <a:srgbClr val="C00000"/>
             </a:solidFill>
           </a:ln>
         </p:spPr>
@@ -6764,10 +8625,10 @@
       </p:sp>
       <p:sp>
         <p:nvSpPr>
-          <p:cNvPr id="11" name="Rectangle 10">
-            <a:extLst>
-              <a:ext uri="{FF2B5EF4-FFF2-40B4-BE49-F238E27FC236}">
-                <a16:creationId xmlns:a16="http://schemas.microsoft.com/office/drawing/2014/main" id="{ACE4FE6F-1F7A-FA7D-DF5C-CA4E907C57B4}"/>
+          <p:cNvPr id="17" name="Rectangle 16">
+            <a:extLst>
+              <a:ext uri="{FF2B5EF4-FFF2-40B4-BE49-F238E27FC236}">
+                <a16:creationId xmlns:a16="http://schemas.microsoft.com/office/drawing/2014/main" id="{B92570B7-BB7B-B8F4-3430-814C78791B87}"/>
               </a:ext>
             </a:extLst>
           </p:cNvPr>
@@ -6776,8 +8637,8 @@
         </p:nvSpPr>
         <p:spPr>
           <a:xfrm>
-            <a:off x="8965654" y="3698419"/>
-            <a:ext cx="2388146" cy="326377"/>
+            <a:off x="8882548" y="2304661"/>
+            <a:ext cx="401217" cy="3834882"/>
           </a:xfrm>
           <a:prstGeom prst="rect">
             <a:avLst/>
@@ -6785,7 +8646,7 @@
           <a:noFill/>
           <a:ln w="38100">
             <a:solidFill>
-              <a:srgbClr val="FF0000"/>
+              <a:srgbClr val="C00000"/>
             </a:solidFill>
           </a:ln>
         </p:spPr>
@@ -6816,60 +8677,224 @@
       </p:sp>
       <p:sp>
         <p:nvSpPr>
-          <p:cNvPr id="16" name="Rectangle 15">
-            <a:extLst>
-              <a:ext uri="{FF2B5EF4-FFF2-40B4-BE49-F238E27FC236}">
-                <a16:creationId xmlns:a16="http://schemas.microsoft.com/office/drawing/2014/main" id="{28CA0697-2F6C-9009-2641-286A669B1B54}"/>
-              </a:ext>
-            </a:extLst>
-          </p:cNvPr>
-          <p:cNvSpPr/>
+          <p:cNvPr id="18" name="TextBox 17">
+            <a:extLst>
+              <a:ext uri="{FF2B5EF4-FFF2-40B4-BE49-F238E27FC236}">
+                <a16:creationId xmlns:a16="http://schemas.microsoft.com/office/drawing/2014/main" id="{3E7714B3-80D5-ABC3-74DD-A794BA3BD9C2}"/>
+              </a:ext>
+            </a:extLst>
+          </p:cNvPr>
+          <p:cNvSpPr txBox="1"/>
           <p:nvPr/>
         </p:nvSpPr>
         <p:spPr>
           <a:xfrm>
-            <a:off x="1264565" y="3447069"/>
-            <a:ext cx="2807902" cy="577726"/>
+            <a:off x="6707970" y="652224"/>
+            <a:ext cx="3646639" cy="369332"/>
           </a:xfrm>
           <a:prstGeom prst="rect">
             <a:avLst/>
           </a:prstGeom>
           <a:noFill/>
-          <a:ln w="38100">
+        </p:spPr>
+        <p:txBody>
+          <a:bodyPr wrap="none" rtlCol="0">
+            <a:spAutoFit/>
+          </a:bodyPr>
+          <a:lstStyle/>
+          <a:p>
+            <a:r>
+              <a:rPr lang="en-US" b="1" dirty="0">
+                <a:solidFill>
+                  <a:srgbClr val="C00000"/>
+                </a:solidFill>
+              </a:rPr>
+              <a:t>KNN-imputed with missing indicator</a:t>
+            </a:r>
+          </a:p>
+        </p:txBody>
+      </p:sp>
+      <p:cxnSp>
+        <p:nvCxnSpPr>
+          <p:cNvPr id="7" name="Straight Connector 6">
+            <a:extLst>
+              <a:ext uri="{FF2B5EF4-FFF2-40B4-BE49-F238E27FC236}">
+                <a16:creationId xmlns:a16="http://schemas.microsoft.com/office/drawing/2014/main" id="{6D9E1431-4F04-64F7-95C1-EC7BAADC1131}"/>
+              </a:ext>
+            </a:extLst>
+          </p:cNvPr>
+          <p:cNvCxnSpPr>
+            <a:cxnSpLocks/>
+          </p:cNvCxnSpPr>
+          <p:nvPr/>
+        </p:nvCxnSpPr>
+        <p:spPr>
+          <a:xfrm flipV="1">
+            <a:off x="4170784" y="1021556"/>
+            <a:ext cx="2410991" cy="1283105"/>
+          </a:xfrm>
+          <a:prstGeom prst="line">
+            <a:avLst/>
+          </a:prstGeom>
+          <a:ln w="28575">
             <a:solidFill>
-              <a:srgbClr val="FF0000"/>
+              <a:srgbClr val="C00000"/>
             </a:solidFill>
+            <a:tailEnd type="triangle"/>
           </a:ln>
         </p:spPr>
         <p:style>
-          <a:lnRef idx="2">
-            <a:schemeClr val="accent1">
-              <a:shade val="15000"/>
-            </a:schemeClr>
+          <a:lnRef idx="1">
+            <a:schemeClr val="accent1"/>
           </a:lnRef>
-          <a:fillRef idx="1">
+          <a:fillRef idx="0">
             <a:schemeClr val="accent1"/>
           </a:fillRef>
           <a:effectRef idx="0">
             <a:schemeClr val="accent1"/>
           </a:effectRef>
           <a:fontRef idx="minor">
-            <a:schemeClr val="lt1"/>
+            <a:schemeClr val="tx1"/>
           </a:fontRef>
         </p:style>
-        <p:txBody>
-          <a:bodyPr rtlCol="0" anchor="ctr"/>
-          <a:lstStyle/>
-          <a:p>
-            <a:pPr algn="ctr"/>
-            <a:endParaRPr lang="en-US"/>
+      </p:cxnSp>
+      <p:cxnSp>
+        <p:nvCxnSpPr>
+          <p:cNvPr id="9" name="Straight Connector 8">
+            <a:extLst>
+              <a:ext uri="{FF2B5EF4-FFF2-40B4-BE49-F238E27FC236}">
+                <a16:creationId xmlns:a16="http://schemas.microsoft.com/office/drawing/2014/main" id="{2FC06B60-8415-3824-6491-9BDC9C4B44EA}"/>
+              </a:ext>
+            </a:extLst>
+          </p:cNvPr>
+          <p:cNvCxnSpPr>
+            <a:cxnSpLocks/>
+            <a:stCxn id="15" idx="0"/>
+          </p:cNvCxnSpPr>
+          <p:nvPr/>
+        </p:nvCxnSpPr>
+        <p:spPr>
+          <a:xfrm flipV="1">
+            <a:off x="5680400" y="1119329"/>
+            <a:ext cx="1812472" cy="1185332"/>
+          </a:xfrm>
+          <a:prstGeom prst="line">
+            <a:avLst/>
+          </a:prstGeom>
+          <a:ln w="28575">
+            <a:solidFill>
+              <a:srgbClr val="C00000"/>
+            </a:solidFill>
+            <a:tailEnd type="triangle"/>
+          </a:ln>
+        </p:spPr>
+        <p:style>
+          <a:lnRef idx="1">
+            <a:schemeClr val="accent1"/>
+          </a:lnRef>
+          <a:fillRef idx="0">
+            <a:schemeClr val="accent1"/>
+          </a:fillRef>
+          <a:effectRef idx="0">
+            <a:schemeClr val="accent1"/>
+          </a:effectRef>
+          <a:fontRef idx="minor">
+            <a:schemeClr val="tx1"/>
+          </a:fontRef>
+        </p:style>
+      </p:cxnSp>
+      <p:cxnSp>
+        <p:nvCxnSpPr>
+          <p:cNvPr id="12" name="Straight Connector 11">
+            <a:extLst>
+              <a:ext uri="{FF2B5EF4-FFF2-40B4-BE49-F238E27FC236}">
+                <a16:creationId xmlns:a16="http://schemas.microsoft.com/office/drawing/2014/main" id="{699DB668-2C83-9FA4-068A-10EEF491B4D3}"/>
+              </a:ext>
+            </a:extLst>
+          </p:cNvPr>
+          <p:cNvCxnSpPr>
+            <a:cxnSpLocks/>
+            <a:stCxn id="17" idx="0"/>
+          </p:cNvCxnSpPr>
+          <p:nvPr/>
+        </p:nvCxnSpPr>
+        <p:spPr>
+          <a:xfrm flipV="1">
+            <a:off x="9083157" y="1119329"/>
+            <a:ext cx="0" cy="1185332"/>
+          </a:xfrm>
+          <a:prstGeom prst="line">
+            <a:avLst/>
+          </a:prstGeom>
+          <a:ln w="28575">
+            <a:solidFill>
+              <a:srgbClr val="C00000"/>
+            </a:solidFill>
+            <a:tailEnd type="triangle"/>
+          </a:ln>
+        </p:spPr>
+        <p:style>
+          <a:lnRef idx="1">
+            <a:schemeClr val="accent1"/>
+          </a:lnRef>
+          <a:fillRef idx="0">
+            <a:schemeClr val="accent1"/>
+          </a:fillRef>
+          <a:effectRef idx="0">
+            <a:schemeClr val="accent1"/>
+          </a:effectRef>
+          <a:fontRef idx="minor">
+            <a:schemeClr val="tx1"/>
+          </a:fontRef>
+        </p:style>
+      </p:cxnSp>
+      <p:sp>
+        <p:nvSpPr>
+          <p:cNvPr id="26" name="TextBox 25">
+            <a:extLst>
+              <a:ext uri="{FF2B5EF4-FFF2-40B4-BE49-F238E27FC236}">
+                <a16:creationId xmlns:a16="http://schemas.microsoft.com/office/drawing/2014/main" id="{74349279-E49C-8C4A-B824-D57753E728E6}"/>
+              </a:ext>
+            </a:extLst>
+          </p:cNvPr>
+          <p:cNvSpPr txBox="1"/>
+          <p:nvPr/>
+        </p:nvSpPr>
+        <p:spPr>
+          <a:xfrm>
+            <a:off x="5195304" y="6269457"/>
+            <a:ext cx="6179962" cy="369332"/>
+          </a:xfrm>
+          <a:prstGeom prst="rect">
+            <a:avLst/>
+          </a:prstGeom>
+          <a:noFill/>
+        </p:spPr>
+        <p:txBody>
+          <a:bodyPr wrap="none" rtlCol="0">
+            <a:spAutoFit/>
+          </a:bodyPr>
+          <a:lstStyle/>
+          <a:p>
+            <a:r>
+              <a:rPr lang="en-US" dirty="0"/>
+              <a:t>* There are 0 in </a:t>
+            </a:r>
+            <a:r>
+              <a:rPr lang="en-US" dirty="0" err="1"/>
+              <a:t>year_built</a:t>
+            </a:r>
+            <a:r>
+              <a:rPr lang="en-US" dirty="0"/>
+              <a:t>, replace it with null and then impute</a:t>
+            </a:r>
           </a:p>
         </p:txBody>
       </p:sp>
     </p:spTree>
     <p:extLst>
       <p:ext uri="{BB962C8B-B14F-4D97-AF65-F5344CB8AC3E}">
-        <p14:creationId xmlns:p14="http://schemas.microsoft.com/office/powerpoint/2010/main" val="4287258574"/>
+        <p14:creationId xmlns:p14="http://schemas.microsoft.com/office/powerpoint/2010/main" val="3030811331"/>
       </p:ext>
     </p:extLst>
   </p:cSld>
@@ -6896,95 +8921,12 @@
           <a:chExt cx="0" cy="0"/>
         </a:xfrm>
       </p:grpSpPr>
-      <p:sp>
-        <p:nvSpPr>
-          <p:cNvPr id="2" name="Title 1">
-            <a:extLst>
-              <a:ext uri="{FF2B5EF4-FFF2-40B4-BE49-F238E27FC236}">
-                <a16:creationId xmlns:a16="http://schemas.microsoft.com/office/drawing/2014/main" id="{148BA62D-8993-7949-6689-69FC6B5AD0E8}"/>
-              </a:ext>
-            </a:extLst>
-          </p:cNvPr>
-          <p:cNvSpPr>
-            <a:spLocks noGrp="1"/>
-          </p:cNvSpPr>
-          <p:nvPr>
-            <p:ph type="title"/>
-          </p:nvPr>
-        </p:nvSpPr>
-        <p:spPr/>
-        <p:txBody>
-          <a:bodyPr/>
-          <a:lstStyle/>
-          <a:p>
-            <a:pPr algn="ctr"/>
-            <a:r>
-              <a:rPr lang="en-US" b="1" dirty="0"/>
-              <a:t>Data transformation summary</a:t>
-            </a:r>
-          </a:p>
-        </p:txBody>
-      </p:sp>
-      <p:sp>
-        <p:nvSpPr>
-          <p:cNvPr id="3" name="Content Placeholder 2">
-            <a:extLst>
-              <a:ext uri="{FF2B5EF4-FFF2-40B4-BE49-F238E27FC236}">
-                <a16:creationId xmlns:a16="http://schemas.microsoft.com/office/drawing/2014/main" id="{15C9E1CB-D7D9-4CC1-CBC0-E8C6A62E721E}"/>
-              </a:ext>
-            </a:extLst>
-          </p:cNvPr>
-          <p:cNvSpPr>
-            <a:spLocks noGrp="1"/>
-          </p:cNvSpPr>
-          <p:nvPr>
-            <p:ph idx="1"/>
-          </p:nvPr>
-        </p:nvSpPr>
-        <p:spPr/>
-        <p:txBody>
-          <a:bodyPr/>
-          <a:lstStyle/>
-          <a:p>
-            <a:endParaRPr lang="en-US"/>
-          </a:p>
-        </p:txBody>
-      </p:sp>
-      <p:sp>
-        <p:nvSpPr>
-          <p:cNvPr id="4" name="Slide Number Placeholder 3">
-            <a:extLst>
-              <a:ext uri="{FF2B5EF4-FFF2-40B4-BE49-F238E27FC236}">
-                <a16:creationId xmlns:a16="http://schemas.microsoft.com/office/drawing/2014/main" id="{D1A0C39A-667A-C3B9-02DC-C83AA0289644}"/>
-              </a:ext>
-            </a:extLst>
-          </p:cNvPr>
-          <p:cNvSpPr>
-            <a:spLocks noGrp="1"/>
-          </p:cNvSpPr>
-          <p:nvPr>
-            <p:ph type="sldNum" sz="quarter" idx="12"/>
-          </p:nvPr>
-        </p:nvSpPr>
-        <p:spPr/>
-        <p:txBody>
-          <a:bodyPr/>
-          <a:lstStyle/>
-          <a:p>
-            <a:fld id="{640C5978-D207-4356-A33B-DAFE34A7F8D2}" type="slidenum">
-              <a:rPr lang="en-US" smtClean="0"/>
-              <a:t>9</a:t>
-            </a:fld>
-            <a:endParaRPr lang="en-US"/>
-          </a:p>
-        </p:txBody>
-      </p:sp>
       <p:pic>
         <p:nvPicPr>
-          <p:cNvPr id="9" name="Picture 8">
-            <a:extLst>
-              <a:ext uri="{FF2B5EF4-FFF2-40B4-BE49-F238E27FC236}">
-                <a16:creationId xmlns:a16="http://schemas.microsoft.com/office/drawing/2014/main" id="{98D673E5-BB90-8C15-8D3F-72A1765658C0}"/>
+          <p:cNvPr id="13" name="Picture 12">
+            <a:extLst>
+              <a:ext uri="{FF2B5EF4-FFF2-40B4-BE49-F238E27FC236}">
+                <a16:creationId xmlns:a16="http://schemas.microsoft.com/office/drawing/2014/main" id="{B91B1AE5-8EFB-F315-E9D9-91D71819B839}"/>
               </a:ext>
             </a:extLst>
           </p:cNvPr>
@@ -6994,25 +8936,520 @@
           <p:nvPr/>
         </p:nvPicPr>
         <p:blipFill>
-          <a:blip r:embed="rId2"/>
+          <a:blip r:embed="rId3"/>
           <a:stretch>
             <a:fillRect/>
           </a:stretch>
         </p:blipFill>
         <p:spPr>
           <a:xfrm>
-            <a:off x="1297678" y="1455154"/>
-            <a:ext cx="9596643" cy="5092280"/>
+            <a:off x="1676010" y="1196159"/>
+            <a:ext cx="8839980" cy="5083361"/>
           </a:xfrm>
           <a:prstGeom prst="rect">
             <a:avLst/>
           </a:prstGeom>
         </p:spPr>
       </p:pic>
+      <p:sp>
+        <p:nvSpPr>
+          <p:cNvPr id="6" name="Title 5">
+            <a:extLst>
+              <a:ext uri="{FF2B5EF4-FFF2-40B4-BE49-F238E27FC236}">
+                <a16:creationId xmlns:a16="http://schemas.microsoft.com/office/drawing/2014/main" id="{1637AF34-8C12-7F6A-2EE0-90F7DCC03ADF}"/>
+              </a:ext>
+            </a:extLst>
+          </p:cNvPr>
+          <p:cNvSpPr>
+            <a:spLocks noGrp="1"/>
+          </p:cNvSpPr>
+          <p:nvPr>
+            <p:ph type="title"/>
+          </p:nvPr>
+        </p:nvSpPr>
+        <p:spPr/>
+        <p:txBody>
+          <a:bodyPr/>
+          <a:lstStyle/>
+          <a:p>
+            <a:r>
+              <a:rPr lang="en-US" b="1" dirty="0"/>
+              <a:t>A lot of missing data</a:t>
+            </a:r>
+          </a:p>
+        </p:txBody>
+      </p:sp>
+      <p:sp>
+        <p:nvSpPr>
+          <p:cNvPr id="5" name="Slide Number Placeholder 4">
+            <a:extLst>
+              <a:ext uri="{FF2B5EF4-FFF2-40B4-BE49-F238E27FC236}">
+                <a16:creationId xmlns:a16="http://schemas.microsoft.com/office/drawing/2014/main" id="{C0256DC6-B7C3-69BB-F56B-6451A6CE8C98}"/>
+              </a:ext>
+            </a:extLst>
+          </p:cNvPr>
+          <p:cNvSpPr>
+            <a:spLocks noGrp="1"/>
+          </p:cNvSpPr>
+          <p:nvPr>
+            <p:ph type="sldNum" sz="quarter" idx="12"/>
+          </p:nvPr>
+        </p:nvSpPr>
+        <p:spPr/>
+        <p:txBody>
+          <a:bodyPr/>
+          <a:lstStyle/>
+          <a:p>
+            <a:fld id="{640C5978-D207-4356-A33B-DAFE34A7F8D2}" type="slidenum">
+              <a:rPr lang="en-US" smtClean="0"/>
+              <a:t>9</a:t>
+            </a:fld>
+            <a:endParaRPr lang="en-US"/>
+          </a:p>
+        </p:txBody>
+      </p:sp>
+      <p:sp>
+        <p:nvSpPr>
+          <p:cNvPr id="14" name="Rectangle 13">
+            <a:extLst>
+              <a:ext uri="{FF2B5EF4-FFF2-40B4-BE49-F238E27FC236}">
+                <a16:creationId xmlns:a16="http://schemas.microsoft.com/office/drawing/2014/main" id="{8FBA0743-B278-CBA6-650E-54C1D90DCE33}"/>
+              </a:ext>
+            </a:extLst>
+          </p:cNvPr>
+          <p:cNvSpPr/>
+          <p:nvPr/>
+        </p:nvSpPr>
+        <p:spPr>
+          <a:xfrm>
+            <a:off x="3965510" y="2304661"/>
+            <a:ext cx="401217" cy="3834882"/>
+          </a:xfrm>
+          <a:prstGeom prst="rect">
+            <a:avLst/>
+          </a:prstGeom>
+          <a:solidFill>
+            <a:srgbClr val="C00000">
+              <a:alpha val="50196"/>
+            </a:srgbClr>
+          </a:solidFill>
+          <a:ln w="38100">
+            <a:solidFill>
+              <a:srgbClr val="C00000"/>
+            </a:solidFill>
+          </a:ln>
+        </p:spPr>
+        <p:style>
+          <a:lnRef idx="2">
+            <a:schemeClr val="accent1">
+              <a:shade val="15000"/>
+            </a:schemeClr>
+          </a:lnRef>
+          <a:fillRef idx="1">
+            <a:schemeClr val="accent1"/>
+          </a:fillRef>
+          <a:effectRef idx="0">
+            <a:schemeClr val="accent1"/>
+          </a:effectRef>
+          <a:fontRef idx="minor">
+            <a:schemeClr val="lt1"/>
+          </a:fontRef>
+        </p:style>
+        <p:txBody>
+          <a:bodyPr rtlCol="0" anchor="ctr"/>
+          <a:lstStyle/>
+          <a:p>
+            <a:pPr algn="ctr"/>
+            <a:endParaRPr lang="en-US"/>
+          </a:p>
+        </p:txBody>
+      </p:sp>
+      <p:sp>
+        <p:nvSpPr>
+          <p:cNvPr id="15" name="Rectangle 14">
+            <a:extLst>
+              <a:ext uri="{FF2B5EF4-FFF2-40B4-BE49-F238E27FC236}">
+                <a16:creationId xmlns:a16="http://schemas.microsoft.com/office/drawing/2014/main" id="{9E1BC2AE-2382-360A-D1C6-87D253CCEBF3}"/>
+              </a:ext>
+            </a:extLst>
+          </p:cNvPr>
+          <p:cNvSpPr/>
+          <p:nvPr/>
+        </p:nvSpPr>
+        <p:spPr>
+          <a:xfrm>
+            <a:off x="5479791" y="2304661"/>
+            <a:ext cx="401218" cy="3834882"/>
+          </a:xfrm>
+          <a:prstGeom prst="rect">
+            <a:avLst/>
+          </a:prstGeom>
+          <a:solidFill>
+            <a:srgbClr val="C00000">
+              <a:alpha val="50196"/>
+            </a:srgbClr>
+          </a:solidFill>
+          <a:ln w="38100">
+            <a:solidFill>
+              <a:srgbClr val="C00000"/>
+            </a:solidFill>
+          </a:ln>
+        </p:spPr>
+        <p:style>
+          <a:lnRef idx="2">
+            <a:schemeClr val="accent1">
+              <a:shade val="15000"/>
+            </a:schemeClr>
+          </a:lnRef>
+          <a:fillRef idx="1">
+            <a:schemeClr val="accent1"/>
+          </a:fillRef>
+          <a:effectRef idx="0">
+            <a:schemeClr val="accent1"/>
+          </a:effectRef>
+          <a:fontRef idx="minor">
+            <a:schemeClr val="lt1"/>
+          </a:fontRef>
+        </p:style>
+        <p:txBody>
+          <a:bodyPr rtlCol="0" anchor="ctr"/>
+          <a:lstStyle/>
+          <a:p>
+            <a:pPr algn="ctr"/>
+            <a:endParaRPr lang="en-US"/>
+          </a:p>
+        </p:txBody>
+      </p:sp>
+      <p:sp>
+        <p:nvSpPr>
+          <p:cNvPr id="17" name="Rectangle 16">
+            <a:extLst>
+              <a:ext uri="{FF2B5EF4-FFF2-40B4-BE49-F238E27FC236}">
+                <a16:creationId xmlns:a16="http://schemas.microsoft.com/office/drawing/2014/main" id="{B92570B7-BB7B-B8F4-3430-814C78791B87}"/>
+              </a:ext>
+            </a:extLst>
+          </p:cNvPr>
+          <p:cNvSpPr/>
+          <p:nvPr/>
+        </p:nvSpPr>
+        <p:spPr>
+          <a:xfrm>
+            <a:off x="8873023" y="2304661"/>
+            <a:ext cx="401217" cy="3834882"/>
+          </a:xfrm>
+          <a:prstGeom prst="rect">
+            <a:avLst/>
+          </a:prstGeom>
+          <a:solidFill>
+            <a:srgbClr val="C00000">
+              <a:alpha val="50196"/>
+            </a:srgbClr>
+          </a:solidFill>
+          <a:ln w="38100">
+            <a:solidFill>
+              <a:srgbClr val="C00000"/>
+            </a:solidFill>
+          </a:ln>
+        </p:spPr>
+        <p:style>
+          <a:lnRef idx="2">
+            <a:schemeClr val="accent1">
+              <a:shade val="15000"/>
+            </a:schemeClr>
+          </a:lnRef>
+          <a:fillRef idx="1">
+            <a:schemeClr val="accent1"/>
+          </a:fillRef>
+          <a:effectRef idx="0">
+            <a:schemeClr val="accent1"/>
+          </a:effectRef>
+          <a:fontRef idx="minor">
+            <a:schemeClr val="lt1"/>
+          </a:fontRef>
+        </p:style>
+        <p:txBody>
+          <a:bodyPr rtlCol="0" anchor="ctr"/>
+          <a:lstStyle/>
+          <a:p>
+            <a:pPr algn="ctr"/>
+            <a:endParaRPr lang="en-US"/>
+          </a:p>
+        </p:txBody>
+      </p:sp>
+      <p:sp>
+        <p:nvSpPr>
+          <p:cNvPr id="2" name="Rectangle 1">
+            <a:extLst>
+              <a:ext uri="{FF2B5EF4-FFF2-40B4-BE49-F238E27FC236}">
+                <a16:creationId xmlns:a16="http://schemas.microsoft.com/office/drawing/2014/main" id="{6D94E452-0F0A-7E1C-4535-ADD91D4791AD}"/>
+              </a:ext>
+            </a:extLst>
+          </p:cNvPr>
+          <p:cNvSpPr/>
+          <p:nvPr/>
+        </p:nvSpPr>
+        <p:spPr>
+          <a:xfrm>
+            <a:off x="5881008" y="2304661"/>
+            <a:ext cx="401217" cy="3834882"/>
+          </a:xfrm>
+          <a:prstGeom prst="rect">
+            <a:avLst/>
+          </a:prstGeom>
+          <a:noFill/>
+          <a:ln w="38100">
+            <a:solidFill>
+              <a:schemeClr val="accent1"/>
+            </a:solidFill>
+          </a:ln>
+        </p:spPr>
+        <p:style>
+          <a:lnRef idx="2">
+            <a:schemeClr val="accent1">
+              <a:shade val="15000"/>
+            </a:schemeClr>
+          </a:lnRef>
+          <a:fillRef idx="1">
+            <a:schemeClr val="accent1"/>
+          </a:fillRef>
+          <a:effectRef idx="0">
+            <a:schemeClr val="accent1"/>
+          </a:effectRef>
+          <a:fontRef idx="minor">
+            <a:schemeClr val="lt1"/>
+          </a:fontRef>
+        </p:style>
+        <p:txBody>
+          <a:bodyPr rtlCol="0" anchor="ctr"/>
+          <a:lstStyle/>
+          <a:p>
+            <a:pPr algn="ctr"/>
+            <a:endParaRPr lang="en-US"/>
+          </a:p>
+        </p:txBody>
+      </p:sp>
+      <p:sp>
+        <p:nvSpPr>
+          <p:cNvPr id="3" name="Rectangle 2">
+            <a:extLst>
+              <a:ext uri="{FF2B5EF4-FFF2-40B4-BE49-F238E27FC236}">
+                <a16:creationId xmlns:a16="http://schemas.microsoft.com/office/drawing/2014/main" id="{2A500011-A2AA-5B8A-26B1-FC7FE82DACC2}"/>
+              </a:ext>
+            </a:extLst>
+          </p:cNvPr>
+          <p:cNvSpPr/>
+          <p:nvPr/>
+        </p:nvSpPr>
+        <p:spPr>
+          <a:xfrm>
+            <a:off x="7752767" y="2304661"/>
+            <a:ext cx="401217" cy="3834882"/>
+          </a:xfrm>
+          <a:prstGeom prst="rect">
+            <a:avLst/>
+          </a:prstGeom>
+          <a:noFill/>
+          <a:ln w="38100">
+            <a:solidFill>
+              <a:schemeClr val="accent1"/>
+            </a:solidFill>
+          </a:ln>
+        </p:spPr>
+        <p:style>
+          <a:lnRef idx="2">
+            <a:schemeClr val="accent1">
+              <a:shade val="15000"/>
+            </a:schemeClr>
+          </a:lnRef>
+          <a:fillRef idx="1">
+            <a:schemeClr val="accent1"/>
+          </a:fillRef>
+          <a:effectRef idx="0">
+            <a:schemeClr val="accent1"/>
+          </a:effectRef>
+          <a:fontRef idx="minor">
+            <a:schemeClr val="lt1"/>
+          </a:fontRef>
+        </p:style>
+        <p:txBody>
+          <a:bodyPr rtlCol="0" anchor="ctr"/>
+          <a:lstStyle/>
+          <a:p>
+            <a:pPr algn="ctr"/>
+            <a:endParaRPr lang="en-US"/>
+          </a:p>
+        </p:txBody>
+      </p:sp>
+      <p:sp>
+        <p:nvSpPr>
+          <p:cNvPr id="4" name="TextBox 3">
+            <a:extLst>
+              <a:ext uri="{FF2B5EF4-FFF2-40B4-BE49-F238E27FC236}">
+                <a16:creationId xmlns:a16="http://schemas.microsoft.com/office/drawing/2014/main" id="{B8F9FDFE-A757-A7FF-DCE4-A6736934D631}"/>
+              </a:ext>
+            </a:extLst>
+          </p:cNvPr>
+          <p:cNvSpPr txBox="1"/>
+          <p:nvPr/>
+        </p:nvSpPr>
+        <p:spPr>
+          <a:xfrm>
+            <a:off x="6707970" y="652224"/>
+            <a:ext cx="3770071" cy="369332"/>
+          </a:xfrm>
+          <a:prstGeom prst="rect">
+            <a:avLst/>
+          </a:prstGeom>
+          <a:noFill/>
+        </p:spPr>
+        <p:txBody>
+          <a:bodyPr wrap="none" rtlCol="0">
+            <a:spAutoFit/>
+          </a:bodyPr>
+          <a:lstStyle/>
+          <a:p>
+            <a:r>
+              <a:rPr lang="en-US" b="1" dirty="0">
+                <a:solidFill>
+                  <a:schemeClr val="accent1"/>
+                </a:solidFill>
+              </a:rPr>
+              <a:t>Mean-imputed with missing indicator</a:t>
+            </a:r>
+          </a:p>
+        </p:txBody>
+      </p:sp>
+      <p:cxnSp>
+        <p:nvCxnSpPr>
+          <p:cNvPr id="8" name="Straight Connector 7">
+            <a:extLst>
+              <a:ext uri="{FF2B5EF4-FFF2-40B4-BE49-F238E27FC236}">
+                <a16:creationId xmlns:a16="http://schemas.microsoft.com/office/drawing/2014/main" id="{AFB665FA-A33C-DC00-C271-86D6E8DC9A24}"/>
+              </a:ext>
+            </a:extLst>
+          </p:cNvPr>
+          <p:cNvCxnSpPr>
+            <a:cxnSpLocks/>
+          </p:cNvCxnSpPr>
+          <p:nvPr/>
+        </p:nvCxnSpPr>
+        <p:spPr>
+          <a:xfrm flipV="1">
+            <a:off x="6096000" y="1114425"/>
+            <a:ext cx="962025" cy="1190236"/>
+          </a:xfrm>
+          <a:prstGeom prst="line">
+            <a:avLst/>
+          </a:prstGeom>
+          <a:ln w="28575">
+            <a:solidFill>
+              <a:schemeClr val="accent1"/>
+            </a:solidFill>
+            <a:tailEnd type="triangle"/>
+          </a:ln>
+        </p:spPr>
+        <p:style>
+          <a:lnRef idx="1">
+            <a:schemeClr val="accent1"/>
+          </a:lnRef>
+          <a:fillRef idx="0">
+            <a:schemeClr val="accent1"/>
+          </a:fillRef>
+          <a:effectRef idx="0">
+            <a:schemeClr val="accent1"/>
+          </a:effectRef>
+          <a:fontRef idx="minor">
+            <a:schemeClr val="tx1"/>
+          </a:fontRef>
+        </p:style>
+      </p:cxnSp>
+      <p:cxnSp>
+        <p:nvCxnSpPr>
+          <p:cNvPr id="16" name="Straight Connector 15">
+            <a:extLst>
+              <a:ext uri="{FF2B5EF4-FFF2-40B4-BE49-F238E27FC236}">
+                <a16:creationId xmlns:a16="http://schemas.microsoft.com/office/drawing/2014/main" id="{34CD7CE4-4B1F-464F-6D29-F5408A8BE08C}"/>
+              </a:ext>
+            </a:extLst>
+          </p:cNvPr>
+          <p:cNvCxnSpPr>
+            <a:cxnSpLocks/>
+          </p:cNvCxnSpPr>
+          <p:nvPr/>
+        </p:nvCxnSpPr>
+        <p:spPr>
+          <a:xfrm flipV="1">
+            <a:off x="7981950" y="1114425"/>
+            <a:ext cx="76200" cy="1190236"/>
+          </a:xfrm>
+          <a:prstGeom prst="line">
+            <a:avLst/>
+          </a:prstGeom>
+          <a:ln w="28575">
+            <a:solidFill>
+              <a:schemeClr val="accent1"/>
+            </a:solidFill>
+            <a:tailEnd type="triangle"/>
+          </a:ln>
+        </p:spPr>
+        <p:style>
+          <a:lnRef idx="1">
+            <a:schemeClr val="accent1"/>
+          </a:lnRef>
+          <a:fillRef idx="0">
+            <a:schemeClr val="accent1"/>
+          </a:fillRef>
+          <a:effectRef idx="0">
+            <a:schemeClr val="accent1"/>
+          </a:effectRef>
+          <a:fontRef idx="minor">
+            <a:schemeClr val="tx1"/>
+          </a:fontRef>
+        </p:style>
+      </p:cxnSp>
+      <p:sp>
+        <p:nvSpPr>
+          <p:cNvPr id="21" name="TextBox 20">
+            <a:extLst>
+              <a:ext uri="{FF2B5EF4-FFF2-40B4-BE49-F238E27FC236}">
+                <a16:creationId xmlns:a16="http://schemas.microsoft.com/office/drawing/2014/main" id="{A346D05E-7E8B-A162-F229-62C5B271585A}"/>
+              </a:ext>
+            </a:extLst>
+          </p:cNvPr>
+          <p:cNvSpPr txBox="1"/>
+          <p:nvPr/>
+        </p:nvSpPr>
+        <p:spPr>
+          <a:xfrm>
+            <a:off x="8322981" y="195591"/>
+            <a:ext cx="3646639" cy="369332"/>
+          </a:xfrm>
+          <a:prstGeom prst="rect">
+            <a:avLst/>
+          </a:prstGeom>
+          <a:noFill/>
+        </p:spPr>
+        <p:txBody>
+          <a:bodyPr wrap="none" rtlCol="0">
+            <a:spAutoFit/>
+          </a:bodyPr>
+          <a:lstStyle/>
+          <a:p>
+            <a:r>
+              <a:rPr lang="en-US" b="1" dirty="0">
+                <a:solidFill>
+                  <a:srgbClr val="C00000"/>
+                </a:solidFill>
+              </a:rPr>
+              <a:t>KNN-imputed with missing indicator</a:t>
+            </a:r>
+          </a:p>
+        </p:txBody>
+      </p:sp>
     </p:spTree>
     <p:extLst>
       <p:ext uri="{BB962C8B-B14F-4D97-AF65-F5344CB8AC3E}">
-        <p14:creationId xmlns:p14="http://schemas.microsoft.com/office/powerpoint/2010/main" val="3928268860"/>
+        <p14:creationId xmlns:p14="http://schemas.microsoft.com/office/powerpoint/2010/main" val="2976565951"/>
       </p:ext>
     </p:extLst>
   </p:cSld>

</xml_diff>

<commit_message>
reduce technical terms in presentation and update readme
</commit_message>
<xml_diff>
--- a/presentation/Bangkok Housing Price Prediction for buyers and sellers.pptx
+++ b/presentation/Bangkok Housing Price Prediction for buyers and sellers.pptx
@@ -5,10 +5,10 @@
     <p:sldMasterId id="2147483648" r:id="rId1"/>
   </p:sldMasterIdLst>
   <p:notesMasterIdLst>
-    <p:notesMasterId r:id="rId19"/>
+    <p:notesMasterId r:id="rId20"/>
   </p:notesMasterIdLst>
   <p:handoutMasterIdLst>
-    <p:handoutMasterId r:id="rId20"/>
+    <p:handoutMasterId r:id="rId21"/>
   </p:handoutMasterIdLst>
   <p:sldIdLst>
     <p:sldId id="256" r:id="rId2"/>
@@ -23,11 +23,12 @@
     <p:sldId id="272" r:id="rId11"/>
     <p:sldId id="273" r:id="rId12"/>
     <p:sldId id="262" r:id="rId13"/>
-    <p:sldId id="264" r:id="rId14"/>
-    <p:sldId id="265" r:id="rId15"/>
-    <p:sldId id="266" r:id="rId16"/>
-    <p:sldId id="267" r:id="rId17"/>
-    <p:sldId id="275" r:id="rId18"/>
+    <p:sldId id="276" r:id="rId14"/>
+    <p:sldId id="264" r:id="rId15"/>
+    <p:sldId id="265" r:id="rId16"/>
+    <p:sldId id="266" r:id="rId17"/>
+    <p:sldId id="267" r:id="rId18"/>
+    <p:sldId id="275" r:id="rId19"/>
   </p:sldIdLst>
   <p:sldSz cx="12192000" cy="6858000"/>
   <p:notesSz cx="6858000" cy="9144000"/>
@@ -231,7 +232,7 @@
           <a:p>
             <a:fld id="{6A635924-7805-4987-B004-633AF8543327}" type="datetimeFigureOut">
               <a:rPr lang="en-US" smtClean="0"/>
-              <a:t>27-Oct-23</a:t>
+              <a:t>28-Oct-23</a:t>
             </a:fld>
             <a:endParaRPr lang="en-US"/>
           </a:p>
@@ -409,7 +410,7 @@
           <a:p>
             <a:fld id="{4792800D-0FCF-451F-A6C3-59608CB4A1C9}" type="datetimeFigureOut">
               <a:rPr lang="en-US" smtClean="0"/>
-              <a:t>27-Oct-23</a:t>
+              <a:t>28-Oct-23</a:t>
             </a:fld>
             <a:endParaRPr lang="en-US"/>
           </a:p>
@@ -723,13 +724,7 @@
           <a:p>
             <a:r>
               <a:rPr lang="en-US" dirty="0"/>
-              <a:t>The data consists of many factors that might be affect the housing price</a:t>
-            </a:r>
-          </a:p>
-          <a:p>
-            <a:r>
-              <a:rPr lang="en-US" dirty="0"/>
-              <a:t>While the price is what we want to predict</a:t>
+              <a:t>Try to aid this problem whoever you are, buyer or seller</a:t>
             </a:r>
           </a:p>
         </p:txBody>
@@ -737,7 +732,162 @@
     </p:spTree>
     <p:extLst>
       <p:ext uri="{BB962C8B-B14F-4D97-AF65-F5344CB8AC3E}">
-        <p14:creationId xmlns:p14="http://schemas.microsoft.com/office/powerpoint/2010/main" val="1463646166"/>
+        <p14:creationId xmlns:p14="http://schemas.microsoft.com/office/powerpoint/2010/main" val="12812973"/>
+      </p:ext>
+    </p:extLst>
+  </p:cSld>
+  <p:clrMapOvr>
+    <a:masterClrMapping/>
+  </p:clrMapOvr>
+</p:notes>
+</file>
+
+<file path=ppt/notesSlides/notesSlide10.xml><?xml version="1.0" encoding="utf-8"?>
+<p:notes xmlns:a="http://schemas.openxmlformats.org/drawingml/2006/main" xmlns:r="http://schemas.openxmlformats.org/officeDocument/2006/relationships" xmlns:p="http://schemas.openxmlformats.org/presentationml/2006/main">
+  <p:cSld>
+    <p:spTree>
+      <p:nvGrpSpPr>
+        <p:cNvPr id="1" name=""/>
+        <p:cNvGrpSpPr/>
+        <p:nvPr/>
+      </p:nvGrpSpPr>
+      <p:grpSpPr>
+        <a:xfrm>
+          <a:off x="0" y="0"/>
+          <a:ext cx="0" cy="0"/>
+          <a:chOff x="0" y="0"/>
+          <a:chExt cx="0" cy="0"/>
+        </a:xfrm>
+      </p:grpSpPr>
+      <p:sp>
+        <p:nvSpPr>
+          <p:cNvPr id="2" name="Slide Image Placeholder 1"/>
+          <p:cNvSpPr>
+            <a:spLocks noGrp="1" noRot="1" noChangeAspect="1"/>
+          </p:cNvSpPr>
+          <p:nvPr>
+            <p:ph type="sldImg"/>
+          </p:nvPr>
+        </p:nvSpPr>
+        <p:spPr/>
+      </p:sp>
+      <p:sp>
+        <p:nvSpPr>
+          <p:cNvPr id="3" name="Notes Placeholder 2"/>
+          <p:cNvSpPr>
+            <a:spLocks noGrp="1"/>
+          </p:cNvSpPr>
+          <p:nvPr>
+            <p:ph type="body" idx="1"/>
+          </p:nvPr>
+        </p:nvSpPr>
+        <p:spPr/>
+        <p:txBody>
+          <a:bodyPr/>
+          <a:lstStyle/>
+          <a:p>
+            <a:r>
+              <a:rPr lang="en-US" dirty="0"/>
+              <a:t>As the modeling technique needs all data to be numbers,</a:t>
+            </a:r>
+          </a:p>
+          <a:p>
+            <a:r>
+              <a:rPr lang="en-US" dirty="0"/>
+              <a:t>Some of columns need to be changed to number instead using method called </a:t>
+            </a:r>
+            <a:r>
+              <a:rPr lang="en-US" dirty="0" err="1"/>
+              <a:t>dummified</a:t>
+            </a:r>
+            <a:endParaRPr lang="en-US" dirty="0"/>
+          </a:p>
+        </p:txBody>
+      </p:sp>
+    </p:spTree>
+    <p:extLst>
+      <p:ext uri="{BB962C8B-B14F-4D97-AF65-F5344CB8AC3E}">
+        <p14:creationId xmlns:p14="http://schemas.microsoft.com/office/powerpoint/2010/main" val="764133662"/>
+      </p:ext>
+    </p:extLst>
+  </p:cSld>
+  <p:clrMapOvr>
+    <a:masterClrMapping/>
+  </p:clrMapOvr>
+</p:notes>
+</file>
+
+<file path=ppt/notesSlides/notesSlide11.xml><?xml version="1.0" encoding="utf-8"?>
+<p:notes xmlns:a="http://schemas.openxmlformats.org/drawingml/2006/main" xmlns:r="http://schemas.openxmlformats.org/officeDocument/2006/relationships" xmlns:p="http://schemas.openxmlformats.org/presentationml/2006/main">
+  <p:cSld>
+    <p:spTree>
+      <p:nvGrpSpPr>
+        <p:cNvPr id="1" name=""/>
+        <p:cNvGrpSpPr/>
+        <p:nvPr/>
+      </p:nvGrpSpPr>
+      <p:grpSpPr>
+        <a:xfrm>
+          <a:off x="0" y="0"/>
+          <a:ext cx="0" cy="0"/>
+          <a:chOff x="0" y="0"/>
+          <a:chExt cx="0" cy="0"/>
+        </a:xfrm>
+      </p:grpSpPr>
+      <p:sp>
+        <p:nvSpPr>
+          <p:cNvPr id="2" name="Slide Image Placeholder 1"/>
+          <p:cNvSpPr>
+            <a:spLocks noGrp="1" noRot="1" noChangeAspect="1"/>
+          </p:cNvSpPr>
+          <p:nvPr>
+            <p:ph type="sldImg"/>
+          </p:nvPr>
+        </p:nvSpPr>
+        <p:spPr/>
+      </p:sp>
+      <p:sp>
+        <p:nvSpPr>
+          <p:cNvPr id="3" name="Notes Placeholder 2"/>
+          <p:cNvSpPr>
+            <a:spLocks noGrp="1"/>
+          </p:cNvSpPr>
+          <p:nvPr>
+            <p:ph type="body" idx="1"/>
+          </p:nvPr>
+        </p:nvSpPr>
+        <p:spPr/>
+        <p:txBody>
+          <a:bodyPr/>
+          <a:lstStyle/>
+          <a:p>
+            <a:r>
+              <a:rPr lang="en-US" dirty="0"/>
+              <a:t>Every column from </a:t>
+            </a:r>
+            <a:r>
+              <a:rPr lang="en-US" dirty="0" err="1"/>
+              <a:t>floor_area</a:t>
+            </a:r>
+            <a:r>
+              <a:rPr lang="en-US" dirty="0"/>
+              <a:t> to </a:t>
+            </a:r>
+            <a:r>
+              <a:rPr lang="en-US" dirty="0" err="1"/>
+              <a:t>nearby_bus_stops</a:t>
+            </a:r>
+            <a:r>
+              <a:rPr lang="en-US" dirty="0"/>
+              <a:t> is also normalized (scaled to the same unit)</a:t>
+            </a:r>
+          </a:p>
+        </p:txBody>
+      </p:sp>
+    </p:spTree>
+    <p:extLst>
+      <p:ext uri="{BB962C8B-B14F-4D97-AF65-F5344CB8AC3E}">
+        <p14:creationId xmlns:p14="http://schemas.microsoft.com/office/powerpoint/2010/main" val="1427478576"/>
       </p:ext>
     </p:extLst>
   </p:cSld>
@@ -793,7 +943,16 @@
           <a:p>
             <a:r>
               <a:rPr lang="en-US" dirty="0"/>
-              <a:t>Nearby bus stops is useless because of very low correlation with price, already experiment with it and have nearly no effect to the model prediction</a:t>
+              <a:t>By using this data to predict housing price</a:t>
+            </a:r>
+          </a:p>
+          <a:p>
+            <a:endParaRPr lang="en-US" dirty="0"/>
+          </a:p>
+          <a:p>
+            <a:r>
+              <a:rPr lang="en-US" dirty="0"/>
+              <a:t>The data consists of many factors that might affect the housing price</a:t>
             </a:r>
           </a:p>
         </p:txBody>
@@ -801,7 +960,7 @@
     </p:spTree>
     <p:extLst>
       <p:ext uri="{BB962C8B-B14F-4D97-AF65-F5344CB8AC3E}">
-        <p14:creationId xmlns:p14="http://schemas.microsoft.com/office/powerpoint/2010/main" val="4286294859"/>
+        <p14:creationId xmlns:p14="http://schemas.microsoft.com/office/powerpoint/2010/main" val="1463646166"/>
       </p:ext>
     </p:extLst>
   </p:cSld>
@@ -855,24 +1014,26 @@
           <a:bodyPr/>
           <a:lstStyle/>
           <a:p>
+            <a:pPr marL="0" marR="0" lvl="0" indent="0" algn="l" defTabSz="914400" rtl="0" eaLnBrk="1" fontAlgn="auto" latinLnBrk="0" hangingPunct="1">
+              <a:lnSpc>
+                <a:spcPct val="100000"/>
+              </a:lnSpc>
+              <a:spcBef>
+                <a:spcPts val="0"/>
+              </a:spcBef>
+              <a:spcAft>
+                <a:spcPts val="0"/>
+              </a:spcAft>
+              <a:buClrTx/>
+              <a:buSzTx/>
+              <a:buFontTx/>
+              <a:buNone/>
+              <a:tabLst/>
+              <a:defRPr/>
+            </a:pPr>
             <a:r>
               <a:rPr lang="en-US" dirty="0"/>
-              <a:t>Some column with fewer missing value, those value can be removed</a:t>
-            </a:r>
-          </a:p>
-          <a:p>
-            <a:r>
-              <a:rPr lang="en-US" dirty="0"/>
-              <a:t>Red columns are what will be used, so it’s need to be imputed</a:t>
-            </a:r>
-          </a:p>
-          <a:p>
-            <a:endParaRPr lang="en-US" dirty="0"/>
-          </a:p>
-          <a:p>
-            <a:r>
-              <a:rPr lang="en-US" dirty="0"/>
-              <a:t>Blue need to use custom transformation, as the missing value means there is no nearby station which can be possible</a:t>
+              <a:t>From this point, if your aren’t into technical, you can just ignore and wait for the result</a:t>
             </a:r>
           </a:p>
         </p:txBody>
@@ -880,7 +1041,7 @@
     </p:spTree>
     <p:extLst>
       <p:ext uri="{BB962C8B-B14F-4D97-AF65-F5344CB8AC3E}">
-        <p14:creationId xmlns:p14="http://schemas.microsoft.com/office/powerpoint/2010/main" val="913288010"/>
+        <p14:creationId xmlns:p14="http://schemas.microsoft.com/office/powerpoint/2010/main" val="4286294859"/>
       </p:ext>
     </p:extLst>
   </p:cSld>
@@ -942,16 +1103,7 @@
           <a:p>
             <a:r>
               <a:rPr lang="en-US" dirty="0"/>
-              <a:t>Red columns are what will be used, so it’s need to be imputed</a:t>
-            </a:r>
-          </a:p>
-          <a:p>
-            <a:endParaRPr lang="en-US" dirty="0"/>
-          </a:p>
-          <a:p>
-            <a:r>
-              <a:rPr lang="en-US" dirty="0"/>
-              <a:t>Blue need to use custom transformation, as the missing value means there is no nearby station which can be possible</a:t>
+              <a:t>Red columns are what will be used, so it’s need to be replace with some value using various techniques (called imputation, being imputed)</a:t>
             </a:r>
           </a:p>
         </p:txBody>
@@ -959,7 +1111,7 @@
     </p:spTree>
     <p:extLst>
       <p:ext uri="{BB962C8B-B14F-4D97-AF65-F5344CB8AC3E}">
-        <p14:creationId xmlns:p14="http://schemas.microsoft.com/office/powerpoint/2010/main" val="3853809233"/>
+        <p14:creationId xmlns:p14="http://schemas.microsoft.com/office/powerpoint/2010/main" val="913288010"/>
       </p:ext>
     </p:extLst>
   </p:cSld>
@@ -1014,23 +1166,18 @@
           <a:lstStyle/>
           <a:p>
             <a:r>
+              <a:rPr lang="en-US" dirty="0" err="1"/>
+              <a:t>Year_built</a:t>
+            </a:r>
+            <a:r>
               <a:rPr lang="en-US" dirty="0"/>
-              <a:t>Some column with fewer missing value, those value can be removed</a:t>
+              <a:t> = 0 has to be replaced with empty value first to be able to use KNN-imputation function</a:t>
             </a:r>
           </a:p>
           <a:p>
             <a:r>
               <a:rPr lang="en-US" dirty="0"/>
-              <a:t>Red columns are what will be used, so it’s need to be imputed</a:t>
-            </a:r>
-          </a:p>
-          <a:p>
-            <a:endParaRPr lang="en-US" dirty="0"/>
-          </a:p>
-          <a:p>
-            <a:r>
-              <a:rPr lang="en-US" dirty="0"/>
-              <a:t>Blue need to use custom transformation, as the missing value means there is no nearby station which can be possible</a:t>
+              <a:t>(one kind of technique, finding the rows in the table that are the most nearly identical to this row and use their values in this column as a guideline to filling the missing one)</a:t>
             </a:r>
           </a:p>
         </p:txBody>
@@ -1038,7 +1185,7 @@
     </p:spTree>
     <p:extLst>
       <p:ext uri="{BB962C8B-B14F-4D97-AF65-F5344CB8AC3E}">
-        <p14:creationId xmlns:p14="http://schemas.microsoft.com/office/powerpoint/2010/main" val="1953685621"/>
+        <p14:creationId xmlns:p14="http://schemas.microsoft.com/office/powerpoint/2010/main" val="3853809233"/>
       </p:ext>
     </p:extLst>
   </p:cSld>
@@ -1094,22 +1241,7 @@
           <a:p>
             <a:r>
               <a:rPr lang="en-US" dirty="0"/>
-              <a:t>Some column with fewer missing value, those value can be removed</a:t>
-            </a:r>
-          </a:p>
-          <a:p>
-            <a:r>
-              <a:rPr lang="en-US" dirty="0"/>
-              <a:t>Red columns are what will be used, so it’s need to be imputed</a:t>
-            </a:r>
-          </a:p>
-          <a:p>
-            <a:endParaRPr lang="en-US" dirty="0"/>
-          </a:p>
-          <a:p>
-            <a:r>
-              <a:rPr lang="en-US" dirty="0"/>
-              <a:t>Blue need to use custom transformation, as the missing value means there is no nearby station which can be possible</a:t>
+              <a:t>Mean-imputed -&gt; replace with its average value</a:t>
             </a:r>
           </a:p>
         </p:txBody>
@@ -1117,7 +1249,7 @@
     </p:spTree>
     <p:extLst>
       <p:ext uri="{BB962C8B-B14F-4D97-AF65-F5344CB8AC3E}">
-        <p14:creationId xmlns:p14="http://schemas.microsoft.com/office/powerpoint/2010/main" val="1820622707"/>
+        <p14:creationId xmlns:p14="http://schemas.microsoft.com/office/powerpoint/2010/main" val="1953685621"/>
       </p:ext>
     </p:extLst>
   </p:cSld>
@@ -1173,6 +1305,76 @@
           <a:p>
             <a:r>
               <a:rPr lang="en-US" dirty="0"/>
+              <a:t>Blue need to use custom transformation, as the missing value means there is no nearby station which can be possible</a:t>
+            </a:r>
+          </a:p>
+          <a:p>
+            <a:r>
+              <a:rPr lang="en-US" dirty="0"/>
+              <a:t>Will be explained more later</a:t>
+            </a:r>
+          </a:p>
+        </p:txBody>
+      </p:sp>
+    </p:spTree>
+    <p:extLst>
+      <p:ext uri="{BB962C8B-B14F-4D97-AF65-F5344CB8AC3E}">
+        <p14:creationId xmlns:p14="http://schemas.microsoft.com/office/powerpoint/2010/main" val="1820622707"/>
+      </p:ext>
+    </p:extLst>
+  </p:cSld>
+  <p:clrMapOvr>
+    <a:masterClrMapping/>
+  </p:clrMapOvr>
+</p:notes>
+</file>
+
+<file path=ppt/notesSlides/notesSlide8.xml><?xml version="1.0" encoding="utf-8"?>
+<p:notes xmlns:a="http://schemas.openxmlformats.org/drawingml/2006/main" xmlns:r="http://schemas.openxmlformats.org/officeDocument/2006/relationships" xmlns:p="http://schemas.openxmlformats.org/presentationml/2006/main">
+  <p:cSld>
+    <p:spTree>
+      <p:nvGrpSpPr>
+        <p:cNvPr id="1" name=""/>
+        <p:cNvGrpSpPr/>
+        <p:nvPr/>
+      </p:nvGrpSpPr>
+      <p:grpSpPr>
+        <a:xfrm>
+          <a:off x="0" y="0"/>
+          <a:ext cx="0" cy="0"/>
+          <a:chOff x="0" y="0"/>
+          <a:chExt cx="0" cy="0"/>
+        </a:xfrm>
+      </p:grpSpPr>
+      <p:sp>
+        <p:nvSpPr>
+          <p:cNvPr id="2" name="Slide Image Placeholder 1"/>
+          <p:cNvSpPr>
+            <a:spLocks noGrp="1" noRot="1" noChangeAspect="1"/>
+          </p:cNvSpPr>
+          <p:nvPr>
+            <p:ph type="sldImg"/>
+          </p:nvPr>
+        </p:nvSpPr>
+        <p:spPr/>
+      </p:sp>
+      <p:sp>
+        <p:nvSpPr>
+          <p:cNvPr id="3" name="Notes Placeholder 2"/>
+          <p:cNvSpPr>
+            <a:spLocks noGrp="1"/>
+          </p:cNvSpPr>
+          <p:nvPr>
+            <p:ph type="body" idx="1"/>
+          </p:nvPr>
+        </p:nvSpPr>
+        <p:spPr/>
+        <p:txBody>
+          <a:bodyPr/>
+          <a:lstStyle/>
+          <a:p>
+            <a:r>
+              <a:rPr lang="en-US" dirty="0"/>
               <a:t>Some column with fewer missing value, those value can be removed</a:t>
             </a:r>
           </a:p>
@@ -1197,6 +1399,70 @@
     <p:extLst>
       <p:ext uri="{BB962C8B-B14F-4D97-AF65-F5344CB8AC3E}">
         <p14:creationId xmlns:p14="http://schemas.microsoft.com/office/powerpoint/2010/main" val="1256420253"/>
+      </p:ext>
+    </p:extLst>
+  </p:cSld>
+  <p:clrMapOvr>
+    <a:masterClrMapping/>
+  </p:clrMapOvr>
+</p:notes>
+</file>
+
+<file path=ppt/notesSlides/notesSlide9.xml><?xml version="1.0" encoding="utf-8"?>
+<p:notes xmlns:a="http://schemas.openxmlformats.org/drawingml/2006/main" xmlns:r="http://schemas.openxmlformats.org/officeDocument/2006/relationships" xmlns:p="http://schemas.openxmlformats.org/presentationml/2006/main">
+  <p:cSld>
+    <p:spTree>
+      <p:nvGrpSpPr>
+        <p:cNvPr id="1" name=""/>
+        <p:cNvGrpSpPr/>
+        <p:nvPr/>
+      </p:nvGrpSpPr>
+      <p:grpSpPr>
+        <a:xfrm>
+          <a:off x="0" y="0"/>
+          <a:ext cx="0" cy="0"/>
+          <a:chOff x="0" y="0"/>
+          <a:chExt cx="0" cy="0"/>
+        </a:xfrm>
+      </p:grpSpPr>
+      <p:sp>
+        <p:nvSpPr>
+          <p:cNvPr id="2" name="Slide Image Placeholder 1"/>
+          <p:cNvSpPr>
+            <a:spLocks noGrp="1" noRot="1" noChangeAspect="1"/>
+          </p:cNvSpPr>
+          <p:nvPr>
+            <p:ph type="sldImg"/>
+          </p:nvPr>
+        </p:nvSpPr>
+        <p:spPr/>
+      </p:sp>
+      <p:sp>
+        <p:nvSpPr>
+          <p:cNvPr id="3" name="Notes Placeholder 2"/>
+          <p:cNvSpPr>
+            <a:spLocks noGrp="1"/>
+          </p:cNvSpPr>
+          <p:nvPr>
+            <p:ph type="body" idx="1"/>
+          </p:nvPr>
+        </p:nvSpPr>
+        <p:spPr/>
+        <p:txBody>
+          <a:bodyPr/>
+          <a:lstStyle/>
+          <a:p>
+            <a:r>
+              <a:rPr lang="en-US" dirty="0"/>
+              <a:t>-2.14975 -&gt; raw value is 0 means the station is not nearby the house</a:t>
+            </a:r>
+          </a:p>
+        </p:txBody>
+      </p:sp>
+    </p:spTree>
+    <p:extLst>
+      <p:ext uri="{BB962C8B-B14F-4D97-AF65-F5344CB8AC3E}">
+        <p14:creationId xmlns:p14="http://schemas.microsoft.com/office/powerpoint/2010/main" val="3346149846"/>
       </p:ext>
     </p:extLst>
   </p:cSld>
@@ -1353,7 +1619,7 @@
           <a:p>
             <a:fld id="{EADCF2BD-E462-4867-B7A9-6BCBFFBCA5D0}" type="datetime1">
               <a:rPr lang="en-US" smtClean="0"/>
-              <a:t>27-Oct-23</a:t>
+              <a:t>28-Oct-23</a:t>
             </a:fld>
             <a:endParaRPr lang="en-US"/>
           </a:p>
@@ -1556,7 +1822,7 @@
           <a:p>
             <a:fld id="{6D6752B0-A24A-4FA4-B387-B73DE53F3B4D}" type="datetime1">
               <a:rPr lang="en-US" smtClean="0"/>
-              <a:t>27-Oct-23</a:t>
+              <a:t>28-Oct-23</a:t>
             </a:fld>
             <a:endParaRPr lang="en-US"/>
           </a:p>
@@ -1769,7 +2035,7 @@
           <a:p>
             <a:fld id="{83889BD8-AEC5-4257-B2A9-6CB4E2FAB22D}" type="datetime1">
               <a:rPr lang="en-US" smtClean="0"/>
-              <a:t>27-Oct-23</a:t>
+              <a:t>28-Oct-23</a:t>
             </a:fld>
             <a:endParaRPr lang="en-US"/>
           </a:p>
@@ -1972,7 +2238,7 @@
           <a:p>
             <a:fld id="{18207518-2712-4D1B-9D80-BD1805B38EC4}" type="datetime1">
               <a:rPr lang="en-US" smtClean="0"/>
-              <a:t>27-Oct-23</a:t>
+              <a:t>28-Oct-23</a:t>
             </a:fld>
             <a:endParaRPr lang="en-US"/>
           </a:p>
@@ -2252,7 +2518,7 @@
           <a:p>
             <a:fld id="{D077CE9B-92D1-4044-8C18-EDFC53ACA153}" type="datetime1">
               <a:rPr lang="en-US" smtClean="0"/>
-              <a:t>27-Oct-23</a:t>
+              <a:t>28-Oct-23</a:t>
             </a:fld>
             <a:endParaRPr lang="en-US"/>
           </a:p>
@@ -2517,7 +2783,7 @@
           <a:p>
             <a:fld id="{8160BC85-221A-4580-AA17-0112E45DBFF0}" type="datetime1">
               <a:rPr lang="en-US" smtClean="0"/>
-              <a:t>27-Oct-23</a:t>
+              <a:t>28-Oct-23</a:t>
             </a:fld>
             <a:endParaRPr lang="en-US"/>
           </a:p>
@@ -2934,7 +3200,7 @@
           <a:p>
             <a:fld id="{10574C72-8AAC-417E-8B40-E1A3D374F20E}" type="datetime1">
               <a:rPr lang="en-US" smtClean="0"/>
-              <a:t>27-Oct-23</a:t>
+              <a:t>28-Oct-23</a:t>
             </a:fld>
             <a:endParaRPr lang="en-US"/>
           </a:p>
@@ -3080,7 +3346,7 @@
           <a:p>
             <a:fld id="{0645CC9E-6DFD-4F28-A9F1-DD672E9008C7}" type="datetime1">
               <a:rPr lang="en-US" smtClean="0"/>
-              <a:t>27-Oct-23</a:t>
+              <a:t>28-Oct-23</a:t>
             </a:fld>
             <a:endParaRPr lang="en-US"/>
           </a:p>
@@ -3198,7 +3464,7 @@
           <a:p>
             <a:fld id="{70E5F7E7-A7A4-415B-A737-DE8F624FEB14}" type="datetime1">
               <a:rPr lang="en-US" smtClean="0"/>
-              <a:t>27-Oct-23</a:t>
+              <a:t>28-Oct-23</a:t>
             </a:fld>
             <a:endParaRPr lang="en-US"/>
           </a:p>
@@ -3514,7 +3780,7 @@
           <a:p>
             <a:fld id="{35912435-556C-4370-B5F7-7A4F23D5F0C2}" type="datetime1">
               <a:rPr lang="en-US" smtClean="0"/>
-              <a:t>27-Oct-23</a:t>
+              <a:t>28-Oct-23</a:t>
             </a:fld>
             <a:endParaRPr lang="en-US"/>
           </a:p>
@@ -3807,7 +4073,7 @@
           <a:p>
             <a:fld id="{A404E8A3-1360-47C4-865E-400D68738A12}" type="datetime1">
               <a:rPr lang="en-US" smtClean="0"/>
-              <a:t>27-Oct-23</a:t>
+              <a:t>28-Oct-23</a:t>
             </a:fld>
             <a:endParaRPr lang="en-US"/>
           </a:p>
@@ -4053,7 +4319,7 @@
           <a:p>
             <a:fld id="{026D7BEE-48F2-4121-9F62-396770CE3475}" type="datetime1">
               <a:rPr lang="en-US" smtClean="0"/>
-              <a:t>27-Oct-23</a:t>
+              <a:t>28-Oct-23</a:t>
             </a:fld>
             <a:endParaRPr lang="en-US"/>
           </a:p>
@@ -5078,7 +5344,7 @@
         <p:spPr>
           <a:xfrm>
             <a:off x="5881008" y="932680"/>
-            <a:ext cx="4001416" cy="369332"/>
+            <a:ext cx="3320653" cy="369332"/>
           </a:xfrm>
           <a:prstGeom prst="rect">
             <a:avLst/>
@@ -5099,7 +5365,7 @@
                   </a:schemeClr>
                 </a:solidFill>
               </a:rPr>
-              <a:t>Custom transformation + normalization </a:t>
+              <a:t>Custom transformation + scaling </a:t>
             </a:r>
           </a:p>
         </p:txBody>
@@ -5698,8 +5964,8 @@
         </p:nvSpPr>
         <p:spPr>
           <a:xfrm>
-            <a:off x="7968204" y="961369"/>
-            <a:ext cx="4001416" cy="369332"/>
+            <a:off x="8648967" y="947812"/>
+            <a:ext cx="3320653" cy="369332"/>
           </a:xfrm>
           <a:prstGeom prst="rect">
             <a:avLst/>
@@ -5720,7 +5986,7 @@
                   </a:schemeClr>
                 </a:solidFill>
               </a:rPr>
-              <a:t>Custom transformation + normalization </a:t>
+              <a:t>Custom transformation + scaling </a:t>
             </a:r>
           </a:p>
         </p:txBody>
@@ -5864,9 +6130,12 @@
           <a:bodyPr/>
           <a:lstStyle/>
           <a:p>
+            <a:pPr marL="0" indent="0">
+              <a:buNone/>
+            </a:pPr>
             <a:r>
               <a:rPr lang="en-US" dirty="0"/>
-              <a:t>Custom transformation + normalization</a:t>
+              <a:t>Custom transformation + scaling</a:t>
             </a:r>
           </a:p>
         </p:txBody>
@@ -5915,7 +6184,7 @@
           <p:nvPr/>
         </p:nvPicPr>
         <p:blipFill rotWithShape="1">
-          <a:blip r:embed="rId2"/>
+          <a:blip r:embed="rId3"/>
           <a:srcRect b="72667"/>
           <a:stretch/>
         </p:blipFill>
@@ -6004,7 +6273,7 @@
           <p:nvPr/>
         </p:nvPicPr>
         <p:blipFill>
-          <a:blip r:embed="rId3"/>
+          <a:blip r:embed="rId4"/>
           <a:stretch>
             <a:fillRect/>
           </a:stretch>
@@ -6210,7 +6479,7 @@
           <p:cNvPr id="2" name="Title 1">
             <a:extLst>
               <a:ext uri="{FF2B5EF4-FFF2-40B4-BE49-F238E27FC236}">
-                <a16:creationId xmlns:a16="http://schemas.microsoft.com/office/drawing/2014/main" id="{148BA62D-8993-7949-6689-69FC6B5AD0E8}"/>
+                <a16:creationId xmlns:a16="http://schemas.microsoft.com/office/drawing/2014/main" id="{9F2E94C4-3FFD-9865-B5D9-4F96208C02B2}"/>
               </a:ext>
             </a:extLst>
           </p:cNvPr>
@@ -6226,10 +6495,50 @@
           <a:bodyPr/>
           <a:lstStyle/>
           <a:p>
-            <a:pPr algn="ctr"/>
-            <a:r>
-              <a:rPr lang="en-US" b="1" dirty="0"/>
-              <a:t>Other transformations &amp; summary</a:t>
+            <a:r>
+              <a:rPr lang="en-US" b="1" dirty="0" err="1"/>
+              <a:t>Dummified</a:t>
+            </a:r>
+            <a:endParaRPr lang="en-US" b="1" dirty="0"/>
+          </a:p>
+        </p:txBody>
+      </p:sp>
+      <p:sp>
+        <p:nvSpPr>
+          <p:cNvPr id="3" name="Content Placeholder 2">
+            <a:extLst>
+              <a:ext uri="{FF2B5EF4-FFF2-40B4-BE49-F238E27FC236}">
+                <a16:creationId xmlns:a16="http://schemas.microsoft.com/office/drawing/2014/main" id="{17200B31-363C-3DD0-848C-0C42344EF1CA}"/>
+              </a:ext>
+            </a:extLst>
+          </p:cNvPr>
+          <p:cNvSpPr>
+            <a:spLocks noGrp="1"/>
+          </p:cNvSpPr>
+          <p:nvPr>
+            <p:ph idx="1"/>
+          </p:nvPr>
+        </p:nvSpPr>
+        <p:spPr/>
+        <p:txBody>
+          <a:bodyPr/>
+          <a:lstStyle/>
+          <a:p>
+            <a:pPr marL="0" indent="0">
+              <a:buNone/>
+            </a:pPr>
+            <a:r>
+              <a:rPr lang="en-US" dirty="0"/>
+              <a:t>Because prediction technique</a:t>
+            </a:r>
+          </a:p>
+          <a:p>
+            <a:pPr marL="0" indent="0">
+              <a:buNone/>
+            </a:pPr>
+            <a:r>
+              <a:rPr lang="en-US" dirty="0"/>
+              <a:t>needs all data to be numbers …</a:t>
             </a:r>
           </a:p>
         </p:txBody>
@@ -6239,7 +6548,7 @@
           <p:cNvPr id="4" name="Slide Number Placeholder 3">
             <a:extLst>
               <a:ext uri="{FF2B5EF4-FFF2-40B4-BE49-F238E27FC236}">
-                <a16:creationId xmlns:a16="http://schemas.microsoft.com/office/drawing/2014/main" id="{D1A0C39A-667A-C3B9-02DC-C83AA0289644}"/>
+                <a16:creationId xmlns:a16="http://schemas.microsoft.com/office/drawing/2014/main" id="{09AD08D0-EBE4-4957-94A6-8E86DD4AA75E}"/>
               </a:ext>
             </a:extLst>
           </p:cNvPr>
@@ -6265,10 +6574,10 @@
       </p:sp>
       <p:pic>
         <p:nvPicPr>
-          <p:cNvPr id="9" name="Picture 8">
-            <a:extLst>
-              <a:ext uri="{FF2B5EF4-FFF2-40B4-BE49-F238E27FC236}">
-                <a16:creationId xmlns:a16="http://schemas.microsoft.com/office/drawing/2014/main" id="{98D673E5-BB90-8C15-8D3F-72A1765658C0}"/>
+          <p:cNvPr id="8" name="Picture 7">
+            <a:extLst>
+              <a:ext uri="{FF2B5EF4-FFF2-40B4-BE49-F238E27FC236}">
+                <a16:creationId xmlns:a16="http://schemas.microsoft.com/office/drawing/2014/main" id="{FCB26A4D-B4CB-0B2A-05B4-A5B68F243BB2}"/>
               </a:ext>
             </a:extLst>
           </p:cNvPr>
@@ -6278,25 +6587,115 @@
           <p:nvPr/>
         </p:nvPicPr>
         <p:blipFill>
-          <a:blip r:embed="rId2"/>
+          <a:blip r:embed="rId3"/>
           <a:stretch>
             <a:fillRect/>
           </a:stretch>
         </p:blipFill>
         <p:spPr>
           <a:xfrm>
-            <a:off x="1297678" y="1455154"/>
-            <a:ext cx="9596643" cy="5092280"/>
+            <a:off x="2656220" y="3089832"/>
+            <a:ext cx="1714739" cy="3153215"/>
           </a:xfrm>
           <a:prstGeom prst="rect">
             <a:avLst/>
           </a:prstGeom>
         </p:spPr>
       </p:pic>
+      <p:pic>
+        <p:nvPicPr>
+          <p:cNvPr id="10" name="Picture 9">
+            <a:extLst>
+              <a:ext uri="{FF2B5EF4-FFF2-40B4-BE49-F238E27FC236}">
+                <a16:creationId xmlns:a16="http://schemas.microsoft.com/office/drawing/2014/main" id="{FC676A36-67AE-2B0C-DD77-735AD863DC69}"/>
+              </a:ext>
+            </a:extLst>
+          </p:cNvPr>
+          <p:cNvPicPr>
+            <a:picLocks noChangeAspect="1"/>
+          </p:cNvPicPr>
+          <p:nvPr/>
+        </p:nvPicPr>
+        <p:blipFill>
+          <a:blip r:embed="rId4"/>
+          <a:stretch>
+            <a:fillRect/>
+          </a:stretch>
+        </p:blipFill>
+        <p:spPr>
+          <a:xfrm>
+            <a:off x="6837916" y="365125"/>
+            <a:ext cx="3562847" cy="6039693"/>
+          </a:xfrm>
+          <a:prstGeom prst="rect">
+            <a:avLst/>
+          </a:prstGeom>
+        </p:spPr>
+      </p:pic>
+      <p:sp>
+        <p:nvSpPr>
+          <p:cNvPr id="11" name="Arrow: Right 10">
+            <a:extLst>
+              <a:ext uri="{FF2B5EF4-FFF2-40B4-BE49-F238E27FC236}">
+                <a16:creationId xmlns:a16="http://schemas.microsoft.com/office/drawing/2014/main" id="{1237C5AD-F64B-3CCA-1BCD-0EE8F3DAA8C7}"/>
+              </a:ext>
+            </a:extLst>
+          </p:cNvPr>
+          <p:cNvSpPr/>
+          <p:nvPr/>
+        </p:nvSpPr>
+        <p:spPr>
+          <a:xfrm>
+            <a:off x="5203221" y="4251584"/>
+            <a:ext cx="802432" cy="414855"/>
+          </a:xfrm>
+          <a:prstGeom prst="rightArrow">
+            <a:avLst>
+              <a:gd name="adj1" fmla="val 50000"/>
+              <a:gd name="adj2" fmla="val 81488"/>
+            </a:avLst>
+          </a:prstGeom>
+          <a:solidFill>
+            <a:schemeClr val="tx1">
+              <a:lumMod val="85000"/>
+              <a:lumOff val="15000"/>
+            </a:schemeClr>
+          </a:solidFill>
+          <a:ln>
+            <a:solidFill>
+              <a:schemeClr val="tx1"/>
+            </a:solidFill>
+          </a:ln>
+        </p:spPr>
+        <p:style>
+          <a:lnRef idx="2">
+            <a:schemeClr val="accent1">
+              <a:shade val="15000"/>
+            </a:schemeClr>
+          </a:lnRef>
+          <a:fillRef idx="1">
+            <a:schemeClr val="accent1"/>
+          </a:fillRef>
+          <a:effectRef idx="0">
+            <a:schemeClr val="accent1"/>
+          </a:effectRef>
+          <a:fontRef idx="minor">
+            <a:schemeClr val="lt1"/>
+          </a:fontRef>
+        </p:style>
+        <p:txBody>
+          <a:bodyPr rtlCol="0" anchor="ctr"/>
+          <a:lstStyle/>
+          <a:p>
+            <a:pPr algn="ctr"/>
+            <a:endParaRPr lang="en-US"/>
+          </a:p>
+        </p:txBody>
+      </p:sp>
     </p:spTree>
     <p:extLst>
       <p:ext uri="{BB962C8B-B14F-4D97-AF65-F5344CB8AC3E}">
-        <p14:creationId xmlns:p14="http://schemas.microsoft.com/office/powerpoint/2010/main" val="3928268860"/>
+        <p14:creationId xmlns:p14="http://schemas.microsoft.com/office/powerpoint/2010/main" val="2404498157"/>
       </p:ext>
     </p:extLst>
   </p:cSld>
@@ -6328,7 +6727,7 @@
           <p:cNvPr id="2" name="Title 1">
             <a:extLst>
               <a:ext uri="{FF2B5EF4-FFF2-40B4-BE49-F238E27FC236}">
-                <a16:creationId xmlns:a16="http://schemas.microsoft.com/office/drawing/2014/main" id="{FB8A6BE0-E966-93AD-F411-DC44B85C3646}"/>
+                <a16:creationId xmlns:a16="http://schemas.microsoft.com/office/drawing/2014/main" id="{148BA62D-8993-7949-6689-69FC6B5AD0E8}"/>
               </a:ext>
             </a:extLst>
           </p:cNvPr>
@@ -6344,75 +6743,10 @@
           <a:bodyPr/>
           <a:lstStyle/>
           <a:p>
+            <a:pPr algn="ctr"/>
             <a:r>
               <a:rPr lang="en-US" b="1" dirty="0"/>
-              <a:t>Result</a:t>
-            </a:r>
-          </a:p>
-        </p:txBody>
-      </p:sp>
-      <p:sp>
-        <p:nvSpPr>
-          <p:cNvPr id="3" name="Content Placeholder 2">
-            <a:extLst>
-              <a:ext uri="{FF2B5EF4-FFF2-40B4-BE49-F238E27FC236}">
-                <a16:creationId xmlns:a16="http://schemas.microsoft.com/office/drawing/2014/main" id="{C6491CDD-2DED-489B-8A10-151C6C020DC1}"/>
-              </a:ext>
-            </a:extLst>
-          </p:cNvPr>
-          <p:cNvSpPr>
-            <a:spLocks noGrp="1"/>
-          </p:cNvSpPr>
-          <p:nvPr>
-            <p:ph idx="1"/>
-          </p:nvPr>
-        </p:nvSpPr>
-        <p:spPr/>
-        <p:txBody>
-          <a:bodyPr/>
-          <a:lstStyle/>
-          <a:p>
-            <a:r>
-              <a:rPr lang="en-US" dirty="0"/>
-              <a:t>Prediction model that</a:t>
-            </a:r>
-          </a:p>
-          <a:p>
-            <a:pPr lvl="1"/>
-            <a:r>
-              <a:rPr lang="en-US" dirty="0"/>
-              <a:t>Can explain </a:t>
-            </a:r>
-            <a:r>
-              <a:rPr lang="en-US" b="1" dirty="0">
-                <a:solidFill>
-                  <a:schemeClr val="accent1"/>
-                </a:solidFill>
-              </a:rPr>
-              <a:t>79.4%</a:t>
-            </a:r>
-            <a:r>
-              <a:rPr lang="en-US" dirty="0"/>
-              <a:t> of data </a:t>
-            </a:r>
-          </a:p>
-          <a:p>
-            <a:pPr lvl="1"/>
-            <a:r>
-              <a:rPr lang="en-US" dirty="0"/>
-              <a:t>The average error of </a:t>
-            </a:r>
-            <a:r>
-              <a:rPr lang="en-US" b="1" dirty="0">
-                <a:solidFill>
-                  <a:schemeClr val="accent1"/>
-                </a:solidFill>
-              </a:rPr>
-              <a:t>945K</a:t>
-            </a:r>
-            <a:r>
-              <a:rPr lang="en-US" dirty="0"/>
-              <a:t> THB approximately</a:t>
+              <a:t>Other transformations &amp; summary</a:t>
             </a:r>
           </a:p>
         </p:txBody>
@@ -6422,7 +6756,7 @@
           <p:cNvPr id="4" name="Slide Number Placeholder 3">
             <a:extLst>
               <a:ext uri="{FF2B5EF4-FFF2-40B4-BE49-F238E27FC236}">
-                <a16:creationId xmlns:a16="http://schemas.microsoft.com/office/drawing/2014/main" id="{52229B81-D7A2-29B1-7673-E477ABEC2B38}"/>
+                <a16:creationId xmlns:a16="http://schemas.microsoft.com/office/drawing/2014/main" id="{D1A0C39A-667A-C3B9-02DC-C83AA0289644}"/>
               </a:ext>
             </a:extLst>
           </p:cNvPr>
@@ -6448,10 +6782,10 @@
       </p:sp>
       <p:pic>
         <p:nvPicPr>
-          <p:cNvPr id="6" name="Picture 5">
-            <a:extLst>
-              <a:ext uri="{FF2B5EF4-FFF2-40B4-BE49-F238E27FC236}">
-                <a16:creationId xmlns:a16="http://schemas.microsoft.com/office/drawing/2014/main" id="{CDF46353-D5C7-5B64-D3B4-7682DAEDA658}"/>
+          <p:cNvPr id="5" name="Picture 4">
+            <a:extLst>
+              <a:ext uri="{FF2B5EF4-FFF2-40B4-BE49-F238E27FC236}">
+                <a16:creationId xmlns:a16="http://schemas.microsoft.com/office/drawing/2014/main" id="{3B2E4247-2795-D02F-4CE9-42474E601411}"/>
               </a:ext>
             </a:extLst>
           </p:cNvPr>
@@ -6461,15 +6795,15 @@
           <p:nvPr/>
         </p:nvPicPr>
         <p:blipFill>
-          <a:blip r:embed="rId2"/>
+          <a:blip r:embed="rId3"/>
           <a:stretch>
             <a:fillRect/>
           </a:stretch>
         </p:blipFill>
         <p:spPr>
           <a:xfrm>
-            <a:off x="838200" y="3600355"/>
-            <a:ext cx="10488489" cy="1352739"/>
+            <a:off x="742203" y="1386731"/>
+            <a:ext cx="10707594" cy="5334744"/>
           </a:xfrm>
           <a:prstGeom prst="rect">
             <a:avLst/>
@@ -6479,7 +6813,7 @@
     </p:spTree>
     <p:extLst>
       <p:ext uri="{BB962C8B-B14F-4D97-AF65-F5344CB8AC3E}">
-        <p14:creationId xmlns:p14="http://schemas.microsoft.com/office/powerpoint/2010/main" val="2713355754"/>
+        <p14:creationId xmlns:p14="http://schemas.microsoft.com/office/powerpoint/2010/main" val="3928268860"/>
       </p:ext>
     </p:extLst>
   </p:cSld>
@@ -6511,7 +6845,7 @@
           <p:cNvPr id="2" name="Title 1">
             <a:extLst>
               <a:ext uri="{FF2B5EF4-FFF2-40B4-BE49-F238E27FC236}">
-                <a16:creationId xmlns:a16="http://schemas.microsoft.com/office/drawing/2014/main" id="{6723FDF9-B596-7CAD-2C57-A539302FD5ED}"/>
+                <a16:creationId xmlns:a16="http://schemas.microsoft.com/office/drawing/2014/main" id="{FB8A6BE0-E966-93AD-F411-DC44B85C3646}"/>
               </a:ext>
             </a:extLst>
           </p:cNvPr>
@@ -6527,10 +6861,9 @@
           <a:bodyPr/>
           <a:lstStyle/>
           <a:p>
-            <a:pPr algn="ctr"/>
             <a:r>
               <a:rPr lang="en-US" b="1" dirty="0"/>
-              <a:t>Other findings</a:t>
+              <a:t>Result</a:t>
             </a:r>
           </a:p>
         </p:txBody>
@@ -6540,7 +6873,7 @@
           <p:cNvPr id="3" name="Content Placeholder 2">
             <a:extLst>
               <a:ext uri="{FF2B5EF4-FFF2-40B4-BE49-F238E27FC236}">
-                <a16:creationId xmlns:a16="http://schemas.microsoft.com/office/drawing/2014/main" id="{70E58C0E-CA1B-669D-293F-DA172BEAACBA}"/>
+                <a16:creationId xmlns:a16="http://schemas.microsoft.com/office/drawing/2014/main" id="{C6491CDD-2DED-489B-8A10-151C6C020DC1}"/>
               </a:ext>
             </a:extLst>
           </p:cNvPr>
@@ -6553,102 +6886,53 @@
         </p:nvSpPr>
         <p:spPr/>
         <p:txBody>
-          <a:bodyPr>
-            <a:normAutofit fontScale="92500" lnSpcReduction="10000"/>
-          </a:bodyPr>
-          <a:lstStyle/>
-          <a:p>
+          <a:bodyPr/>
+          <a:lstStyle/>
+          <a:p>
+            <a:pPr marL="0" indent="0">
+              <a:buNone/>
+            </a:pPr>
             <a:r>
               <a:rPr lang="en-US" dirty="0"/>
-              <a:t>The following factors are significantly affect housing price positively.</a:t>
+              <a:t>Prediction model that</a:t>
             </a:r>
           </a:p>
           <a:p>
             <a:pPr lvl="1"/>
             <a:r>
               <a:rPr lang="en-US" dirty="0"/>
-              <a:t>Floor area</a:t>
+              <a:t>Can explain </a:t>
+            </a:r>
+            <a:r>
+              <a:rPr lang="en-US" b="1" dirty="0">
+                <a:solidFill>
+                  <a:schemeClr val="accent1"/>
+                </a:solidFill>
+              </a:rPr>
+              <a:t>79.4%</a:t>
+            </a:r>
+            <a:r>
+              <a:rPr lang="en-US" dirty="0"/>
+              <a:t> of data </a:t>
             </a:r>
           </a:p>
           <a:p>
             <a:pPr lvl="1"/>
             <a:r>
               <a:rPr lang="en-US" dirty="0"/>
-              <a:t>Number of nearby stations (within 1km)</a:t>
-            </a:r>
-          </a:p>
-          <a:p>
-            <a:pPr lvl="1"/>
+              <a:t>The average error of </a:t>
+            </a:r>
+            <a:r>
+              <a:rPr lang="en-US" b="1" dirty="0">
+                <a:solidFill>
+                  <a:schemeClr val="accent1"/>
+                </a:solidFill>
+              </a:rPr>
+              <a:t>945K</a:t>
+            </a:r>
             <a:r>
               <a:rPr lang="en-US" dirty="0"/>
-              <a:t>Number of bathrooms</a:t>
-            </a:r>
-          </a:p>
-          <a:p>
-            <a:pPr lvl="1"/>
-            <a:r>
-              <a:rPr lang="en-US" dirty="0"/>
-              <a:t>Total area of the land</a:t>
-            </a:r>
-          </a:p>
-          <a:p>
-            <a:pPr lvl="1"/>
-            <a:r>
-              <a:rPr lang="en-US" dirty="0"/>
-              <a:t>Year built</a:t>
-            </a:r>
-          </a:p>
-          <a:p>
-            <a:pPr lvl="1"/>
-            <a:r>
-              <a:rPr lang="en-US" dirty="0"/>
-              <a:t>Number of bedrooms</a:t>
-            </a:r>
-          </a:p>
-          <a:p>
-            <a:endParaRPr lang="en-US" dirty="0"/>
-          </a:p>
-          <a:p>
-            <a:r>
-              <a:rPr lang="en-US" dirty="0"/>
-              <a:t>Locating </a:t>
-            </a:r>
-            <a:r>
-              <a:rPr lang="en-US" dirty="0" err="1"/>
-              <a:t>neaby</a:t>
-            </a:r>
-            <a:r>
-              <a:rPr lang="en-US" dirty="0"/>
-              <a:t> these stations will significantly raise the price as well.</a:t>
-            </a:r>
-          </a:p>
-          <a:p>
-            <a:pPr lvl="1"/>
-            <a:r>
-              <a:rPr lang="en-US" dirty="0"/>
-              <a:t>BL11 Bang Sue MRT</a:t>
-            </a:r>
-          </a:p>
-          <a:p>
-            <a:pPr lvl="1"/>
-            <a:r>
-              <a:rPr lang="en-US" dirty="0"/>
-              <a:t>BL32 </a:t>
-            </a:r>
-            <a:r>
-              <a:rPr lang="en-US" dirty="0" err="1"/>
-              <a:t>Itsaraphap</a:t>
-            </a:r>
-            <a:r>
-              <a:rPr lang="en-US" dirty="0"/>
-              <a:t> MRT</a:t>
-            </a:r>
-          </a:p>
-          <a:p>
-            <a:pPr lvl="1"/>
-            <a:r>
-              <a:rPr lang="en-US" dirty="0"/>
-              <a:t>B9 Rama IX Bridge BRT</a:t>
+              <a:t> THB approximately</a:t>
             </a:r>
           </a:p>
         </p:txBody>
@@ -6658,7 +6942,7 @@
           <p:cNvPr id="4" name="Slide Number Placeholder 3">
             <a:extLst>
               <a:ext uri="{FF2B5EF4-FFF2-40B4-BE49-F238E27FC236}">
-                <a16:creationId xmlns:a16="http://schemas.microsoft.com/office/drawing/2014/main" id="{09750248-72D6-C397-181A-BF727D58C4D1}"/>
+                <a16:creationId xmlns:a16="http://schemas.microsoft.com/office/drawing/2014/main" id="{52229B81-D7A2-29B1-7673-E477ABEC2B38}"/>
               </a:ext>
             </a:extLst>
           </p:cNvPr>
@@ -6682,184 +6966,40 @@
           </a:p>
         </p:txBody>
       </p:sp>
-      <p:sp>
-        <p:nvSpPr>
-          <p:cNvPr id="7" name="Arrow: Right 6">
-            <a:extLst>
-              <a:ext uri="{FF2B5EF4-FFF2-40B4-BE49-F238E27FC236}">
-                <a16:creationId xmlns:a16="http://schemas.microsoft.com/office/drawing/2014/main" id="{75933EC6-8C4D-50A7-13C7-30CA63AB2BED}"/>
-              </a:ext>
-            </a:extLst>
-          </p:cNvPr>
-          <p:cNvSpPr/>
+      <p:pic>
+        <p:nvPicPr>
+          <p:cNvPr id="6" name="Picture 5">
+            <a:extLst>
+              <a:ext uri="{FF2B5EF4-FFF2-40B4-BE49-F238E27FC236}">
+                <a16:creationId xmlns:a16="http://schemas.microsoft.com/office/drawing/2014/main" id="{CDF46353-D5C7-5B64-D3B4-7682DAEDA658}"/>
+              </a:ext>
+            </a:extLst>
+          </p:cNvPr>
+          <p:cNvPicPr>
+            <a:picLocks noChangeAspect="1"/>
+          </p:cNvPicPr>
           <p:nvPr/>
-        </p:nvSpPr>
-        <p:spPr>
-          <a:xfrm rot="16200000">
-            <a:off x="8872018" y="3027636"/>
-            <a:ext cx="1385094" cy="606671"/>
-          </a:xfrm>
-          <a:prstGeom prst="rightArrow">
-            <a:avLst>
-              <a:gd name="adj1" fmla="val 50000"/>
-              <a:gd name="adj2" fmla="val 81488"/>
-            </a:avLst>
-          </a:prstGeom>
-          <a:solidFill>
-            <a:srgbClr val="00B050"/>
-          </a:solidFill>
-          <a:ln>
-            <a:solidFill>
-              <a:schemeClr val="accent6">
-                <a:lumMod val="50000"/>
-              </a:schemeClr>
-            </a:solidFill>
-          </a:ln>
-        </p:spPr>
-        <p:style>
-          <a:lnRef idx="2">
-            <a:schemeClr val="accent1">
-              <a:shade val="15000"/>
-            </a:schemeClr>
-          </a:lnRef>
-          <a:fillRef idx="1">
-            <a:schemeClr val="accent1"/>
-          </a:fillRef>
-          <a:effectRef idx="0">
-            <a:schemeClr val="accent1"/>
-          </a:effectRef>
-          <a:fontRef idx="minor">
-            <a:schemeClr val="lt1"/>
-          </a:fontRef>
-        </p:style>
-        <p:txBody>
-          <a:bodyPr rtlCol="0" anchor="ctr"/>
-          <a:lstStyle/>
-          <a:p>
-            <a:pPr algn="ctr"/>
-            <a:endParaRPr lang="en-US"/>
-          </a:p>
-        </p:txBody>
-      </p:sp>
-      <p:sp>
-        <p:nvSpPr>
-          <p:cNvPr id="9" name="Arrow: Right 8">
-            <a:extLst>
-              <a:ext uri="{FF2B5EF4-FFF2-40B4-BE49-F238E27FC236}">
-                <a16:creationId xmlns:a16="http://schemas.microsoft.com/office/drawing/2014/main" id="{0E43C9E1-FB20-F24E-CE72-F0CC4F9CFE0B}"/>
-              </a:ext>
-            </a:extLst>
-          </p:cNvPr>
-          <p:cNvSpPr/>
-          <p:nvPr/>
-        </p:nvSpPr>
-        <p:spPr>
-          <a:xfrm rot="16200000">
-            <a:off x="8148119" y="3027635"/>
-            <a:ext cx="1385094" cy="606671"/>
-          </a:xfrm>
-          <a:prstGeom prst="rightArrow">
-            <a:avLst>
-              <a:gd name="adj1" fmla="val 50000"/>
-              <a:gd name="adj2" fmla="val 81488"/>
-            </a:avLst>
-          </a:prstGeom>
-          <a:solidFill>
-            <a:srgbClr val="00B050"/>
-          </a:solidFill>
-          <a:ln>
-            <a:solidFill>
-              <a:schemeClr val="accent6">
-                <a:lumMod val="50000"/>
-              </a:schemeClr>
-            </a:solidFill>
-          </a:ln>
-        </p:spPr>
-        <p:style>
-          <a:lnRef idx="2">
-            <a:schemeClr val="accent1">
-              <a:shade val="15000"/>
-            </a:schemeClr>
-          </a:lnRef>
-          <a:fillRef idx="1">
-            <a:schemeClr val="accent1"/>
-          </a:fillRef>
-          <a:effectRef idx="0">
-            <a:schemeClr val="accent1"/>
-          </a:effectRef>
-          <a:fontRef idx="minor">
-            <a:schemeClr val="lt1"/>
-          </a:fontRef>
-        </p:style>
-        <p:txBody>
-          <a:bodyPr rtlCol="0" anchor="ctr"/>
-          <a:lstStyle/>
-          <a:p>
-            <a:pPr algn="ctr"/>
-            <a:endParaRPr lang="en-US"/>
-          </a:p>
-        </p:txBody>
-      </p:sp>
-      <p:sp>
-        <p:nvSpPr>
-          <p:cNvPr id="10" name="Plus Sign 9">
-            <a:extLst>
-              <a:ext uri="{FF2B5EF4-FFF2-40B4-BE49-F238E27FC236}">
-                <a16:creationId xmlns:a16="http://schemas.microsoft.com/office/drawing/2014/main" id="{F6FECDB0-1530-7ED8-4308-B67E5BFA9E88}"/>
-              </a:ext>
-            </a:extLst>
-          </p:cNvPr>
-          <p:cNvSpPr/>
-          <p:nvPr/>
-        </p:nvSpPr>
+        </p:nvPicPr>
+        <p:blipFill>
+          <a:blip r:embed="rId2"/>
+          <a:stretch>
+            <a:fillRect/>
+          </a:stretch>
+        </p:blipFill>
         <p:spPr>
           <a:xfrm>
-            <a:off x="9791700" y="2419350"/>
-            <a:ext cx="606672" cy="606672"/>
-          </a:xfrm>
-          <a:prstGeom prst="mathPlus">
+            <a:off x="838200" y="3600355"/>
+            <a:ext cx="10488489" cy="1352739"/>
+          </a:xfrm>
+          <a:prstGeom prst="rect">
             <a:avLst/>
           </a:prstGeom>
-          <a:solidFill>
-            <a:srgbClr val="00B050"/>
-          </a:solidFill>
-          <a:ln>
-            <a:solidFill>
-              <a:schemeClr val="accent6">
-                <a:lumMod val="50000"/>
-              </a:schemeClr>
-            </a:solidFill>
-          </a:ln>
-        </p:spPr>
-        <p:style>
-          <a:lnRef idx="2">
-            <a:schemeClr val="accent1">
-              <a:shade val="15000"/>
-            </a:schemeClr>
-          </a:lnRef>
-          <a:fillRef idx="1">
-            <a:schemeClr val="accent1"/>
-          </a:fillRef>
-          <a:effectRef idx="0">
-            <a:schemeClr val="accent1"/>
-          </a:effectRef>
-          <a:fontRef idx="minor">
-            <a:schemeClr val="lt1"/>
-          </a:fontRef>
-        </p:style>
-        <p:txBody>
-          <a:bodyPr rtlCol="0" anchor="ctr"/>
-          <a:lstStyle/>
-          <a:p>
-            <a:pPr algn="ctr"/>
-            <a:endParaRPr lang="en-US"/>
-          </a:p>
-        </p:txBody>
-      </p:sp>
+        </p:spPr>
+      </p:pic>
     </p:spTree>
     <p:extLst>
       <p:ext uri="{BB962C8B-B14F-4D97-AF65-F5344CB8AC3E}">
-        <p14:creationId xmlns:p14="http://schemas.microsoft.com/office/powerpoint/2010/main" val="3432038458"/>
+        <p14:creationId xmlns:p14="http://schemas.microsoft.com/office/powerpoint/2010/main" val="2713355754"/>
       </p:ext>
     </p:extLst>
   </p:cSld>
@@ -6891,7 +7031,7 @@
           <p:cNvPr id="2" name="Title 1">
             <a:extLst>
               <a:ext uri="{FF2B5EF4-FFF2-40B4-BE49-F238E27FC236}">
-                <a16:creationId xmlns:a16="http://schemas.microsoft.com/office/drawing/2014/main" id="{1E9777B6-1D18-9AE4-4B2D-A39F96472237}"/>
+                <a16:creationId xmlns:a16="http://schemas.microsoft.com/office/drawing/2014/main" id="{6723FDF9-B596-7CAD-2C57-A539302FD5ED}"/>
               </a:ext>
             </a:extLst>
           </p:cNvPr>
@@ -6920,7 +7060,7 @@
           <p:cNvPr id="3" name="Content Placeholder 2">
             <a:extLst>
               <a:ext uri="{FF2B5EF4-FFF2-40B4-BE49-F238E27FC236}">
-                <a16:creationId xmlns:a16="http://schemas.microsoft.com/office/drawing/2014/main" id="{E8A09B5F-DE2C-7CF2-CBF8-F50A988F953A}"/>
+                <a16:creationId xmlns:a16="http://schemas.microsoft.com/office/drawing/2014/main" id="{70E58C0E-CA1B-669D-293F-DA172BEAACBA}"/>
               </a:ext>
             </a:extLst>
           </p:cNvPr>
@@ -6933,24 +7073,108 @@
         </p:nvSpPr>
         <p:spPr/>
         <p:txBody>
-          <a:bodyPr/>
-          <a:lstStyle/>
-          <a:p>
-            <a:pPr marL="0" indent="0" algn="ctr">
+          <a:bodyPr>
+            <a:normAutofit fontScale="92500" lnSpcReduction="10000"/>
+          </a:bodyPr>
+          <a:lstStyle/>
+          <a:p>
+            <a:pPr marL="0" indent="0">
               <a:buNone/>
             </a:pPr>
             <a:r>
               <a:rPr lang="en-US" dirty="0"/>
-              <a:t>Top 10 district/subdistrict that will have</a:t>
-            </a:r>
-          </a:p>
-          <a:p>
-            <a:pPr marL="0" indent="0" algn="ctr">
+              <a:t>The following factors are significantly affect housing price positively.</a:t>
+            </a:r>
+          </a:p>
+          <a:p>
+            <a:pPr lvl="1"/>
+            <a:r>
+              <a:rPr lang="en-US" dirty="0"/>
+              <a:t>Floor area</a:t>
+            </a:r>
+          </a:p>
+          <a:p>
+            <a:pPr lvl="1"/>
+            <a:r>
+              <a:rPr lang="en-US" dirty="0"/>
+              <a:t>Number of nearby stations (within 1km)</a:t>
+            </a:r>
+          </a:p>
+          <a:p>
+            <a:pPr lvl="1"/>
+            <a:r>
+              <a:rPr lang="en-US" dirty="0"/>
+              <a:t>Number of bathrooms</a:t>
+            </a:r>
+          </a:p>
+          <a:p>
+            <a:pPr lvl="1"/>
+            <a:r>
+              <a:rPr lang="en-US" dirty="0"/>
+              <a:t>Total area of the land</a:t>
+            </a:r>
+          </a:p>
+          <a:p>
+            <a:pPr lvl="1"/>
+            <a:r>
+              <a:rPr lang="en-US" dirty="0"/>
+              <a:t>Year built</a:t>
+            </a:r>
+          </a:p>
+          <a:p>
+            <a:pPr lvl="1"/>
+            <a:r>
+              <a:rPr lang="en-US" dirty="0"/>
+              <a:t>Number of bedrooms</a:t>
+            </a:r>
+          </a:p>
+          <a:p>
+            <a:endParaRPr lang="en-US" dirty="0"/>
+          </a:p>
+          <a:p>
+            <a:pPr marL="0" indent="0">
               <a:buNone/>
             </a:pPr>
             <a:r>
               <a:rPr lang="en-US" dirty="0"/>
-              <a:t>higher housing price according to the model.</a:t>
+              <a:t>Locating </a:t>
+            </a:r>
+            <a:r>
+              <a:rPr lang="en-US" dirty="0" err="1"/>
+              <a:t>neaby</a:t>
+            </a:r>
+            <a:r>
+              <a:rPr lang="en-US" dirty="0"/>
+              <a:t> these stations will significantly raise the price as well.</a:t>
+            </a:r>
+          </a:p>
+          <a:p>
+            <a:pPr lvl="1"/>
+            <a:r>
+              <a:rPr lang="en-US" dirty="0"/>
+              <a:t>BL11 Bang Sue MRT</a:t>
+            </a:r>
+          </a:p>
+          <a:p>
+            <a:pPr lvl="1"/>
+            <a:r>
+              <a:rPr lang="en-US" dirty="0"/>
+              <a:t>BL32 </a:t>
+            </a:r>
+            <a:r>
+              <a:rPr lang="en-US" dirty="0" err="1"/>
+              <a:t>Itsaraphap</a:t>
+            </a:r>
+            <a:r>
+              <a:rPr lang="en-US" dirty="0"/>
+              <a:t> MRT</a:t>
+            </a:r>
+          </a:p>
+          <a:p>
+            <a:pPr lvl="1"/>
+            <a:r>
+              <a:rPr lang="en-US" dirty="0"/>
+              <a:t>B9 Rama IX Bridge BRT</a:t>
             </a:r>
           </a:p>
         </p:txBody>
@@ -6960,7 +7184,7 @@
           <p:cNvPr id="4" name="Slide Number Placeholder 3">
             <a:extLst>
               <a:ext uri="{FF2B5EF4-FFF2-40B4-BE49-F238E27FC236}">
-                <a16:creationId xmlns:a16="http://schemas.microsoft.com/office/drawing/2014/main" id="{6B418609-1306-BE71-6DA7-0D5AA915DE99}"/>
+                <a16:creationId xmlns:a16="http://schemas.microsoft.com/office/drawing/2014/main" id="{09750248-72D6-C397-181A-BF727D58C4D1}"/>
               </a:ext>
             </a:extLst>
           </p:cNvPr>
@@ -6984,40 +7208,184 @@
           </a:p>
         </p:txBody>
       </p:sp>
-      <p:pic>
-        <p:nvPicPr>
-          <p:cNvPr id="6" name="Picture 5">
-            <a:extLst>
-              <a:ext uri="{FF2B5EF4-FFF2-40B4-BE49-F238E27FC236}">
-                <a16:creationId xmlns:a16="http://schemas.microsoft.com/office/drawing/2014/main" id="{49A24DA1-0F48-F3C2-A7D4-5111DC5363B1}"/>
-              </a:ext>
-            </a:extLst>
-          </p:cNvPr>
-          <p:cNvPicPr>
-            <a:picLocks noChangeAspect="1"/>
-          </p:cNvPicPr>
+      <p:sp>
+        <p:nvSpPr>
+          <p:cNvPr id="7" name="Arrow: Right 6">
+            <a:extLst>
+              <a:ext uri="{FF2B5EF4-FFF2-40B4-BE49-F238E27FC236}">
+                <a16:creationId xmlns:a16="http://schemas.microsoft.com/office/drawing/2014/main" id="{75933EC6-8C4D-50A7-13C7-30CA63AB2BED}"/>
+              </a:ext>
+            </a:extLst>
+          </p:cNvPr>
+          <p:cNvSpPr/>
           <p:nvPr/>
-        </p:nvPicPr>
-        <p:blipFill>
-          <a:blip r:embed="rId2"/>
-          <a:stretch>
-            <a:fillRect/>
-          </a:stretch>
-        </p:blipFill>
+        </p:nvSpPr>
+        <p:spPr>
+          <a:xfrm rot="16200000">
+            <a:off x="8872018" y="3027636"/>
+            <a:ext cx="1385094" cy="606671"/>
+          </a:xfrm>
+          <a:prstGeom prst="rightArrow">
+            <a:avLst>
+              <a:gd name="adj1" fmla="val 50000"/>
+              <a:gd name="adj2" fmla="val 81488"/>
+            </a:avLst>
+          </a:prstGeom>
+          <a:solidFill>
+            <a:srgbClr val="00B050"/>
+          </a:solidFill>
+          <a:ln>
+            <a:solidFill>
+              <a:schemeClr val="accent6">
+                <a:lumMod val="50000"/>
+              </a:schemeClr>
+            </a:solidFill>
+          </a:ln>
+        </p:spPr>
+        <p:style>
+          <a:lnRef idx="2">
+            <a:schemeClr val="accent1">
+              <a:shade val="15000"/>
+            </a:schemeClr>
+          </a:lnRef>
+          <a:fillRef idx="1">
+            <a:schemeClr val="accent1"/>
+          </a:fillRef>
+          <a:effectRef idx="0">
+            <a:schemeClr val="accent1"/>
+          </a:effectRef>
+          <a:fontRef idx="minor">
+            <a:schemeClr val="lt1"/>
+          </a:fontRef>
+        </p:style>
+        <p:txBody>
+          <a:bodyPr rtlCol="0" anchor="ctr"/>
+          <a:lstStyle/>
+          <a:p>
+            <a:pPr algn="ctr"/>
+            <a:endParaRPr lang="en-US"/>
+          </a:p>
+        </p:txBody>
+      </p:sp>
+      <p:sp>
+        <p:nvSpPr>
+          <p:cNvPr id="9" name="Arrow: Right 8">
+            <a:extLst>
+              <a:ext uri="{FF2B5EF4-FFF2-40B4-BE49-F238E27FC236}">
+                <a16:creationId xmlns:a16="http://schemas.microsoft.com/office/drawing/2014/main" id="{0E43C9E1-FB20-F24E-CE72-F0CC4F9CFE0B}"/>
+              </a:ext>
+            </a:extLst>
+          </p:cNvPr>
+          <p:cNvSpPr/>
+          <p:nvPr/>
+        </p:nvSpPr>
+        <p:spPr>
+          <a:xfrm rot="16200000">
+            <a:off x="8148119" y="3027635"/>
+            <a:ext cx="1385094" cy="606671"/>
+          </a:xfrm>
+          <a:prstGeom prst="rightArrow">
+            <a:avLst>
+              <a:gd name="adj1" fmla="val 50000"/>
+              <a:gd name="adj2" fmla="val 81488"/>
+            </a:avLst>
+          </a:prstGeom>
+          <a:solidFill>
+            <a:srgbClr val="00B050"/>
+          </a:solidFill>
+          <a:ln>
+            <a:solidFill>
+              <a:schemeClr val="accent6">
+                <a:lumMod val="50000"/>
+              </a:schemeClr>
+            </a:solidFill>
+          </a:ln>
+        </p:spPr>
+        <p:style>
+          <a:lnRef idx="2">
+            <a:schemeClr val="accent1">
+              <a:shade val="15000"/>
+            </a:schemeClr>
+          </a:lnRef>
+          <a:fillRef idx="1">
+            <a:schemeClr val="accent1"/>
+          </a:fillRef>
+          <a:effectRef idx="0">
+            <a:schemeClr val="accent1"/>
+          </a:effectRef>
+          <a:fontRef idx="minor">
+            <a:schemeClr val="lt1"/>
+          </a:fontRef>
+        </p:style>
+        <p:txBody>
+          <a:bodyPr rtlCol="0" anchor="ctr"/>
+          <a:lstStyle/>
+          <a:p>
+            <a:pPr algn="ctr"/>
+            <a:endParaRPr lang="en-US"/>
+          </a:p>
+        </p:txBody>
+      </p:sp>
+      <p:sp>
+        <p:nvSpPr>
+          <p:cNvPr id="10" name="Plus Sign 9">
+            <a:extLst>
+              <a:ext uri="{FF2B5EF4-FFF2-40B4-BE49-F238E27FC236}">
+                <a16:creationId xmlns:a16="http://schemas.microsoft.com/office/drawing/2014/main" id="{F6FECDB0-1530-7ED8-4308-B67E5BFA9E88}"/>
+              </a:ext>
+            </a:extLst>
+          </p:cNvPr>
+          <p:cNvSpPr/>
+          <p:nvPr/>
+        </p:nvSpPr>
         <p:spPr>
           <a:xfrm>
-            <a:off x="4800419" y="2958607"/>
-            <a:ext cx="2591162" cy="3534268"/>
-          </a:xfrm>
-          <a:prstGeom prst="rect">
+            <a:off x="9791700" y="2419350"/>
+            <a:ext cx="606672" cy="606672"/>
+          </a:xfrm>
+          <a:prstGeom prst="mathPlus">
             <a:avLst/>
           </a:prstGeom>
-        </p:spPr>
-      </p:pic>
+          <a:solidFill>
+            <a:srgbClr val="00B050"/>
+          </a:solidFill>
+          <a:ln>
+            <a:solidFill>
+              <a:schemeClr val="accent6">
+                <a:lumMod val="50000"/>
+              </a:schemeClr>
+            </a:solidFill>
+          </a:ln>
+        </p:spPr>
+        <p:style>
+          <a:lnRef idx="2">
+            <a:schemeClr val="accent1">
+              <a:shade val="15000"/>
+            </a:schemeClr>
+          </a:lnRef>
+          <a:fillRef idx="1">
+            <a:schemeClr val="accent1"/>
+          </a:fillRef>
+          <a:effectRef idx="0">
+            <a:schemeClr val="accent1"/>
+          </a:effectRef>
+          <a:fontRef idx="minor">
+            <a:schemeClr val="lt1"/>
+          </a:fontRef>
+        </p:style>
+        <p:txBody>
+          <a:bodyPr rtlCol="0" anchor="ctr"/>
+          <a:lstStyle/>
+          <a:p>
+            <a:pPr algn="ctr"/>
+            <a:endParaRPr lang="en-US"/>
+          </a:p>
+        </p:txBody>
+      </p:sp>
     </p:spTree>
     <p:extLst>
       <p:ext uri="{BB962C8B-B14F-4D97-AF65-F5344CB8AC3E}">
-        <p14:creationId xmlns:p14="http://schemas.microsoft.com/office/powerpoint/2010/main" val="1643273746"/>
+        <p14:creationId xmlns:p14="http://schemas.microsoft.com/office/powerpoint/2010/main" val="3432038458"/>
       </p:ext>
     </p:extLst>
   </p:cSld>
@@ -7049,7 +7417,7 @@
           <p:cNvPr id="2" name="Title 1">
             <a:extLst>
               <a:ext uri="{FF2B5EF4-FFF2-40B4-BE49-F238E27FC236}">
-                <a16:creationId xmlns:a16="http://schemas.microsoft.com/office/drawing/2014/main" id="{AFE45B05-502C-7008-8FD5-2B91973F5067}"/>
+                <a16:creationId xmlns:a16="http://schemas.microsoft.com/office/drawing/2014/main" id="{1E9777B6-1D18-9AE4-4B2D-A39F96472237}"/>
               </a:ext>
             </a:extLst>
           </p:cNvPr>
@@ -7065,9 +7433,10 @@
           <a:bodyPr/>
           <a:lstStyle/>
           <a:p>
+            <a:pPr algn="ctr"/>
             <a:r>
               <a:rPr lang="en-US" b="1" dirty="0"/>
-              <a:t>Extra</a:t>
+              <a:t>Other findings</a:t>
             </a:r>
           </a:p>
         </p:txBody>
@@ -7077,7 +7446,7 @@
           <p:cNvPr id="3" name="Content Placeholder 2">
             <a:extLst>
               <a:ext uri="{FF2B5EF4-FFF2-40B4-BE49-F238E27FC236}">
-                <a16:creationId xmlns:a16="http://schemas.microsoft.com/office/drawing/2014/main" id="{A951D87B-10C8-E86F-A536-50FB2BA0FB45}"/>
+                <a16:creationId xmlns:a16="http://schemas.microsoft.com/office/drawing/2014/main" id="{E8A09B5F-DE2C-7CF2-CBF8-F50A988F953A}"/>
               </a:ext>
             </a:extLst>
           </p:cNvPr>
@@ -7093,25 +7462,21 @@
           <a:bodyPr/>
           <a:lstStyle/>
           <a:p>
-            <a:r>
-              <a:rPr lang="en-US" dirty="0" err="1"/>
-              <a:t>XGBoost</a:t>
-            </a:r>
+            <a:pPr marL="0" indent="0" algn="ctr">
+              <a:buNone/>
+            </a:pPr>
             <a:r>
               <a:rPr lang="en-US" dirty="0"/>
-              <a:t> model with ~85% score</a:t>
-            </a:r>
-          </a:p>
-          <a:p>
+              <a:t>Top 10 district/subdistrict that will have</a:t>
+            </a:r>
+          </a:p>
+          <a:p>
+            <a:pPr marL="0" indent="0" algn="ctr">
+              <a:buNone/>
+            </a:pPr>
             <a:r>
               <a:rPr lang="en-US" dirty="0"/>
-              <a:t>Average error ~771K</a:t>
-            </a:r>
-          </a:p>
-          <a:p>
-            <a:r>
-              <a:rPr lang="en-US" dirty="0"/>
-              <a:t>Total of 49 features</a:t>
+              <a:t>higher housing price according to the model.</a:t>
             </a:r>
           </a:p>
         </p:txBody>
@@ -7121,7 +7486,7 @@
           <p:cNvPr id="4" name="Slide Number Placeholder 3">
             <a:extLst>
               <a:ext uri="{FF2B5EF4-FFF2-40B4-BE49-F238E27FC236}">
-                <a16:creationId xmlns:a16="http://schemas.microsoft.com/office/drawing/2014/main" id="{87E73D06-CD4C-B2C2-7DBC-D9AC79147D9B}"/>
+                <a16:creationId xmlns:a16="http://schemas.microsoft.com/office/drawing/2014/main" id="{6B418609-1306-BE71-6DA7-0D5AA915DE99}"/>
               </a:ext>
             </a:extLst>
           </p:cNvPr>
@@ -7150,7 +7515,7 @@
           <p:cNvPr id="6" name="Picture 5">
             <a:extLst>
               <a:ext uri="{FF2B5EF4-FFF2-40B4-BE49-F238E27FC236}">
-                <a16:creationId xmlns:a16="http://schemas.microsoft.com/office/drawing/2014/main" id="{60094B30-0F8C-55BA-A46E-B82536E8981E}"/>
+                <a16:creationId xmlns:a16="http://schemas.microsoft.com/office/drawing/2014/main" id="{49A24DA1-0F48-F3C2-A7D4-5111DC5363B1}"/>
               </a:ext>
             </a:extLst>
           </p:cNvPr>
@@ -7167,6 +7532,187 @@
         </p:blipFill>
         <p:spPr>
           <a:xfrm>
+            <a:off x="4800419" y="2958607"/>
+            <a:ext cx="2591162" cy="3534268"/>
+          </a:xfrm>
+          <a:prstGeom prst="rect">
+            <a:avLst/>
+          </a:prstGeom>
+        </p:spPr>
+      </p:pic>
+    </p:spTree>
+    <p:extLst>
+      <p:ext uri="{BB962C8B-B14F-4D97-AF65-F5344CB8AC3E}">
+        <p14:creationId xmlns:p14="http://schemas.microsoft.com/office/powerpoint/2010/main" val="1643273746"/>
+      </p:ext>
+    </p:extLst>
+  </p:cSld>
+  <p:clrMapOvr>
+    <a:masterClrMapping/>
+  </p:clrMapOvr>
+</p:sld>
+</file>
+
+<file path=ppt/slides/slide18.xml><?xml version="1.0" encoding="utf-8"?>
+<p:sld xmlns:a="http://schemas.openxmlformats.org/drawingml/2006/main" xmlns:r="http://schemas.openxmlformats.org/officeDocument/2006/relationships" xmlns:p="http://schemas.openxmlformats.org/presentationml/2006/main">
+  <p:cSld>
+    <p:spTree>
+      <p:nvGrpSpPr>
+        <p:cNvPr id="1" name=""/>
+        <p:cNvGrpSpPr/>
+        <p:nvPr/>
+      </p:nvGrpSpPr>
+      <p:grpSpPr>
+        <a:xfrm>
+          <a:off x="0" y="0"/>
+          <a:ext cx="0" cy="0"/>
+          <a:chOff x="0" y="0"/>
+          <a:chExt cx="0" cy="0"/>
+        </a:xfrm>
+      </p:grpSpPr>
+      <p:sp>
+        <p:nvSpPr>
+          <p:cNvPr id="2" name="Title 1">
+            <a:extLst>
+              <a:ext uri="{FF2B5EF4-FFF2-40B4-BE49-F238E27FC236}">
+                <a16:creationId xmlns:a16="http://schemas.microsoft.com/office/drawing/2014/main" id="{AFE45B05-502C-7008-8FD5-2B91973F5067}"/>
+              </a:ext>
+            </a:extLst>
+          </p:cNvPr>
+          <p:cNvSpPr>
+            <a:spLocks noGrp="1"/>
+          </p:cNvSpPr>
+          <p:nvPr>
+            <p:ph type="title"/>
+          </p:nvPr>
+        </p:nvSpPr>
+        <p:spPr/>
+        <p:txBody>
+          <a:bodyPr/>
+          <a:lstStyle/>
+          <a:p>
+            <a:r>
+              <a:rPr lang="en-US" b="1" dirty="0"/>
+              <a:t>Extra</a:t>
+            </a:r>
+          </a:p>
+        </p:txBody>
+      </p:sp>
+      <p:sp>
+        <p:nvSpPr>
+          <p:cNvPr id="3" name="Content Placeholder 2">
+            <a:extLst>
+              <a:ext uri="{FF2B5EF4-FFF2-40B4-BE49-F238E27FC236}">
+                <a16:creationId xmlns:a16="http://schemas.microsoft.com/office/drawing/2014/main" id="{A951D87B-10C8-E86F-A536-50FB2BA0FB45}"/>
+              </a:ext>
+            </a:extLst>
+          </p:cNvPr>
+          <p:cNvSpPr>
+            <a:spLocks noGrp="1"/>
+          </p:cNvSpPr>
+          <p:nvPr>
+            <p:ph idx="1"/>
+          </p:nvPr>
+        </p:nvSpPr>
+        <p:spPr/>
+        <p:txBody>
+          <a:bodyPr/>
+          <a:lstStyle/>
+          <a:p>
+            <a:r>
+              <a:rPr lang="en-US" dirty="0" err="1"/>
+              <a:t>XGBoost</a:t>
+            </a:r>
+            <a:r>
+              <a:rPr lang="en-US" dirty="0"/>
+              <a:t> model with </a:t>
+            </a:r>
+            <a:r>
+              <a:rPr lang="en-US" b="1" dirty="0">
+                <a:solidFill>
+                  <a:schemeClr val="accent1"/>
+                </a:solidFill>
+              </a:rPr>
+              <a:t>~85% </a:t>
+            </a:r>
+            <a:r>
+              <a:rPr lang="en-US" dirty="0"/>
+              <a:t>score</a:t>
+            </a:r>
+          </a:p>
+          <a:p>
+            <a:r>
+              <a:rPr lang="en-US" dirty="0"/>
+              <a:t>Average error </a:t>
+            </a:r>
+            <a:r>
+              <a:rPr lang="en-US" b="1" dirty="0">
+                <a:solidFill>
+                  <a:schemeClr val="accent1"/>
+                </a:solidFill>
+              </a:rPr>
+              <a:t>~771K</a:t>
+            </a:r>
+          </a:p>
+          <a:p>
+            <a:r>
+              <a:rPr lang="en-US" dirty="0"/>
+              <a:t>Total of 49 features</a:t>
+            </a:r>
+          </a:p>
+        </p:txBody>
+      </p:sp>
+      <p:sp>
+        <p:nvSpPr>
+          <p:cNvPr id="4" name="Slide Number Placeholder 3">
+            <a:extLst>
+              <a:ext uri="{FF2B5EF4-FFF2-40B4-BE49-F238E27FC236}">
+                <a16:creationId xmlns:a16="http://schemas.microsoft.com/office/drawing/2014/main" id="{87E73D06-CD4C-B2C2-7DBC-D9AC79147D9B}"/>
+              </a:ext>
+            </a:extLst>
+          </p:cNvPr>
+          <p:cNvSpPr>
+            <a:spLocks noGrp="1"/>
+          </p:cNvSpPr>
+          <p:nvPr>
+            <p:ph type="sldNum" sz="quarter" idx="12"/>
+          </p:nvPr>
+        </p:nvSpPr>
+        <p:spPr/>
+        <p:txBody>
+          <a:bodyPr/>
+          <a:lstStyle/>
+          <a:p>
+            <a:fld id="{640C5978-D207-4356-A33B-DAFE34A7F8D2}" type="slidenum">
+              <a:rPr lang="en-US" smtClean="0"/>
+              <a:t>18</a:t>
+            </a:fld>
+            <a:endParaRPr lang="en-US"/>
+          </a:p>
+        </p:txBody>
+      </p:sp>
+      <p:pic>
+        <p:nvPicPr>
+          <p:cNvPr id="6" name="Picture 5">
+            <a:extLst>
+              <a:ext uri="{FF2B5EF4-FFF2-40B4-BE49-F238E27FC236}">
+                <a16:creationId xmlns:a16="http://schemas.microsoft.com/office/drawing/2014/main" id="{60094B30-0F8C-55BA-A46E-B82536E8981E}"/>
+              </a:ext>
+            </a:extLst>
+          </p:cNvPr>
+          <p:cNvPicPr>
+            <a:picLocks noChangeAspect="1"/>
+          </p:cNvPicPr>
+          <p:nvPr/>
+        </p:nvPicPr>
+        <p:blipFill>
+          <a:blip r:embed="rId2"/>
+          <a:stretch>
+            <a:fillRect/>
+          </a:stretch>
+        </p:blipFill>
+        <p:spPr>
+          <a:xfrm>
             <a:off x="838200" y="5748227"/>
             <a:ext cx="10240804" cy="790685"/>
           </a:xfrm>
@@ -7207,10 +7753,10 @@
       </p:pic>
       <p:pic>
         <p:nvPicPr>
-          <p:cNvPr id="12" name="Picture 11">
-            <a:extLst>
-              <a:ext uri="{FF2B5EF4-FFF2-40B4-BE49-F238E27FC236}">
-                <a16:creationId xmlns:a16="http://schemas.microsoft.com/office/drawing/2014/main" id="{EFA08DD2-9478-5AF1-C1D4-1FAE80F70832}"/>
+          <p:cNvPr id="7" name="Picture 6">
+            <a:extLst>
+              <a:ext uri="{FF2B5EF4-FFF2-40B4-BE49-F238E27FC236}">
+                <a16:creationId xmlns:a16="http://schemas.microsoft.com/office/drawing/2014/main" id="{F30AFE4F-1505-11CE-9133-10CBFA509FB8}"/>
               </a:ext>
             </a:extLst>
           </p:cNvPr>
@@ -7227,8 +7773,8 @@
         </p:blipFill>
         <p:spPr>
           <a:xfrm>
-            <a:off x="6480348" y="411920"/>
-            <a:ext cx="4944165" cy="5153744"/>
+            <a:off x="6215994" y="392867"/>
+            <a:ext cx="5477639" cy="5172797"/>
           </a:xfrm>
           <a:prstGeom prst="rect">
             <a:avLst/>
@@ -7265,6 +7811,109 @@
           <a:chExt cx="0" cy="0"/>
         </a:xfrm>
       </p:grpSpPr>
+      <p:pic>
+        <p:nvPicPr>
+          <p:cNvPr id="1026" name="Picture 2" descr="Free Money Home photo and picture">
+            <a:extLst>
+              <a:ext uri="{FF2B5EF4-FFF2-40B4-BE49-F238E27FC236}">
+                <a16:creationId xmlns:a16="http://schemas.microsoft.com/office/drawing/2014/main" id="{F9AA9DBA-6DFC-6726-1F00-4F8E26339270}"/>
+              </a:ext>
+            </a:extLst>
+          </p:cNvPr>
+          <p:cNvPicPr>
+            <a:picLocks noChangeAspect="1" noChangeArrowheads="1"/>
+          </p:cNvPicPr>
+          <p:nvPr/>
+        </p:nvPicPr>
+        <p:blipFill>
+          <a:blip r:embed="rId3">
+            <a:extLst>
+              <a:ext uri="{28A0092B-C50C-407E-A947-70E740481C1C}">
+                <a14:useLocalDpi xmlns:a14="http://schemas.microsoft.com/office/drawing/2010/main" val="0"/>
+              </a:ext>
+            </a:extLst>
+          </a:blip>
+          <a:srcRect/>
+          <a:stretch>
+            <a:fillRect/>
+          </a:stretch>
+        </p:blipFill>
+        <p:spPr bwMode="auto">
+          <a:xfrm>
+            <a:off x="0" y="-181438"/>
+            <a:ext cx="12192000" cy="7219936"/>
+          </a:xfrm>
+          <a:prstGeom prst="rect">
+            <a:avLst/>
+          </a:prstGeom>
+          <a:noFill/>
+          <a:extLst>
+            <a:ext uri="{909E8E84-426E-40DD-AFC4-6F175D3DCCD1}">
+              <a14:hiddenFill xmlns:a14="http://schemas.microsoft.com/office/drawing/2010/main">
+                <a:solidFill>
+                  <a:srgbClr val="FFFFFF"/>
+                </a:solidFill>
+              </a14:hiddenFill>
+            </a:ext>
+          </a:extLst>
+        </p:spPr>
+      </p:pic>
+      <p:sp>
+        <p:nvSpPr>
+          <p:cNvPr id="4" name="Rectangle 3">
+            <a:extLst>
+              <a:ext uri="{FF2B5EF4-FFF2-40B4-BE49-F238E27FC236}">
+                <a16:creationId xmlns:a16="http://schemas.microsoft.com/office/drawing/2014/main" id="{2E48DFCE-9AC0-A5CA-2C7E-ADD67593D6E2}"/>
+              </a:ext>
+            </a:extLst>
+          </p:cNvPr>
+          <p:cNvSpPr/>
+          <p:nvPr/>
+        </p:nvSpPr>
+        <p:spPr>
+          <a:xfrm>
+            <a:off x="0" y="0"/>
+            <a:ext cx="12192000" cy="6858000"/>
+          </a:xfrm>
+          <a:prstGeom prst="rect">
+            <a:avLst/>
+          </a:prstGeom>
+          <a:solidFill>
+            <a:srgbClr val="FFFFFF">
+              <a:alpha val="69804"/>
+            </a:srgbClr>
+          </a:solidFill>
+          <a:ln>
+            <a:solidFill>
+              <a:srgbClr val="FFFFFF"/>
+            </a:solidFill>
+          </a:ln>
+        </p:spPr>
+        <p:style>
+          <a:lnRef idx="2">
+            <a:schemeClr val="accent1">
+              <a:shade val="15000"/>
+            </a:schemeClr>
+          </a:lnRef>
+          <a:fillRef idx="1">
+            <a:schemeClr val="accent1"/>
+          </a:fillRef>
+          <a:effectRef idx="0">
+            <a:schemeClr val="accent1"/>
+          </a:effectRef>
+          <a:fontRef idx="minor">
+            <a:schemeClr val="lt1"/>
+          </a:fontRef>
+        </p:style>
+        <p:txBody>
+          <a:bodyPr rtlCol="0" anchor="ctr"/>
+          <a:lstStyle/>
+          <a:p>
+            <a:pPr algn="ctr"/>
+            <a:endParaRPr lang="en-US"/>
+          </a:p>
+        </p:txBody>
+      </p:sp>
       <p:sp>
         <p:nvSpPr>
           <p:cNvPr id="2" name="Title 1">
@@ -7328,7 +7977,16 @@
             </a:pPr>
             <a:r>
               <a:rPr lang="en-US" dirty="0"/>
-              <a:t>Do you ever have a problem when moving to a new home ?</a:t>
+              <a:t>Do you ever have a problem with housing price</a:t>
+            </a:r>
+          </a:p>
+          <a:p>
+            <a:pPr marL="0" indent="0" algn="ctr">
+              <a:buNone/>
+            </a:pPr>
+            <a:r>
+              <a:rPr lang="en-US" dirty="0"/>
+              <a:t>when trying move to a new home ?</a:t>
             </a:r>
           </a:p>
           <a:p>
@@ -7343,7 +8001,16 @@
             </a:pPr>
             <a:r>
               <a:rPr lang="en-US" dirty="0"/>
-              <a:t>Housing price in Bangkok is normally fluctuated due to many factors, some factors are considered to be positive for the price, but is that always true ?</a:t>
+              <a:t>Housing price in Bangkok is normally fluctuated due to many factors, some factors are considered to be positive for the price,</a:t>
+            </a:r>
+          </a:p>
+          <a:p>
+            <a:pPr marL="0" indent="0" algn="ctr">
+              <a:buNone/>
+            </a:pPr>
+            <a:r>
+              <a:rPr lang="en-US" dirty="0"/>
+              <a:t>but is that always true ?</a:t>
             </a:r>
           </a:p>
         </p:txBody>
@@ -8515,7 +9182,7 @@
               <a:rPr lang="en-US" smtClean="0"/>
               <a:t>8</a:t>
             </a:fld>
-            <a:endParaRPr lang="en-US"/>
+            <a:endParaRPr lang="en-US" dirty="0"/>
           </a:p>
         </p:txBody>
       </p:sp>
@@ -8862,8 +9529,8 @@
         </p:nvSpPr>
         <p:spPr>
           <a:xfrm>
-            <a:off x="5195304" y="6269457"/>
-            <a:ext cx="6179962" cy="369332"/>
+            <a:off x="4366727" y="6216373"/>
+            <a:ext cx="6933758" cy="369332"/>
           </a:xfrm>
           <a:prstGeom prst="rect">
             <a:avLst/>
@@ -8886,7 +9553,7 @@
             </a:r>
             <a:r>
               <a:rPr lang="en-US" dirty="0"/>
-              <a:t>, replace it with null and then impute</a:t>
+              <a:t>, replace it with empty value and then impute</a:t>
             </a:r>
           </a:p>
         </p:txBody>

</xml_diff>

<commit_message>
Update scaling method in nearby station dstance and presentation theme
</commit_message>
<xml_diff>
--- a/presentation/Bangkok Housing Price Prediction for buyers and sellers.pptx
+++ b/presentation/Bangkok Housing Price Prediction for buyers and sellers.pptx
@@ -232,7 +232,7 @@
           <a:p>
             <a:fld id="{6A635924-7805-4987-B004-633AF8543327}" type="datetimeFigureOut">
               <a:rPr lang="en-US" smtClean="0"/>
-              <a:t>28-Oct-23</a:t>
+              <a:t>29-Oct-23</a:t>
             </a:fld>
             <a:endParaRPr lang="en-US"/>
           </a:p>
@@ -410,7 +410,7 @@
           <a:p>
             <a:fld id="{4792800D-0FCF-451F-A6C3-59608CB4A1C9}" type="datetimeFigureOut">
               <a:rPr lang="en-US" smtClean="0"/>
-              <a:t>28-Oct-23</a:t>
+              <a:t>29-Oct-23</a:t>
             </a:fld>
             <a:endParaRPr lang="en-US"/>
           </a:p>
@@ -1452,10 +1452,7 @@
           <a:bodyPr/>
           <a:lstStyle/>
           <a:p>
-            <a:r>
-              <a:rPr lang="en-US" dirty="0"/>
-              <a:t>-2.14975 -&gt; raw value is 0 means the station is not nearby the house</a:t>
-            </a:r>
+            <a:endParaRPr lang="en-US" dirty="0"/>
           </a:p>
         </p:txBody>
       </p:sp>
@@ -1619,7 +1616,7 @@
           <a:p>
             <a:fld id="{EADCF2BD-E462-4867-B7A9-6BCBFFBCA5D0}" type="datetime1">
               <a:rPr lang="en-US" smtClean="0"/>
-              <a:t>28-Oct-23</a:t>
+              <a:t>29-Oct-23</a:t>
             </a:fld>
             <a:endParaRPr lang="en-US"/>
           </a:p>
@@ -1652,10 +1649,10 @@
       </p:sp>
       <p:sp>
         <p:nvSpPr>
-          <p:cNvPr id="6" name="Slide Number Placeholder 5">
-            <a:extLst>
-              <a:ext uri="{FF2B5EF4-FFF2-40B4-BE49-F238E27FC236}">
-                <a16:creationId xmlns:a16="http://schemas.microsoft.com/office/drawing/2014/main" id="{61C4B10F-8224-919F-C835-7CCB893E2528}"/>
+          <p:cNvPr id="7" name="Slide Number Placeholder 5">
+            <a:extLst>
+              <a:ext uri="{FF2B5EF4-FFF2-40B4-BE49-F238E27FC236}">
+                <a16:creationId xmlns:a16="http://schemas.microsoft.com/office/drawing/2014/main" id="{B76690B7-F6D6-68A5-4D3C-4B22807B1F9C}"/>
               </a:ext>
             </a:extLst>
           </p:cNvPr>
@@ -1668,7 +1665,7 @@
         </p:nvSpPr>
         <p:spPr>
           <a:xfrm>
-            <a:off x="9296400" y="6356349"/>
+            <a:off x="9226420" y="6356350"/>
             <a:ext cx="2743200" cy="365125"/>
           </a:xfrm>
         </p:spPr>
@@ -1822,7 +1819,7 @@
           <a:p>
             <a:fld id="{6D6752B0-A24A-4FA4-B387-B73DE53F3B4D}" type="datetime1">
               <a:rPr lang="en-US" smtClean="0"/>
-              <a:t>28-Oct-23</a:t>
+              <a:t>29-Oct-23</a:t>
             </a:fld>
             <a:endParaRPr lang="en-US"/>
           </a:p>
@@ -1855,10 +1852,10 @@
       </p:sp>
       <p:sp>
         <p:nvSpPr>
-          <p:cNvPr id="7" name="Slide Number Placeholder 5">
-            <a:extLst>
-              <a:ext uri="{FF2B5EF4-FFF2-40B4-BE49-F238E27FC236}">
-                <a16:creationId xmlns:a16="http://schemas.microsoft.com/office/drawing/2014/main" id="{13640919-389E-4508-C67D-560BF77A50A7}"/>
+          <p:cNvPr id="6" name="Slide Number Placeholder 5">
+            <a:extLst>
+              <a:ext uri="{FF2B5EF4-FFF2-40B4-BE49-F238E27FC236}">
+                <a16:creationId xmlns:a16="http://schemas.microsoft.com/office/drawing/2014/main" id="{9420F0DE-9C54-CAE7-C0E6-8E39FF3F5880}"/>
               </a:ext>
             </a:extLst>
           </p:cNvPr>
@@ -1871,7 +1868,7 @@
         </p:nvSpPr>
         <p:spPr>
           <a:xfrm>
-            <a:off x="9296400" y="6356349"/>
+            <a:off x="9226420" y="6356350"/>
             <a:ext cx="2743200" cy="365125"/>
           </a:xfrm>
         </p:spPr>
@@ -2035,7 +2032,7 @@
           <a:p>
             <a:fld id="{83889BD8-AEC5-4257-B2A9-6CB4E2FAB22D}" type="datetime1">
               <a:rPr lang="en-US" smtClean="0"/>
-              <a:t>28-Oct-23</a:t>
+              <a:t>29-Oct-23</a:t>
             </a:fld>
             <a:endParaRPr lang="en-US"/>
           </a:p>
@@ -2068,10 +2065,10 @@
       </p:sp>
       <p:sp>
         <p:nvSpPr>
-          <p:cNvPr id="7" name="Slide Number Placeholder 5">
-            <a:extLst>
-              <a:ext uri="{FF2B5EF4-FFF2-40B4-BE49-F238E27FC236}">
-                <a16:creationId xmlns:a16="http://schemas.microsoft.com/office/drawing/2014/main" id="{35ADD1E1-3C1A-10B4-1261-222A256E7841}"/>
+          <p:cNvPr id="6" name="Slide Number Placeholder 5">
+            <a:extLst>
+              <a:ext uri="{FF2B5EF4-FFF2-40B4-BE49-F238E27FC236}">
+                <a16:creationId xmlns:a16="http://schemas.microsoft.com/office/drawing/2014/main" id="{60CF9C22-8F1A-DA85-2E79-1B3ABA931694}"/>
               </a:ext>
             </a:extLst>
           </p:cNvPr>
@@ -2084,7 +2081,7 @@
         </p:nvSpPr>
         <p:spPr>
           <a:xfrm>
-            <a:off x="9296400" y="6356349"/>
+            <a:off x="9226420" y="6356350"/>
             <a:ext cx="2743200" cy="365125"/>
           </a:xfrm>
         </p:spPr>
@@ -2238,7 +2235,7 @@
           <a:p>
             <a:fld id="{18207518-2712-4D1B-9D80-BD1805B38EC4}" type="datetime1">
               <a:rPr lang="en-US" smtClean="0"/>
-              <a:t>28-Oct-23</a:t>
+              <a:t>29-Oct-23</a:t>
             </a:fld>
             <a:endParaRPr lang="en-US"/>
           </a:p>
@@ -2518,7 +2515,7 @@
           <a:p>
             <a:fld id="{D077CE9B-92D1-4044-8C18-EDFC53ACA153}" type="datetime1">
               <a:rPr lang="en-US" smtClean="0"/>
-              <a:t>28-Oct-23</a:t>
+              <a:t>29-Oct-23</a:t>
             </a:fld>
             <a:endParaRPr lang="en-US"/>
           </a:p>
@@ -2551,10 +2548,10 @@
       </p:sp>
       <p:sp>
         <p:nvSpPr>
-          <p:cNvPr id="6" name="Slide Number Placeholder 5">
-            <a:extLst>
-              <a:ext uri="{FF2B5EF4-FFF2-40B4-BE49-F238E27FC236}">
-                <a16:creationId xmlns:a16="http://schemas.microsoft.com/office/drawing/2014/main" id="{61819E98-D59D-52A6-2D1D-BD60D1AC8317}"/>
+          <p:cNvPr id="7" name="Slide Number Placeholder 5">
+            <a:extLst>
+              <a:ext uri="{FF2B5EF4-FFF2-40B4-BE49-F238E27FC236}">
+                <a16:creationId xmlns:a16="http://schemas.microsoft.com/office/drawing/2014/main" id="{3098125F-DF75-DB76-18CC-9F5A03BC7902}"/>
               </a:ext>
             </a:extLst>
           </p:cNvPr>
@@ -2565,7 +2562,12 @@
             <p:ph type="sldNum" sz="quarter" idx="12"/>
           </p:nvPr>
         </p:nvSpPr>
-        <p:spPr/>
+        <p:spPr>
+          <a:xfrm>
+            <a:off x="9226420" y="6356350"/>
+            <a:ext cx="2743200" cy="365125"/>
+          </a:xfrm>
+        </p:spPr>
         <p:txBody>
           <a:bodyPr/>
           <a:lstStyle/>
@@ -2783,7 +2785,7 @@
           <a:p>
             <a:fld id="{8160BC85-221A-4580-AA17-0112E45DBFF0}" type="datetime1">
               <a:rPr lang="en-US" smtClean="0"/>
-              <a:t>28-Oct-23</a:t>
+              <a:t>29-Oct-23</a:t>
             </a:fld>
             <a:endParaRPr lang="en-US"/>
           </a:p>
@@ -2816,10 +2818,10 @@
       </p:sp>
       <p:sp>
         <p:nvSpPr>
-          <p:cNvPr id="8" name="Slide Number Placeholder 5">
-            <a:extLst>
-              <a:ext uri="{FF2B5EF4-FFF2-40B4-BE49-F238E27FC236}">
-                <a16:creationId xmlns:a16="http://schemas.microsoft.com/office/drawing/2014/main" id="{6E7DFAA3-EDCF-D609-8CEE-16B3933FD2F8}"/>
+          <p:cNvPr id="7" name="Slide Number Placeholder 5">
+            <a:extLst>
+              <a:ext uri="{FF2B5EF4-FFF2-40B4-BE49-F238E27FC236}">
+                <a16:creationId xmlns:a16="http://schemas.microsoft.com/office/drawing/2014/main" id="{36827DCE-6317-D05B-BC74-0AC47D6C390C}"/>
               </a:ext>
             </a:extLst>
           </p:cNvPr>
@@ -2832,7 +2834,7 @@
         </p:nvSpPr>
         <p:spPr>
           <a:xfrm>
-            <a:off x="9296400" y="6356349"/>
+            <a:off x="9226420" y="6356350"/>
             <a:ext cx="2743200" cy="365125"/>
           </a:xfrm>
         </p:spPr>
@@ -3200,7 +3202,7 @@
           <a:p>
             <a:fld id="{10574C72-8AAC-417E-8B40-E1A3D374F20E}" type="datetime1">
               <a:rPr lang="en-US" smtClean="0"/>
-              <a:t>28-Oct-23</a:t>
+              <a:t>29-Oct-23</a:t>
             </a:fld>
             <a:endParaRPr lang="en-US"/>
           </a:p>
@@ -3233,10 +3235,10 @@
       </p:sp>
       <p:sp>
         <p:nvSpPr>
-          <p:cNvPr id="10" name="Slide Number Placeholder 5">
-            <a:extLst>
-              <a:ext uri="{FF2B5EF4-FFF2-40B4-BE49-F238E27FC236}">
-                <a16:creationId xmlns:a16="http://schemas.microsoft.com/office/drawing/2014/main" id="{3CFCBAC0-939D-BDBB-F6A1-BFFEC7391AB9}"/>
+          <p:cNvPr id="9" name="Slide Number Placeholder 5">
+            <a:extLst>
+              <a:ext uri="{FF2B5EF4-FFF2-40B4-BE49-F238E27FC236}">
+                <a16:creationId xmlns:a16="http://schemas.microsoft.com/office/drawing/2014/main" id="{338A3DFF-EED9-38AB-2F4E-745E5774253F}"/>
               </a:ext>
             </a:extLst>
           </p:cNvPr>
@@ -3249,7 +3251,7 @@
         </p:nvSpPr>
         <p:spPr>
           <a:xfrm>
-            <a:off x="9296400" y="6356349"/>
+            <a:off x="9226420" y="6356350"/>
             <a:ext cx="2743200" cy="365125"/>
           </a:xfrm>
         </p:spPr>
@@ -3346,7 +3348,7 @@
           <a:p>
             <a:fld id="{0645CC9E-6DFD-4F28-A9F1-DD672E9008C7}" type="datetime1">
               <a:rPr lang="en-US" smtClean="0"/>
-              <a:t>28-Oct-23</a:t>
+              <a:t>29-Oct-23</a:t>
             </a:fld>
             <a:endParaRPr lang="en-US"/>
           </a:p>
@@ -3379,10 +3381,10 @@
       </p:sp>
       <p:sp>
         <p:nvSpPr>
-          <p:cNvPr id="6" name="Slide Number Placeholder 5">
-            <a:extLst>
-              <a:ext uri="{FF2B5EF4-FFF2-40B4-BE49-F238E27FC236}">
-                <a16:creationId xmlns:a16="http://schemas.microsoft.com/office/drawing/2014/main" id="{1CFB11B2-B4C4-0FD8-BB5C-F66174F8E9FA}"/>
+          <p:cNvPr id="5" name="Slide Number Placeholder 5">
+            <a:extLst>
+              <a:ext uri="{FF2B5EF4-FFF2-40B4-BE49-F238E27FC236}">
+                <a16:creationId xmlns:a16="http://schemas.microsoft.com/office/drawing/2014/main" id="{2391F48B-006D-8897-64C7-A7769A1E7FB5}"/>
               </a:ext>
             </a:extLst>
           </p:cNvPr>
@@ -3395,7 +3397,7 @@
         </p:nvSpPr>
         <p:spPr>
           <a:xfrm>
-            <a:off x="9296400" y="6356349"/>
+            <a:off x="9226420" y="6356350"/>
             <a:ext cx="2743200" cy="365125"/>
           </a:xfrm>
         </p:spPr>
@@ -3464,7 +3466,7 @@
           <a:p>
             <a:fld id="{70E5F7E7-A7A4-415B-A737-DE8F624FEB14}" type="datetime1">
               <a:rPr lang="en-US" smtClean="0"/>
-              <a:t>28-Oct-23</a:t>
+              <a:t>29-Oct-23</a:t>
             </a:fld>
             <a:endParaRPr lang="en-US"/>
           </a:p>
@@ -3497,10 +3499,10 @@
       </p:sp>
       <p:sp>
         <p:nvSpPr>
-          <p:cNvPr id="5" name="Slide Number Placeholder 5">
-            <a:extLst>
-              <a:ext uri="{FF2B5EF4-FFF2-40B4-BE49-F238E27FC236}">
-                <a16:creationId xmlns:a16="http://schemas.microsoft.com/office/drawing/2014/main" id="{77C30A7C-7B33-F6F8-8820-B891931FDB23}"/>
+          <p:cNvPr id="4" name="Slide Number Placeholder 5">
+            <a:extLst>
+              <a:ext uri="{FF2B5EF4-FFF2-40B4-BE49-F238E27FC236}">
+                <a16:creationId xmlns:a16="http://schemas.microsoft.com/office/drawing/2014/main" id="{A506C539-5310-37B0-125A-76CDD2B86B27}"/>
               </a:ext>
             </a:extLst>
           </p:cNvPr>
@@ -3513,7 +3515,7 @@
         </p:nvSpPr>
         <p:spPr>
           <a:xfrm>
-            <a:off x="9296400" y="6356349"/>
+            <a:off x="9226420" y="6356350"/>
             <a:ext cx="2743200" cy="365125"/>
           </a:xfrm>
         </p:spPr>
@@ -3780,7 +3782,7 @@
           <a:p>
             <a:fld id="{35912435-556C-4370-B5F7-7A4F23D5F0C2}" type="datetime1">
               <a:rPr lang="en-US" smtClean="0"/>
-              <a:t>28-Oct-23</a:t>
+              <a:t>29-Oct-23</a:t>
             </a:fld>
             <a:endParaRPr lang="en-US"/>
           </a:p>
@@ -3813,10 +3815,10 @@
       </p:sp>
       <p:sp>
         <p:nvSpPr>
-          <p:cNvPr id="8" name="Slide Number Placeholder 5">
-            <a:extLst>
-              <a:ext uri="{FF2B5EF4-FFF2-40B4-BE49-F238E27FC236}">
-                <a16:creationId xmlns:a16="http://schemas.microsoft.com/office/drawing/2014/main" id="{554B471A-BA72-3402-1FF4-761113379768}"/>
+          <p:cNvPr id="7" name="Slide Number Placeholder 5">
+            <a:extLst>
+              <a:ext uri="{FF2B5EF4-FFF2-40B4-BE49-F238E27FC236}">
+                <a16:creationId xmlns:a16="http://schemas.microsoft.com/office/drawing/2014/main" id="{195D46B1-E4EE-9F72-BDAA-754C147977AB}"/>
               </a:ext>
             </a:extLst>
           </p:cNvPr>
@@ -3829,7 +3831,7 @@
         </p:nvSpPr>
         <p:spPr>
           <a:xfrm>
-            <a:off x="9296400" y="6356349"/>
+            <a:off x="9226420" y="6356350"/>
             <a:ext cx="2743200" cy="365125"/>
           </a:xfrm>
         </p:spPr>
@@ -4073,7 +4075,7 @@
           <a:p>
             <a:fld id="{A404E8A3-1360-47C4-865E-400D68738A12}" type="datetime1">
               <a:rPr lang="en-US" smtClean="0"/>
-              <a:t>28-Oct-23</a:t>
+              <a:t>29-Oct-23</a:t>
             </a:fld>
             <a:endParaRPr lang="en-US"/>
           </a:p>
@@ -4106,10 +4108,10 @@
       </p:sp>
       <p:sp>
         <p:nvSpPr>
-          <p:cNvPr id="8" name="Slide Number Placeholder 5">
-            <a:extLst>
-              <a:ext uri="{FF2B5EF4-FFF2-40B4-BE49-F238E27FC236}">
-                <a16:creationId xmlns:a16="http://schemas.microsoft.com/office/drawing/2014/main" id="{71BFA05C-8433-3AFF-3469-F71CB0BD8CC0}"/>
+          <p:cNvPr id="7" name="Slide Number Placeholder 5">
+            <a:extLst>
+              <a:ext uri="{FF2B5EF4-FFF2-40B4-BE49-F238E27FC236}">
+                <a16:creationId xmlns:a16="http://schemas.microsoft.com/office/drawing/2014/main" id="{E4BABE24-DDD1-B590-1FE1-7F7E4BC2CCA4}"/>
               </a:ext>
             </a:extLst>
           </p:cNvPr>
@@ -4122,7 +4124,7 @@
         </p:nvSpPr>
         <p:spPr>
           <a:xfrm>
-            <a:off x="9296400" y="6356349"/>
+            <a:off x="9226420" y="6356350"/>
             <a:ext cx="2743200" cy="365125"/>
           </a:xfrm>
         </p:spPr>
@@ -4319,7 +4321,7 @@
           <a:p>
             <a:fld id="{026D7BEE-48F2-4121-9F62-396770CE3475}" type="datetime1">
               <a:rPr lang="en-US" smtClean="0"/>
-              <a:t>28-Oct-23</a:t>
+              <a:t>29-Oct-23</a:t>
             </a:fld>
             <a:endParaRPr lang="en-US"/>
           </a:p>
@@ -6076,6 +6078,66 @@
           <a:chExt cx="0" cy="0"/>
         </a:xfrm>
       </p:grpSpPr>
+      <p:pic>
+        <p:nvPicPr>
+          <p:cNvPr id="14" name="Picture 13">
+            <a:extLst>
+              <a:ext uri="{FF2B5EF4-FFF2-40B4-BE49-F238E27FC236}">
+                <a16:creationId xmlns:a16="http://schemas.microsoft.com/office/drawing/2014/main" id="{3830E59E-6183-964E-BF26-1E0D321CFAF7}"/>
+              </a:ext>
+            </a:extLst>
+          </p:cNvPr>
+          <p:cNvPicPr>
+            <a:picLocks noChangeAspect="1"/>
+          </p:cNvPicPr>
+          <p:nvPr/>
+        </p:nvPicPr>
+        <p:blipFill>
+          <a:blip r:embed="rId3"/>
+          <a:stretch>
+            <a:fillRect/>
+          </a:stretch>
+        </p:blipFill>
+        <p:spPr>
+          <a:xfrm>
+            <a:off x="5697746" y="3000067"/>
+            <a:ext cx="5963482" cy="1829055"/>
+          </a:xfrm>
+          <a:prstGeom prst="rect">
+            <a:avLst/>
+          </a:prstGeom>
+        </p:spPr>
+      </p:pic>
+      <p:pic>
+        <p:nvPicPr>
+          <p:cNvPr id="12" name="Picture 11">
+            <a:extLst>
+              <a:ext uri="{FF2B5EF4-FFF2-40B4-BE49-F238E27FC236}">
+                <a16:creationId xmlns:a16="http://schemas.microsoft.com/office/drawing/2014/main" id="{1442366E-B8FF-390A-EACD-4464F8BF280D}"/>
+              </a:ext>
+            </a:extLst>
+          </p:cNvPr>
+          <p:cNvPicPr>
+            <a:picLocks noChangeAspect="1"/>
+          </p:cNvPicPr>
+          <p:nvPr/>
+        </p:nvPicPr>
+        <p:blipFill>
+          <a:blip r:embed="rId4"/>
+          <a:stretch>
+            <a:fillRect/>
+          </a:stretch>
+        </p:blipFill>
+        <p:spPr>
+          <a:xfrm>
+            <a:off x="684738" y="2932790"/>
+            <a:ext cx="3629532" cy="1857634"/>
+          </a:xfrm>
+          <a:prstGeom prst="rect">
+            <a:avLst/>
+          </a:prstGeom>
+        </p:spPr>
+      </p:pic>
       <p:sp>
         <p:nvSpPr>
           <p:cNvPr id="2" name="Title 1">
@@ -6097,6 +6159,7 @@
           <a:bodyPr/>
           <a:lstStyle/>
           <a:p>
+            <a:pPr algn="ctr"/>
             <a:r>
               <a:rPr lang="en-US" b="1" dirty="0"/>
               <a:t>For </a:t>
@@ -6130,7 +6193,7 @@
           <a:bodyPr/>
           <a:lstStyle/>
           <a:p>
-            <a:pPr marL="0" indent="0">
+            <a:pPr marL="0" indent="0" algn="ctr">
               <a:buNone/>
             </a:pPr>
             <a:r>
@@ -6169,35 +6232,6 @@
           </a:p>
         </p:txBody>
       </p:sp>
-      <p:pic>
-        <p:nvPicPr>
-          <p:cNvPr id="6" name="Picture 5">
-            <a:extLst>
-              <a:ext uri="{FF2B5EF4-FFF2-40B4-BE49-F238E27FC236}">
-                <a16:creationId xmlns:a16="http://schemas.microsoft.com/office/drawing/2014/main" id="{E71FF561-A9DF-12D8-E865-1F11DA554B9A}"/>
-              </a:ext>
-            </a:extLst>
-          </p:cNvPr>
-          <p:cNvPicPr>
-            <a:picLocks noChangeAspect="1"/>
-          </p:cNvPicPr>
-          <p:nvPr/>
-        </p:nvPicPr>
-        <p:blipFill rotWithShape="1">
-          <a:blip r:embed="rId3"/>
-          <a:srcRect b="72667"/>
-          <a:stretch/>
-        </p:blipFill>
-        <p:spPr>
-          <a:xfrm>
-            <a:off x="1020209" y="3251812"/>
-            <a:ext cx="3052258" cy="1325563"/>
-          </a:xfrm>
-          <a:prstGeom prst="rect">
-            <a:avLst/>
-          </a:prstGeom>
-        </p:spPr>
-      </p:pic>
       <p:sp>
         <p:nvSpPr>
           <p:cNvPr id="9" name="Arrow: Right 8">
@@ -6212,7 +6246,7 @@
         </p:nvSpPr>
         <p:spPr>
           <a:xfrm>
-            <a:off x="4440196" y="3707168"/>
+            <a:off x="4604792" y="3630876"/>
             <a:ext cx="802432" cy="414855"/>
           </a:xfrm>
           <a:prstGeom prst="rightArrow">
@@ -6258,36 +6292,6 @@
           </a:p>
         </p:txBody>
       </p:sp>
-      <p:pic>
-        <p:nvPicPr>
-          <p:cNvPr id="15" name="Picture 14">
-            <a:extLst>
-              <a:ext uri="{FF2B5EF4-FFF2-40B4-BE49-F238E27FC236}">
-                <a16:creationId xmlns:a16="http://schemas.microsoft.com/office/drawing/2014/main" id="{A83A28AD-253E-F0B1-D407-B883745B5EFF}"/>
-              </a:ext>
-            </a:extLst>
-          </p:cNvPr>
-          <p:cNvPicPr>
-            <a:picLocks noChangeAspect="1"/>
-          </p:cNvPicPr>
-          <p:nvPr/>
-        </p:nvPicPr>
-        <p:blipFill>
-          <a:blip r:embed="rId4"/>
-          <a:stretch>
-            <a:fillRect/>
-          </a:stretch>
-        </p:blipFill>
-        <p:spPr>
-          <a:xfrm>
-            <a:off x="5571318" y="3176304"/>
-            <a:ext cx="5782482" cy="1476581"/>
-          </a:xfrm>
-          <a:prstGeom prst="rect">
-            <a:avLst/>
-          </a:prstGeom>
-        </p:spPr>
-      </p:pic>
       <p:sp>
         <p:nvSpPr>
           <p:cNvPr id="10" name="Rectangle 9">
@@ -6302,8 +6306,8 @@
         </p:nvSpPr>
         <p:spPr>
           <a:xfrm>
-            <a:off x="6250335" y="3441922"/>
-            <a:ext cx="2048002" cy="326377"/>
+            <a:off x="6494360" y="3234281"/>
+            <a:ext cx="2122067" cy="326377"/>
           </a:xfrm>
           <a:prstGeom prst="rect">
             <a:avLst/>
@@ -6354,7 +6358,7 @@
         </p:nvSpPr>
         <p:spPr>
           <a:xfrm>
-            <a:off x="8965654" y="3698419"/>
+            <a:off x="9278970" y="3478197"/>
             <a:ext cx="2388146" cy="326377"/>
           </a:xfrm>
           <a:prstGeom prst="rect">
@@ -6406,8 +6410,8 @@
         </p:nvSpPr>
         <p:spPr>
           <a:xfrm>
-            <a:off x="1264565" y="3447069"/>
-            <a:ext cx="2807902" cy="577726"/>
+            <a:off x="1208187" y="3171667"/>
+            <a:ext cx="3050211" cy="577726"/>
           </a:xfrm>
           <a:prstGeom prst="rect">
             <a:avLst/>
@@ -6495,6 +6499,7 @@
           <a:bodyPr/>
           <a:lstStyle/>
           <a:p>
+            <a:pPr algn="ctr"/>
             <a:r>
               <a:rPr lang="en-US" b="1" dirty="0" err="1"/>
               <a:t>Dummified</a:t>
@@ -6524,21 +6529,12 @@
           <a:bodyPr/>
           <a:lstStyle/>
           <a:p>
-            <a:pPr marL="0" indent="0">
+            <a:pPr marL="0" indent="0" algn="ctr">
               <a:buNone/>
             </a:pPr>
             <a:r>
               <a:rPr lang="en-US" dirty="0"/>
-              <a:t>Because prediction technique</a:t>
-            </a:r>
-          </a:p>
-          <a:p>
-            <a:pPr marL="0" indent="0">
-              <a:buNone/>
-            </a:pPr>
-            <a:r>
-              <a:rPr lang="en-US" dirty="0"/>
-              <a:t>needs all data to be numbers …</a:t>
+              <a:t>Because prediction technique needs all data to be numbers …</a:t>
             </a:r>
           </a:p>
         </p:txBody>
@@ -6572,66 +6568,6 @@
           </a:p>
         </p:txBody>
       </p:sp>
-      <p:pic>
-        <p:nvPicPr>
-          <p:cNvPr id="8" name="Picture 7">
-            <a:extLst>
-              <a:ext uri="{FF2B5EF4-FFF2-40B4-BE49-F238E27FC236}">
-                <a16:creationId xmlns:a16="http://schemas.microsoft.com/office/drawing/2014/main" id="{FCB26A4D-B4CB-0B2A-05B4-A5B68F243BB2}"/>
-              </a:ext>
-            </a:extLst>
-          </p:cNvPr>
-          <p:cNvPicPr>
-            <a:picLocks noChangeAspect="1"/>
-          </p:cNvPicPr>
-          <p:nvPr/>
-        </p:nvPicPr>
-        <p:blipFill>
-          <a:blip r:embed="rId3"/>
-          <a:stretch>
-            <a:fillRect/>
-          </a:stretch>
-        </p:blipFill>
-        <p:spPr>
-          <a:xfrm>
-            <a:off x="2656220" y="3089832"/>
-            <a:ext cx="1714739" cy="3153215"/>
-          </a:xfrm>
-          <a:prstGeom prst="rect">
-            <a:avLst/>
-          </a:prstGeom>
-        </p:spPr>
-      </p:pic>
-      <p:pic>
-        <p:nvPicPr>
-          <p:cNvPr id="10" name="Picture 9">
-            <a:extLst>
-              <a:ext uri="{FF2B5EF4-FFF2-40B4-BE49-F238E27FC236}">
-                <a16:creationId xmlns:a16="http://schemas.microsoft.com/office/drawing/2014/main" id="{FC676A36-67AE-2B0C-DD77-735AD863DC69}"/>
-              </a:ext>
-            </a:extLst>
-          </p:cNvPr>
-          <p:cNvPicPr>
-            <a:picLocks noChangeAspect="1"/>
-          </p:cNvPicPr>
-          <p:nvPr/>
-        </p:nvPicPr>
-        <p:blipFill>
-          <a:blip r:embed="rId4"/>
-          <a:stretch>
-            <a:fillRect/>
-          </a:stretch>
-        </p:blipFill>
-        <p:spPr>
-          <a:xfrm>
-            <a:off x="6837916" y="365125"/>
-            <a:ext cx="3562847" cy="6039693"/>
-          </a:xfrm>
-          <a:prstGeom prst="rect">
-            <a:avLst/>
-          </a:prstGeom>
-        </p:spPr>
-      </p:pic>
       <p:sp>
         <p:nvSpPr>
           <p:cNvPr id="11" name="Arrow: Right 10">
@@ -6646,7 +6582,7 @@
         </p:nvSpPr>
         <p:spPr>
           <a:xfrm>
-            <a:off x="5203221" y="4251584"/>
+            <a:off x="4361627" y="3793866"/>
             <a:ext cx="802432" cy="414855"/>
           </a:xfrm>
           <a:prstGeom prst="rightArrow">
@@ -6692,6 +6628,66 @@
           </a:p>
         </p:txBody>
       </p:sp>
+      <p:pic>
+        <p:nvPicPr>
+          <p:cNvPr id="6" name="Picture 5">
+            <a:extLst>
+              <a:ext uri="{FF2B5EF4-FFF2-40B4-BE49-F238E27FC236}">
+                <a16:creationId xmlns:a16="http://schemas.microsoft.com/office/drawing/2014/main" id="{1D578BAF-5579-D509-19F7-9B7582592EDC}"/>
+              </a:ext>
+            </a:extLst>
+          </p:cNvPr>
+          <p:cNvPicPr>
+            <a:picLocks noChangeAspect="1"/>
+          </p:cNvPicPr>
+          <p:nvPr/>
+        </p:nvPicPr>
+        <p:blipFill>
+          <a:blip r:embed="rId3"/>
+          <a:stretch>
+            <a:fillRect/>
+          </a:stretch>
+        </p:blipFill>
+        <p:spPr>
+          <a:xfrm>
+            <a:off x="2086073" y="2689264"/>
+            <a:ext cx="1676634" cy="3124636"/>
+          </a:xfrm>
+          <a:prstGeom prst="rect">
+            <a:avLst/>
+          </a:prstGeom>
+        </p:spPr>
+      </p:pic>
+      <p:pic>
+        <p:nvPicPr>
+          <p:cNvPr id="9" name="Picture 8">
+            <a:extLst>
+              <a:ext uri="{FF2B5EF4-FFF2-40B4-BE49-F238E27FC236}">
+                <a16:creationId xmlns:a16="http://schemas.microsoft.com/office/drawing/2014/main" id="{4AC8258B-1D46-0F50-1912-145F15377D1F}"/>
+              </a:ext>
+            </a:extLst>
+          </p:cNvPr>
+          <p:cNvPicPr>
+            <a:picLocks noChangeAspect="1"/>
+          </p:cNvPicPr>
+          <p:nvPr/>
+        </p:nvPicPr>
+        <p:blipFill>
+          <a:blip r:embed="rId4"/>
+          <a:stretch>
+            <a:fillRect/>
+          </a:stretch>
+        </p:blipFill>
+        <p:spPr>
+          <a:xfrm>
+            <a:off x="5609500" y="2670211"/>
+            <a:ext cx="4496427" cy="3162741"/>
+          </a:xfrm>
+          <a:prstGeom prst="rect">
+            <a:avLst/>
+          </a:prstGeom>
+        </p:spPr>
+      </p:pic>
     </p:spTree>
     <p:extLst>
       <p:ext uri="{BB962C8B-B14F-4D97-AF65-F5344CB8AC3E}">
@@ -6738,7 +6734,12 @@
             <p:ph type="title"/>
           </p:nvPr>
         </p:nvSpPr>
-        <p:spPr/>
+        <p:spPr>
+          <a:xfrm>
+            <a:off x="838199" y="136525"/>
+            <a:ext cx="10515600" cy="1325563"/>
+          </a:xfrm>
+        </p:spPr>
         <p:txBody>
           <a:bodyPr/>
           <a:lstStyle/>
@@ -6782,10 +6783,10 @@
       </p:sp>
       <p:pic>
         <p:nvPicPr>
-          <p:cNvPr id="5" name="Picture 4">
-            <a:extLst>
-              <a:ext uri="{FF2B5EF4-FFF2-40B4-BE49-F238E27FC236}">
-                <a16:creationId xmlns:a16="http://schemas.microsoft.com/office/drawing/2014/main" id="{3B2E4247-2795-D02F-4CE9-42474E601411}"/>
+          <p:cNvPr id="8" name="Picture 7">
+            <a:extLst>
+              <a:ext uri="{FF2B5EF4-FFF2-40B4-BE49-F238E27FC236}">
+                <a16:creationId xmlns:a16="http://schemas.microsoft.com/office/drawing/2014/main" id="{D70C7736-0D14-8EFD-8EFA-14104FC34E05}"/>
               </a:ext>
             </a:extLst>
           </p:cNvPr>
@@ -6802,8 +6803,8 @@
         </p:blipFill>
         <p:spPr>
           <a:xfrm>
-            <a:off x="742203" y="1386731"/>
-            <a:ext cx="10707594" cy="5334744"/>
+            <a:off x="789834" y="1367678"/>
+            <a:ext cx="10612331" cy="5353797"/>
           </a:xfrm>
           <a:prstGeom prst="rect">
             <a:avLst/>
@@ -6909,7 +6910,7 @@
                   <a:schemeClr val="accent1"/>
                 </a:solidFill>
               </a:rPr>
-              <a:t>79.4%</a:t>
+              <a:t>79.8%</a:t>
             </a:r>
             <a:r>
               <a:rPr lang="en-US" dirty="0"/>
@@ -6928,7 +6929,7 @@
                   <a:schemeClr val="accent1"/>
                 </a:solidFill>
               </a:rPr>
-              <a:t>945K</a:t>
+              <a:t>952K</a:t>
             </a:r>
             <a:r>
               <a:rPr lang="en-US" dirty="0"/>
@@ -6968,10 +6969,10 @@
       </p:sp>
       <p:pic>
         <p:nvPicPr>
-          <p:cNvPr id="6" name="Picture 5">
-            <a:extLst>
-              <a:ext uri="{FF2B5EF4-FFF2-40B4-BE49-F238E27FC236}">
-                <a16:creationId xmlns:a16="http://schemas.microsoft.com/office/drawing/2014/main" id="{CDF46353-D5C7-5B64-D3B4-7682DAEDA658}"/>
+          <p:cNvPr id="9" name="Picture 8">
+            <a:extLst>
+              <a:ext uri="{FF2B5EF4-FFF2-40B4-BE49-F238E27FC236}">
+                <a16:creationId xmlns:a16="http://schemas.microsoft.com/office/drawing/2014/main" id="{D1DDABA6-E099-8189-9BCC-DFA6B924B357}"/>
               </a:ext>
             </a:extLst>
           </p:cNvPr>
@@ -6988,8 +6989,8 @@
         </p:blipFill>
         <p:spPr>
           <a:xfrm>
-            <a:off x="838200" y="3600355"/>
-            <a:ext cx="10488489" cy="1352739"/>
+            <a:off x="914400" y="3438197"/>
+            <a:ext cx="10363200" cy="1295400"/>
           </a:xfrm>
           <a:prstGeom prst="rect">
             <a:avLst/>
@@ -7074,7 +7075,7 @@
         <p:spPr/>
         <p:txBody>
           <a:bodyPr>
-            <a:normAutofit fontScale="92500" lnSpcReduction="10000"/>
+            <a:normAutofit/>
           </a:bodyPr>
           <a:lstStyle/>
           <a:p>
@@ -7097,14 +7098,14 @@
             <a:pPr lvl="1"/>
             <a:r>
               <a:rPr lang="en-US" dirty="0"/>
+              <a:t>Number of bathrooms</a:t>
+            </a:r>
+          </a:p>
+          <a:p>
+            <a:pPr lvl="1"/>
+            <a:r>
+              <a:rPr lang="en-US" dirty="0"/>
               <a:t>Number of nearby stations (within 1km)</a:t>
-            </a:r>
-          </a:p>
-          <a:p>
-            <a:pPr lvl="1"/>
-            <a:r>
-              <a:rPr lang="en-US" dirty="0"/>
-              <a:t>Number of bathrooms</a:t>
             </a:r>
           </a:p>
           <a:p>
@@ -7126,55 +7127,6 @@
             <a:r>
               <a:rPr lang="en-US" dirty="0"/>
               <a:t>Number of bedrooms</a:t>
-            </a:r>
-          </a:p>
-          <a:p>
-            <a:endParaRPr lang="en-US" dirty="0"/>
-          </a:p>
-          <a:p>
-            <a:pPr marL="0" indent="0">
-              <a:buNone/>
-            </a:pPr>
-            <a:r>
-              <a:rPr lang="en-US" dirty="0"/>
-              <a:t>Locating </a:t>
-            </a:r>
-            <a:r>
-              <a:rPr lang="en-US" dirty="0" err="1"/>
-              <a:t>neaby</a:t>
-            </a:r>
-            <a:r>
-              <a:rPr lang="en-US" dirty="0"/>
-              <a:t> these stations will significantly raise the price as well.</a:t>
-            </a:r>
-          </a:p>
-          <a:p>
-            <a:pPr lvl="1"/>
-            <a:r>
-              <a:rPr lang="en-US" dirty="0"/>
-              <a:t>BL11 Bang Sue MRT</a:t>
-            </a:r>
-          </a:p>
-          <a:p>
-            <a:pPr lvl="1"/>
-            <a:r>
-              <a:rPr lang="en-US" dirty="0"/>
-              <a:t>BL32 </a:t>
-            </a:r>
-            <a:r>
-              <a:rPr lang="en-US" dirty="0" err="1"/>
-              <a:t>Itsaraphap</a:t>
-            </a:r>
-            <a:r>
-              <a:rPr lang="en-US" dirty="0"/>
-              <a:t> MRT</a:t>
-            </a:r>
-          </a:p>
-          <a:p>
-            <a:pPr lvl="1"/>
-            <a:r>
-              <a:rPr lang="en-US" dirty="0"/>
-              <a:t>B9 Rama IX Bridge BRT</a:t>
             </a:r>
           </a:p>
         </p:txBody>
@@ -7222,7 +7174,7 @@
         </p:nvSpPr>
         <p:spPr>
           <a:xfrm rot="16200000">
-            <a:off x="8872018" y="3027636"/>
+            <a:off x="8872019" y="3321925"/>
             <a:ext cx="1385094" cy="606671"/>
           </a:xfrm>
           <a:prstGeom prst="rightArrow">
@@ -7281,7 +7233,7 @@
         </p:nvSpPr>
         <p:spPr>
           <a:xfrm rot="16200000">
-            <a:off x="8148119" y="3027635"/>
+            <a:off x="8148120" y="3321924"/>
             <a:ext cx="1385094" cy="606671"/>
           </a:xfrm>
           <a:prstGeom prst="rightArrow">
@@ -7340,7 +7292,7 @@
         </p:nvSpPr>
         <p:spPr>
           <a:xfrm>
-            <a:off x="9791700" y="2419350"/>
+            <a:off x="9791701" y="2713639"/>
             <a:ext cx="606672" cy="606672"/>
           </a:xfrm>
           <a:prstGeom prst="mathPlus">
@@ -7457,16 +7409,23 @@
             <p:ph idx="1"/>
           </p:nvPr>
         </p:nvSpPr>
-        <p:spPr/>
-        <p:txBody>
-          <a:bodyPr/>
+        <p:spPr>
+          <a:xfrm>
+            <a:off x="838200" y="1690688"/>
+            <a:ext cx="10515600" cy="4351338"/>
+          </a:xfrm>
+        </p:spPr>
+        <p:txBody>
+          <a:bodyPr>
+            <a:normAutofit/>
+          </a:bodyPr>
           <a:lstStyle/>
           <a:p>
             <a:pPr marL="0" indent="0" algn="ctr">
               <a:buNone/>
             </a:pPr>
             <a:r>
-              <a:rPr lang="en-US" dirty="0"/>
+              <a:rPr lang="en-US" sz="2400" dirty="0"/>
               <a:t>Top 10 district/subdistrict that will have</a:t>
             </a:r>
           </a:p>
@@ -7475,7 +7434,7 @@
               <a:buNone/>
             </a:pPr>
             <a:r>
-              <a:rPr lang="en-US" dirty="0"/>
+              <a:rPr lang="en-US" sz="2400" dirty="0"/>
               <a:t>higher housing price according to the model.</a:t>
             </a:r>
           </a:p>
@@ -7512,10 +7471,10 @@
       </p:sp>
       <p:pic>
         <p:nvPicPr>
-          <p:cNvPr id="6" name="Picture 5">
-            <a:extLst>
-              <a:ext uri="{FF2B5EF4-FFF2-40B4-BE49-F238E27FC236}">
-                <a16:creationId xmlns:a16="http://schemas.microsoft.com/office/drawing/2014/main" id="{49A24DA1-0F48-F3C2-A7D4-5111DC5363B1}"/>
+          <p:cNvPr id="11" name="Picture 10">
+            <a:extLst>
+              <a:ext uri="{FF2B5EF4-FFF2-40B4-BE49-F238E27FC236}">
+                <a16:creationId xmlns:a16="http://schemas.microsoft.com/office/drawing/2014/main" id="{1F533B49-341A-A6F0-4121-CD5515FC6E7F}"/>
               </a:ext>
             </a:extLst>
           </p:cNvPr>
@@ -7532,8 +7491,8 @@
         </p:blipFill>
         <p:spPr>
           <a:xfrm>
-            <a:off x="4800419" y="2958607"/>
-            <a:ext cx="2591162" cy="3534268"/>
+            <a:off x="4787869" y="2690168"/>
+            <a:ext cx="2616262" cy="3802707"/>
           </a:xfrm>
           <a:prstGeom prst="rect">
             <a:avLst/>
@@ -7723,10 +7682,10 @@
       </p:pic>
       <p:pic>
         <p:nvPicPr>
-          <p:cNvPr id="8" name="Picture 7">
-            <a:extLst>
-              <a:ext uri="{FF2B5EF4-FFF2-40B4-BE49-F238E27FC236}">
-                <a16:creationId xmlns:a16="http://schemas.microsoft.com/office/drawing/2014/main" id="{4325931C-1EC1-BA82-6862-8A37E7B93E63}"/>
+          <p:cNvPr id="9" name="Picture 8">
+            <a:extLst>
+              <a:ext uri="{FF2B5EF4-FFF2-40B4-BE49-F238E27FC236}">
+                <a16:creationId xmlns:a16="http://schemas.microsoft.com/office/drawing/2014/main" id="{25111AD2-701E-5530-985E-D60C043BF4D9}"/>
               </a:ext>
             </a:extLst>
           </p:cNvPr>
@@ -7743,38 +7702,8 @@
         </p:blipFill>
         <p:spPr>
           <a:xfrm>
-            <a:off x="838200" y="5246532"/>
-            <a:ext cx="10374173" cy="638264"/>
-          </a:xfrm>
-          <a:prstGeom prst="rect">
-            <a:avLst/>
-          </a:prstGeom>
-        </p:spPr>
-      </p:pic>
-      <p:pic>
-        <p:nvPicPr>
-          <p:cNvPr id="7" name="Picture 6">
-            <a:extLst>
-              <a:ext uri="{FF2B5EF4-FFF2-40B4-BE49-F238E27FC236}">
-                <a16:creationId xmlns:a16="http://schemas.microsoft.com/office/drawing/2014/main" id="{F30AFE4F-1505-11CE-9133-10CBFA509FB8}"/>
-              </a:ext>
-            </a:extLst>
-          </p:cNvPr>
-          <p:cNvPicPr>
-            <a:picLocks noChangeAspect="1"/>
-          </p:cNvPicPr>
-          <p:nvPr/>
-        </p:nvPicPr>
-        <p:blipFill>
-          <a:blip r:embed="rId4"/>
-          <a:stretch>
-            <a:fillRect/>
-          </a:stretch>
-        </p:blipFill>
-        <p:spPr>
-          <a:xfrm>
-            <a:off x="6215994" y="392867"/>
-            <a:ext cx="5477639" cy="5172797"/>
+            <a:off x="6025286" y="421446"/>
+            <a:ext cx="5439534" cy="5144218"/>
           </a:xfrm>
           <a:prstGeom prst="rect">
             <a:avLst/>
@@ -8074,95 +8003,12 @@
           <a:chExt cx="0" cy="0"/>
         </a:xfrm>
       </p:grpSpPr>
-      <p:sp>
-        <p:nvSpPr>
-          <p:cNvPr id="2" name="Title 1">
-            <a:extLst>
-              <a:ext uri="{FF2B5EF4-FFF2-40B4-BE49-F238E27FC236}">
-                <a16:creationId xmlns:a16="http://schemas.microsoft.com/office/drawing/2014/main" id="{85509D40-1E08-D5EF-A550-4F2859839975}"/>
-              </a:ext>
-            </a:extLst>
-          </p:cNvPr>
-          <p:cNvSpPr>
-            <a:spLocks noGrp="1"/>
-          </p:cNvSpPr>
-          <p:nvPr>
-            <p:ph type="title"/>
-          </p:nvPr>
-        </p:nvSpPr>
-        <p:spPr>
-          <a:xfrm>
-            <a:off x="839788" y="457199"/>
-            <a:ext cx="3932237" cy="5899149"/>
-          </a:xfrm>
-        </p:spPr>
-        <p:txBody>
-          <a:bodyPr anchor="ctr">
-            <a:normAutofit/>
-          </a:bodyPr>
-          <a:lstStyle/>
-          <a:p>
-            <a:pPr algn="ctr"/>
-            <a:r>
-              <a:rPr lang="en-US" b="1" dirty="0"/>
-              <a:t>The data:</a:t>
-            </a:r>
-            <a:br>
-              <a:rPr lang="en-US" b="1" dirty="0"/>
-            </a:br>
-            <a:br>
-              <a:rPr lang="en-US" b="1" dirty="0"/>
-            </a:br>
-            <a:r>
-              <a:rPr lang="en-US" sz="4000" b="1" dirty="0"/>
-              <a:t>Bangkok</a:t>
-            </a:r>
-            <a:br>
-              <a:rPr lang="en-US" sz="4000" b="1" dirty="0"/>
-            </a:br>
-            <a:r>
-              <a:rPr lang="en-US" sz="4000" b="1" dirty="0"/>
-              <a:t>Housing Price</a:t>
-            </a:r>
-            <a:endParaRPr lang="en-US" b="1" dirty="0"/>
-          </a:p>
-        </p:txBody>
-      </p:sp>
-      <p:sp>
-        <p:nvSpPr>
-          <p:cNvPr id="17" name="Slide Number Placeholder 16">
-            <a:extLst>
-              <a:ext uri="{FF2B5EF4-FFF2-40B4-BE49-F238E27FC236}">
-                <a16:creationId xmlns:a16="http://schemas.microsoft.com/office/drawing/2014/main" id="{1793876B-EEDF-C521-6907-7C11DC9CDAA5}"/>
-              </a:ext>
-            </a:extLst>
-          </p:cNvPr>
-          <p:cNvSpPr>
-            <a:spLocks noGrp="1"/>
-          </p:cNvSpPr>
-          <p:nvPr>
-            <p:ph type="sldNum" sz="quarter" idx="12"/>
-          </p:nvPr>
-        </p:nvSpPr>
-        <p:spPr/>
-        <p:txBody>
-          <a:bodyPr/>
-          <a:lstStyle/>
-          <a:p>
-            <a:fld id="{640C5978-D207-4356-A33B-DAFE34A7F8D2}" type="slidenum">
-              <a:rPr lang="en-US" smtClean="0"/>
-              <a:t>3</a:t>
-            </a:fld>
-            <a:endParaRPr lang="en-US" dirty="0"/>
-          </a:p>
-        </p:txBody>
-      </p:sp>
       <p:pic>
         <p:nvPicPr>
-          <p:cNvPr id="6" name="Picture 5">
-            <a:extLst>
-              <a:ext uri="{FF2B5EF4-FFF2-40B4-BE49-F238E27FC236}">
-                <a16:creationId xmlns:a16="http://schemas.microsoft.com/office/drawing/2014/main" id="{6AA823C4-D25D-6154-A6FF-92815A7F9380}"/>
+          <p:cNvPr id="5" name="Picture 4">
+            <a:extLst>
+              <a:ext uri="{FF2B5EF4-FFF2-40B4-BE49-F238E27FC236}">
+                <a16:creationId xmlns:a16="http://schemas.microsoft.com/office/drawing/2014/main" id="{72593F07-F998-0FB3-76F5-AF506E44F6A6}"/>
               </a:ext>
             </a:extLst>
           </p:cNvPr>
@@ -8179,8 +8025,8 @@
         </p:blipFill>
         <p:spPr>
           <a:xfrm>
-            <a:off x="5657804" y="194"/>
-            <a:ext cx="6534196" cy="6858000"/>
+            <a:off x="5717166" y="0"/>
+            <a:ext cx="6453617" cy="6858000"/>
           </a:xfrm>
           <a:prstGeom prst="rect">
             <a:avLst/>
@@ -8189,6 +8035,89 @@
       </p:pic>
       <p:sp>
         <p:nvSpPr>
+          <p:cNvPr id="2" name="Title 1">
+            <a:extLst>
+              <a:ext uri="{FF2B5EF4-FFF2-40B4-BE49-F238E27FC236}">
+                <a16:creationId xmlns:a16="http://schemas.microsoft.com/office/drawing/2014/main" id="{85509D40-1E08-D5EF-A550-4F2859839975}"/>
+              </a:ext>
+            </a:extLst>
+          </p:cNvPr>
+          <p:cNvSpPr>
+            <a:spLocks noGrp="1"/>
+          </p:cNvSpPr>
+          <p:nvPr>
+            <p:ph type="title"/>
+          </p:nvPr>
+        </p:nvSpPr>
+        <p:spPr>
+          <a:xfrm>
+            <a:off x="422077" y="131324"/>
+            <a:ext cx="4990751" cy="6595351"/>
+          </a:xfrm>
+        </p:spPr>
+        <p:txBody>
+          <a:bodyPr anchor="ctr">
+            <a:normAutofit/>
+          </a:bodyPr>
+          <a:lstStyle/>
+          <a:p>
+            <a:pPr algn="ctr"/>
+            <a:r>
+              <a:rPr lang="en-US" dirty="0"/>
+              <a:t>The data:</a:t>
+            </a:r>
+            <a:br>
+              <a:rPr lang="en-US" dirty="0"/>
+            </a:br>
+            <a:br>
+              <a:rPr lang="en-US" b="1" dirty="0"/>
+            </a:br>
+            <a:r>
+              <a:rPr lang="en-US" sz="4000" b="1" dirty="0"/>
+              <a:t>Bangkok</a:t>
+            </a:r>
+            <a:br>
+              <a:rPr lang="en-US" sz="4000" b="1" dirty="0"/>
+            </a:br>
+            <a:r>
+              <a:rPr lang="en-US" sz="4000" b="1" dirty="0"/>
+              <a:t>Housing Price</a:t>
+            </a:r>
+            <a:endParaRPr lang="en-US" b="1" dirty="0"/>
+          </a:p>
+        </p:txBody>
+      </p:sp>
+      <p:sp>
+        <p:nvSpPr>
+          <p:cNvPr id="17" name="Slide Number Placeholder 16">
+            <a:extLst>
+              <a:ext uri="{FF2B5EF4-FFF2-40B4-BE49-F238E27FC236}">
+                <a16:creationId xmlns:a16="http://schemas.microsoft.com/office/drawing/2014/main" id="{1793876B-EEDF-C521-6907-7C11DC9CDAA5}"/>
+              </a:ext>
+            </a:extLst>
+          </p:cNvPr>
+          <p:cNvSpPr>
+            <a:spLocks noGrp="1"/>
+          </p:cNvSpPr>
+          <p:nvPr>
+            <p:ph type="sldNum" sz="quarter" idx="12"/>
+          </p:nvPr>
+        </p:nvSpPr>
+        <p:spPr/>
+        <p:txBody>
+          <a:bodyPr/>
+          <a:lstStyle/>
+          <a:p>
+            <a:fld id="{640C5978-D207-4356-A33B-DAFE34A7F8D2}" type="slidenum">
+              <a:rPr lang="en-US" smtClean="0"/>
+              <a:t>3</a:t>
+            </a:fld>
+            <a:endParaRPr lang="en-US" dirty="0"/>
+          </a:p>
+        </p:txBody>
+      </p:sp>
+      <p:sp>
+        <p:nvSpPr>
           <p:cNvPr id="3" name="Rectangle 2">
             <a:extLst>
               <a:ext uri="{FF2B5EF4-FFF2-40B4-BE49-F238E27FC236}">
@@ -8201,7 +8130,7 @@
         </p:nvSpPr>
         <p:spPr>
           <a:xfrm>
-            <a:off x="5659692" y="6512767"/>
+            <a:off x="5764792" y="6512767"/>
             <a:ext cx="3284283" cy="326377"/>
           </a:xfrm>
           <a:prstGeom prst="rect">
@@ -8285,12 +8214,7 @@
             <p:ph type="title"/>
           </p:nvPr>
         </p:nvSpPr>
-        <p:spPr>
-          <a:xfrm>
-            <a:off x="838200" y="336550"/>
-            <a:ext cx="10515600" cy="1325563"/>
-          </a:xfrm>
-        </p:spPr>
+        <p:spPr/>
         <p:txBody>
           <a:bodyPr/>
           <a:lstStyle/>
@@ -8319,12 +8243,7 @@
             <p:ph sz="half" idx="2"/>
           </p:nvPr>
         </p:nvSpPr>
-        <p:spPr>
-          <a:xfrm>
-            <a:off x="838200" y="1825625"/>
-            <a:ext cx="4097694" cy="4351338"/>
-          </a:xfrm>
-        </p:spPr>
+        <p:spPr/>
         <p:txBody>
           <a:bodyPr>
             <a:normAutofit/>
@@ -8439,10 +8358,10 @@
       </p:sp>
       <p:pic>
         <p:nvPicPr>
-          <p:cNvPr id="8" name="Picture 7">
-            <a:extLst>
-              <a:ext uri="{FF2B5EF4-FFF2-40B4-BE49-F238E27FC236}">
-                <a16:creationId xmlns:a16="http://schemas.microsoft.com/office/drawing/2014/main" id="{EA1A8507-B9DC-8495-686B-D96C79AE7B8F}"/>
+          <p:cNvPr id="3" name="Picture 2">
+            <a:extLst>
+              <a:ext uri="{FF2B5EF4-FFF2-40B4-BE49-F238E27FC236}">
+                <a16:creationId xmlns:a16="http://schemas.microsoft.com/office/drawing/2014/main" id="{1800D27D-1547-F5C5-E202-65979C3B61C1}"/>
               </a:ext>
             </a:extLst>
           </p:cNvPr>
@@ -8459,14 +8378,285 @@
         </p:blipFill>
         <p:spPr>
           <a:xfrm>
-            <a:off x="5152116" y="1593057"/>
-            <a:ext cx="6392184" cy="4816474"/>
+            <a:off x="4077365" y="1408032"/>
+            <a:ext cx="6845511" cy="5186523"/>
           </a:xfrm>
           <a:prstGeom prst="rect">
             <a:avLst/>
           </a:prstGeom>
         </p:spPr>
       </p:pic>
+      <p:sp>
+        <p:nvSpPr>
+          <p:cNvPr id="7" name="Content Placeholder 16">
+            <a:extLst>
+              <a:ext uri="{FF2B5EF4-FFF2-40B4-BE49-F238E27FC236}">
+                <a16:creationId xmlns:a16="http://schemas.microsoft.com/office/drawing/2014/main" id="{1615D1EC-7FFD-5165-E1BC-6CA723000492}"/>
+              </a:ext>
+            </a:extLst>
+          </p:cNvPr>
+          <p:cNvSpPr txBox="1">
+            <a:spLocks/>
+          </p:cNvSpPr>
+          <p:nvPr/>
+        </p:nvSpPr>
+        <p:spPr>
+          <a:xfrm>
+            <a:off x="1053338" y="1825624"/>
+            <a:ext cx="2808890" cy="4351338"/>
+          </a:xfrm>
+          <a:prstGeom prst="rect">
+            <a:avLst/>
+          </a:prstGeom>
+        </p:spPr>
+        <p:txBody>
+          <a:bodyPr vert="horz" lIns="91440" tIns="45720" rIns="91440" bIns="45720" rtlCol="0">
+            <a:normAutofit/>
+          </a:bodyPr>
+          <a:lstStyle>
+            <a:lvl1pPr marL="228600" indent="-228600" algn="l" defTabSz="914400" rtl="0" eaLnBrk="1" latinLnBrk="0" hangingPunct="1">
+              <a:lnSpc>
+                <a:spcPct val="90000"/>
+              </a:lnSpc>
+              <a:spcBef>
+                <a:spcPts val="1000"/>
+              </a:spcBef>
+              <a:buFont typeface="Arial" panose="020B0604020202020204" pitchFamily="34" charset="0"/>
+              <a:buChar char="•"/>
+              <a:defRPr sz="2800" kern="1200">
+                <a:solidFill>
+                  <a:schemeClr val="tx1"/>
+                </a:solidFill>
+                <a:latin typeface="+mn-lt"/>
+                <a:ea typeface="+mn-ea"/>
+                <a:cs typeface="+mn-cs"/>
+              </a:defRPr>
+            </a:lvl1pPr>
+            <a:lvl2pPr marL="685800" indent="-228600" algn="l" defTabSz="914400" rtl="0" eaLnBrk="1" latinLnBrk="0" hangingPunct="1">
+              <a:lnSpc>
+                <a:spcPct val="90000"/>
+              </a:lnSpc>
+              <a:spcBef>
+                <a:spcPts val="500"/>
+              </a:spcBef>
+              <a:buFont typeface="Arial" panose="020B0604020202020204" pitchFamily="34" charset="0"/>
+              <a:buChar char="•"/>
+              <a:defRPr sz="2400" kern="1200">
+                <a:solidFill>
+                  <a:schemeClr val="tx1"/>
+                </a:solidFill>
+                <a:latin typeface="+mn-lt"/>
+                <a:ea typeface="+mn-ea"/>
+                <a:cs typeface="+mn-cs"/>
+              </a:defRPr>
+            </a:lvl2pPr>
+            <a:lvl3pPr marL="1143000" indent="-228600" algn="l" defTabSz="914400" rtl="0" eaLnBrk="1" latinLnBrk="0" hangingPunct="1">
+              <a:lnSpc>
+                <a:spcPct val="90000"/>
+              </a:lnSpc>
+              <a:spcBef>
+                <a:spcPts val="500"/>
+              </a:spcBef>
+              <a:buFont typeface="Arial" panose="020B0604020202020204" pitchFamily="34" charset="0"/>
+              <a:buChar char="•"/>
+              <a:defRPr sz="2000" kern="1200">
+                <a:solidFill>
+                  <a:schemeClr val="tx1"/>
+                </a:solidFill>
+                <a:latin typeface="+mn-lt"/>
+                <a:ea typeface="+mn-ea"/>
+                <a:cs typeface="+mn-cs"/>
+              </a:defRPr>
+            </a:lvl3pPr>
+            <a:lvl4pPr marL="1600200" indent="-228600" algn="l" defTabSz="914400" rtl="0" eaLnBrk="1" latinLnBrk="0" hangingPunct="1">
+              <a:lnSpc>
+                <a:spcPct val="90000"/>
+              </a:lnSpc>
+              <a:spcBef>
+                <a:spcPts val="500"/>
+              </a:spcBef>
+              <a:buFont typeface="Arial" panose="020B0604020202020204" pitchFamily="34" charset="0"/>
+              <a:buChar char="•"/>
+              <a:defRPr sz="1800" kern="1200">
+                <a:solidFill>
+                  <a:schemeClr val="tx1"/>
+                </a:solidFill>
+                <a:latin typeface="+mn-lt"/>
+                <a:ea typeface="+mn-ea"/>
+                <a:cs typeface="+mn-cs"/>
+              </a:defRPr>
+            </a:lvl4pPr>
+            <a:lvl5pPr marL="2057400" indent="-228600" algn="l" defTabSz="914400" rtl="0" eaLnBrk="1" latinLnBrk="0" hangingPunct="1">
+              <a:lnSpc>
+                <a:spcPct val="90000"/>
+              </a:lnSpc>
+              <a:spcBef>
+                <a:spcPts val="500"/>
+              </a:spcBef>
+              <a:buFont typeface="Arial" panose="020B0604020202020204" pitchFamily="34" charset="0"/>
+              <a:buChar char="•"/>
+              <a:defRPr sz="1800" kern="1200">
+                <a:solidFill>
+                  <a:schemeClr val="tx1"/>
+                </a:solidFill>
+                <a:latin typeface="+mn-lt"/>
+                <a:ea typeface="+mn-ea"/>
+                <a:cs typeface="+mn-cs"/>
+              </a:defRPr>
+            </a:lvl5pPr>
+            <a:lvl6pPr marL="2514600" indent="-228600" algn="l" defTabSz="914400" rtl="0" eaLnBrk="1" latinLnBrk="0" hangingPunct="1">
+              <a:lnSpc>
+                <a:spcPct val="90000"/>
+              </a:lnSpc>
+              <a:spcBef>
+                <a:spcPts val="500"/>
+              </a:spcBef>
+              <a:buFont typeface="Arial" panose="020B0604020202020204" pitchFamily="34" charset="0"/>
+              <a:buChar char="•"/>
+              <a:defRPr sz="1800" kern="1200">
+                <a:solidFill>
+                  <a:schemeClr val="tx1"/>
+                </a:solidFill>
+                <a:latin typeface="+mn-lt"/>
+                <a:ea typeface="+mn-ea"/>
+                <a:cs typeface="+mn-cs"/>
+              </a:defRPr>
+            </a:lvl6pPr>
+            <a:lvl7pPr marL="2971800" indent="-228600" algn="l" defTabSz="914400" rtl="0" eaLnBrk="1" latinLnBrk="0" hangingPunct="1">
+              <a:lnSpc>
+                <a:spcPct val="90000"/>
+              </a:lnSpc>
+              <a:spcBef>
+                <a:spcPts val="500"/>
+              </a:spcBef>
+              <a:buFont typeface="Arial" panose="020B0604020202020204" pitchFamily="34" charset="0"/>
+              <a:buChar char="•"/>
+              <a:defRPr sz="1800" kern="1200">
+                <a:solidFill>
+                  <a:schemeClr val="tx1"/>
+                </a:solidFill>
+                <a:latin typeface="+mn-lt"/>
+                <a:ea typeface="+mn-ea"/>
+                <a:cs typeface="+mn-cs"/>
+              </a:defRPr>
+            </a:lvl7pPr>
+            <a:lvl8pPr marL="3429000" indent="-228600" algn="l" defTabSz="914400" rtl="0" eaLnBrk="1" latinLnBrk="0" hangingPunct="1">
+              <a:lnSpc>
+                <a:spcPct val="90000"/>
+              </a:lnSpc>
+              <a:spcBef>
+                <a:spcPts val="500"/>
+              </a:spcBef>
+              <a:buFont typeface="Arial" panose="020B0604020202020204" pitchFamily="34" charset="0"/>
+              <a:buChar char="•"/>
+              <a:defRPr sz="1800" kern="1200">
+                <a:solidFill>
+                  <a:schemeClr val="tx1"/>
+                </a:solidFill>
+                <a:latin typeface="+mn-lt"/>
+                <a:ea typeface="+mn-ea"/>
+                <a:cs typeface="+mn-cs"/>
+              </a:defRPr>
+            </a:lvl8pPr>
+            <a:lvl9pPr marL="3886200" indent="-228600" algn="l" defTabSz="914400" rtl="0" eaLnBrk="1" latinLnBrk="0" hangingPunct="1">
+              <a:lnSpc>
+                <a:spcPct val="90000"/>
+              </a:lnSpc>
+              <a:spcBef>
+                <a:spcPts val="500"/>
+              </a:spcBef>
+              <a:buFont typeface="Arial" panose="020B0604020202020204" pitchFamily="34" charset="0"/>
+              <a:buChar char="•"/>
+              <a:defRPr sz="1800" kern="1200">
+                <a:solidFill>
+                  <a:schemeClr val="tx1"/>
+                </a:solidFill>
+                <a:latin typeface="+mn-lt"/>
+                <a:ea typeface="+mn-ea"/>
+                <a:cs typeface="+mn-cs"/>
+              </a:defRPr>
+            </a:lvl9pPr>
+          </a:lstStyle>
+          <a:p>
+            <a:pPr marL="0" indent="0">
+              <a:buFont typeface="Arial" panose="020B0604020202020204" pitchFamily="34" charset="0"/>
+              <a:buNone/>
+            </a:pPr>
+            <a:r>
+              <a:rPr lang="en-US" b="1">
+                <a:solidFill>
+                  <a:srgbClr val="C00000"/>
+                </a:solidFill>
+              </a:rPr>
+              <a:t>Useless</a:t>
+            </a:r>
+          </a:p>
+          <a:p>
+            <a:pPr lvl="1"/>
+            <a:r>
+              <a:rPr lang="en-US"/>
+              <a:t>Id</a:t>
+            </a:r>
+          </a:p>
+          <a:p>
+            <a:pPr lvl="1"/>
+            <a:r>
+              <a:rPr lang="en-US"/>
+              <a:t>Month built</a:t>
+            </a:r>
+          </a:p>
+          <a:p>
+            <a:pPr lvl="1"/>
+            <a:r>
+              <a:rPr lang="en-US"/>
+              <a:t>Address</a:t>
+            </a:r>
+          </a:p>
+          <a:p>
+            <a:pPr lvl="1"/>
+            <a:endParaRPr lang="en-US"/>
+          </a:p>
+          <a:p>
+            <a:pPr marL="0" indent="0">
+              <a:buFont typeface="Arial" panose="020B0604020202020204" pitchFamily="34" charset="0"/>
+              <a:buNone/>
+            </a:pPr>
+            <a:r>
+              <a:rPr lang="en-US" b="1">
+                <a:solidFill>
+                  <a:schemeClr val="accent1"/>
+                </a:solidFill>
+              </a:rPr>
+              <a:t>Redundant</a:t>
+            </a:r>
+          </a:p>
+          <a:p>
+            <a:pPr lvl="1"/>
+            <a:r>
+              <a:rPr lang="en-US"/>
+              <a:t>Province</a:t>
+            </a:r>
+          </a:p>
+          <a:p>
+            <a:pPr lvl="1"/>
+            <a:r>
+              <a:rPr lang="en-US"/>
+              <a:t>Latitude</a:t>
+            </a:r>
+          </a:p>
+          <a:p>
+            <a:pPr lvl="1"/>
+            <a:r>
+              <a:rPr lang="en-US"/>
+              <a:t>Longitude</a:t>
+            </a:r>
+          </a:p>
+          <a:p>
+            <a:pPr lvl="1"/>
+            <a:endParaRPr lang="en-US" dirty="0"/>
+          </a:p>
+        </p:txBody>
+      </p:sp>
     </p:spTree>
     <p:extLst>
       <p:ext uri="{BB962C8B-B14F-4D97-AF65-F5344CB8AC3E}">
@@ -8613,31 +8803,6 @@
           </p:sp>
         </mc:Fallback>
       </mc:AlternateContent>
-      <p:sp>
-        <p:nvSpPr>
-          <p:cNvPr id="3" name="Content Placeholder 2">
-            <a:extLst>
-              <a:ext uri="{FF2B5EF4-FFF2-40B4-BE49-F238E27FC236}">
-                <a16:creationId xmlns:a16="http://schemas.microsoft.com/office/drawing/2014/main" id="{6C36C541-CDCA-B93B-994C-89F8D18DDFC9}"/>
-              </a:ext>
-            </a:extLst>
-          </p:cNvPr>
-          <p:cNvSpPr>
-            <a:spLocks noGrp="1"/>
-          </p:cNvSpPr>
-          <p:nvPr>
-            <p:ph idx="1"/>
-          </p:nvPr>
-        </p:nvSpPr>
-        <p:spPr/>
-        <p:txBody>
-          <a:bodyPr/>
-          <a:lstStyle/>
-          <a:p>
-            <a:endParaRPr lang="en-US"/>
-          </a:p>
-        </p:txBody>
-      </p:sp>
       <p:sp>
         <p:nvSpPr>
           <p:cNvPr id="4" name="Slide Number Placeholder 3">

</xml_diff>

<commit_message>
update cross validation score and MSE
</commit_message>
<xml_diff>
--- a/presentation/Bangkok Housing Price Prediction for buyers and sellers.pptx
+++ b/presentation/Bangkok Housing Price Prediction for buyers and sellers.pptx
@@ -232,7 +232,7 @@
           <a:p>
             <a:fld id="{6A635924-7805-4987-B004-633AF8543327}" type="datetimeFigureOut">
               <a:rPr lang="en-US" smtClean="0"/>
-              <a:t>29-Oct-23</a:t>
+              <a:t>30-Oct-23</a:t>
             </a:fld>
             <a:endParaRPr lang="en-US"/>
           </a:p>
@@ -410,7 +410,7 @@
           <a:p>
             <a:fld id="{4792800D-0FCF-451F-A6C3-59608CB4A1C9}" type="datetimeFigureOut">
               <a:rPr lang="en-US" smtClean="0"/>
-              <a:t>29-Oct-23</a:t>
+              <a:t>30-Oct-23</a:t>
             </a:fld>
             <a:endParaRPr lang="en-US"/>
           </a:p>
@@ -1616,7 +1616,7 @@
           <a:p>
             <a:fld id="{EADCF2BD-E462-4867-B7A9-6BCBFFBCA5D0}" type="datetime1">
               <a:rPr lang="en-US" smtClean="0"/>
-              <a:t>29-Oct-23</a:t>
+              <a:t>30-Oct-23</a:t>
             </a:fld>
             <a:endParaRPr lang="en-US"/>
           </a:p>
@@ -1819,7 +1819,7 @@
           <a:p>
             <a:fld id="{6D6752B0-A24A-4FA4-B387-B73DE53F3B4D}" type="datetime1">
               <a:rPr lang="en-US" smtClean="0"/>
-              <a:t>29-Oct-23</a:t>
+              <a:t>30-Oct-23</a:t>
             </a:fld>
             <a:endParaRPr lang="en-US"/>
           </a:p>
@@ -2032,7 +2032,7 @@
           <a:p>
             <a:fld id="{83889BD8-AEC5-4257-B2A9-6CB4E2FAB22D}" type="datetime1">
               <a:rPr lang="en-US" smtClean="0"/>
-              <a:t>29-Oct-23</a:t>
+              <a:t>30-Oct-23</a:t>
             </a:fld>
             <a:endParaRPr lang="en-US"/>
           </a:p>
@@ -2235,7 +2235,7 @@
           <a:p>
             <a:fld id="{18207518-2712-4D1B-9D80-BD1805B38EC4}" type="datetime1">
               <a:rPr lang="en-US" smtClean="0"/>
-              <a:t>29-Oct-23</a:t>
+              <a:t>30-Oct-23</a:t>
             </a:fld>
             <a:endParaRPr lang="en-US"/>
           </a:p>
@@ -2515,7 +2515,7 @@
           <a:p>
             <a:fld id="{D077CE9B-92D1-4044-8C18-EDFC53ACA153}" type="datetime1">
               <a:rPr lang="en-US" smtClean="0"/>
-              <a:t>29-Oct-23</a:t>
+              <a:t>30-Oct-23</a:t>
             </a:fld>
             <a:endParaRPr lang="en-US"/>
           </a:p>
@@ -2785,7 +2785,7 @@
           <a:p>
             <a:fld id="{8160BC85-221A-4580-AA17-0112E45DBFF0}" type="datetime1">
               <a:rPr lang="en-US" smtClean="0"/>
-              <a:t>29-Oct-23</a:t>
+              <a:t>30-Oct-23</a:t>
             </a:fld>
             <a:endParaRPr lang="en-US"/>
           </a:p>
@@ -3202,7 +3202,7 @@
           <a:p>
             <a:fld id="{10574C72-8AAC-417E-8B40-E1A3D374F20E}" type="datetime1">
               <a:rPr lang="en-US" smtClean="0"/>
-              <a:t>29-Oct-23</a:t>
+              <a:t>30-Oct-23</a:t>
             </a:fld>
             <a:endParaRPr lang="en-US"/>
           </a:p>
@@ -3348,7 +3348,7 @@
           <a:p>
             <a:fld id="{0645CC9E-6DFD-4F28-A9F1-DD672E9008C7}" type="datetime1">
               <a:rPr lang="en-US" smtClean="0"/>
-              <a:t>29-Oct-23</a:t>
+              <a:t>30-Oct-23</a:t>
             </a:fld>
             <a:endParaRPr lang="en-US"/>
           </a:p>
@@ -3466,7 +3466,7 @@
           <a:p>
             <a:fld id="{70E5F7E7-A7A4-415B-A737-DE8F624FEB14}" type="datetime1">
               <a:rPr lang="en-US" smtClean="0"/>
-              <a:t>29-Oct-23</a:t>
+              <a:t>30-Oct-23</a:t>
             </a:fld>
             <a:endParaRPr lang="en-US"/>
           </a:p>
@@ -3782,7 +3782,7 @@
           <a:p>
             <a:fld id="{35912435-556C-4370-B5F7-7A4F23D5F0C2}" type="datetime1">
               <a:rPr lang="en-US" smtClean="0"/>
-              <a:t>29-Oct-23</a:t>
+              <a:t>30-Oct-23</a:t>
             </a:fld>
             <a:endParaRPr lang="en-US"/>
           </a:p>
@@ -4075,7 +4075,7 @@
           <a:p>
             <a:fld id="{A404E8A3-1360-47C4-865E-400D68738A12}" type="datetime1">
               <a:rPr lang="en-US" smtClean="0"/>
-              <a:t>29-Oct-23</a:t>
+              <a:t>30-Oct-23</a:t>
             </a:fld>
             <a:endParaRPr lang="en-US"/>
           </a:p>
@@ -4321,7 +4321,7 @@
           <a:p>
             <a:fld id="{026D7BEE-48F2-4121-9F62-396770CE3475}" type="datetime1">
               <a:rPr lang="en-US" smtClean="0"/>
-              <a:t>29-Oct-23</a:t>
+              <a:t>30-Oct-23</a:t>
             </a:fld>
             <a:endParaRPr lang="en-US"/>
           </a:p>
@@ -6929,7 +6929,7 @@
                   <a:schemeClr val="accent1"/>
                 </a:solidFill>
               </a:rPr>
-              <a:t>952K</a:t>
+              <a:t>971K</a:t>
             </a:r>
             <a:r>
               <a:rPr lang="en-US" dirty="0"/>

</xml_diff>

<commit_message>
update y vs y pred. chart
</commit_message>
<xml_diff>
--- a/presentation/Bangkok Housing Price Prediction for buyers and sellers.pptx
+++ b/presentation/Bangkok Housing Price Prediction for buyers and sellers.pptx
@@ -6933,7 +6933,16 @@
             </a:r>
             <a:r>
               <a:rPr lang="en-US" dirty="0"/>
-              <a:t> THB approximately</a:t>
+              <a:t> THB</a:t>
+            </a:r>
+          </a:p>
+          <a:p>
+            <a:pPr marL="457200" lvl="1" indent="0">
+              <a:buNone/>
+            </a:pPr>
+            <a:r>
+              <a:rPr lang="en-US" dirty="0"/>
+              <a:t>approximately</a:t>
             </a:r>
           </a:p>
         </p:txBody>
@@ -6989,8 +6998,38 @@
         </p:blipFill>
         <p:spPr>
           <a:xfrm>
-            <a:off x="914400" y="3438197"/>
+            <a:off x="838200" y="5197475"/>
             <a:ext cx="10363200" cy="1295400"/>
+          </a:xfrm>
+          <a:prstGeom prst="rect">
+            <a:avLst/>
+          </a:prstGeom>
+        </p:spPr>
+      </p:pic>
+      <p:pic>
+        <p:nvPicPr>
+          <p:cNvPr id="6" name="Picture 5">
+            <a:extLst>
+              <a:ext uri="{FF2B5EF4-FFF2-40B4-BE49-F238E27FC236}">
+                <a16:creationId xmlns:a16="http://schemas.microsoft.com/office/drawing/2014/main" id="{996AD32E-3E36-FD5D-8F80-F227852DE37C}"/>
+              </a:ext>
+            </a:extLst>
+          </p:cNvPr>
+          <p:cNvPicPr>
+            <a:picLocks noChangeAspect="1"/>
+          </p:cNvPicPr>
+          <p:nvPr/>
+        </p:nvPicPr>
+        <p:blipFill>
+          <a:blip r:embed="rId3"/>
+          <a:stretch>
+            <a:fillRect/>
+          </a:stretch>
+        </p:blipFill>
+        <p:spPr>
+          <a:xfrm>
+            <a:off x="6019800" y="681037"/>
+            <a:ext cx="5400675" cy="4267200"/>
           </a:xfrm>
           <a:prstGeom prst="rect">
             <a:avLst/>

</xml_diff>

<commit_message>
update final presentation and code
</commit_message>
<xml_diff>
--- a/presentation/Bangkok Housing Price Prediction for buyers and sellers.pptx
+++ b/presentation/Bangkok Housing Price Prediction for buyers and sellers.pptx
@@ -5,10 +5,10 @@
     <p:sldMasterId id="2147483648" r:id="rId1"/>
   </p:sldMasterIdLst>
   <p:notesMasterIdLst>
-    <p:notesMasterId r:id="rId20"/>
+    <p:notesMasterId r:id="rId21"/>
   </p:notesMasterIdLst>
   <p:handoutMasterIdLst>
-    <p:handoutMasterId r:id="rId21"/>
+    <p:handoutMasterId r:id="rId22"/>
   </p:handoutMasterIdLst>
   <p:sldIdLst>
     <p:sldId id="256" r:id="rId2"/>
@@ -25,10 +25,11 @@
     <p:sldId id="262" r:id="rId13"/>
     <p:sldId id="276" r:id="rId14"/>
     <p:sldId id="264" r:id="rId15"/>
-    <p:sldId id="265" r:id="rId16"/>
-    <p:sldId id="266" r:id="rId17"/>
-    <p:sldId id="267" r:id="rId18"/>
-    <p:sldId id="275" r:id="rId19"/>
+    <p:sldId id="277" r:id="rId16"/>
+    <p:sldId id="265" r:id="rId17"/>
+    <p:sldId id="266" r:id="rId18"/>
+    <p:sldId id="267" r:id="rId19"/>
+    <p:sldId id="275" r:id="rId20"/>
   </p:sldIdLst>
   <p:sldSz cx="12192000" cy="6858000"/>
   <p:notesSz cx="6858000" cy="9144000"/>
@@ -897,6 +898,143 @@
 </p:notes>
 </file>
 
+<file path=ppt/notesSlides/notesSlide12.xml><?xml version="1.0" encoding="utf-8"?>
+<p:notes xmlns:a="http://schemas.openxmlformats.org/drawingml/2006/main" xmlns:r="http://schemas.openxmlformats.org/officeDocument/2006/relationships" xmlns:p="http://schemas.openxmlformats.org/presentationml/2006/main">
+  <p:cSld>
+    <p:spTree>
+      <p:nvGrpSpPr>
+        <p:cNvPr id="1" name=""/>
+        <p:cNvGrpSpPr/>
+        <p:nvPr/>
+      </p:nvGrpSpPr>
+      <p:grpSpPr>
+        <a:xfrm>
+          <a:off x="0" y="0"/>
+          <a:ext cx="0" cy="0"/>
+          <a:chOff x="0" y="0"/>
+          <a:chExt cx="0" cy="0"/>
+        </a:xfrm>
+      </p:grpSpPr>
+      <p:sp>
+        <p:nvSpPr>
+          <p:cNvPr id="2" name="Slide Image Placeholder 1"/>
+          <p:cNvSpPr>
+            <a:spLocks noGrp="1" noRot="1" noChangeAspect="1"/>
+          </p:cNvSpPr>
+          <p:nvPr>
+            <p:ph type="sldImg"/>
+          </p:nvPr>
+        </p:nvSpPr>
+        <p:spPr/>
+      </p:sp>
+      <p:sp>
+        <p:nvSpPr>
+          <p:cNvPr id="3" name="Notes Placeholder 2"/>
+          <p:cNvSpPr>
+            <a:spLocks noGrp="1"/>
+          </p:cNvSpPr>
+          <p:nvPr>
+            <p:ph type="body" idx="1"/>
+          </p:nvPr>
+        </p:nvSpPr>
+        <p:spPr/>
+        <p:txBody>
+          <a:bodyPr/>
+          <a:lstStyle/>
+          <a:p>
+            <a:r>
+              <a:rPr lang="en-US" dirty="0"/>
+              <a:t>Experimenting with many models, comparing the score</a:t>
+            </a:r>
+          </a:p>
+          <a:p>
+            <a:endParaRPr lang="en-US" dirty="0"/>
+          </a:p>
+          <a:p>
+            <a:r>
+              <a:rPr lang="en-US" dirty="0"/>
+              <a:t>Also run some train/test split</a:t>
+            </a:r>
+          </a:p>
+        </p:txBody>
+      </p:sp>
+    </p:spTree>
+    <p:extLst>
+      <p:ext uri="{BB962C8B-B14F-4D97-AF65-F5344CB8AC3E}">
+        <p14:creationId xmlns:p14="http://schemas.microsoft.com/office/powerpoint/2010/main" val="4042697156"/>
+      </p:ext>
+    </p:extLst>
+  </p:cSld>
+  <p:clrMapOvr>
+    <a:masterClrMapping/>
+  </p:clrMapOvr>
+</p:notes>
+</file>
+
+<file path=ppt/notesSlides/notesSlide13.xml><?xml version="1.0" encoding="utf-8"?>
+<p:notes xmlns:a="http://schemas.openxmlformats.org/drawingml/2006/main" xmlns:r="http://schemas.openxmlformats.org/officeDocument/2006/relationships" xmlns:p="http://schemas.openxmlformats.org/presentationml/2006/main">
+  <p:cSld>
+    <p:spTree>
+      <p:nvGrpSpPr>
+        <p:cNvPr id="1" name=""/>
+        <p:cNvGrpSpPr/>
+        <p:nvPr/>
+      </p:nvGrpSpPr>
+      <p:grpSpPr>
+        <a:xfrm>
+          <a:off x="0" y="0"/>
+          <a:ext cx="0" cy="0"/>
+          <a:chOff x="0" y="0"/>
+          <a:chExt cx="0" cy="0"/>
+        </a:xfrm>
+      </p:grpSpPr>
+      <p:sp>
+        <p:nvSpPr>
+          <p:cNvPr id="2" name="Slide Image Placeholder 1"/>
+          <p:cNvSpPr>
+            <a:spLocks noGrp="1" noRot="1" noChangeAspect="1"/>
+          </p:cNvSpPr>
+          <p:nvPr>
+            <p:ph type="sldImg"/>
+          </p:nvPr>
+        </p:nvSpPr>
+        <p:spPr/>
+      </p:sp>
+      <p:sp>
+        <p:nvSpPr>
+          <p:cNvPr id="3" name="Notes Placeholder 2"/>
+          <p:cNvSpPr>
+            <a:spLocks noGrp="1"/>
+          </p:cNvSpPr>
+          <p:nvPr>
+            <p:ph type="body" idx="1"/>
+          </p:nvPr>
+        </p:nvSpPr>
+        <p:spPr/>
+        <p:txBody>
+          <a:bodyPr/>
+          <a:lstStyle/>
+          <a:p>
+            <a:r>
+              <a:rPr lang="en-US" dirty="0"/>
+              <a:t>From the limitation of given data</a:t>
+            </a:r>
+          </a:p>
+        </p:txBody>
+      </p:sp>
+    </p:spTree>
+    <p:extLst>
+      <p:ext uri="{BB962C8B-B14F-4D97-AF65-F5344CB8AC3E}">
+        <p14:creationId xmlns:p14="http://schemas.microsoft.com/office/powerpoint/2010/main" val="4197863016"/>
+      </p:ext>
+    </p:extLst>
+  </p:cSld>
+  <p:clrMapOvr>
+    <a:masterClrMapping/>
+  </p:clrMapOvr>
+</p:notes>
+</file>
+
 <file path=ppt/notesSlides/notesSlide2.xml><?xml version="1.0" encoding="utf-8"?>
 <p:notes xmlns:a="http://schemas.openxmlformats.org/drawingml/2006/main" xmlns:r="http://schemas.openxmlformats.org/officeDocument/2006/relationships" xmlns:p="http://schemas.openxmlformats.org/presentationml/2006/main">
   <p:cSld>
@@ -1033,6 +1171,49 @@
             </a:pPr>
             <a:r>
               <a:rPr lang="en-US" dirty="0"/>
+              <a:t>After exploring the data, relationship is not that strong, so first try to pick features from basic knowledge</a:t>
+            </a:r>
+          </a:p>
+          <a:p>
+            <a:pPr marL="0" marR="0" lvl="0" indent="0" algn="l" defTabSz="914400" rtl="0" eaLnBrk="1" fontAlgn="auto" latinLnBrk="0" hangingPunct="1">
+              <a:lnSpc>
+                <a:spcPct val="100000"/>
+              </a:lnSpc>
+              <a:spcBef>
+                <a:spcPts val="0"/>
+              </a:spcBef>
+              <a:spcAft>
+                <a:spcPts val="0"/>
+              </a:spcAft>
+              <a:buClrTx/>
+              <a:buSzTx/>
+              <a:buFontTx/>
+              <a:buNone/>
+              <a:tabLst/>
+              <a:defRPr/>
+            </a:pPr>
+            <a:endParaRPr lang="en-US" dirty="0"/>
+          </a:p>
+          <a:p>
+            <a:pPr marL="0" marR="0" lvl="0" indent="0" algn="l" defTabSz="914400" rtl="0" eaLnBrk="1" fontAlgn="auto" latinLnBrk="0" hangingPunct="1">
+              <a:lnSpc>
+                <a:spcPct val="100000"/>
+              </a:lnSpc>
+              <a:spcBef>
+                <a:spcPts val="0"/>
+              </a:spcBef>
+              <a:spcAft>
+                <a:spcPts val="0"/>
+              </a:spcAft>
+              <a:buClrTx/>
+              <a:buSzTx/>
+              <a:buFontTx/>
+              <a:buNone/>
+              <a:tabLst/>
+              <a:defRPr/>
+            </a:pPr>
+            <a:r>
+              <a:rPr lang="en-US" dirty="0"/>
               <a:t>From this point, if your aren’t into technical, you can just ignore and wait for the result</a:t>
             </a:r>
           </a:p>
@@ -1096,6 +1277,34 @@
           <a:lstStyle/>
           <a:p>
             <a:r>
+              <a:rPr lang="en-US" b="0" dirty="0">
+                <a:solidFill>
+                  <a:srgbClr val="CCCCCC"/>
+                </a:solidFill>
+                <a:effectLst/>
+                <a:latin typeface="Consolas" panose="020B0609020204030204" pitchFamily="49" charset="0"/>
+              </a:rPr>
+              <a:t>As there is a lot of missing data, various techniques is used to ensure that model training data is enough for better prediction accuracy,</a:t>
+            </a:r>
+          </a:p>
+          <a:p>
+            <a:r>
+              <a:rPr lang="en-US" b="0" dirty="0">
+                <a:solidFill>
+                  <a:srgbClr val="CCCCCC"/>
+                </a:solidFill>
+                <a:effectLst/>
+                <a:latin typeface="Consolas" panose="020B0609020204030204" pitchFamily="49" charset="0"/>
+              </a:rPr>
+              <a:t>along with some transformations on the original data.</a:t>
+            </a:r>
+            <a:endParaRPr lang="en-US" dirty="0"/>
+          </a:p>
+          <a:p>
+            <a:endParaRPr lang="en-US" dirty="0"/>
+          </a:p>
+          <a:p>
+            <a:r>
               <a:rPr lang="en-US" dirty="0"/>
               <a:t>Some column with fewer missing value, those value can be removed</a:t>
             </a:r>
@@ -1241,6 +1450,15 @@
           <a:p>
             <a:r>
               <a:rPr lang="en-US" dirty="0"/>
+              <a:t>Land area missing a lot for Condo (property type), but the mean-imputed product the better result</a:t>
+            </a:r>
+          </a:p>
+          <a:p>
+            <a:endParaRPr lang="en-US" dirty="0"/>
+          </a:p>
+          <a:p>
+            <a:r>
+              <a:rPr lang="en-US" dirty="0"/>
               <a:t>Mean-imputed -&gt; replace with its average value</a:t>
             </a:r>
           </a:p>
@@ -1392,6 +1610,22 @@
               <a:rPr lang="en-US" dirty="0"/>
               <a:t>Blue need to use custom transformation, as the missing value means there is no nearby station which can be possible</a:t>
             </a:r>
+          </a:p>
+          <a:p>
+            <a:endParaRPr lang="en-US" dirty="0"/>
+          </a:p>
+          <a:p>
+            <a:r>
+              <a:rPr lang="en-US" b="0" i="0" dirty="0">
+                <a:solidFill>
+                  <a:srgbClr val="CCCCCC"/>
+                </a:solidFill>
+                <a:effectLst/>
+                <a:latin typeface="Consolas" panose="020B0609020204030204" pitchFamily="49" charset="0"/>
+              </a:rPr>
+              <a:t>14271 -&gt; 13725 (96.17%)</a:t>
+            </a:r>
+            <a:endParaRPr lang="en-US" dirty="0"/>
           </a:p>
         </p:txBody>
       </p:sp>
@@ -6048,6 +6282,47 @@
           </a:p>
         </p:txBody>
       </p:sp>
+      <p:sp>
+        <p:nvSpPr>
+          <p:cNvPr id="11" name="TextBox 10">
+            <a:extLst>
+              <a:ext uri="{FF2B5EF4-FFF2-40B4-BE49-F238E27FC236}">
+                <a16:creationId xmlns:a16="http://schemas.microsoft.com/office/drawing/2014/main" id="{D1BE1569-26F6-9B32-F3A0-41E9836A5715}"/>
+              </a:ext>
+            </a:extLst>
+          </p:cNvPr>
+          <p:cNvSpPr txBox="1"/>
+          <p:nvPr/>
+        </p:nvSpPr>
+        <p:spPr>
+          <a:xfrm>
+            <a:off x="10470182" y="5493212"/>
+            <a:ext cx="1721818" cy="646331"/>
+          </a:xfrm>
+          <a:prstGeom prst="rect">
+            <a:avLst/>
+          </a:prstGeom>
+          <a:noFill/>
+        </p:spPr>
+        <p:txBody>
+          <a:bodyPr wrap="none" rtlCol="0">
+            <a:spAutoFit/>
+          </a:bodyPr>
+          <a:lstStyle/>
+          <a:p>
+            <a:r>
+              <a:rPr lang="en-US" dirty="0"/>
+              <a:t>96.17% of</a:t>
+            </a:r>
+          </a:p>
+          <a:p>
+            <a:r>
+              <a:rPr lang="en-US" dirty="0"/>
+              <a:t>the original data</a:t>
+            </a:r>
+          </a:p>
+        </p:txBody>
+      </p:sp>
     </p:spTree>
     <p:extLst>
       <p:ext uri="{BB962C8B-B14F-4D97-AF65-F5344CB8AC3E}">
@@ -6811,6 +7086,41 @@
           </a:prstGeom>
         </p:spPr>
       </p:pic>
+      <p:sp>
+        <p:nvSpPr>
+          <p:cNvPr id="3" name="TextBox 2">
+            <a:extLst>
+              <a:ext uri="{FF2B5EF4-FFF2-40B4-BE49-F238E27FC236}">
+                <a16:creationId xmlns:a16="http://schemas.microsoft.com/office/drawing/2014/main" id="{D466759D-5A50-A0F4-792C-FA9ADEAC70AB}"/>
+              </a:ext>
+            </a:extLst>
+          </p:cNvPr>
+          <p:cNvSpPr txBox="1"/>
+          <p:nvPr/>
+        </p:nvSpPr>
+        <p:spPr>
+          <a:xfrm>
+            <a:off x="9077791" y="1277422"/>
+            <a:ext cx="2276008" cy="369332"/>
+          </a:xfrm>
+          <a:prstGeom prst="rect">
+            <a:avLst/>
+          </a:prstGeom>
+          <a:noFill/>
+        </p:spPr>
+        <p:txBody>
+          <a:bodyPr wrap="none" rtlCol="0">
+            <a:spAutoFit/>
+          </a:bodyPr>
+          <a:lstStyle/>
+          <a:p>
+            <a:r>
+              <a:rPr lang="en-US" dirty="0"/>
+              <a:t>* Total of 438 features</a:t>
+            </a:r>
+          </a:p>
+        </p:txBody>
+      </p:sp>
     </p:spTree>
     <p:extLst>
       <p:ext uri="{BB962C8B-B14F-4D97-AF65-F5344CB8AC3E}">
@@ -6846,7 +7156,7 @@
           <p:cNvPr id="2" name="Title 1">
             <a:extLst>
               <a:ext uri="{FF2B5EF4-FFF2-40B4-BE49-F238E27FC236}">
-                <a16:creationId xmlns:a16="http://schemas.microsoft.com/office/drawing/2014/main" id="{FB8A6BE0-E966-93AD-F411-DC44B85C3646}"/>
+                <a16:creationId xmlns:a16="http://schemas.microsoft.com/office/drawing/2014/main" id="{F6DD30B6-D393-4272-A98F-D6F3C1309264}"/>
               </a:ext>
             </a:extLst>
           </p:cNvPr>
@@ -6864,7 +7174,7 @@
           <a:p>
             <a:r>
               <a:rPr lang="en-US" b="1" dirty="0"/>
-              <a:t>Result</a:t>
+              <a:t>Model Validation and Selection</a:t>
             </a:r>
           </a:p>
         </p:txBody>
@@ -6874,7 +7184,7 @@
           <p:cNvPr id="3" name="Content Placeholder 2">
             <a:extLst>
               <a:ext uri="{FF2B5EF4-FFF2-40B4-BE49-F238E27FC236}">
-                <a16:creationId xmlns:a16="http://schemas.microsoft.com/office/drawing/2014/main" id="{C6491CDD-2DED-489B-8A10-151C6C020DC1}"/>
+                <a16:creationId xmlns:a16="http://schemas.microsoft.com/office/drawing/2014/main" id="{AE7D49DF-CE4E-5417-DAC4-304E25C61BA8}"/>
               </a:ext>
             </a:extLst>
           </p:cNvPr>
@@ -6890,60 +7200,7 @@
           <a:bodyPr/>
           <a:lstStyle/>
           <a:p>
-            <a:pPr marL="0" indent="0">
-              <a:buNone/>
-            </a:pPr>
-            <a:r>
-              <a:rPr lang="en-US" dirty="0"/>
-              <a:t>Prediction model that</a:t>
-            </a:r>
-          </a:p>
-          <a:p>
-            <a:pPr lvl="1"/>
-            <a:r>
-              <a:rPr lang="en-US" dirty="0"/>
-              <a:t>Can explain </a:t>
-            </a:r>
-            <a:r>
-              <a:rPr lang="en-US" b="1" dirty="0">
-                <a:solidFill>
-                  <a:schemeClr val="accent1"/>
-                </a:solidFill>
-              </a:rPr>
-              <a:t>79.8%</a:t>
-            </a:r>
-            <a:r>
-              <a:rPr lang="en-US" dirty="0"/>
-              <a:t> of data </a:t>
-            </a:r>
-          </a:p>
-          <a:p>
-            <a:pPr lvl="1"/>
-            <a:r>
-              <a:rPr lang="en-US" dirty="0"/>
-              <a:t>The average error of </a:t>
-            </a:r>
-            <a:r>
-              <a:rPr lang="en-US" b="1" dirty="0">
-                <a:solidFill>
-                  <a:schemeClr val="accent1"/>
-                </a:solidFill>
-              </a:rPr>
-              <a:t>971K</a:t>
-            </a:r>
-            <a:r>
-              <a:rPr lang="en-US" dirty="0"/>
-              <a:t> THB</a:t>
-            </a:r>
-          </a:p>
-          <a:p>
-            <a:pPr marL="457200" lvl="1" indent="0">
-              <a:buNone/>
-            </a:pPr>
-            <a:r>
-              <a:rPr lang="en-US" dirty="0"/>
-              <a:t>approximately</a:t>
-            </a:r>
+            <a:endParaRPr lang="en-US" dirty="0"/>
           </a:p>
         </p:txBody>
       </p:sp>
@@ -6952,7 +7209,7 @@
           <p:cNvPr id="4" name="Slide Number Placeholder 3">
             <a:extLst>
               <a:ext uri="{FF2B5EF4-FFF2-40B4-BE49-F238E27FC236}">
-                <a16:creationId xmlns:a16="http://schemas.microsoft.com/office/drawing/2014/main" id="{52229B81-D7A2-29B1-7673-E477ABEC2B38}"/>
+                <a16:creationId xmlns:a16="http://schemas.microsoft.com/office/drawing/2014/main" id="{59982224-AD8F-02C8-75A3-1ACB1C94E6C5}"/>
               </a:ext>
             </a:extLst>
           </p:cNvPr>
@@ -6978,40 +7235,10 @@
       </p:sp>
       <p:pic>
         <p:nvPicPr>
-          <p:cNvPr id="9" name="Picture 8">
-            <a:extLst>
-              <a:ext uri="{FF2B5EF4-FFF2-40B4-BE49-F238E27FC236}">
-                <a16:creationId xmlns:a16="http://schemas.microsoft.com/office/drawing/2014/main" id="{D1DDABA6-E099-8189-9BCC-DFA6B924B357}"/>
-              </a:ext>
-            </a:extLst>
-          </p:cNvPr>
-          <p:cNvPicPr>
-            <a:picLocks noChangeAspect="1"/>
-          </p:cNvPicPr>
-          <p:nvPr/>
-        </p:nvPicPr>
-        <p:blipFill>
-          <a:blip r:embed="rId2"/>
-          <a:stretch>
-            <a:fillRect/>
-          </a:stretch>
-        </p:blipFill>
-        <p:spPr>
-          <a:xfrm>
-            <a:off x="838200" y="5197475"/>
-            <a:ext cx="10363200" cy="1295400"/>
-          </a:xfrm>
-          <a:prstGeom prst="rect">
-            <a:avLst/>
-          </a:prstGeom>
-        </p:spPr>
-      </p:pic>
-      <p:pic>
-        <p:nvPicPr>
-          <p:cNvPr id="6" name="Picture 5">
-            <a:extLst>
-              <a:ext uri="{FF2B5EF4-FFF2-40B4-BE49-F238E27FC236}">
-                <a16:creationId xmlns:a16="http://schemas.microsoft.com/office/drawing/2014/main" id="{996AD32E-3E36-FD5D-8F80-F227852DE37C}"/>
+          <p:cNvPr id="8" name="Picture 7">
+            <a:extLst>
+              <a:ext uri="{FF2B5EF4-FFF2-40B4-BE49-F238E27FC236}">
+                <a16:creationId xmlns:a16="http://schemas.microsoft.com/office/drawing/2014/main" id="{004D8C2D-061E-D8E2-154E-2C367AE7019C}"/>
               </a:ext>
             </a:extLst>
           </p:cNvPr>
@@ -7028,8 +7255,8 @@
         </p:blipFill>
         <p:spPr>
           <a:xfrm>
-            <a:off x="6019800" y="681037"/>
-            <a:ext cx="5400675" cy="4267200"/>
+            <a:off x="2199731" y="1475226"/>
+            <a:ext cx="7792537" cy="5096586"/>
           </a:xfrm>
           <a:prstGeom prst="rect">
             <a:avLst/>
@@ -7039,7 +7266,7 @@
     </p:spTree>
     <p:extLst>
       <p:ext uri="{BB962C8B-B14F-4D97-AF65-F5344CB8AC3E}">
-        <p14:creationId xmlns:p14="http://schemas.microsoft.com/office/powerpoint/2010/main" val="2713355754"/>
+        <p14:creationId xmlns:p14="http://schemas.microsoft.com/office/powerpoint/2010/main" val="4136375017"/>
       </p:ext>
     </p:extLst>
   </p:cSld>
@@ -7071,7 +7298,7 @@
           <p:cNvPr id="2" name="Title 1">
             <a:extLst>
               <a:ext uri="{FF2B5EF4-FFF2-40B4-BE49-F238E27FC236}">
-                <a16:creationId xmlns:a16="http://schemas.microsoft.com/office/drawing/2014/main" id="{6723FDF9-B596-7CAD-2C57-A539302FD5ED}"/>
+                <a16:creationId xmlns:a16="http://schemas.microsoft.com/office/drawing/2014/main" id="{FB8A6BE0-E966-93AD-F411-DC44B85C3646}"/>
               </a:ext>
             </a:extLst>
           </p:cNvPr>
@@ -7087,10 +7314,9 @@
           <a:bodyPr/>
           <a:lstStyle/>
           <a:p>
-            <a:pPr algn="ctr"/>
             <a:r>
               <a:rPr lang="en-US" b="1" dirty="0"/>
-              <a:t>Other findings</a:t>
+              <a:t>Result</a:t>
             </a:r>
           </a:p>
         </p:txBody>
@@ -7100,7 +7326,7 @@
           <p:cNvPr id="3" name="Content Placeholder 2">
             <a:extLst>
               <a:ext uri="{FF2B5EF4-FFF2-40B4-BE49-F238E27FC236}">
-                <a16:creationId xmlns:a16="http://schemas.microsoft.com/office/drawing/2014/main" id="{70E58C0E-CA1B-669D-293F-DA172BEAACBA}"/>
+                <a16:creationId xmlns:a16="http://schemas.microsoft.com/office/drawing/2014/main" id="{C6491CDD-2DED-489B-8A10-151C6C020DC1}"/>
               </a:ext>
             </a:extLst>
           </p:cNvPr>
@@ -7113,9 +7339,7 @@
         </p:nvSpPr>
         <p:spPr/>
         <p:txBody>
-          <a:bodyPr>
-            <a:normAutofit/>
-          </a:bodyPr>
+          <a:bodyPr/>
           <a:lstStyle/>
           <a:p>
             <a:pPr marL="0" indent="0">
@@ -7123,49 +7347,54 @@
             </a:pPr>
             <a:r>
               <a:rPr lang="en-US" dirty="0"/>
-              <a:t>The following factors are significantly affect housing price positively.</a:t>
+              <a:t>Prediction model that</a:t>
             </a:r>
           </a:p>
           <a:p>
             <a:pPr lvl="1"/>
             <a:r>
               <a:rPr lang="en-US" dirty="0"/>
-              <a:t>Floor area</a:t>
+              <a:t>Can explain </a:t>
+            </a:r>
+            <a:r>
+              <a:rPr lang="en-US" b="1" dirty="0">
+                <a:solidFill>
+                  <a:schemeClr val="accent1"/>
+                </a:solidFill>
+              </a:rPr>
+              <a:t>79.8%</a:t>
+            </a:r>
+            <a:r>
+              <a:rPr lang="en-US" dirty="0"/>
+              <a:t> of data </a:t>
             </a:r>
           </a:p>
           <a:p>
             <a:pPr lvl="1"/>
             <a:r>
               <a:rPr lang="en-US" dirty="0"/>
-              <a:t>Number of bathrooms</a:t>
-            </a:r>
-          </a:p>
-          <a:p>
-            <a:pPr lvl="1"/>
+              <a:t>The average error of </a:t>
+            </a:r>
+            <a:r>
+              <a:rPr lang="en-US" b="1" dirty="0">
+                <a:solidFill>
+                  <a:schemeClr val="accent1"/>
+                </a:solidFill>
+              </a:rPr>
+              <a:t>971K</a:t>
+            </a:r>
             <a:r>
               <a:rPr lang="en-US" dirty="0"/>
-              <a:t>Number of nearby stations (within 1km)</a:t>
-            </a:r>
-          </a:p>
-          <a:p>
-            <a:pPr lvl="1"/>
+              <a:t> THB</a:t>
+            </a:r>
+          </a:p>
+          <a:p>
+            <a:pPr marL="457200" lvl="1" indent="0">
+              <a:buNone/>
+            </a:pPr>
             <a:r>
               <a:rPr lang="en-US" dirty="0"/>
-              <a:t>Total area of the land</a:t>
-            </a:r>
-          </a:p>
-          <a:p>
-            <a:pPr lvl="1"/>
-            <a:r>
-              <a:rPr lang="en-US" dirty="0"/>
-              <a:t>Year built</a:t>
-            </a:r>
-          </a:p>
-          <a:p>
-            <a:pPr lvl="1"/>
-            <a:r>
-              <a:rPr lang="en-US" dirty="0"/>
-              <a:t>Number of bedrooms</a:t>
+              <a:t>approximately</a:t>
             </a:r>
           </a:p>
         </p:txBody>
@@ -7175,7 +7404,7 @@
           <p:cNvPr id="4" name="Slide Number Placeholder 3">
             <a:extLst>
               <a:ext uri="{FF2B5EF4-FFF2-40B4-BE49-F238E27FC236}">
-                <a16:creationId xmlns:a16="http://schemas.microsoft.com/office/drawing/2014/main" id="{09750248-72D6-C397-181A-BF727D58C4D1}"/>
+                <a16:creationId xmlns:a16="http://schemas.microsoft.com/office/drawing/2014/main" id="{52229B81-D7A2-29B1-7673-E477ABEC2B38}"/>
               </a:ext>
             </a:extLst>
           </p:cNvPr>
@@ -7199,184 +7428,70 @@
           </a:p>
         </p:txBody>
       </p:sp>
-      <p:sp>
-        <p:nvSpPr>
-          <p:cNvPr id="7" name="Arrow: Right 6">
-            <a:extLst>
-              <a:ext uri="{FF2B5EF4-FFF2-40B4-BE49-F238E27FC236}">
-                <a16:creationId xmlns:a16="http://schemas.microsoft.com/office/drawing/2014/main" id="{75933EC6-8C4D-50A7-13C7-30CA63AB2BED}"/>
-              </a:ext>
-            </a:extLst>
-          </p:cNvPr>
-          <p:cNvSpPr/>
+      <p:pic>
+        <p:nvPicPr>
+          <p:cNvPr id="9" name="Picture 8">
+            <a:extLst>
+              <a:ext uri="{FF2B5EF4-FFF2-40B4-BE49-F238E27FC236}">
+                <a16:creationId xmlns:a16="http://schemas.microsoft.com/office/drawing/2014/main" id="{D1DDABA6-E099-8189-9BCC-DFA6B924B357}"/>
+              </a:ext>
+            </a:extLst>
+          </p:cNvPr>
+          <p:cNvPicPr>
+            <a:picLocks noChangeAspect="1"/>
+          </p:cNvPicPr>
           <p:nvPr/>
-        </p:nvSpPr>
-        <p:spPr>
-          <a:xfrm rot="16200000">
-            <a:off x="8872019" y="3321925"/>
-            <a:ext cx="1385094" cy="606671"/>
-          </a:xfrm>
-          <a:prstGeom prst="rightArrow">
-            <a:avLst>
-              <a:gd name="adj1" fmla="val 50000"/>
-              <a:gd name="adj2" fmla="val 81488"/>
-            </a:avLst>
-          </a:prstGeom>
-          <a:solidFill>
-            <a:srgbClr val="00B050"/>
-          </a:solidFill>
-          <a:ln>
-            <a:solidFill>
-              <a:schemeClr val="accent6">
-                <a:lumMod val="50000"/>
-              </a:schemeClr>
-            </a:solidFill>
-          </a:ln>
-        </p:spPr>
-        <p:style>
-          <a:lnRef idx="2">
-            <a:schemeClr val="accent1">
-              <a:shade val="15000"/>
-            </a:schemeClr>
-          </a:lnRef>
-          <a:fillRef idx="1">
-            <a:schemeClr val="accent1"/>
-          </a:fillRef>
-          <a:effectRef idx="0">
-            <a:schemeClr val="accent1"/>
-          </a:effectRef>
-          <a:fontRef idx="minor">
-            <a:schemeClr val="lt1"/>
-          </a:fontRef>
-        </p:style>
-        <p:txBody>
-          <a:bodyPr rtlCol="0" anchor="ctr"/>
-          <a:lstStyle/>
-          <a:p>
-            <a:pPr algn="ctr"/>
-            <a:endParaRPr lang="en-US"/>
-          </a:p>
-        </p:txBody>
-      </p:sp>
-      <p:sp>
-        <p:nvSpPr>
-          <p:cNvPr id="9" name="Arrow: Right 8">
-            <a:extLst>
-              <a:ext uri="{FF2B5EF4-FFF2-40B4-BE49-F238E27FC236}">
-                <a16:creationId xmlns:a16="http://schemas.microsoft.com/office/drawing/2014/main" id="{0E43C9E1-FB20-F24E-CE72-F0CC4F9CFE0B}"/>
-              </a:ext>
-            </a:extLst>
-          </p:cNvPr>
-          <p:cNvSpPr/>
-          <p:nvPr/>
-        </p:nvSpPr>
-        <p:spPr>
-          <a:xfrm rot="16200000">
-            <a:off x="8148120" y="3321924"/>
-            <a:ext cx="1385094" cy="606671"/>
-          </a:xfrm>
-          <a:prstGeom prst="rightArrow">
-            <a:avLst>
-              <a:gd name="adj1" fmla="val 50000"/>
-              <a:gd name="adj2" fmla="val 81488"/>
-            </a:avLst>
-          </a:prstGeom>
-          <a:solidFill>
-            <a:srgbClr val="00B050"/>
-          </a:solidFill>
-          <a:ln>
-            <a:solidFill>
-              <a:schemeClr val="accent6">
-                <a:lumMod val="50000"/>
-              </a:schemeClr>
-            </a:solidFill>
-          </a:ln>
-        </p:spPr>
-        <p:style>
-          <a:lnRef idx="2">
-            <a:schemeClr val="accent1">
-              <a:shade val="15000"/>
-            </a:schemeClr>
-          </a:lnRef>
-          <a:fillRef idx="1">
-            <a:schemeClr val="accent1"/>
-          </a:fillRef>
-          <a:effectRef idx="0">
-            <a:schemeClr val="accent1"/>
-          </a:effectRef>
-          <a:fontRef idx="minor">
-            <a:schemeClr val="lt1"/>
-          </a:fontRef>
-        </p:style>
-        <p:txBody>
-          <a:bodyPr rtlCol="0" anchor="ctr"/>
-          <a:lstStyle/>
-          <a:p>
-            <a:pPr algn="ctr"/>
-            <a:endParaRPr lang="en-US"/>
-          </a:p>
-        </p:txBody>
-      </p:sp>
-      <p:sp>
-        <p:nvSpPr>
-          <p:cNvPr id="10" name="Plus Sign 9">
-            <a:extLst>
-              <a:ext uri="{FF2B5EF4-FFF2-40B4-BE49-F238E27FC236}">
-                <a16:creationId xmlns:a16="http://schemas.microsoft.com/office/drawing/2014/main" id="{F6FECDB0-1530-7ED8-4308-B67E5BFA9E88}"/>
-              </a:ext>
-            </a:extLst>
-          </p:cNvPr>
-          <p:cNvSpPr/>
-          <p:nvPr/>
-        </p:nvSpPr>
+        </p:nvPicPr>
+        <p:blipFill>
+          <a:blip r:embed="rId3"/>
+          <a:stretch>
+            <a:fillRect/>
+          </a:stretch>
+        </p:blipFill>
         <p:spPr>
           <a:xfrm>
-            <a:off x="9791701" y="2713639"/>
-            <a:ext cx="606672" cy="606672"/>
-          </a:xfrm>
-          <a:prstGeom prst="mathPlus">
+            <a:off x="838200" y="5197475"/>
+            <a:ext cx="10363200" cy="1295400"/>
+          </a:xfrm>
+          <a:prstGeom prst="rect">
             <a:avLst/>
           </a:prstGeom>
-          <a:solidFill>
-            <a:srgbClr val="00B050"/>
-          </a:solidFill>
-          <a:ln>
-            <a:solidFill>
-              <a:schemeClr val="accent6">
-                <a:lumMod val="50000"/>
-              </a:schemeClr>
-            </a:solidFill>
-          </a:ln>
-        </p:spPr>
-        <p:style>
-          <a:lnRef idx="2">
-            <a:schemeClr val="accent1">
-              <a:shade val="15000"/>
-            </a:schemeClr>
-          </a:lnRef>
-          <a:fillRef idx="1">
-            <a:schemeClr val="accent1"/>
-          </a:fillRef>
-          <a:effectRef idx="0">
-            <a:schemeClr val="accent1"/>
-          </a:effectRef>
-          <a:fontRef idx="minor">
-            <a:schemeClr val="lt1"/>
-          </a:fontRef>
-        </p:style>
-        <p:txBody>
-          <a:bodyPr rtlCol="0" anchor="ctr"/>
-          <a:lstStyle/>
-          <a:p>
-            <a:pPr algn="ctr"/>
-            <a:endParaRPr lang="en-US"/>
-          </a:p>
-        </p:txBody>
-      </p:sp>
+        </p:spPr>
+      </p:pic>
+      <p:pic>
+        <p:nvPicPr>
+          <p:cNvPr id="10" name="Picture 9">
+            <a:extLst>
+              <a:ext uri="{FF2B5EF4-FFF2-40B4-BE49-F238E27FC236}">
+                <a16:creationId xmlns:a16="http://schemas.microsoft.com/office/drawing/2014/main" id="{7A6AE099-9154-9D31-7B87-2B2356DEDCF8}"/>
+              </a:ext>
+            </a:extLst>
+          </p:cNvPr>
+          <p:cNvPicPr>
+            <a:picLocks noChangeAspect="1"/>
+          </p:cNvPicPr>
+          <p:nvPr/>
+        </p:nvPicPr>
+        <p:blipFill>
+          <a:blip r:embed="rId4"/>
+          <a:stretch>
+            <a:fillRect/>
+          </a:stretch>
+        </p:blipFill>
+        <p:spPr>
+          <a:xfrm>
+            <a:off x="5876104" y="719138"/>
+            <a:ext cx="5400675" cy="4343400"/>
+          </a:xfrm>
+          <a:prstGeom prst="rect">
+            <a:avLst/>
+          </a:prstGeom>
+        </p:spPr>
+      </p:pic>
     </p:spTree>
     <p:extLst>
       <p:ext uri="{BB962C8B-B14F-4D97-AF65-F5344CB8AC3E}">
-        <p14:creationId xmlns:p14="http://schemas.microsoft.com/office/powerpoint/2010/main" val="3432038458"/>
+        <p14:creationId xmlns:p14="http://schemas.microsoft.com/office/powerpoint/2010/main" val="2713355754"/>
       </p:ext>
     </p:extLst>
   </p:cSld>
@@ -7408,7 +7523,7 @@
           <p:cNvPr id="2" name="Title 1">
             <a:extLst>
               <a:ext uri="{FF2B5EF4-FFF2-40B4-BE49-F238E27FC236}">
-                <a16:creationId xmlns:a16="http://schemas.microsoft.com/office/drawing/2014/main" id="{1E9777B6-1D18-9AE4-4B2D-A39F96472237}"/>
+                <a16:creationId xmlns:a16="http://schemas.microsoft.com/office/drawing/2014/main" id="{6723FDF9-B596-7CAD-2C57-A539302FD5ED}"/>
               </a:ext>
             </a:extLst>
           </p:cNvPr>
@@ -7437,7 +7552,7 @@
           <p:cNvPr id="3" name="Content Placeholder 2">
             <a:extLst>
               <a:ext uri="{FF2B5EF4-FFF2-40B4-BE49-F238E27FC236}">
-                <a16:creationId xmlns:a16="http://schemas.microsoft.com/office/drawing/2014/main" id="{E8A09B5F-DE2C-7CF2-CBF8-F50A988F953A}"/>
+                <a16:creationId xmlns:a16="http://schemas.microsoft.com/office/drawing/2014/main" id="{70E58C0E-CA1B-669D-293F-DA172BEAACBA}"/>
               </a:ext>
             </a:extLst>
           </p:cNvPr>
@@ -7448,33 +7563,61 @@
             <p:ph idx="1"/>
           </p:nvPr>
         </p:nvSpPr>
-        <p:spPr>
-          <a:xfrm>
-            <a:off x="838200" y="1690688"/>
-            <a:ext cx="10515600" cy="4351338"/>
-          </a:xfrm>
-        </p:spPr>
+        <p:spPr/>
         <p:txBody>
           <a:bodyPr>
             <a:normAutofit/>
           </a:bodyPr>
           <a:lstStyle/>
           <a:p>
-            <a:pPr marL="0" indent="0" algn="ctr">
+            <a:pPr marL="0" indent="0">
               <a:buNone/>
             </a:pPr>
             <a:r>
-              <a:rPr lang="en-US" sz="2400" dirty="0"/>
-              <a:t>Top 10 district/subdistrict that will have</a:t>
-            </a:r>
-          </a:p>
-          <a:p>
-            <a:pPr marL="0" indent="0" algn="ctr">
-              <a:buNone/>
-            </a:pPr>
-            <a:r>
-              <a:rPr lang="en-US" sz="2400" dirty="0"/>
-              <a:t>higher housing price according to the model.</a:t>
+              <a:rPr lang="en-US" dirty="0"/>
+              <a:t>The following factors are significantly affect housing price positively.</a:t>
+            </a:r>
+          </a:p>
+          <a:p>
+            <a:pPr lvl="1"/>
+            <a:r>
+              <a:rPr lang="en-US" dirty="0"/>
+              <a:t>Floor area</a:t>
+            </a:r>
+          </a:p>
+          <a:p>
+            <a:pPr lvl="1"/>
+            <a:r>
+              <a:rPr lang="en-US" dirty="0"/>
+              <a:t>Number of bathrooms</a:t>
+            </a:r>
+          </a:p>
+          <a:p>
+            <a:pPr lvl="1"/>
+            <a:r>
+              <a:rPr lang="en-US" dirty="0"/>
+              <a:t>Number of nearby stations (within 1km)</a:t>
+            </a:r>
+          </a:p>
+          <a:p>
+            <a:pPr lvl="1"/>
+            <a:r>
+              <a:rPr lang="en-US" dirty="0"/>
+              <a:t>Total area of the land</a:t>
+            </a:r>
+          </a:p>
+          <a:p>
+            <a:pPr lvl="1"/>
+            <a:r>
+              <a:rPr lang="en-US" dirty="0"/>
+              <a:t>Year built</a:t>
+            </a:r>
+          </a:p>
+          <a:p>
+            <a:pPr lvl="1"/>
+            <a:r>
+              <a:rPr lang="en-US" dirty="0"/>
+              <a:t>Number of bedrooms</a:t>
             </a:r>
           </a:p>
         </p:txBody>
@@ -7484,7 +7627,7 @@
           <p:cNvPr id="4" name="Slide Number Placeholder 3">
             <a:extLst>
               <a:ext uri="{FF2B5EF4-FFF2-40B4-BE49-F238E27FC236}">
-                <a16:creationId xmlns:a16="http://schemas.microsoft.com/office/drawing/2014/main" id="{6B418609-1306-BE71-6DA7-0D5AA915DE99}"/>
+                <a16:creationId xmlns:a16="http://schemas.microsoft.com/office/drawing/2014/main" id="{09750248-72D6-C397-181A-BF727D58C4D1}"/>
               </a:ext>
             </a:extLst>
           </p:cNvPr>
@@ -7508,40 +7651,184 @@
           </a:p>
         </p:txBody>
       </p:sp>
-      <p:pic>
-        <p:nvPicPr>
-          <p:cNvPr id="11" name="Picture 10">
-            <a:extLst>
-              <a:ext uri="{FF2B5EF4-FFF2-40B4-BE49-F238E27FC236}">
-                <a16:creationId xmlns:a16="http://schemas.microsoft.com/office/drawing/2014/main" id="{1F533B49-341A-A6F0-4121-CD5515FC6E7F}"/>
-              </a:ext>
-            </a:extLst>
-          </p:cNvPr>
-          <p:cNvPicPr>
-            <a:picLocks noChangeAspect="1"/>
-          </p:cNvPicPr>
+      <p:sp>
+        <p:nvSpPr>
+          <p:cNvPr id="7" name="Arrow: Right 6">
+            <a:extLst>
+              <a:ext uri="{FF2B5EF4-FFF2-40B4-BE49-F238E27FC236}">
+                <a16:creationId xmlns:a16="http://schemas.microsoft.com/office/drawing/2014/main" id="{75933EC6-8C4D-50A7-13C7-30CA63AB2BED}"/>
+              </a:ext>
+            </a:extLst>
+          </p:cNvPr>
+          <p:cNvSpPr/>
           <p:nvPr/>
-        </p:nvPicPr>
-        <p:blipFill>
-          <a:blip r:embed="rId2"/>
-          <a:stretch>
-            <a:fillRect/>
-          </a:stretch>
-        </p:blipFill>
+        </p:nvSpPr>
+        <p:spPr>
+          <a:xfrm rot="16200000">
+            <a:off x="8872019" y="3321925"/>
+            <a:ext cx="1385094" cy="606671"/>
+          </a:xfrm>
+          <a:prstGeom prst="rightArrow">
+            <a:avLst>
+              <a:gd name="adj1" fmla="val 50000"/>
+              <a:gd name="adj2" fmla="val 81488"/>
+            </a:avLst>
+          </a:prstGeom>
+          <a:solidFill>
+            <a:srgbClr val="00B050"/>
+          </a:solidFill>
+          <a:ln>
+            <a:solidFill>
+              <a:schemeClr val="accent6">
+                <a:lumMod val="50000"/>
+              </a:schemeClr>
+            </a:solidFill>
+          </a:ln>
+        </p:spPr>
+        <p:style>
+          <a:lnRef idx="2">
+            <a:schemeClr val="accent1">
+              <a:shade val="15000"/>
+            </a:schemeClr>
+          </a:lnRef>
+          <a:fillRef idx="1">
+            <a:schemeClr val="accent1"/>
+          </a:fillRef>
+          <a:effectRef idx="0">
+            <a:schemeClr val="accent1"/>
+          </a:effectRef>
+          <a:fontRef idx="minor">
+            <a:schemeClr val="lt1"/>
+          </a:fontRef>
+        </p:style>
+        <p:txBody>
+          <a:bodyPr rtlCol="0" anchor="ctr"/>
+          <a:lstStyle/>
+          <a:p>
+            <a:pPr algn="ctr"/>
+            <a:endParaRPr lang="en-US"/>
+          </a:p>
+        </p:txBody>
+      </p:sp>
+      <p:sp>
+        <p:nvSpPr>
+          <p:cNvPr id="9" name="Arrow: Right 8">
+            <a:extLst>
+              <a:ext uri="{FF2B5EF4-FFF2-40B4-BE49-F238E27FC236}">
+                <a16:creationId xmlns:a16="http://schemas.microsoft.com/office/drawing/2014/main" id="{0E43C9E1-FB20-F24E-CE72-F0CC4F9CFE0B}"/>
+              </a:ext>
+            </a:extLst>
+          </p:cNvPr>
+          <p:cNvSpPr/>
+          <p:nvPr/>
+        </p:nvSpPr>
+        <p:spPr>
+          <a:xfrm rot="16200000">
+            <a:off x="8148120" y="3321924"/>
+            <a:ext cx="1385094" cy="606671"/>
+          </a:xfrm>
+          <a:prstGeom prst="rightArrow">
+            <a:avLst>
+              <a:gd name="adj1" fmla="val 50000"/>
+              <a:gd name="adj2" fmla="val 81488"/>
+            </a:avLst>
+          </a:prstGeom>
+          <a:solidFill>
+            <a:srgbClr val="00B050"/>
+          </a:solidFill>
+          <a:ln>
+            <a:solidFill>
+              <a:schemeClr val="accent6">
+                <a:lumMod val="50000"/>
+              </a:schemeClr>
+            </a:solidFill>
+          </a:ln>
+        </p:spPr>
+        <p:style>
+          <a:lnRef idx="2">
+            <a:schemeClr val="accent1">
+              <a:shade val="15000"/>
+            </a:schemeClr>
+          </a:lnRef>
+          <a:fillRef idx="1">
+            <a:schemeClr val="accent1"/>
+          </a:fillRef>
+          <a:effectRef idx="0">
+            <a:schemeClr val="accent1"/>
+          </a:effectRef>
+          <a:fontRef idx="minor">
+            <a:schemeClr val="lt1"/>
+          </a:fontRef>
+        </p:style>
+        <p:txBody>
+          <a:bodyPr rtlCol="0" anchor="ctr"/>
+          <a:lstStyle/>
+          <a:p>
+            <a:pPr algn="ctr"/>
+            <a:endParaRPr lang="en-US"/>
+          </a:p>
+        </p:txBody>
+      </p:sp>
+      <p:sp>
+        <p:nvSpPr>
+          <p:cNvPr id="10" name="Plus Sign 9">
+            <a:extLst>
+              <a:ext uri="{FF2B5EF4-FFF2-40B4-BE49-F238E27FC236}">
+                <a16:creationId xmlns:a16="http://schemas.microsoft.com/office/drawing/2014/main" id="{F6FECDB0-1530-7ED8-4308-B67E5BFA9E88}"/>
+              </a:ext>
+            </a:extLst>
+          </p:cNvPr>
+          <p:cNvSpPr/>
+          <p:nvPr/>
+        </p:nvSpPr>
         <p:spPr>
           <a:xfrm>
-            <a:off x="4787869" y="2690168"/>
-            <a:ext cx="2616262" cy="3802707"/>
-          </a:xfrm>
-          <a:prstGeom prst="rect">
+            <a:off x="9791701" y="2713639"/>
+            <a:ext cx="606672" cy="606672"/>
+          </a:xfrm>
+          <a:prstGeom prst="mathPlus">
             <a:avLst/>
           </a:prstGeom>
-        </p:spPr>
-      </p:pic>
+          <a:solidFill>
+            <a:srgbClr val="00B050"/>
+          </a:solidFill>
+          <a:ln>
+            <a:solidFill>
+              <a:schemeClr val="accent6">
+                <a:lumMod val="50000"/>
+              </a:schemeClr>
+            </a:solidFill>
+          </a:ln>
+        </p:spPr>
+        <p:style>
+          <a:lnRef idx="2">
+            <a:schemeClr val="accent1">
+              <a:shade val="15000"/>
+            </a:schemeClr>
+          </a:lnRef>
+          <a:fillRef idx="1">
+            <a:schemeClr val="accent1"/>
+          </a:fillRef>
+          <a:effectRef idx="0">
+            <a:schemeClr val="accent1"/>
+          </a:effectRef>
+          <a:fontRef idx="minor">
+            <a:schemeClr val="lt1"/>
+          </a:fontRef>
+        </p:style>
+        <p:txBody>
+          <a:bodyPr rtlCol="0" anchor="ctr"/>
+          <a:lstStyle/>
+          <a:p>
+            <a:pPr algn="ctr"/>
+            <a:endParaRPr lang="en-US"/>
+          </a:p>
+        </p:txBody>
+      </p:sp>
     </p:spTree>
     <p:extLst>
       <p:ext uri="{BB962C8B-B14F-4D97-AF65-F5344CB8AC3E}">
-        <p14:creationId xmlns:p14="http://schemas.microsoft.com/office/powerpoint/2010/main" val="1643273746"/>
+        <p14:creationId xmlns:p14="http://schemas.microsoft.com/office/powerpoint/2010/main" val="3432038458"/>
       </p:ext>
     </p:extLst>
   </p:cSld>
@@ -7573,6 +7860,171 @@
           <p:cNvPr id="2" name="Title 1">
             <a:extLst>
               <a:ext uri="{FF2B5EF4-FFF2-40B4-BE49-F238E27FC236}">
+                <a16:creationId xmlns:a16="http://schemas.microsoft.com/office/drawing/2014/main" id="{1E9777B6-1D18-9AE4-4B2D-A39F96472237}"/>
+              </a:ext>
+            </a:extLst>
+          </p:cNvPr>
+          <p:cNvSpPr>
+            <a:spLocks noGrp="1"/>
+          </p:cNvSpPr>
+          <p:nvPr>
+            <p:ph type="title"/>
+          </p:nvPr>
+        </p:nvSpPr>
+        <p:spPr/>
+        <p:txBody>
+          <a:bodyPr/>
+          <a:lstStyle/>
+          <a:p>
+            <a:pPr algn="ctr"/>
+            <a:r>
+              <a:rPr lang="en-US" b="1" dirty="0"/>
+              <a:t>Other findings</a:t>
+            </a:r>
+          </a:p>
+        </p:txBody>
+      </p:sp>
+      <p:sp>
+        <p:nvSpPr>
+          <p:cNvPr id="3" name="Content Placeholder 2">
+            <a:extLst>
+              <a:ext uri="{FF2B5EF4-FFF2-40B4-BE49-F238E27FC236}">
+                <a16:creationId xmlns:a16="http://schemas.microsoft.com/office/drawing/2014/main" id="{E8A09B5F-DE2C-7CF2-CBF8-F50A988F953A}"/>
+              </a:ext>
+            </a:extLst>
+          </p:cNvPr>
+          <p:cNvSpPr>
+            <a:spLocks noGrp="1"/>
+          </p:cNvSpPr>
+          <p:nvPr>
+            <p:ph idx="1"/>
+          </p:nvPr>
+        </p:nvSpPr>
+        <p:spPr>
+          <a:xfrm>
+            <a:off x="838200" y="1690688"/>
+            <a:ext cx="10515600" cy="4351338"/>
+          </a:xfrm>
+        </p:spPr>
+        <p:txBody>
+          <a:bodyPr>
+            <a:normAutofit/>
+          </a:bodyPr>
+          <a:lstStyle/>
+          <a:p>
+            <a:pPr marL="0" indent="0" algn="ctr">
+              <a:buNone/>
+            </a:pPr>
+            <a:r>
+              <a:rPr lang="en-US" sz="2400" dirty="0"/>
+              <a:t>Top 10 district/subdistrict that will have</a:t>
+            </a:r>
+          </a:p>
+          <a:p>
+            <a:pPr marL="0" indent="0" algn="ctr">
+              <a:buNone/>
+            </a:pPr>
+            <a:r>
+              <a:rPr lang="en-US" sz="2400" dirty="0"/>
+              <a:t>higher housing price according to the model.</a:t>
+            </a:r>
+          </a:p>
+        </p:txBody>
+      </p:sp>
+      <p:sp>
+        <p:nvSpPr>
+          <p:cNvPr id="4" name="Slide Number Placeholder 3">
+            <a:extLst>
+              <a:ext uri="{FF2B5EF4-FFF2-40B4-BE49-F238E27FC236}">
+                <a16:creationId xmlns:a16="http://schemas.microsoft.com/office/drawing/2014/main" id="{6B418609-1306-BE71-6DA7-0D5AA915DE99}"/>
+              </a:ext>
+            </a:extLst>
+          </p:cNvPr>
+          <p:cNvSpPr>
+            <a:spLocks noGrp="1"/>
+          </p:cNvSpPr>
+          <p:nvPr>
+            <p:ph type="sldNum" sz="quarter" idx="12"/>
+          </p:nvPr>
+        </p:nvSpPr>
+        <p:spPr/>
+        <p:txBody>
+          <a:bodyPr/>
+          <a:lstStyle/>
+          <a:p>
+            <a:fld id="{640C5978-D207-4356-A33B-DAFE34A7F8D2}" type="slidenum">
+              <a:rPr lang="en-US" smtClean="0"/>
+              <a:t>18</a:t>
+            </a:fld>
+            <a:endParaRPr lang="en-US"/>
+          </a:p>
+        </p:txBody>
+      </p:sp>
+      <p:pic>
+        <p:nvPicPr>
+          <p:cNvPr id="11" name="Picture 10">
+            <a:extLst>
+              <a:ext uri="{FF2B5EF4-FFF2-40B4-BE49-F238E27FC236}">
+                <a16:creationId xmlns:a16="http://schemas.microsoft.com/office/drawing/2014/main" id="{1F533B49-341A-A6F0-4121-CD5515FC6E7F}"/>
+              </a:ext>
+            </a:extLst>
+          </p:cNvPr>
+          <p:cNvPicPr>
+            <a:picLocks noChangeAspect="1"/>
+          </p:cNvPicPr>
+          <p:nvPr/>
+        </p:nvPicPr>
+        <p:blipFill>
+          <a:blip r:embed="rId2"/>
+          <a:stretch>
+            <a:fillRect/>
+          </a:stretch>
+        </p:blipFill>
+        <p:spPr>
+          <a:xfrm>
+            <a:off x="4787869" y="2690168"/>
+            <a:ext cx="2616262" cy="3802707"/>
+          </a:xfrm>
+          <a:prstGeom prst="rect">
+            <a:avLst/>
+          </a:prstGeom>
+        </p:spPr>
+      </p:pic>
+    </p:spTree>
+    <p:extLst>
+      <p:ext uri="{BB962C8B-B14F-4D97-AF65-F5344CB8AC3E}">
+        <p14:creationId xmlns:p14="http://schemas.microsoft.com/office/powerpoint/2010/main" val="1643273746"/>
+      </p:ext>
+    </p:extLst>
+  </p:cSld>
+  <p:clrMapOvr>
+    <a:masterClrMapping/>
+  </p:clrMapOvr>
+</p:sld>
+</file>
+
+<file path=ppt/slides/slide19.xml><?xml version="1.0" encoding="utf-8"?>
+<p:sld xmlns:a="http://schemas.openxmlformats.org/drawingml/2006/main" xmlns:r="http://schemas.openxmlformats.org/officeDocument/2006/relationships" xmlns:p="http://schemas.openxmlformats.org/presentationml/2006/main">
+  <p:cSld>
+    <p:spTree>
+      <p:nvGrpSpPr>
+        <p:cNvPr id="1" name=""/>
+        <p:cNvGrpSpPr/>
+        <p:nvPr/>
+      </p:nvGrpSpPr>
+      <p:grpSpPr>
+        <a:xfrm>
+          <a:off x="0" y="0"/>
+          <a:ext cx="0" cy="0"/>
+          <a:chOff x="0" y="0"/>
+          <a:chExt cx="0" cy="0"/>
+        </a:xfrm>
+      </p:grpSpPr>
+      <p:sp>
+        <p:nvSpPr>
+          <p:cNvPr id="2" name="Title 1">
+            <a:extLst>
+              <a:ext uri="{FF2B5EF4-FFF2-40B4-BE49-F238E27FC236}">
                 <a16:creationId xmlns:a16="http://schemas.microsoft.com/office/drawing/2014/main" id="{AFE45B05-502C-7008-8FD5-2B91973F5067}"/>
               </a:ext>
             </a:extLst>
@@ -7683,7 +8135,7 @@
           <a:p>
             <a:fld id="{640C5978-D207-4356-A33B-DAFE34A7F8D2}" type="slidenum">
               <a:rPr lang="en-US" smtClean="0"/>
-              <a:t>18</a:t>
+              <a:t>19</a:t>
             </a:fld>
             <a:endParaRPr lang="en-US"/>
           </a:p>

</xml_diff>